<commit_message>
revised regex demo and saved matthias nlp stuff
</commit_message>
<xml_diff>
--- a/5_seminar/Contents_Part_02/slides/Präsentation_Teil2_Lisa.pptx
+++ b/5_seminar/Contents_Part_02/slides/Präsentation_Teil2_Lisa.pptx
@@ -5,7 +5,7 @@
     <p:sldMasterId id="2147483648" r:id="rId1"/>
   </p:sldMasterIdLst>
   <p:notesMasterIdLst>
-    <p:notesMasterId r:id="rId28"/>
+    <p:notesMasterId r:id="rId30"/>
   </p:notesMasterIdLst>
   <p:sldIdLst>
     <p:sldId id="303" r:id="rId2"/>
@@ -28,12 +28,14 @@
     <p:sldId id="320" r:id="rId19"/>
     <p:sldId id="328" r:id="rId20"/>
     <p:sldId id="322" r:id="rId21"/>
-    <p:sldId id="329" r:id="rId22"/>
-    <p:sldId id="327" r:id="rId23"/>
-    <p:sldId id="324" r:id="rId24"/>
-    <p:sldId id="332" r:id="rId25"/>
-    <p:sldId id="331" r:id="rId26"/>
-    <p:sldId id="274" r:id="rId27"/>
+    <p:sldId id="333" r:id="rId22"/>
+    <p:sldId id="334" r:id="rId23"/>
+    <p:sldId id="329" r:id="rId24"/>
+    <p:sldId id="327" r:id="rId25"/>
+    <p:sldId id="324" r:id="rId26"/>
+    <p:sldId id="332" r:id="rId27"/>
+    <p:sldId id="331" r:id="rId28"/>
+    <p:sldId id="274" r:id="rId29"/>
   </p:sldIdLst>
   <p:sldSz cx="12192000" cy="6858000"/>
   <p:notesSz cx="6858000" cy="9144000"/>
@@ -1465,31 +1467,6 @@
           <a:bodyPr/>
           <a:lstStyle/>
           <a:p>
-            <a:r>
-              <a:rPr lang="de-DE"/>
-              <a:t>Ziel ist möglichst gute Suchergebnisse zu liefern</a:t>
-            </a:r>
-          </a:p>
-          <a:p>
-            <a:r>
-              <a:rPr lang="de-DE"/>
-              <a:t>Dafür werden verschiedene Verfahren eingesetzt. </a:t>
-            </a:r>
-          </a:p>
-          <a:p>
-            <a:r>
-              <a:rPr lang="de-DE"/>
-              <a:t>Stemming (Grundformenreduktion) ist ein Verfahren, mit dem verschiedene morphologische Varianten eines Wortes auf ihren gemeinsamen Wortstamm (stem) zurückgeführt werden </a:t>
-            </a:r>
-          </a:p>
-          <a:p>
-            <a:r>
-              <a:rPr lang="de-DE"/>
-              <a:t>Die Idee: die eigentliche lexikalische Bedeutung eines Wortes ist in seinem Stamm zu finden</a:t>
-            </a:r>
-            <a:endParaRPr lang="en-US"/>
-          </a:p>
-          <a:p>
             <a:pPr marL="0" marR="0" lvl="0" indent="0" algn="l" defTabSz="914400" rtl="0" eaLnBrk="1" fontAlgn="auto" latinLnBrk="0" hangingPunct="1">
               <a:lnSpc>
                 <a:spcPct val="100000"/>
@@ -1537,7 +1514,7 @@
     </p:spTree>
     <p:extLst>
       <p:ext uri="{BB962C8B-B14F-4D97-AF65-F5344CB8AC3E}">
-        <p14:creationId xmlns:p14="http://schemas.microsoft.com/office/powerpoint/2010/main" val="217416670"/>
+        <p14:creationId xmlns:p14="http://schemas.microsoft.com/office/powerpoint/2010/main" val="2125338506"/>
       </p:ext>
     </p:extLst>
   </p:cSld>
@@ -1591,48 +1568,24 @@
           <a:bodyPr/>
           <a:lstStyle/>
           <a:p>
-            <a:r>
-              <a:rPr lang="en-US"/>
-              <a:t>Slower bc </a:t>
-            </a:r>
-            <a:r>
-              <a:rPr lang="en-US" sz="1200" b="0" i="0" u="none" strike="noStrike" kern="1200" baseline="0">
-                <a:solidFill>
-                  <a:schemeClr val="tx1"/>
-                </a:solidFill>
-                <a:latin typeface="+mn-lt"/>
-                <a:ea typeface="+mn-ea"/>
-                <a:cs typeface="+mn-cs"/>
-              </a:rPr>
-              <a:t>an</a:t>
-            </a:r>
-          </a:p>
-          <a:p>
-            <a:r>
-              <a:rPr lang="en-GB" sz="1200" b="0" i="0" u="none" strike="noStrike" kern="1200" baseline="0">
-                <a:solidFill>
-                  <a:schemeClr val="tx1"/>
-                </a:solidFill>
-                <a:latin typeface="+mn-lt"/>
-                <a:ea typeface="+mn-ea"/>
-                <a:cs typeface="+mn-cs"/>
-              </a:rPr>
-              <a:t>additional step is involved where the root form or lemma is formed by removing the affix</a:t>
-            </a:r>
-          </a:p>
-          <a:p>
-            <a:r>
-              <a:rPr lang="en-GB" sz="1200" b="0" i="0" u="none" strike="noStrike" kern="1200" baseline="0">
-                <a:solidFill>
-                  <a:schemeClr val="tx1"/>
-                </a:solidFill>
-                <a:latin typeface="+mn-lt"/>
-                <a:ea typeface="+mn-ea"/>
-                <a:cs typeface="+mn-cs"/>
-              </a:rPr>
-              <a:t>from the word if and only if the lemma is present in the dictionary</a:t>
-            </a:r>
-            <a:endParaRPr lang="en-US" dirty="0"/>
+            <a:pPr marL="0" marR="0" lvl="0" indent="0" algn="l" defTabSz="914400" rtl="0" eaLnBrk="1" fontAlgn="auto" latinLnBrk="0" hangingPunct="1">
+              <a:lnSpc>
+                <a:spcPct val="100000"/>
+              </a:lnSpc>
+              <a:spcBef>
+                <a:spcPts val="0"/>
+              </a:spcBef>
+              <a:spcAft>
+                <a:spcPts val="0"/>
+              </a:spcAft>
+              <a:buClrTx/>
+              <a:buSzTx/>
+              <a:buFontTx/>
+              <a:buNone/>
+              <a:tabLst/>
+              <a:defRPr/>
+            </a:pPr>
+            <a:endParaRPr lang="en-US" b="1"/>
           </a:p>
         </p:txBody>
       </p:sp>
@@ -1662,7 +1615,7 @@
     </p:spTree>
     <p:extLst>
       <p:ext uri="{BB962C8B-B14F-4D97-AF65-F5344CB8AC3E}">
-        <p14:creationId xmlns:p14="http://schemas.microsoft.com/office/powerpoint/2010/main" val="1596822755"/>
+        <p14:creationId xmlns:p14="http://schemas.microsoft.com/office/powerpoint/2010/main" val="1043460771"/>
       </p:ext>
     </p:extLst>
   </p:cSld>
@@ -1849,6 +1802,31 @@
           <a:bodyPr/>
           <a:lstStyle/>
           <a:p>
+            <a:r>
+              <a:rPr lang="de-DE"/>
+              <a:t>Ziel ist möglichst gute Suchergebnisse zu liefern</a:t>
+            </a:r>
+          </a:p>
+          <a:p>
+            <a:r>
+              <a:rPr lang="de-DE"/>
+              <a:t>Dafür werden verschiedene Verfahren eingesetzt. </a:t>
+            </a:r>
+          </a:p>
+          <a:p>
+            <a:r>
+              <a:rPr lang="de-DE"/>
+              <a:t>Stemming (Grundformenreduktion) ist ein Verfahren, mit dem verschiedene morphologische Varianten eines Wortes auf ihren gemeinsamen Wortstamm (stem) zurückgeführt werden </a:t>
+            </a:r>
+          </a:p>
+          <a:p>
+            <a:r>
+              <a:rPr lang="de-DE"/>
+              <a:t>Die Idee: die eigentliche lexikalische Bedeutung eines Wortes ist in seinem Stamm zu finden</a:t>
+            </a:r>
+            <a:endParaRPr lang="en-US"/>
+          </a:p>
+          <a:p>
             <a:pPr marL="0" marR="0" lvl="0" indent="0" algn="l" defTabSz="914400" rtl="0" eaLnBrk="1" fontAlgn="auto" latinLnBrk="0" hangingPunct="1">
               <a:lnSpc>
                 <a:spcPct val="100000"/>
@@ -1896,7 +1874,7 @@
     </p:spTree>
     <p:extLst>
       <p:ext uri="{BB962C8B-B14F-4D97-AF65-F5344CB8AC3E}">
-        <p14:creationId xmlns:p14="http://schemas.microsoft.com/office/powerpoint/2010/main" val="2610095379"/>
+        <p14:creationId xmlns:p14="http://schemas.microsoft.com/office/powerpoint/2010/main" val="217416670"/>
       </p:ext>
     </p:extLst>
   </p:cSld>
@@ -1950,6 +1928,131 @@
           <a:bodyPr/>
           <a:lstStyle/>
           <a:p>
+            <a:r>
+              <a:rPr lang="en-US"/>
+              <a:t>Slower bc </a:t>
+            </a:r>
+            <a:r>
+              <a:rPr lang="en-US" sz="1200" b="0" i="0" u="none" strike="noStrike" kern="1200" baseline="0">
+                <a:solidFill>
+                  <a:schemeClr val="tx1"/>
+                </a:solidFill>
+                <a:latin typeface="+mn-lt"/>
+                <a:ea typeface="+mn-ea"/>
+                <a:cs typeface="+mn-cs"/>
+              </a:rPr>
+              <a:t>an</a:t>
+            </a:r>
+          </a:p>
+          <a:p>
+            <a:r>
+              <a:rPr lang="en-GB" sz="1200" b="0" i="0" u="none" strike="noStrike" kern="1200" baseline="0">
+                <a:solidFill>
+                  <a:schemeClr val="tx1"/>
+                </a:solidFill>
+                <a:latin typeface="+mn-lt"/>
+                <a:ea typeface="+mn-ea"/>
+                <a:cs typeface="+mn-cs"/>
+              </a:rPr>
+              <a:t>additional step is involved where the root form or lemma is formed by removing the affix</a:t>
+            </a:r>
+          </a:p>
+          <a:p>
+            <a:r>
+              <a:rPr lang="en-GB" sz="1200" b="0" i="0" u="none" strike="noStrike" kern="1200" baseline="0">
+                <a:solidFill>
+                  <a:schemeClr val="tx1"/>
+                </a:solidFill>
+                <a:latin typeface="+mn-lt"/>
+                <a:ea typeface="+mn-ea"/>
+                <a:cs typeface="+mn-cs"/>
+              </a:rPr>
+              <a:t>from the word if and only if the lemma is present in the dictionary</a:t>
+            </a:r>
+            <a:endParaRPr lang="en-US" dirty="0"/>
+          </a:p>
+        </p:txBody>
+      </p:sp>
+      <p:sp>
+        <p:nvSpPr>
+          <p:cNvPr id="4" name="Foliennummernplatzhalter 3"/>
+          <p:cNvSpPr>
+            <a:spLocks noGrp="1"/>
+          </p:cNvSpPr>
+          <p:nvPr>
+            <p:ph type="sldNum" sz="quarter" idx="10"/>
+          </p:nvPr>
+        </p:nvSpPr>
+        <p:spPr/>
+        <p:txBody>
+          <a:bodyPr/>
+          <a:lstStyle/>
+          <a:p>
+            <a:fld id="{20A41429-B750-4047-B563-2878417A70E7}" type="slidenum">
+              <a:rPr lang="en-US" smtClean="0"/>
+              <a:t>24</a:t>
+            </a:fld>
+            <a:endParaRPr lang="en-US"/>
+          </a:p>
+        </p:txBody>
+      </p:sp>
+    </p:spTree>
+    <p:extLst>
+      <p:ext uri="{BB962C8B-B14F-4D97-AF65-F5344CB8AC3E}">
+        <p14:creationId xmlns:p14="http://schemas.microsoft.com/office/powerpoint/2010/main" val="1596822755"/>
+      </p:ext>
+    </p:extLst>
+  </p:cSld>
+  <p:clrMapOvr>
+    <a:masterClrMapping/>
+  </p:clrMapOvr>
+</p:notes>
+</file>
+
+<file path=ppt/notesSlides/notesSlide22.xml><?xml version="1.0" encoding="utf-8"?>
+<p:notes xmlns:a="http://schemas.openxmlformats.org/drawingml/2006/main" xmlns:r="http://schemas.openxmlformats.org/officeDocument/2006/relationships" xmlns:p="http://schemas.openxmlformats.org/presentationml/2006/main">
+  <p:cSld>
+    <p:spTree>
+      <p:nvGrpSpPr>
+        <p:cNvPr id="1" name=""/>
+        <p:cNvGrpSpPr/>
+        <p:nvPr/>
+      </p:nvGrpSpPr>
+      <p:grpSpPr>
+        <a:xfrm>
+          <a:off x="0" y="0"/>
+          <a:ext cx="0" cy="0"/>
+          <a:chOff x="0" y="0"/>
+          <a:chExt cx="0" cy="0"/>
+        </a:xfrm>
+      </p:grpSpPr>
+      <p:sp>
+        <p:nvSpPr>
+          <p:cNvPr id="2" name="Folienbildplatzhalter 1"/>
+          <p:cNvSpPr>
+            <a:spLocks noGrp="1" noRot="1" noChangeAspect="1"/>
+          </p:cNvSpPr>
+          <p:nvPr>
+            <p:ph type="sldImg"/>
+          </p:nvPr>
+        </p:nvSpPr>
+        <p:spPr/>
+      </p:sp>
+      <p:sp>
+        <p:nvSpPr>
+          <p:cNvPr id="3" name="Notizenplatzhalter 2"/>
+          <p:cNvSpPr>
+            <a:spLocks noGrp="1"/>
+          </p:cNvSpPr>
+          <p:nvPr>
+            <p:ph type="body" idx="1"/>
+          </p:nvPr>
+        </p:nvSpPr>
+        <p:spPr/>
+        <p:txBody>
+          <a:bodyPr/>
+          <a:lstStyle/>
+          <a:p>
             <a:pPr marL="0" marR="0" lvl="0" indent="0" algn="l" defTabSz="914400" rtl="0" eaLnBrk="1" fontAlgn="auto" latinLnBrk="0" hangingPunct="1">
               <a:lnSpc>
                 <a:spcPct val="100000"/>
@@ -1988,7 +2091,108 @@
           <a:p>
             <a:fld id="{20A41429-B750-4047-B563-2878417A70E7}" type="slidenum">
               <a:rPr lang="en-US" smtClean="0"/>
-              <a:t>24</a:t>
+              <a:t>25</a:t>
+            </a:fld>
+            <a:endParaRPr lang="en-US"/>
+          </a:p>
+        </p:txBody>
+      </p:sp>
+    </p:spTree>
+    <p:extLst>
+      <p:ext uri="{BB962C8B-B14F-4D97-AF65-F5344CB8AC3E}">
+        <p14:creationId xmlns:p14="http://schemas.microsoft.com/office/powerpoint/2010/main" val="2610095379"/>
+      </p:ext>
+    </p:extLst>
+  </p:cSld>
+  <p:clrMapOvr>
+    <a:masterClrMapping/>
+  </p:clrMapOvr>
+</p:notes>
+</file>
+
+<file path=ppt/notesSlides/notesSlide23.xml><?xml version="1.0" encoding="utf-8"?>
+<p:notes xmlns:a="http://schemas.openxmlformats.org/drawingml/2006/main" xmlns:r="http://schemas.openxmlformats.org/officeDocument/2006/relationships" xmlns:p="http://schemas.openxmlformats.org/presentationml/2006/main">
+  <p:cSld>
+    <p:spTree>
+      <p:nvGrpSpPr>
+        <p:cNvPr id="1" name=""/>
+        <p:cNvGrpSpPr/>
+        <p:nvPr/>
+      </p:nvGrpSpPr>
+      <p:grpSpPr>
+        <a:xfrm>
+          <a:off x="0" y="0"/>
+          <a:ext cx="0" cy="0"/>
+          <a:chOff x="0" y="0"/>
+          <a:chExt cx="0" cy="0"/>
+        </a:xfrm>
+      </p:grpSpPr>
+      <p:sp>
+        <p:nvSpPr>
+          <p:cNvPr id="2" name="Folienbildplatzhalter 1"/>
+          <p:cNvSpPr>
+            <a:spLocks noGrp="1" noRot="1" noChangeAspect="1"/>
+          </p:cNvSpPr>
+          <p:nvPr>
+            <p:ph type="sldImg"/>
+          </p:nvPr>
+        </p:nvSpPr>
+        <p:spPr/>
+      </p:sp>
+      <p:sp>
+        <p:nvSpPr>
+          <p:cNvPr id="3" name="Notizenplatzhalter 2"/>
+          <p:cNvSpPr>
+            <a:spLocks noGrp="1"/>
+          </p:cNvSpPr>
+          <p:nvPr>
+            <p:ph type="body" idx="1"/>
+          </p:nvPr>
+        </p:nvSpPr>
+        <p:spPr/>
+        <p:txBody>
+          <a:bodyPr/>
+          <a:lstStyle/>
+          <a:p>
+            <a:pPr marL="0" marR="0" lvl="0" indent="0" algn="l" defTabSz="914400" rtl="0" eaLnBrk="1" fontAlgn="auto" latinLnBrk="0" hangingPunct="1">
+              <a:lnSpc>
+                <a:spcPct val="100000"/>
+              </a:lnSpc>
+              <a:spcBef>
+                <a:spcPts val="0"/>
+              </a:spcBef>
+              <a:spcAft>
+                <a:spcPts val="0"/>
+              </a:spcAft>
+              <a:buClrTx/>
+              <a:buSzTx/>
+              <a:buFontTx/>
+              <a:buNone/>
+              <a:tabLst/>
+              <a:defRPr/>
+            </a:pPr>
+            <a:endParaRPr lang="en-US" b="1"/>
+          </a:p>
+        </p:txBody>
+      </p:sp>
+      <p:sp>
+        <p:nvSpPr>
+          <p:cNvPr id="4" name="Foliennummernplatzhalter 3"/>
+          <p:cNvSpPr>
+            <a:spLocks noGrp="1"/>
+          </p:cNvSpPr>
+          <p:nvPr>
+            <p:ph type="sldNum" sz="quarter" idx="10"/>
+          </p:nvPr>
+        </p:nvSpPr>
+        <p:spPr/>
+        <p:txBody>
+          <a:bodyPr/>
+          <a:lstStyle/>
+          <a:p>
+            <a:fld id="{20A41429-B750-4047-B563-2878417A70E7}" type="slidenum">
+              <a:rPr lang="en-US" smtClean="0"/>
+              <a:t>26</a:t>
             </a:fld>
             <a:endParaRPr lang="en-US"/>
           </a:p>
@@ -8004,64 +8208,6 @@
             <a:pPr marL="0" indent="0">
               <a:buNone/>
             </a:pPr>
-            <a:endParaRPr lang="en-US"/>
-          </a:p>
-        </p:txBody>
-      </p:sp>
-      <p:sp>
-        <p:nvSpPr>
-          <p:cNvPr id="5" name="Rectangle 4">
-            <a:extLst>
-              <a:ext uri="{FF2B5EF4-FFF2-40B4-BE49-F238E27FC236}">
-                <a16:creationId xmlns:a16="http://schemas.microsoft.com/office/drawing/2014/main" id="{AA103985-9AF4-409C-8103-6981344D75D0}"/>
-              </a:ext>
-            </a:extLst>
-          </p:cNvPr>
-          <p:cNvSpPr/>
-          <p:nvPr/>
-        </p:nvSpPr>
-        <p:spPr>
-          <a:xfrm>
-            <a:off x="4827104" y="0"/>
-            <a:ext cx="7364896" cy="914400"/>
-          </a:xfrm>
-          <a:prstGeom prst="rect">
-            <a:avLst/>
-          </a:prstGeom>
-          <a:solidFill>
-            <a:schemeClr val="accent2"/>
-          </a:solidFill>
-          <a:ln>
-            <a:solidFill>
-              <a:schemeClr val="accent2"/>
-            </a:solidFill>
-          </a:ln>
-        </p:spPr>
-        <p:style>
-          <a:lnRef idx="2">
-            <a:schemeClr val="accent1">
-              <a:shade val="50000"/>
-            </a:schemeClr>
-          </a:lnRef>
-          <a:fillRef idx="1">
-            <a:schemeClr val="accent1"/>
-          </a:fillRef>
-          <a:effectRef idx="0">
-            <a:schemeClr val="accent1"/>
-          </a:effectRef>
-          <a:fontRef idx="minor">
-            <a:schemeClr val="lt1"/>
-          </a:fontRef>
-        </p:style>
-        <p:txBody>
-          <a:bodyPr rtlCol="0" anchor="ctr"/>
-          <a:lstStyle/>
-          <a:p>
-            <a:pPr algn="ctr"/>
-            <a:r>
-              <a:rPr lang="de-DE"/>
-              <a:t>regex kapitel erweitern (matthias)</a:t>
-            </a:r>
             <a:endParaRPr lang="en-US"/>
           </a:p>
         </p:txBody>
@@ -9919,7 +10065,14 @@
             <a:pPr algn="ctr"/>
             <a:r>
               <a:rPr lang="de-DE"/>
-              <a:t>nochmal checken!! und ggf. ergänzen</a:t>
+              <a:t>nochmal checken!! und ggf. ergänzen </a:t>
+            </a:r>
+          </a:p>
+          <a:p>
+            <a:pPr algn="ctr"/>
+            <a:r>
+              <a:rPr lang="de-DE"/>
+              <a:t>https://cran.r-project.org/web/packages/stringr/vignettes/regular-expressions.html</a:t>
             </a:r>
             <a:endParaRPr lang="en-US"/>
           </a:p>
@@ -9973,6 +10126,1880 @@
             <a:fld id="{C9E0B00B-E6DF-4183-A694-3DE28BEFB357}" type="slidenum">
               <a:rPr lang="en-US" smtClean="0"/>
               <a:t>21</a:t>
+            </a:fld>
+            <a:endParaRPr lang="en-US"/>
+          </a:p>
+        </p:txBody>
+      </p:sp>
+      <p:sp>
+        <p:nvSpPr>
+          <p:cNvPr id="12" name="Titel 1">
+            <a:extLst>
+              <a:ext uri="{FF2B5EF4-FFF2-40B4-BE49-F238E27FC236}">
+                <a16:creationId xmlns:a16="http://schemas.microsoft.com/office/drawing/2014/main" id="{478EA67A-3C39-4D0A-996A-C363F30A14B2}"/>
+              </a:ext>
+            </a:extLst>
+          </p:cNvPr>
+          <p:cNvSpPr>
+            <a:spLocks noGrp="1"/>
+          </p:cNvSpPr>
+          <p:nvPr>
+            <p:ph type="title"/>
+          </p:nvPr>
+        </p:nvSpPr>
+        <p:spPr>
+          <a:xfrm>
+            <a:off x="1066800" y="561524"/>
+            <a:ext cx="10287000" cy="1129164"/>
+          </a:xfrm>
+        </p:spPr>
+        <p:txBody>
+          <a:bodyPr/>
+          <a:lstStyle/>
+          <a:p>
+            <a:r>
+              <a:rPr lang="en-US"/>
+              <a:t>Text Normalization  </a:t>
+            </a:r>
+            <a:r>
+              <a:rPr lang="en-US" b="1"/>
+              <a:t>Useful regex patterns</a:t>
+            </a:r>
+            <a:endParaRPr lang="en-US" b="1">
+              <a:latin typeface="Consolas" panose="020B0609020204030204" pitchFamily="49" charset="0"/>
+            </a:endParaRPr>
+          </a:p>
+        </p:txBody>
+      </p:sp>
+      <p:graphicFrame>
+        <p:nvGraphicFramePr>
+          <p:cNvPr id="8" name="Tabelle 4">
+            <a:extLst>
+              <a:ext uri="{FF2B5EF4-FFF2-40B4-BE49-F238E27FC236}">
+                <a16:creationId xmlns:a16="http://schemas.microsoft.com/office/drawing/2014/main" id="{537B2507-2BD2-4806-9EA4-E88973333406}"/>
+              </a:ext>
+            </a:extLst>
+          </p:cNvPr>
+          <p:cNvGraphicFramePr>
+            <a:graphicFrameLocks noGrp="1"/>
+          </p:cNvGraphicFramePr>
+          <p:nvPr>
+            <p:extLst>
+              <p:ext uri="{D42A27DB-BD31-4B8C-83A1-F6EECF244321}">
+                <p14:modId xmlns:p14="http://schemas.microsoft.com/office/powerpoint/2010/main" val="2274877544"/>
+              </p:ext>
+            </p:extLst>
+          </p:nvPr>
+        </p:nvGraphicFramePr>
+        <p:xfrm>
+          <a:off x="1066801" y="1966913"/>
+          <a:ext cx="10287000" cy="4297680"/>
+        </p:xfrm>
+        <a:graphic>
+          <a:graphicData uri="http://schemas.openxmlformats.org/drawingml/2006/table">
+            <a:tbl>
+              <a:tblPr firstRow="1" bandRow="1">
+                <a:tableStyleId>{5940675A-B579-460E-94D1-54222C63F5DA}</a:tableStyleId>
+              </a:tblPr>
+              <a:tblGrid>
+                <a:gridCol w="2886074">
+                  <a:extLst>
+                    <a:ext uri="{9D8B030D-6E8A-4147-A177-3AD203B41FA5}">
+                      <a16:colId xmlns:a16="http://schemas.microsoft.com/office/drawing/2014/main" val="1121755169"/>
+                    </a:ext>
+                  </a:extLst>
+                </a:gridCol>
+                <a:gridCol w="7400926">
+                  <a:extLst>
+                    <a:ext uri="{9D8B030D-6E8A-4147-A177-3AD203B41FA5}">
+                      <a16:colId xmlns:a16="http://schemas.microsoft.com/office/drawing/2014/main" val="3255343523"/>
+                    </a:ext>
+                  </a:extLst>
+                </a:gridCol>
+              </a:tblGrid>
+              <a:tr h="254794">
+                <a:tc>
+                  <a:txBody>
+                    <a:bodyPr/>
+                    <a:lstStyle/>
+                    <a:p>
+                      <a:pPr algn="l"/>
+                      <a:r>
+                        <a:rPr lang="en-US" sz="1800" b="1" dirty="0"/>
+                        <a:t>Pattern</a:t>
+                      </a:r>
+                    </a:p>
+                  </a:txBody>
+                  <a:tcPr anchor="ctr">
+                    <a:solidFill>
+                      <a:schemeClr val="bg1">
+                        <a:lumMod val="85000"/>
+                      </a:schemeClr>
+                    </a:solidFill>
+                  </a:tcPr>
+                </a:tc>
+                <a:tc>
+                  <a:txBody>
+                    <a:bodyPr/>
+                    <a:lstStyle/>
+                    <a:p>
+                      <a:pPr algn="l"/>
+                      <a:r>
+                        <a:rPr lang="en-US" sz="1800" b="1" dirty="0"/>
+                        <a:t>Function</a:t>
+                      </a:r>
+                    </a:p>
+                  </a:txBody>
+                  <a:tcPr anchor="ctr"/>
+                </a:tc>
+                <a:extLst>
+                  <a:ext uri="{0D108BD9-81ED-4DB2-BD59-A6C34878D82A}">
+                    <a16:rowId xmlns:a16="http://schemas.microsoft.com/office/drawing/2014/main" val="3604647407"/>
+                  </a:ext>
+                </a:extLst>
+              </a:tr>
+              <a:tr h="254794">
+                <a:tc>
+                  <a:txBody>
+                    <a:bodyPr/>
+                    <a:lstStyle/>
+                    <a:p>
+                      <a:pPr algn="l"/>
+                      <a:r>
+                        <a:rPr lang="en-US" sz="1800" b="0" kern="1200" dirty="0">
+                          <a:solidFill>
+                            <a:schemeClr val="tx1"/>
+                          </a:solidFill>
+                          <a:latin typeface="+mn-lt"/>
+                          <a:ea typeface="+mn-ea"/>
+                          <a:cs typeface="+mn-cs"/>
+                        </a:rPr>
+                        <a:t>\d or [:digit:] or [0-9]</a:t>
+                      </a:r>
+                    </a:p>
+                  </a:txBody>
+                  <a:tcPr anchor="ctr">
+                    <a:solidFill>
+                      <a:schemeClr val="bg1">
+                        <a:lumMod val="85000"/>
+                      </a:schemeClr>
+                    </a:solidFill>
+                  </a:tcPr>
+                </a:tc>
+                <a:tc>
+                  <a:txBody>
+                    <a:bodyPr/>
+                    <a:lstStyle/>
+                    <a:p>
+                      <a:pPr algn="l"/>
+                      <a:r>
+                        <a:rPr lang="en-US" sz="1800" b="0" kern="1200" dirty="0">
+                          <a:solidFill>
+                            <a:schemeClr val="tx1"/>
+                          </a:solidFill>
+                          <a:latin typeface="+mn-lt"/>
+                          <a:ea typeface="+mn-ea"/>
+                          <a:cs typeface="+mn-cs"/>
+                        </a:rPr>
+                        <a:t>Matches any digit</a:t>
+                      </a:r>
+                    </a:p>
+                  </a:txBody>
+                  <a:tcPr anchor="ctr"/>
+                </a:tc>
+                <a:extLst>
+                  <a:ext uri="{0D108BD9-81ED-4DB2-BD59-A6C34878D82A}">
+                    <a16:rowId xmlns:a16="http://schemas.microsoft.com/office/drawing/2014/main" val="1726118439"/>
+                  </a:ext>
+                </a:extLst>
+              </a:tr>
+              <a:tr h="254794">
+                <a:tc>
+                  <a:txBody>
+                    <a:bodyPr/>
+                    <a:lstStyle/>
+                    <a:p>
+                      <a:pPr algn="l"/>
+                      <a:r>
+                        <a:rPr lang="de-DE" sz="1800" b="0" kern="1200">
+                          <a:solidFill>
+                            <a:schemeClr val="tx1"/>
+                          </a:solidFill>
+                          <a:latin typeface="+mn-lt"/>
+                          <a:ea typeface="+mn-ea"/>
+                          <a:cs typeface="+mn-cs"/>
+                        </a:rPr>
+                        <a:t>[:alpha:] or [A-Za-z]</a:t>
+                      </a:r>
+                      <a:endParaRPr lang="en-US" sz="1800" b="0" kern="1200" dirty="0">
+                        <a:solidFill>
+                          <a:schemeClr val="tx1"/>
+                        </a:solidFill>
+                        <a:latin typeface="+mn-lt"/>
+                        <a:ea typeface="+mn-ea"/>
+                        <a:cs typeface="+mn-cs"/>
+                      </a:endParaRPr>
+                    </a:p>
+                  </a:txBody>
+                  <a:tcPr anchor="ctr">
+                    <a:solidFill>
+                      <a:schemeClr val="bg1">
+                        <a:lumMod val="85000"/>
+                      </a:schemeClr>
+                    </a:solidFill>
+                  </a:tcPr>
+                </a:tc>
+                <a:tc>
+                  <a:txBody>
+                    <a:bodyPr/>
+                    <a:lstStyle/>
+                    <a:p>
+                      <a:pPr algn="l"/>
+                      <a:r>
+                        <a:rPr lang="de-DE" sz="1800" b="0" kern="1200">
+                          <a:solidFill>
+                            <a:schemeClr val="tx1"/>
+                          </a:solidFill>
+                          <a:latin typeface="+mn-lt"/>
+                          <a:ea typeface="+mn-ea"/>
+                          <a:cs typeface="+mn-cs"/>
+                        </a:rPr>
+                        <a:t>Matches any character</a:t>
+                      </a:r>
+                      <a:endParaRPr lang="en-US" sz="1800" b="0" kern="1200" dirty="0">
+                        <a:solidFill>
+                          <a:schemeClr val="tx1"/>
+                        </a:solidFill>
+                        <a:latin typeface="+mn-lt"/>
+                        <a:ea typeface="+mn-ea"/>
+                        <a:cs typeface="+mn-cs"/>
+                      </a:endParaRPr>
+                    </a:p>
+                  </a:txBody>
+                  <a:tcPr anchor="ctr"/>
+                </a:tc>
+                <a:extLst>
+                  <a:ext uri="{0D108BD9-81ED-4DB2-BD59-A6C34878D82A}">
+                    <a16:rowId xmlns:a16="http://schemas.microsoft.com/office/drawing/2014/main" val="3025012687"/>
+                  </a:ext>
+                </a:extLst>
+              </a:tr>
+              <a:tr h="254794">
+                <a:tc>
+                  <a:txBody>
+                    <a:bodyPr/>
+                    <a:lstStyle/>
+                    <a:p>
+                      <a:pPr marL="0" marR="0" lvl="0" indent="0" algn="l" defTabSz="914400" rtl="0" eaLnBrk="1" fontAlgn="auto" latinLnBrk="0" hangingPunct="1">
+                        <a:lnSpc>
+                          <a:spcPct val="100000"/>
+                        </a:lnSpc>
+                        <a:spcBef>
+                          <a:spcPts val="0"/>
+                        </a:spcBef>
+                        <a:spcAft>
+                          <a:spcPts val="0"/>
+                        </a:spcAft>
+                        <a:buClrTx/>
+                        <a:buSzTx/>
+                        <a:buFontTx/>
+                        <a:buNone/>
+                        <a:tabLst/>
+                        <a:defRPr/>
+                      </a:pPr>
+                      <a:r>
+                        <a:rPr lang="en-GB" sz="1800" b="0" kern="1200" dirty="0">
+                          <a:solidFill>
+                            <a:schemeClr val="tx1"/>
+                          </a:solidFill>
+                          <a:latin typeface="+mn-lt"/>
+                          <a:ea typeface="+mn-ea"/>
+                          <a:cs typeface="+mn-cs"/>
+                        </a:rPr>
+                        <a:t>[a-z] or [:lower:]</a:t>
+                      </a:r>
+                      <a:endParaRPr lang="en-US" sz="1800" b="0" kern="1200" dirty="0">
+                        <a:solidFill>
+                          <a:schemeClr val="tx1"/>
+                        </a:solidFill>
+                        <a:latin typeface="+mn-lt"/>
+                        <a:ea typeface="+mn-ea"/>
+                        <a:cs typeface="+mn-cs"/>
+                      </a:endParaRPr>
+                    </a:p>
+                  </a:txBody>
+                  <a:tcPr anchor="ctr">
+                    <a:solidFill>
+                      <a:schemeClr val="bg1">
+                        <a:lumMod val="85000"/>
+                      </a:schemeClr>
+                    </a:solidFill>
+                  </a:tcPr>
+                </a:tc>
+                <a:tc>
+                  <a:txBody>
+                    <a:bodyPr/>
+                    <a:lstStyle/>
+                    <a:p>
+                      <a:pPr algn="l"/>
+                      <a:r>
+                        <a:rPr lang="en-US" sz="1800" b="0" kern="1200" dirty="0">
+                          <a:solidFill>
+                            <a:schemeClr val="tx1"/>
+                          </a:solidFill>
+                          <a:latin typeface="+mn-lt"/>
+                          <a:ea typeface="+mn-ea"/>
+                          <a:cs typeface="+mn-cs"/>
+                        </a:rPr>
+                        <a:t>Matches </a:t>
+                      </a:r>
+                      <a:r>
+                        <a:rPr lang="en-US" sz="1800" b="0" kern="1200">
+                          <a:solidFill>
+                            <a:schemeClr val="tx1"/>
+                          </a:solidFill>
+                          <a:latin typeface="+mn-lt"/>
+                          <a:ea typeface="+mn-ea"/>
+                          <a:cs typeface="+mn-cs"/>
+                        </a:rPr>
+                        <a:t>any lowercase character</a:t>
+                      </a:r>
+                      <a:endParaRPr lang="en-US" sz="1800" b="0" kern="1200" dirty="0">
+                        <a:solidFill>
+                          <a:schemeClr val="tx1"/>
+                        </a:solidFill>
+                        <a:latin typeface="+mn-lt"/>
+                        <a:ea typeface="+mn-ea"/>
+                        <a:cs typeface="+mn-cs"/>
+                      </a:endParaRPr>
+                    </a:p>
+                  </a:txBody>
+                  <a:tcPr anchor="ctr"/>
+                </a:tc>
+                <a:extLst>
+                  <a:ext uri="{0D108BD9-81ED-4DB2-BD59-A6C34878D82A}">
+                    <a16:rowId xmlns:a16="http://schemas.microsoft.com/office/drawing/2014/main" val="1294027997"/>
+                  </a:ext>
+                </a:extLst>
+              </a:tr>
+              <a:tr h="254794">
+                <a:tc>
+                  <a:txBody>
+                    <a:bodyPr/>
+                    <a:lstStyle/>
+                    <a:p>
+                      <a:pPr algn="l"/>
+                      <a:r>
+                        <a:rPr lang="en-GB" sz="1800" b="0" kern="1200" dirty="0">
+                          <a:solidFill>
+                            <a:schemeClr val="tx1"/>
+                          </a:solidFill>
+                          <a:latin typeface="+mn-lt"/>
+                          <a:ea typeface="+mn-ea"/>
+                          <a:cs typeface="+mn-cs"/>
+                        </a:rPr>
+                        <a:t>[A-Z] or [:upper:]</a:t>
+                      </a:r>
+                      <a:endParaRPr lang="en-US" sz="1800" b="0" kern="1200" dirty="0">
+                        <a:solidFill>
+                          <a:schemeClr val="tx1"/>
+                        </a:solidFill>
+                        <a:latin typeface="+mn-lt"/>
+                        <a:ea typeface="+mn-ea"/>
+                        <a:cs typeface="+mn-cs"/>
+                      </a:endParaRPr>
+                    </a:p>
+                  </a:txBody>
+                  <a:tcPr anchor="ctr">
+                    <a:solidFill>
+                      <a:schemeClr val="bg1">
+                        <a:lumMod val="85000"/>
+                      </a:schemeClr>
+                    </a:solidFill>
+                  </a:tcPr>
+                </a:tc>
+                <a:tc>
+                  <a:txBody>
+                    <a:bodyPr/>
+                    <a:lstStyle/>
+                    <a:p>
+                      <a:pPr marL="0" marR="0" lvl="0" indent="0" algn="l" defTabSz="914400" rtl="0" eaLnBrk="1" fontAlgn="auto" latinLnBrk="0" hangingPunct="1">
+                        <a:lnSpc>
+                          <a:spcPct val="100000"/>
+                        </a:lnSpc>
+                        <a:spcBef>
+                          <a:spcPts val="0"/>
+                        </a:spcBef>
+                        <a:spcAft>
+                          <a:spcPts val="0"/>
+                        </a:spcAft>
+                        <a:buClrTx/>
+                        <a:buSzTx/>
+                        <a:buFontTx/>
+                        <a:buNone/>
+                        <a:tabLst/>
+                        <a:defRPr/>
+                      </a:pPr>
+                      <a:r>
+                        <a:rPr lang="en-US" sz="1800" b="0" kern="1200" dirty="0">
+                          <a:solidFill>
+                            <a:schemeClr val="tx1"/>
+                          </a:solidFill>
+                          <a:latin typeface="+mn-lt"/>
+                          <a:ea typeface="+mn-ea"/>
+                          <a:cs typeface="+mn-cs"/>
+                        </a:rPr>
+                        <a:t>Matches </a:t>
+                      </a:r>
+                      <a:r>
+                        <a:rPr lang="en-US" sz="1800" b="0" kern="1200">
+                          <a:solidFill>
+                            <a:schemeClr val="tx1"/>
+                          </a:solidFill>
+                          <a:latin typeface="+mn-lt"/>
+                          <a:ea typeface="+mn-ea"/>
+                          <a:cs typeface="+mn-cs"/>
+                        </a:rPr>
+                        <a:t>any uppercase character</a:t>
+                      </a:r>
+                      <a:endParaRPr lang="en-US" sz="1800" b="0" kern="1200" dirty="0">
+                        <a:solidFill>
+                          <a:schemeClr val="tx1"/>
+                        </a:solidFill>
+                        <a:latin typeface="+mn-lt"/>
+                        <a:ea typeface="+mn-ea"/>
+                        <a:cs typeface="+mn-cs"/>
+                      </a:endParaRPr>
+                    </a:p>
+                  </a:txBody>
+                  <a:tcPr anchor="ctr"/>
+                </a:tc>
+                <a:extLst>
+                  <a:ext uri="{0D108BD9-81ED-4DB2-BD59-A6C34878D82A}">
+                    <a16:rowId xmlns:a16="http://schemas.microsoft.com/office/drawing/2014/main" val="427721822"/>
+                  </a:ext>
+                </a:extLst>
+              </a:tr>
+              <a:tr h="254794">
+                <a:tc>
+                  <a:txBody>
+                    <a:bodyPr/>
+                    <a:lstStyle/>
+                    <a:p>
+                      <a:pPr algn="l"/>
+                      <a:r>
+                        <a:rPr lang="en-GB" sz="1800" b="0" kern="1200" dirty="0">
+                          <a:solidFill>
+                            <a:schemeClr val="tx1"/>
+                          </a:solidFill>
+                          <a:latin typeface="+mn-lt"/>
+                          <a:ea typeface="+mn-ea"/>
+                          <a:cs typeface="+mn-cs"/>
+                        </a:rPr>
+                        <a:t>[</a:t>
+                      </a:r>
+                      <a:r>
+                        <a:rPr lang="en-GB" sz="1800" b="0" kern="1200" dirty="0" err="1">
+                          <a:solidFill>
+                            <a:schemeClr val="tx1"/>
+                          </a:solidFill>
+                          <a:latin typeface="+mn-lt"/>
+                          <a:ea typeface="+mn-ea"/>
+                          <a:cs typeface="+mn-cs"/>
+                        </a:rPr>
+                        <a:t>abc</a:t>
+                      </a:r>
+                      <a:r>
+                        <a:rPr lang="en-GB" sz="1800" b="0" kern="1200" dirty="0">
+                          <a:solidFill>
+                            <a:schemeClr val="tx1"/>
+                          </a:solidFill>
+                          <a:latin typeface="+mn-lt"/>
+                          <a:ea typeface="+mn-ea"/>
+                          <a:cs typeface="+mn-cs"/>
+                        </a:rPr>
+                        <a:t>]</a:t>
+                      </a:r>
+                      <a:endParaRPr lang="en-US" sz="1800" b="0" kern="1200" dirty="0">
+                        <a:solidFill>
+                          <a:schemeClr val="tx1"/>
+                        </a:solidFill>
+                        <a:latin typeface="+mn-lt"/>
+                        <a:ea typeface="+mn-ea"/>
+                        <a:cs typeface="+mn-cs"/>
+                      </a:endParaRPr>
+                    </a:p>
+                  </a:txBody>
+                  <a:tcPr anchor="ctr">
+                    <a:solidFill>
+                      <a:schemeClr val="bg1">
+                        <a:lumMod val="85000"/>
+                      </a:schemeClr>
+                    </a:solidFill>
+                  </a:tcPr>
+                </a:tc>
+                <a:tc>
+                  <a:txBody>
+                    <a:bodyPr/>
+                    <a:lstStyle/>
+                    <a:p>
+                      <a:pPr algn="l"/>
+                      <a:r>
+                        <a:rPr lang="en-US" sz="1800" b="0" kern="1200" dirty="0">
+                          <a:solidFill>
+                            <a:schemeClr val="tx1"/>
+                          </a:solidFill>
+                          <a:latin typeface="+mn-lt"/>
+                          <a:ea typeface="+mn-ea"/>
+                          <a:cs typeface="+mn-cs"/>
+                        </a:rPr>
+                        <a:t>Matches a, b or c</a:t>
+                      </a:r>
+                    </a:p>
+                  </a:txBody>
+                  <a:tcPr anchor="ctr"/>
+                </a:tc>
+                <a:extLst>
+                  <a:ext uri="{0D108BD9-81ED-4DB2-BD59-A6C34878D82A}">
+                    <a16:rowId xmlns:a16="http://schemas.microsoft.com/office/drawing/2014/main" val="3626129505"/>
+                  </a:ext>
+                </a:extLst>
+              </a:tr>
+              <a:tr h="254794">
+                <a:tc>
+                  <a:txBody>
+                    <a:bodyPr/>
+                    <a:lstStyle/>
+                    <a:p>
+                      <a:pPr algn="l"/>
+                      <a:r>
+                        <a:rPr lang="en-GB" sz="1800" b="0" kern="1200" dirty="0">
+                          <a:solidFill>
+                            <a:schemeClr val="tx1"/>
+                          </a:solidFill>
+                          <a:latin typeface="+mn-lt"/>
+                          <a:ea typeface="+mn-ea"/>
+                          <a:cs typeface="+mn-cs"/>
+                        </a:rPr>
+                        <a:t>[^</a:t>
+                      </a:r>
+                      <a:r>
+                        <a:rPr lang="en-GB" sz="1800" b="0" kern="1200" dirty="0" err="1">
+                          <a:solidFill>
+                            <a:schemeClr val="tx1"/>
+                          </a:solidFill>
+                          <a:latin typeface="+mn-lt"/>
+                          <a:ea typeface="+mn-ea"/>
+                          <a:cs typeface="+mn-cs"/>
+                        </a:rPr>
+                        <a:t>abc</a:t>
+                      </a:r>
+                      <a:r>
+                        <a:rPr lang="en-GB" sz="1800" b="0" kern="1200" dirty="0">
+                          <a:solidFill>
+                            <a:schemeClr val="tx1"/>
+                          </a:solidFill>
+                          <a:latin typeface="+mn-lt"/>
+                          <a:ea typeface="+mn-ea"/>
+                          <a:cs typeface="+mn-cs"/>
+                        </a:rPr>
+                        <a:t>]</a:t>
+                      </a:r>
+                      <a:r>
+                        <a:rPr lang="en-US" sz="1800" b="0" kern="1200" dirty="0">
+                          <a:solidFill>
+                            <a:schemeClr val="tx1"/>
+                          </a:solidFill>
+                          <a:latin typeface="+mn-lt"/>
+                          <a:ea typeface="+mn-ea"/>
+                          <a:cs typeface="+mn-cs"/>
+                        </a:rPr>
+                        <a:t> </a:t>
+                      </a:r>
+                    </a:p>
+                  </a:txBody>
+                  <a:tcPr anchor="ctr">
+                    <a:solidFill>
+                      <a:schemeClr val="bg1">
+                        <a:lumMod val="85000"/>
+                      </a:schemeClr>
+                    </a:solidFill>
+                  </a:tcPr>
+                </a:tc>
+                <a:tc>
+                  <a:txBody>
+                    <a:bodyPr/>
+                    <a:lstStyle/>
+                    <a:p>
+                      <a:pPr algn="l"/>
+                      <a:r>
+                        <a:rPr lang="en-GB" sz="1800" b="0" kern="1200" dirty="0">
+                          <a:solidFill>
+                            <a:schemeClr val="tx1"/>
+                          </a:solidFill>
+                          <a:latin typeface="+mn-lt"/>
+                          <a:ea typeface="+mn-ea"/>
+                          <a:cs typeface="+mn-cs"/>
+                        </a:rPr>
+                        <a:t>Matches anything except a, b, or c.</a:t>
+                      </a:r>
+                      <a:endParaRPr lang="en-US" sz="1800" b="0" kern="1200" dirty="0">
+                        <a:solidFill>
+                          <a:schemeClr val="tx1"/>
+                        </a:solidFill>
+                        <a:latin typeface="+mn-lt"/>
+                        <a:ea typeface="+mn-ea"/>
+                        <a:cs typeface="+mn-cs"/>
+                      </a:endParaRPr>
+                    </a:p>
+                  </a:txBody>
+                  <a:tcPr anchor="ctr"/>
+                </a:tc>
+                <a:extLst>
+                  <a:ext uri="{0D108BD9-81ED-4DB2-BD59-A6C34878D82A}">
+                    <a16:rowId xmlns:a16="http://schemas.microsoft.com/office/drawing/2014/main" val="2605753601"/>
+                  </a:ext>
+                </a:extLst>
+              </a:tr>
+              <a:tr h="254794">
+                <a:tc>
+                  <a:txBody>
+                    <a:bodyPr/>
+                    <a:lstStyle/>
+                    <a:p>
+                      <a:pPr algn="l"/>
+                      <a:r>
+                        <a:rPr lang="en-GB" sz="1800" b="0" kern="1200" dirty="0">
+                          <a:solidFill>
+                            <a:schemeClr val="tx1"/>
+                          </a:solidFill>
+                          <a:latin typeface="+mn-lt"/>
+                          <a:ea typeface="+mn-ea"/>
+                          <a:cs typeface="+mn-cs"/>
+                        </a:rPr>
+                        <a:t>[:</a:t>
+                      </a:r>
+                      <a:r>
+                        <a:rPr lang="en-GB" sz="1800" b="0" kern="1200" dirty="0" err="1">
+                          <a:solidFill>
+                            <a:schemeClr val="tx1"/>
+                          </a:solidFill>
+                          <a:latin typeface="+mn-lt"/>
+                          <a:ea typeface="+mn-ea"/>
+                          <a:cs typeface="+mn-cs"/>
+                        </a:rPr>
+                        <a:t>punct</a:t>
+                      </a:r>
+                      <a:r>
+                        <a:rPr lang="en-GB" sz="1800" b="0" kern="1200" dirty="0">
+                          <a:solidFill>
+                            <a:schemeClr val="tx1"/>
+                          </a:solidFill>
+                          <a:latin typeface="+mn-lt"/>
+                          <a:ea typeface="+mn-ea"/>
+                          <a:cs typeface="+mn-cs"/>
+                        </a:rPr>
+                        <a:t>:]</a:t>
+                      </a:r>
+                      <a:endParaRPr lang="en-US" sz="1800" b="0" kern="1200" dirty="0">
+                        <a:solidFill>
+                          <a:schemeClr val="tx1"/>
+                        </a:solidFill>
+                        <a:latin typeface="+mn-lt"/>
+                        <a:ea typeface="+mn-ea"/>
+                        <a:cs typeface="+mn-cs"/>
+                      </a:endParaRPr>
+                    </a:p>
+                  </a:txBody>
+                  <a:tcPr anchor="ctr">
+                    <a:solidFill>
+                      <a:schemeClr val="bg1">
+                        <a:lumMod val="85000"/>
+                      </a:schemeClr>
+                    </a:solidFill>
+                  </a:tcPr>
+                </a:tc>
+                <a:tc>
+                  <a:txBody>
+                    <a:bodyPr/>
+                    <a:lstStyle/>
+                    <a:p>
+                      <a:pPr algn="l"/>
+                      <a:r>
+                        <a:rPr lang="en-GB" sz="1800" b="0" kern="1200">
+                          <a:solidFill>
+                            <a:schemeClr val="tx1"/>
+                          </a:solidFill>
+                          <a:latin typeface="+mn-lt"/>
+                          <a:ea typeface="+mn-ea"/>
+                          <a:cs typeface="+mn-cs"/>
+                        </a:rPr>
+                        <a:t>Matches punctuation characters:</a:t>
+                      </a:r>
+                      <a:br>
+                        <a:rPr lang="en-GB" sz="1800" b="0" kern="1200">
+                          <a:solidFill>
+                            <a:schemeClr val="tx1"/>
+                          </a:solidFill>
+                          <a:latin typeface="+mn-lt"/>
+                          <a:ea typeface="+mn-ea"/>
+                          <a:cs typeface="+mn-cs"/>
+                        </a:rPr>
+                      </a:br>
+                      <a:r>
+                        <a:rPr lang="en-GB" sz="1800" b="0" kern="1200">
+                          <a:solidFill>
+                            <a:schemeClr val="tx1"/>
+                          </a:solidFill>
+                          <a:latin typeface="+mn-lt"/>
+                          <a:ea typeface="+mn-ea"/>
+                          <a:cs typeface="+mn-cs"/>
+                        </a:rPr>
+                        <a:t>! </a:t>
+                      </a:r>
+                      <a:r>
+                        <a:rPr lang="en-GB" sz="1800" b="0" kern="1200" dirty="0">
+                          <a:solidFill>
+                            <a:schemeClr val="tx1"/>
+                          </a:solidFill>
+                          <a:latin typeface="+mn-lt"/>
+                          <a:ea typeface="+mn-ea"/>
+                          <a:cs typeface="+mn-cs"/>
+                        </a:rPr>
+                        <a:t>" # $ % &amp; ’ ( ) * + , - . / : ; &lt; = &gt; ? @ [  ] ^ _ ` { | } ~</a:t>
+                      </a:r>
+                      <a:endParaRPr lang="en-US" sz="1800" b="0" kern="1200" dirty="0">
+                        <a:solidFill>
+                          <a:schemeClr val="tx1"/>
+                        </a:solidFill>
+                        <a:latin typeface="+mn-lt"/>
+                        <a:ea typeface="+mn-ea"/>
+                        <a:cs typeface="+mn-cs"/>
+                      </a:endParaRPr>
+                    </a:p>
+                  </a:txBody>
+                  <a:tcPr anchor="ctr"/>
+                </a:tc>
+                <a:extLst>
+                  <a:ext uri="{0D108BD9-81ED-4DB2-BD59-A6C34878D82A}">
+                    <a16:rowId xmlns:a16="http://schemas.microsoft.com/office/drawing/2014/main" val="1165361152"/>
+                  </a:ext>
+                </a:extLst>
+              </a:tr>
+              <a:tr h="254794">
+                <a:tc>
+                  <a:txBody>
+                    <a:bodyPr/>
+                    <a:lstStyle/>
+                    <a:p>
+                      <a:pPr algn="l"/>
+                      <a:r>
+                        <a:rPr lang="en-GB" sz="1800" b="0" kern="1200" dirty="0">
+                          <a:solidFill>
+                            <a:schemeClr val="tx1"/>
+                          </a:solidFill>
+                          <a:latin typeface="+mn-lt"/>
+                          <a:ea typeface="+mn-ea"/>
+                          <a:cs typeface="+mn-cs"/>
+                        </a:rPr>
+                        <a:t>{n,}</a:t>
+                      </a:r>
+                      <a:endParaRPr lang="en-US" sz="1800" b="0" kern="1200" dirty="0">
+                        <a:solidFill>
+                          <a:schemeClr val="tx1"/>
+                        </a:solidFill>
+                        <a:latin typeface="+mn-lt"/>
+                        <a:ea typeface="+mn-ea"/>
+                        <a:cs typeface="+mn-cs"/>
+                      </a:endParaRPr>
+                    </a:p>
+                  </a:txBody>
+                  <a:tcPr anchor="ctr">
+                    <a:solidFill>
+                      <a:schemeClr val="bg1">
+                        <a:lumMod val="85000"/>
+                      </a:schemeClr>
+                    </a:solidFill>
+                  </a:tcPr>
+                </a:tc>
+                <a:tc>
+                  <a:txBody>
+                    <a:bodyPr/>
+                    <a:lstStyle/>
+                    <a:p>
+                      <a:pPr algn="l"/>
+                      <a:r>
+                        <a:rPr lang="en-GB" sz="1800" b="0" kern="1200" dirty="0">
+                          <a:solidFill>
+                            <a:schemeClr val="tx1"/>
+                          </a:solidFill>
+                          <a:latin typeface="+mn-lt"/>
+                          <a:ea typeface="+mn-ea"/>
+                          <a:cs typeface="+mn-cs"/>
+                        </a:rPr>
+                        <a:t>n or more matches</a:t>
+                      </a:r>
+                      <a:endParaRPr lang="en-US" sz="1800" b="0" kern="1200" dirty="0">
+                        <a:solidFill>
+                          <a:schemeClr val="tx1"/>
+                        </a:solidFill>
+                        <a:latin typeface="+mn-lt"/>
+                        <a:ea typeface="+mn-ea"/>
+                        <a:cs typeface="+mn-cs"/>
+                      </a:endParaRPr>
+                    </a:p>
+                  </a:txBody>
+                  <a:tcPr anchor="ctr"/>
+                </a:tc>
+                <a:extLst>
+                  <a:ext uri="{0D108BD9-81ED-4DB2-BD59-A6C34878D82A}">
+                    <a16:rowId xmlns:a16="http://schemas.microsoft.com/office/drawing/2014/main" val="714321488"/>
+                  </a:ext>
+                </a:extLst>
+              </a:tr>
+              <a:tr h="254794">
+                <a:tc>
+                  <a:txBody>
+                    <a:bodyPr/>
+                    <a:lstStyle/>
+                    <a:p>
+                      <a:pPr algn="l"/>
+                      <a:r>
+                        <a:rPr lang="en-GB" sz="1800" b="0" kern="1200" dirty="0">
+                          <a:solidFill>
+                            <a:schemeClr val="tx1"/>
+                          </a:solidFill>
+                          <a:latin typeface="+mn-lt"/>
+                          <a:ea typeface="+mn-ea"/>
+                          <a:cs typeface="+mn-cs"/>
+                        </a:rPr>
+                        <a:t>{,m}</a:t>
+                      </a:r>
+                      <a:endParaRPr lang="en-US" sz="1800" b="0" kern="1200" dirty="0">
+                        <a:solidFill>
+                          <a:schemeClr val="tx1"/>
+                        </a:solidFill>
+                        <a:latin typeface="+mn-lt"/>
+                        <a:ea typeface="+mn-ea"/>
+                        <a:cs typeface="+mn-cs"/>
+                      </a:endParaRPr>
+                    </a:p>
+                  </a:txBody>
+                  <a:tcPr anchor="ctr">
+                    <a:solidFill>
+                      <a:schemeClr val="bg1">
+                        <a:lumMod val="85000"/>
+                      </a:schemeClr>
+                    </a:solidFill>
+                  </a:tcPr>
+                </a:tc>
+                <a:tc>
+                  <a:txBody>
+                    <a:bodyPr/>
+                    <a:lstStyle/>
+                    <a:p>
+                      <a:pPr algn="l"/>
+                      <a:r>
+                        <a:rPr lang="en-GB" sz="1800" b="0" kern="1200" dirty="0">
+                          <a:solidFill>
+                            <a:schemeClr val="tx1"/>
+                          </a:solidFill>
+                          <a:latin typeface="+mn-lt"/>
+                          <a:ea typeface="+mn-ea"/>
+                          <a:cs typeface="+mn-cs"/>
+                        </a:rPr>
+                        <a:t>at most m matches</a:t>
+                      </a:r>
+                      <a:endParaRPr lang="en-US" sz="1800" b="0" kern="1200" dirty="0">
+                        <a:solidFill>
+                          <a:schemeClr val="tx1"/>
+                        </a:solidFill>
+                        <a:latin typeface="+mn-lt"/>
+                        <a:ea typeface="+mn-ea"/>
+                        <a:cs typeface="+mn-cs"/>
+                      </a:endParaRPr>
+                    </a:p>
+                  </a:txBody>
+                  <a:tcPr anchor="ctr"/>
+                </a:tc>
+                <a:extLst>
+                  <a:ext uri="{0D108BD9-81ED-4DB2-BD59-A6C34878D82A}">
+                    <a16:rowId xmlns:a16="http://schemas.microsoft.com/office/drawing/2014/main" val="119559271"/>
+                  </a:ext>
+                </a:extLst>
+              </a:tr>
+              <a:tr h="254794">
+                <a:tc>
+                  <a:txBody>
+                    <a:bodyPr/>
+                    <a:lstStyle/>
+                    <a:p>
+                      <a:pPr algn="l"/>
+                      <a:r>
+                        <a:rPr lang="en-GB" sz="1800" b="0" kern="1200" dirty="0">
+                          <a:solidFill>
+                            <a:schemeClr val="tx1"/>
+                          </a:solidFill>
+                          <a:latin typeface="+mn-lt"/>
+                          <a:ea typeface="+mn-ea"/>
+                          <a:cs typeface="+mn-cs"/>
+                        </a:rPr>
+                        <a:t>{</a:t>
+                      </a:r>
+                      <a:r>
+                        <a:rPr lang="en-GB" sz="1800" b="0" kern="1200" dirty="0" err="1">
+                          <a:solidFill>
+                            <a:schemeClr val="tx1"/>
+                          </a:solidFill>
+                          <a:latin typeface="+mn-lt"/>
+                          <a:ea typeface="+mn-ea"/>
+                          <a:cs typeface="+mn-cs"/>
+                        </a:rPr>
+                        <a:t>n,m</a:t>
+                      </a:r>
+                      <a:r>
+                        <a:rPr lang="en-GB" sz="1800" b="0" kern="1200" dirty="0">
+                          <a:solidFill>
+                            <a:schemeClr val="tx1"/>
+                          </a:solidFill>
+                          <a:latin typeface="+mn-lt"/>
+                          <a:ea typeface="+mn-ea"/>
+                          <a:cs typeface="+mn-cs"/>
+                        </a:rPr>
+                        <a:t>}</a:t>
+                      </a:r>
+                      <a:endParaRPr lang="en-US" sz="1800" b="0" kern="1200" dirty="0">
+                        <a:solidFill>
+                          <a:schemeClr val="tx1"/>
+                        </a:solidFill>
+                        <a:latin typeface="+mn-lt"/>
+                        <a:ea typeface="+mn-ea"/>
+                        <a:cs typeface="+mn-cs"/>
+                      </a:endParaRPr>
+                    </a:p>
+                  </a:txBody>
+                  <a:tcPr anchor="ctr">
+                    <a:solidFill>
+                      <a:schemeClr val="bg1">
+                        <a:lumMod val="85000"/>
+                      </a:schemeClr>
+                    </a:solidFill>
+                  </a:tcPr>
+                </a:tc>
+                <a:tc>
+                  <a:txBody>
+                    <a:bodyPr/>
+                    <a:lstStyle/>
+                    <a:p>
+                      <a:pPr algn="l"/>
+                      <a:r>
+                        <a:rPr lang="en-GB" sz="1800" b="0" kern="1200" dirty="0">
+                          <a:solidFill>
+                            <a:schemeClr val="tx1"/>
+                          </a:solidFill>
+                          <a:latin typeface="+mn-lt"/>
+                          <a:ea typeface="+mn-ea"/>
+                          <a:cs typeface="+mn-cs"/>
+                        </a:rPr>
+                        <a:t>between n and m matches</a:t>
+                      </a:r>
+                      <a:endParaRPr lang="en-US" sz="1800" b="0" kern="1200" dirty="0">
+                        <a:solidFill>
+                          <a:schemeClr val="tx1"/>
+                        </a:solidFill>
+                        <a:latin typeface="+mn-lt"/>
+                        <a:ea typeface="+mn-ea"/>
+                        <a:cs typeface="+mn-cs"/>
+                      </a:endParaRPr>
+                    </a:p>
+                  </a:txBody>
+                  <a:tcPr anchor="ctr"/>
+                </a:tc>
+                <a:extLst>
+                  <a:ext uri="{0D108BD9-81ED-4DB2-BD59-A6C34878D82A}">
+                    <a16:rowId xmlns:a16="http://schemas.microsoft.com/office/drawing/2014/main" val="869907065"/>
+                  </a:ext>
+                </a:extLst>
+              </a:tr>
+            </a:tbl>
+          </a:graphicData>
+        </a:graphic>
+      </p:graphicFrame>
+      <p:sp>
+        <p:nvSpPr>
+          <p:cNvPr id="9" name="Rectangle 8">
+            <a:extLst>
+              <a:ext uri="{FF2B5EF4-FFF2-40B4-BE49-F238E27FC236}">
+                <a16:creationId xmlns:a16="http://schemas.microsoft.com/office/drawing/2014/main" id="{681685EE-532E-4BCA-82AE-FC4ABF85F532}"/>
+              </a:ext>
+            </a:extLst>
+          </p:cNvPr>
+          <p:cNvSpPr/>
+          <p:nvPr/>
+        </p:nvSpPr>
+        <p:spPr>
+          <a:xfrm>
+            <a:off x="4827104" y="0"/>
+            <a:ext cx="7364896" cy="914400"/>
+          </a:xfrm>
+          <a:prstGeom prst="rect">
+            <a:avLst/>
+          </a:prstGeom>
+          <a:solidFill>
+            <a:schemeClr val="accent2"/>
+          </a:solidFill>
+          <a:ln>
+            <a:solidFill>
+              <a:schemeClr val="accent2"/>
+            </a:solidFill>
+          </a:ln>
+        </p:spPr>
+        <p:style>
+          <a:lnRef idx="2">
+            <a:schemeClr val="accent1">
+              <a:shade val="50000"/>
+            </a:schemeClr>
+          </a:lnRef>
+          <a:fillRef idx="1">
+            <a:schemeClr val="accent1"/>
+          </a:fillRef>
+          <a:effectRef idx="0">
+            <a:schemeClr val="accent1"/>
+          </a:effectRef>
+          <a:fontRef idx="minor">
+            <a:schemeClr val="lt1"/>
+          </a:fontRef>
+        </p:style>
+        <p:txBody>
+          <a:bodyPr rtlCol="0" anchor="ctr"/>
+          <a:lstStyle/>
+          <a:p>
+            <a:pPr algn="ctr"/>
+            <a:r>
+              <a:rPr lang="de-DE"/>
+              <a:t>nochmal checken!! und ggf. ergänzen </a:t>
+            </a:r>
+          </a:p>
+          <a:p>
+            <a:pPr algn="ctr"/>
+            <a:r>
+              <a:rPr lang="de-DE"/>
+              <a:t>https://cran.r-project.org/web/packages/stringr/vignettes/regular-expressions.html</a:t>
+            </a:r>
+            <a:endParaRPr lang="en-US"/>
+          </a:p>
+        </p:txBody>
+      </p:sp>
+    </p:spTree>
+    <p:extLst>
+      <p:ext uri="{BB962C8B-B14F-4D97-AF65-F5344CB8AC3E}">
+        <p14:creationId xmlns:p14="http://schemas.microsoft.com/office/powerpoint/2010/main" val="2618022743"/>
+      </p:ext>
+    </p:extLst>
+  </p:cSld>
+  <p:clrMapOvr>
+    <a:masterClrMapping/>
+  </p:clrMapOvr>
+</p:sld>
+</file>
+
+<file path=ppt/slides/slide22.xml><?xml version="1.0" encoding="utf-8"?>
+<p:sld xmlns:a="http://schemas.openxmlformats.org/drawingml/2006/main" xmlns:r="http://schemas.openxmlformats.org/officeDocument/2006/relationships" xmlns:p="http://schemas.openxmlformats.org/presentationml/2006/main">
+  <p:cSld>
+    <p:spTree>
+      <p:nvGrpSpPr>
+        <p:cNvPr id="1" name=""/>
+        <p:cNvGrpSpPr/>
+        <p:nvPr/>
+      </p:nvGrpSpPr>
+      <p:grpSpPr>
+        <a:xfrm>
+          <a:off x="0" y="0"/>
+          <a:ext cx="0" cy="0"/>
+          <a:chOff x="0" y="0"/>
+          <a:chExt cx="0" cy="0"/>
+        </a:xfrm>
+      </p:grpSpPr>
+      <p:sp>
+        <p:nvSpPr>
+          <p:cNvPr id="4" name="Foliennummernplatzhalter 3"/>
+          <p:cNvSpPr>
+            <a:spLocks noGrp="1"/>
+          </p:cNvSpPr>
+          <p:nvPr>
+            <p:ph type="sldNum" sz="quarter" idx="12"/>
+          </p:nvPr>
+        </p:nvSpPr>
+        <p:spPr/>
+        <p:txBody>
+          <a:bodyPr/>
+          <a:lstStyle/>
+          <a:p>
+            <a:fld id="{C9E0B00B-E6DF-4183-A694-3DE28BEFB357}" type="slidenum">
+              <a:rPr lang="en-US" smtClean="0"/>
+              <a:t>22</a:t>
+            </a:fld>
+            <a:endParaRPr lang="en-US"/>
+          </a:p>
+        </p:txBody>
+      </p:sp>
+      <p:sp>
+        <p:nvSpPr>
+          <p:cNvPr id="12" name="Titel 1">
+            <a:extLst>
+              <a:ext uri="{FF2B5EF4-FFF2-40B4-BE49-F238E27FC236}">
+                <a16:creationId xmlns:a16="http://schemas.microsoft.com/office/drawing/2014/main" id="{478EA67A-3C39-4D0A-996A-C363F30A14B2}"/>
+              </a:ext>
+            </a:extLst>
+          </p:cNvPr>
+          <p:cNvSpPr>
+            <a:spLocks noGrp="1"/>
+          </p:cNvSpPr>
+          <p:nvPr>
+            <p:ph type="title"/>
+          </p:nvPr>
+        </p:nvSpPr>
+        <p:spPr>
+          <a:xfrm>
+            <a:off x="1066800" y="561524"/>
+            <a:ext cx="10287000" cy="1129164"/>
+          </a:xfrm>
+        </p:spPr>
+        <p:txBody>
+          <a:bodyPr/>
+          <a:lstStyle/>
+          <a:p>
+            <a:r>
+              <a:rPr lang="en-US"/>
+              <a:t>Text Normalization  </a:t>
+            </a:r>
+            <a:r>
+              <a:rPr lang="en-US" b="1"/>
+              <a:t>Useful regex patterns</a:t>
+            </a:r>
+            <a:endParaRPr lang="en-US" b="1">
+              <a:latin typeface="Consolas" panose="020B0609020204030204" pitchFamily="49" charset="0"/>
+            </a:endParaRPr>
+          </a:p>
+        </p:txBody>
+      </p:sp>
+      <p:graphicFrame>
+        <p:nvGraphicFramePr>
+          <p:cNvPr id="8" name="Tabelle 4">
+            <a:extLst>
+              <a:ext uri="{FF2B5EF4-FFF2-40B4-BE49-F238E27FC236}">
+                <a16:creationId xmlns:a16="http://schemas.microsoft.com/office/drawing/2014/main" id="{537B2507-2BD2-4806-9EA4-E88973333406}"/>
+              </a:ext>
+            </a:extLst>
+          </p:cNvPr>
+          <p:cNvGraphicFramePr>
+            <a:graphicFrameLocks noGrp="1"/>
+          </p:cNvGraphicFramePr>
+          <p:nvPr>
+            <p:extLst>
+              <p:ext uri="{D42A27DB-BD31-4B8C-83A1-F6EECF244321}">
+                <p14:modId xmlns:p14="http://schemas.microsoft.com/office/powerpoint/2010/main" val="3249419493"/>
+              </p:ext>
+            </p:extLst>
+          </p:nvPr>
+        </p:nvGraphicFramePr>
+        <p:xfrm>
+          <a:off x="1066801" y="1966913"/>
+          <a:ext cx="10287000" cy="2926080"/>
+        </p:xfrm>
+        <a:graphic>
+          <a:graphicData uri="http://schemas.openxmlformats.org/drawingml/2006/table">
+            <a:tbl>
+              <a:tblPr firstRow="1" bandRow="1">
+                <a:tableStyleId>{5940675A-B579-460E-94D1-54222C63F5DA}</a:tableStyleId>
+              </a:tblPr>
+              <a:tblGrid>
+                <a:gridCol w="2886074">
+                  <a:extLst>
+                    <a:ext uri="{9D8B030D-6E8A-4147-A177-3AD203B41FA5}">
+                      <a16:colId xmlns:a16="http://schemas.microsoft.com/office/drawing/2014/main" val="1121755169"/>
+                    </a:ext>
+                  </a:extLst>
+                </a:gridCol>
+                <a:gridCol w="7400926">
+                  <a:extLst>
+                    <a:ext uri="{9D8B030D-6E8A-4147-A177-3AD203B41FA5}">
+                      <a16:colId xmlns:a16="http://schemas.microsoft.com/office/drawing/2014/main" val="3255343523"/>
+                    </a:ext>
+                  </a:extLst>
+                </a:gridCol>
+              </a:tblGrid>
+              <a:tr h="254794">
+                <a:tc>
+                  <a:txBody>
+                    <a:bodyPr/>
+                    <a:lstStyle/>
+                    <a:p>
+                      <a:pPr algn="l"/>
+                      <a:r>
+                        <a:rPr lang="en-US" sz="1800" b="1" dirty="0"/>
+                        <a:t>Pattern</a:t>
+                      </a:r>
+                    </a:p>
+                  </a:txBody>
+                  <a:tcPr anchor="ctr">
+                    <a:solidFill>
+                      <a:schemeClr val="bg1">
+                        <a:lumMod val="85000"/>
+                      </a:schemeClr>
+                    </a:solidFill>
+                  </a:tcPr>
+                </a:tc>
+                <a:tc>
+                  <a:txBody>
+                    <a:bodyPr/>
+                    <a:lstStyle/>
+                    <a:p>
+                      <a:pPr algn="l"/>
+                      <a:r>
+                        <a:rPr lang="en-US" sz="1800" b="1" dirty="0"/>
+                        <a:t>Function</a:t>
+                      </a:r>
+                    </a:p>
+                  </a:txBody>
+                  <a:tcPr anchor="ctr"/>
+                </a:tc>
+                <a:extLst>
+                  <a:ext uri="{0D108BD9-81ED-4DB2-BD59-A6C34878D82A}">
+                    <a16:rowId xmlns:a16="http://schemas.microsoft.com/office/drawing/2014/main" val="3604647407"/>
+                  </a:ext>
+                </a:extLst>
+              </a:tr>
+              <a:tr h="254794">
+                <a:tc>
+                  <a:txBody>
+                    <a:bodyPr/>
+                    <a:lstStyle/>
+                    <a:p>
+                      <a:pPr algn="l"/>
+                      <a:r>
+                        <a:rPr lang="de-DE" sz="1800" b="0" kern="1200">
+                          <a:solidFill>
+                            <a:schemeClr val="tx1"/>
+                          </a:solidFill>
+                          <a:latin typeface="+mn-lt"/>
+                          <a:ea typeface="+mn-ea"/>
+                          <a:cs typeface="+mn-cs"/>
+                        </a:rPr>
+                        <a:t>?</a:t>
+                      </a:r>
+                      <a:endParaRPr lang="en-US" sz="1800" b="0" kern="1200" dirty="0">
+                        <a:solidFill>
+                          <a:schemeClr val="tx1"/>
+                        </a:solidFill>
+                        <a:latin typeface="+mn-lt"/>
+                        <a:ea typeface="+mn-ea"/>
+                        <a:cs typeface="+mn-cs"/>
+                      </a:endParaRPr>
+                    </a:p>
+                  </a:txBody>
+                  <a:tcPr anchor="ctr">
+                    <a:solidFill>
+                      <a:schemeClr val="bg1">
+                        <a:lumMod val="85000"/>
+                      </a:schemeClr>
+                    </a:solidFill>
+                  </a:tcPr>
+                </a:tc>
+                <a:tc>
+                  <a:txBody>
+                    <a:bodyPr/>
+                    <a:lstStyle/>
+                    <a:p>
+                      <a:pPr marL="0" marR="0" lvl="0" indent="0" algn="l" defTabSz="914400" rtl="0" eaLnBrk="1" fontAlgn="auto" latinLnBrk="0" hangingPunct="1">
+                        <a:lnSpc>
+                          <a:spcPct val="100000"/>
+                        </a:lnSpc>
+                        <a:spcBef>
+                          <a:spcPts val="0"/>
+                        </a:spcBef>
+                        <a:spcAft>
+                          <a:spcPts val="0"/>
+                        </a:spcAft>
+                        <a:buClrTx/>
+                        <a:buSzTx/>
+                        <a:buFontTx/>
+                        <a:buNone/>
+                        <a:tabLst/>
+                        <a:defRPr/>
+                      </a:pPr>
+                      <a:r>
+                        <a:rPr lang="de-DE" sz="1800" b="0" kern="1200">
+                          <a:solidFill>
+                            <a:schemeClr val="tx1"/>
+                          </a:solidFill>
+                          <a:latin typeface="+mn-lt"/>
+                          <a:ea typeface="+mn-ea"/>
+                          <a:cs typeface="+mn-cs"/>
+                        </a:rPr>
+                        <a:t>0 or 1 matches</a:t>
+                      </a:r>
+                      <a:endParaRPr lang="en-US" sz="1800" b="0" kern="1200" dirty="0">
+                        <a:solidFill>
+                          <a:schemeClr val="tx1"/>
+                        </a:solidFill>
+                        <a:latin typeface="+mn-lt"/>
+                        <a:ea typeface="+mn-ea"/>
+                        <a:cs typeface="+mn-cs"/>
+                      </a:endParaRPr>
+                    </a:p>
+                  </a:txBody>
+                  <a:tcPr anchor="ctr"/>
+                </a:tc>
+                <a:extLst>
+                  <a:ext uri="{0D108BD9-81ED-4DB2-BD59-A6C34878D82A}">
+                    <a16:rowId xmlns:a16="http://schemas.microsoft.com/office/drawing/2014/main" val="427721822"/>
+                  </a:ext>
+                </a:extLst>
+              </a:tr>
+              <a:tr h="254794">
+                <a:tc>
+                  <a:txBody>
+                    <a:bodyPr/>
+                    <a:lstStyle/>
+                    <a:p>
+                      <a:pPr algn="l"/>
+                      <a:r>
+                        <a:rPr lang="de-DE" sz="1800" b="0" kern="1200">
+                          <a:solidFill>
+                            <a:schemeClr val="tx1"/>
+                          </a:solidFill>
+                          <a:latin typeface="+mn-lt"/>
+                          <a:ea typeface="+mn-ea"/>
+                          <a:cs typeface="+mn-cs"/>
+                        </a:rPr>
+                        <a:t>*</a:t>
+                      </a:r>
+                      <a:endParaRPr lang="en-US" sz="1800" b="0" kern="1200" dirty="0">
+                        <a:solidFill>
+                          <a:schemeClr val="tx1"/>
+                        </a:solidFill>
+                        <a:latin typeface="+mn-lt"/>
+                        <a:ea typeface="+mn-ea"/>
+                        <a:cs typeface="+mn-cs"/>
+                      </a:endParaRPr>
+                    </a:p>
+                  </a:txBody>
+                  <a:tcPr anchor="ctr">
+                    <a:solidFill>
+                      <a:schemeClr val="bg1">
+                        <a:lumMod val="85000"/>
+                      </a:schemeClr>
+                    </a:solidFill>
+                  </a:tcPr>
+                </a:tc>
+                <a:tc>
+                  <a:txBody>
+                    <a:bodyPr/>
+                    <a:lstStyle/>
+                    <a:p>
+                      <a:pPr algn="l"/>
+                      <a:r>
+                        <a:rPr lang="de-DE" sz="1800" b="0" kern="1200">
+                          <a:solidFill>
+                            <a:schemeClr val="tx1"/>
+                          </a:solidFill>
+                          <a:latin typeface="+mn-lt"/>
+                          <a:ea typeface="+mn-ea"/>
+                          <a:cs typeface="+mn-cs"/>
+                        </a:rPr>
+                        <a:t>0 or more matches</a:t>
+                      </a:r>
+                      <a:endParaRPr lang="en-US" sz="1800" b="0" kern="1200" dirty="0">
+                        <a:solidFill>
+                          <a:schemeClr val="tx1"/>
+                        </a:solidFill>
+                        <a:latin typeface="+mn-lt"/>
+                        <a:ea typeface="+mn-ea"/>
+                        <a:cs typeface="+mn-cs"/>
+                      </a:endParaRPr>
+                    </a:p>
+                  </a:txBody>
+                  <a:tcPr anchor="ctr"/>
+                </a:tc>
+                <a:extLst>
+                  <a:ext uri="{0D108BD9-81ED-4DB2-BD59-A6C34878D82A}">
+                    <a16:rowId xmlns:a16="http://schemas.microsoft.com/office/drawing/2014/main" val="3626129505"/>
+                  </a:ext>
+                </a:extLst>
+              </a:tr>
+              <a:tr h="254794">
+                <a:tc>
+                  <a:txBody>
+                    <a:bodyPr/>
+                    <a:lstStyle/>
+                    <a:p>
+                      <a:pPr algn="l"/>
+                      <a:r>
+                        <a:rPr lang="de-DE" sz="1800" b="0" kern="1200">
+                          <a:solidFill>
+                            <a:schemeClr val="tx1"/>
+                          </a:solidFill>
+                          <a:latin typeface="+mn-lt"/>
+                          <a:ea typeface="+mn-ea"/>
+                          <a:cs typeface="+mn-cs"/>
+                        </a:rPr>
+                        <a:t>+ </a:t>
+                      </a:r>
+                      <a:endParaRPr lang="en-US" sz="1800" b="0" kern="1200" dirty="0">
+                        <a:solidFill>
+                          <a:schemeClr val="tx1"/>
+                        </a:solidFill>
+                        <a:latin typeface="+mn-lt"/>
+                        <a:ea typeface="+mn-ea"/>
+                        <a:cs typeface="+mn-cs"/>
+                      </a:endParaRPr>
+                    </a:p>
+                  </a:txBody>
+                  <a:tcPr anchor="ctr">
+                    <a:solidFill>
+                      <a:schemeClr val="bg1">
+                        <a:lumMod val="85000"/>
+                      </a:schemeClr>
+                    </a:solidFill>
+                  </a:tcPr>
+                </a:tc>
+                <a:tc>
+                  <a:txBody>
+                    <a:bodyPr/>
+                    <a:lstStyle/>
+                    <a:p>
+                      <a:pPr algn="l"/>
+                      <a:r>
+                        <a:rPr lang="de-DE" sz="1800" b="0" kern="1200">
+                          <a:solidFill>
+                            <a:schemeClr val="tx1"/>
+                          </a:solidFill>
+                          <a:latin typeface="+mn-lt"/>
+                          <a:ea typeface="+mn-ea"/>
+                          <a:cs typeface="+mn-cs"/>
+                        </a:rPr>
+                        <a:t>1 or more matches</a:t>
+                      </a:r>
+                      <a:endParaRPr lang="en-US" sz="1800" b="0" kern="1200" dirty="0">
+                        <a:solidFill>
+                          <a:schemeClr val="tx1"/>
+                        </a:solidFill>
+                        <a:latin typeface="+mn-lt"/>
+                        <a:ea typeface="+mn-ea"/>
+                        <a:cs typeface="+mn-cs"/>
+                      </a:endParaRPr>
+                    </a:p>
+                  </a:txBody>
+                  <a:tcPr anchor="ctr"/>
+                </a:tc>
+                <a:extLst>
+                  <a:ext uri="{0D108BD9-81ED-4DB2-BD59-A6C34878D82A}">
+                    <a16:rowId xmlns:a16="http://schemas.microsoft.com/office/drawing/2014/main" val="2605753601"/>
+                  </a:ext>
+                </a:extLst>
+              </a:tr>
+              <a:tr h="254794">
+                <a:tc>
+                  <a:txBody>
+                    <a:bodyPr/>
+                    <a:lstStyle/>
+                    <a:p>
+                      <a:pPr algn="l"/>
+                      <a:r>
+                        <a:rPr lang="en-GB" sz="1800" b="0" kern="1200" dirty="0">
+                          <a:solidFill>
+                            <a:schemeClr val="tx1"/>
+                          </a:solidFill>
+                          <a:latin typeface="+mn-lt"/>
+                          <a:ea typeface="+mn-ea"/>
+                          <a:cs typeface="+mn-cs"/>
+                        </a:rPr>
+                        <a:t>{n,}</a:t>
+                      </a:r>
+                      <a:endParaRPr lang="en-US" sz="1800" b="0" kern="1200" dirty="0">
+                        <a:solidFill>
+                          <a:schemeClr val="tx1"/>
+                        </a:solidFill>
+                        <a:latin typeface="+mn-lt"/>
+                        <a:ea typeface="+mn-ea"/>
+                        <a:cs typeface="+mn-cs"/>
+                      </a:endParaRPr>
+                    </a:p>
+                  </a:txBody>
+                  <a:tcPr anchor="ctr">
+                    <a:solidFill>
+                      <a:schemeClr val="bg1">
+                        <a:lumMod val="85000"/>
+                      </a:schemeClr>
+                    </a:solidFill>
+                  </a:tcPr>
+                </a:tc>
+                <a:tc>
+                  <a:txBody>
+                    <a:bodyPr/>
+                    <a:lstStyle/>
+                    <a:p>
+                      <a:pPr algn="l"/>
+                      <a:r>
+                        <a:rPr lang="en-GB" sz="1800" b="0" kern="1200" dirty="0">
+                          <a:solidFill>
+                            <a:schemeClr val="tx1"/>
+                          </a:solidFill>
+                          <a:latin typeface="+mn-lt"/>
+                          <a:ea typeface="+mn-ea"/>
+                          <a:cs typeface="+mn-cs"/>
+                        </a:rPr>
+                        <a:t>n or more matches</a:t>
+                      </a:r>
+                      <a:endParaRPr lang="en-US" sz="1800" b="0" kern="1200" dirty="0">
+                        <a:solidFill>
+                          <a:schemeClr val="tx1"/>
+                        </a:solidFill>
+                        <a:latin typeface="+mn-lt"/>
+                        <a:ea typeface="+mn-ea"/>
+                        <a:cs typeface="+mn-cs"/>
+                      </a:endParaRPr>
+                    </a:p>
+                  </a:txBody>
+                  <a:tcPr anchor="ctr"/>
+                </a:tc>
+                <a:extLst>
+                  <a:ext uri="{0D108BD9-81ED-4DB2-BD59-A6C34878D82A}">
+                    <a16:rowId xmlns:a16="http://schemas.microsoft.com/office/drawing/2014/main" val="1165361152"/>
+                  </a:ext>
+                </a:extLst>
+              </a:tr>
+              <a:tr h="254794">
+                <a:tc>
+                  <a:txBody>
+                    <a:bodyPr/>
+                    <a:lstStyle/>
+                    <a:p>
+                      <a:pPr algn="l"/>
+                      <a:r>
+                        <a:rPr lang="en-GB" sz="1800" b="0" kern="1200" dirty="0">
+                          <a:solidFill>
+                            <a:schemeClr val="tx1"/>
+                          </a:solidFill>
+                          <a:latin typeface="+mn-lt"/>
+                          <a:ea typeface="+mn-ea"/>
+                          <a:cs typeface="+mn-cs"/>
+                        </a:rPr>
+                        <a:t>{,m}</a:t>
+                      </a:r>
+                      <a:endParaRPr lang="en-US" sz="1800" b="0" kern="1200" dirty="0">
+                        <a:solidFill>
+                          <a:schemeClr val="tx1"/>
+                        </a:solidFill>
+                        <a:latin typeface="+mn-lt"/>
+                        <a:ea typeface="+mn-ea"/>
+                        <a:cs typeface="+mn-cs"/>
+                      </a:endParaRPr>
+                    </a:p>
+                  </a:txBody>
+                  <a:tcPr anchor="ctr">
+                    <a:solidFill>
+                      <a:schemeClr val="bg1">
+                        <a:lumMod val="85000"/>
+                      </a:schemeClr>
+                    </a:solidFill>
+                  </a:tcPr>
+                </a:tc>
+                <a:tc>
+                  <a:txBody>
+                    <a:bodyPr/>
+                    <a:lstStyle/>
+                    <a:p>
+                      <a:pPr algn="l"/>
+                      <a:r>
+                        <a:rPr lang="en-GB" sz="1800" b="0" kern="1200" dirty="0">
+                          <a:solidFill>
+                            <a:schemeClr val="tx1"/>
+                          </a:solidFill>
+                          <a:latin typeface="+mn-lt"/>
+                          <a:ea typeface="+mn-ea"/>
+                          <a:cs typeface="+mn-cs"/>
+                        </a:rPr>
+                        <a:t>at most m matches</a:t>
+                      </a:r>
+                      <a:endParaRPr lang="en-US" sz="1800" b="0" kern="1200" dirty="0">
+                        <a:solidFill>
+                          <a:schemeClr val="tx1"/>
+                        </a:solidFill>
+                        <a:latin typeface="+mn-lt"/>
+                        <a:ea typeface="+mn-ea"/>
+                        <a:cs typeface="+mn-cs"/>
+                      </a:endParaRPr>
+                    </a:p>
+                  </a:txBody>
+                  <a:tcPr anchor="ctr"/>
+                </a:tc>
+                <a:extLst>
+                  <a:ext uri="{0D108BD9-81ED-4DB2-BD59-A6C34878D82A}">
+                    <a16:rowId xmlns:a16="http://schemas.microsoft.com/office/drawing/2014/main" val="714321488"/>
+                  </a:ext>
+                </a:extLst>
+              </a:tr>
+              <a:tr h="254794">
+                <a:tc>
+                  <a:txBody>
+                    <a:bodyPr/>
+                    <a:lstStyle/>
+                    <a:p>
+                      <a:pPr algn="l"/>
+                      <a:r>
+                        <a:rPr lang="en-GB" sz="1800" b="0" kern="1200" dirty="0">
+                          <a:solidFill>
+                            <a:schemeClr val="tx1"/>
+                          </a:solidFill>
+                          <a:latin typeface="+mn-lt"/>
+                          <a:ea typeface="+mn-ea"/>
+                          <a:cs typeface="+mn-cs"/>
+                        </a:rPr>
+                        <a:t>{</a:t>
+                      </a:r>
+                      <a:r>
+                        <a:rPr lang="en-GB" sz="1800" b="0" kern="1200" dirty="0" err="1">
+                          <a:solidFill>
+                            <a:schemeClr val="tx1"/>
+                          </a:solidFill>
+                          <a:latin typeface="+mn-lt"/>
+                          <a:ea typeface="+mn-ea"/>
+                          <a:cs typeface="+mn-cs"/>
+                        </a:rPr>
+                        <a:t>n,m</a:t>
+                      </a:r>
+                      <a:r>
+                        <a:rPr lang="en-GB" sz="1800" b="0" kern="1200" dirty="0">
+                          <a:solidFill>
+                            <a:schemeClr val="tx1"/>
+                          </a:solidFill>
+                          <a:latin typeface="+mn-lt"/>
+                          <a:ea typeface="+mn-ea"/>
+                          <a:cs typeface="+mn-cs"/>
+                        </a:rPr>
+                        <a:t>}</a:t>
+                      </a:r>
+                      <a:endParaRPr lang="en-US" sz="1800" b="0" kern="1200" dirty="0">
+                        <a:solidFill>
+                          <a:schemeClr val="tx1"/>
+                        </a:solidFill>
+                        <a:latin typeface="+mn-lt"/>
+                        <a:ea typeface="+mn-ea"/>
+                        <a:cs typeface="+mn-cs"/>
+                      </a:endParaRPr>
+                    </a:p>
+                  </a:txBody>
+                  <a:tcPr anchor="ctr">
+                    <a:solidFill>
+                      <a:schemeClr val="bg1">
+                        <a:lumMod val="85000"/>
+                      </a:schemeClr>
+                    </a:solidFill>
+                  </a:tcPr>
+                </a:tc>
+                <a:tc>
+                  <a:txBody>
+                    <a:bodyPr/>
+                    <a:lstStyle/>
+                    <a:p>
+                      <a:pPr algn="l"/>
+                      <a:r>
+                        <a:rPr lang="en-GB" sz="1800" b="0" kern="1200" dirty="0">
+                          <a:solidFill>
+                            <a:schemeClr val="tx1"/>
+                          </a:solidFill>
+                          <a:latin typeface="+mn-lt"/>
+                          <a:ea typeface="+mn-ea"/>
+                          <a:cs typeface="+mn-cs"/>
+                        </a:rPr>
+                        <a:t>between n and m matches</a:t>
+                      </a:r>
+                      <a:endParaRPr lang="en-US" sz="1800" b="0" kern="1200" dirty="0">
+                        <a:solidFill>
+                          <a:schemeClr val="tx1"/>
+                        </a:solidFill>
+                        <a:latin typeface="+mn-lt"/>
+                        <a:ea typeface="+mn-ea"/>
+                        <a:cs typeface="+mn-cs"/>
+                      </a:endParaRPr>
+                    </a:p>
+                  </a:txBody>
+                  <a:tcPr anchor="ctr"/>
+                </a:tc>
+                <a:extLst>
+                  <a:ext uri="{0D108BD9-81ED-4DB2-BD59-A6C34878D82A}">
+                    <a16:rowId xmlns:a16="http://schemas.microsoft.com/office/drawing/2014/main" val="119559271"/>
+                  </a:ext>
+                </a:extLst>
+              </a:tr>
+              <a:tr h="254794">
+                <a:tc>
+                  <a:txBody>
+                    <a:bodyPr/>
+                    <a:lstStyle/>
+                    <a:p>
+                      <a:pPr algn="l"/>
+                      <a:endParaRPr lang="en-US" sz="1800" b="0" kern="1200" dirty="0">
+                        <a:solidFill>
+                          <a:schemeClr val="tx1"/>
+                        </a:solidFill>
+                        <a:latin typeface="+mn-lt"/>
+                        <a:ea typeface="+mn-ea"/>
+                        <a:cs typeface="+mn-cs"/>
+                      </a:endParaRPr>
+                    </a:p>
+                  </a:txBody>
+                  <a:tcPr anchor="ctr">
+                    <a:solidFill>
+                      <a:schemeClr val="bg1">
+                        <a:lumMod val="85000"/>
+                      </a:schemeClr>
+                    </a:solidFill>
+                  </a:tcPr>
+                </a:tc>
+                <a:tc>
+                  <a:txBody>
+                    <a:bodyPr/>
+                    <a:lstStyle/>
+                    <a:p>
+                      <a:pPr algn="l"/>
+                      <a:endParaRPr lang="en-US" sz="1800" b="0" kern="1200" dirty="0">
+                        <a:solidFill>
+                          <a:schemeClr val="tx1"/>
+                        </a:solidFill>
+                        <a:latin typeface="+mn-lt"/>
+                        <a:ea typeface="+mn-ea"/>
+                        <a:cs typeface="+mn-cs"/>
+                      </a:endParaRPr>
+                    </a:p>
+                  </a:txBody>
+                  <a:tcPr anchor="ctr"/>
+                </a:tc>
+                <a:extLst>
+                  <a:ext uri="{0D108BD9-81ED-4DB2-BD59-A6C34878D82A}">
+                    <a16:rowId xmlns:a16="http://schemas.microsoft.com/office/drawing/2014/main" val="869907065"/>
+                  </a:ext>
+                </a:extLst>
+              </a:tr>
+            </a:tbl>
+          </a:graphicData>
+        </a:graphic>
+      </p:graphicFrame>
+      <p:sp>
+        <p:nvSpPr>
+          <p:cNvPr id="9" name="Rectangle 8">
+            <a:extLst>
+              <a:ext uri="{FF2B5EF4-FFF2-40B4-BE49-F238E27FC236}">
+                <a16:creationId xmlns:a16="http://schemas.microsoft.com/office/drawing/2014/main" id="{681685EE-532E-4BCA-82AE-FC4ABF85F532}"/>
+              </a:ext>
+            </a:extLst>
+          </p:cNvPr>
+          <p:cNvSpPr/>
+          <p:nvPr/>
+        </p:nvSpPr>
+        <p:spPr>
+          <a:xfrm>
+            <a:off x="4827104" y="0"/>
+            <a:ext cx="7364896" cy="914400"/>
+          </a:xfrm>
+          <a:prstGeom prst="rect">
+            <a:avLst/>
+          </a:prstGeom>
+          <a:solidFill>
+            <a:schemeClr val="accent2"/>
+          </a:solidFill>
+          <a:ln>
+            <a:solidFill>
+              <a:schemeClr val="accent2"/>
+            </a:solidFill>
+          </a:ln>
+        </p:spPr>
+        <p:style>
+          <a:lnRef idx="2">
+            <a:schemeClr val="accent1">
+              <a:shade val="50000"/>
+            </a:schemeClr>
+          </a:lnRef>
+          <a:fillRef idx="1">
+            <a:schemeClr val="accent1"/>
+          </a:fillRef>
+          <a:effectRef idx="0">
+            <a:schemeClr val="accent1"/>
+          </a:effectRef>
+          <a:fontRef idx="minor">
+            <a:schemeClr val="lt1"/>
+          </a:fontRef>
+        </p:style>
+        <p:txBody>
+          <a:bodyPr rtlCol="0" anchor="ctr"/>
+          <a:lstStyle/>
+          <a:p>
+            <a:pPr algn="ctr"/>
+            <a:r>
+              <a:rPr lang="de-DE"/>
+              <a:t>nochmal checken!! und ggf. ergänzen </a:t>
+            </a:r>
+          </a:p>
+          <a:p>
+            <a:pPr algn="ctr"/>
+            <a:r>
+              <a:rPr lang="de-DE"/>
+              <a:t>https://cran.r-project.org/web/packages/stringr/vignettes/regular-expressions.html</a:t>
+            </a:r>
+            <a:endParaRPr lang="en-US"/>
+          </a:p>
+        </p:txBody>
+      </p:sp>
+    </p:spTree>
+    <p:extLst>
+      <p:ext uri="{BB962C8B-B14F-4D97-AF65-F5344CB8AC3E}">
+        <p14:creationId xmlns:p14="http://schemas.microsoft.com/office/powerpoint/2010/main" val="1583612714"/>
+      </p:ext>
+    </p:extLst>
+  </p:cSld>
+  <p:clrMapOvr>
+    <a:masterClrMapping/>
+  </p:clrMapOvr>
+</p:sld>
+</file>
+
+<file path=ppt/slides/slide23.xml><?xml version="1.0" encoding="utf-8"?>
+<p:sld xmlns:a="http://schemas.openxmlformats.org/drawingml/2006/main" xmlns:r="http://schemas.openxmlformats.org/officeDocument/2006/relationships" xmlns:p="http://schemas.openxmlformats.org/presentationml/2006/main">
+  <p:cSld>
+    <p:spTree>
+      <p:nvGrpSpPr>
+        <p:cNvPr id="1" name=""/>
+        <p:cNvGrpSpPr/>
+        <p:nvPr/>
+      </p:nvGrpSpPr>
+      <p:grpSpPr>
+        <a:xfrm>
+          <a:off x="0" y="0"/>
+          <a:ext cx="0" cy="0"/>
+          <a:chOff x="0" y="0"/>
+          <a:chExt cx="0" cy="0"/>
+        </a:xfrm>
+      </p:grpSpPr>
+      <p:sp>
+        <p:nvSpPr>
+          <p:cNvPr id="4" name="Foliennummernplatzhalter 3"/>
+          <p:cNvSpPr>
+            <a:spLocks noGrp="1"/>
+          </p:cNvSpPr>
+          <p:nvPr>
+            <p:ph type="sldNum" sz="quarter" idx="12"/>
+          </p:nvPr>
+        </p:nvSpPr>
+        <p:spPr/>
+        <p:txBody>
+          <a:bodyPr/>
+          <a:lstStyle/>
+          <a:p>
+            <a:fld id="{C9E0B00B-E6DF-4183-A694-3DE28BEFB357}" type="slidenum">
+              <a:rPr lang="en-US" smtClean="0"/>
+              <a:t>23</a:t>
             </a:fld>
             <a:endParaRPr lang="en-US"/>
           </a:p>
@@ -10822,64 +12849,6 @@
           </a:p>
         </p:txBody>
       </p:sp>
-      <p:sp>
-        <p:nvSpPr>
-          <p:cNvPr id="19" name="Rectangle 18">
-            <a:extLst>
-              <a:ext uri="{FF2B5EF4-FFF2-40B4-BE49-F238E27FC236}">
-                <a16:creationId xmlns:a16="http://schemas.microsoft.com/office/drawing/2014/main" id="{C22E037B-91C0-4FF0-9124-30AE6F479834}"/>
-              </a:ext>
-            </a:extLst>
-          </p:cNvPr>
-          <p:cNvSpPr/>
-          <p:nvPr/>
-        </p:nvSpPr>
-        <p:spPr>
-          <a:xfrm>
-            <a:off x="4827104" y="0"/>
-            <a:ext cx="7364896" cy="914400"/>
-          </a:xfrm>
-          <a:prstGeom prst="rect">
-            <a:avLst/>
-          </a:prstGeom>
-          <a:solidFill>
-            <a:schemeClr val="accent2"/>
-          </a:solidFill>
-          <a:ln>
-            <a:solidFill>
-              <a:schemeClr val="accent2"/>
-            </a:solidFill>
-          </a:ln>
-        </p:spPr>
-        <p:style>
-          <a:lnRef idx="2">
-            <a:schemeClr val="accent1">
-              <a:shade val="50000"/>
-            </a:schemeClr>
-          </a:lnRef>
-          <a:fillRef idx="1">
-            <a:schemeClr val="accent1"/>
-          </a:fillRef>
-          <a:effectRef idx="0">
-            <a:schemeClr val="accent1"/>
-          </a:effectRef>
-          <a:fontRef idx="minor">
-            <a:schemeClr val="lt1"/>
-          </a:fontRef>
-        </p:style>
-        <p:txBody>
-          <a:bodyPr rtlCol="0" anchor="ctr"/>
-          <a:lstStyle/>
-          <a:p>
-            <a:pPr algn="ctr"/>
-            <a:r>
-              <a:rPr lang="de-DE"/>
-              <a:t>stemming &amp; lemmatization bisschen ausführlicher (bzw. vor allem demo dazu)</a:t>
-            </a:r>
-            <a:endParaRPr lang="en-US"/>
-          </a:p>
-        </p:txBody>
-      </p:sp>
     </p:spTree>
     <p:extLst>
       <p:ext uri="{BB962C8B-B14F-4D97-AF65-F5344CB8AC3E}">
@@ -10893,7 +12862,7 @@
 </p:sld>
 </file>
 
-<file path=ppt/slides/slide22.xml><?xml version="1.0" encoding="utf-8"?>
+<file path=ppt/slides/slide24.xml><?xml version="1.0" encoding="utf-8"?>
 <p:sld xmlns:a="http://schemas.openxmlformats.org/drawingml/2006/main" xmlns:r="http://schemas.openxmlformats.org/officeDocument/2006/relationships" xmlns:p="http://schemas.openxmlformats.org/presentationml/2006/main">
   <p:cSld>
     <p:spTree>
@@ -10927,7 +12896,7 @@
           <a:p>
             <a:fld id="{C9E0B00B-E6DF-4183-A694-3DE28BEFB357}" type="slidenum">
               <a:rPr lang="en-US" smtClean="0"/>
-              <a:t>22</a:t>
+              <a:t>24</a:t>
             </a:fld>
             <a:endParaRPr lang="en-US"/>
           </a:p>
@@ -11176,7 +13145,7 @@
 </p:sld>
 </file>
 
-<file path=ppt/slides/slide23.xml><?xml version="1.0" encoding="utf-8"?>
+<file path=ppt/slides/slide25.xml><?xml version="1.0" encoding="utf-8"?>
 <p:sld xmlns:a="http://schemas.openxmlformats.org/drawingml/2006/main" xmlns:r="http://schemas.openxmlformats.org/officeDocument/2006/relationships" xmlns:p="http://schemas.openxmlformats.org/presentationml/2006/main">
   <p:cSld>
     <p:spTree>
@@ -11210,7 +13179,7 @@
           <a:p>
             <a:fld id="{C9E0B00B-E6DF-4183-A694-3DE28BEFB357}" type="slidenum">
               <a:rPr lang="en-US" smtClean="0"/>
-              <a:t>23</a:t>
+              <a:t>25</a:t>
             </a:fld>
             <a:endParaRPr lang="en-US"/>
           </a:p>
@@ -11426,7 +13395,7 @@
 </p:sld>
 </file>
 
-<file path=ppt/slides/slide24.xml><?xml version="1.0" encoding="utf-8"?>
+<file path=ppt/slides/slide26.xml><?xml version="1.0" encoding="utf-8"?>
 <p:sld xmlns:a="http://schemas.openxmlformats.org/drawingml/2006/main" xmlns:r="http://schemas.openxmlformats.org/officeDocument/2006/relationships" xmlns:p="http://schemas.openxmlformats.org/presentationml/2006/main">
   <p:cSld>
     <p:spTree>
@@ -11460,7 +13429,7 @@
           <a:p>
             <a:fld id="{C9E0B00B-E6DF-4183-A694-3DE28BEFB357}" type="slidenum">
               <a:rPr lang="en-US" smtClean="0"/>
-              <a:t>24</a:t>
+              <a:t>26</a:t>
             </a:fld>
             <a:endParaRPr lang="en-US"/>
           </a:p>
@@ -11574,7 +13543,7 @@
 </p:sld>
 </file>
 
-<file path=ppt/slides/slide25.xml><?xml version="1.0" encoding="utf-8"?>
+<file path=ppt/slides/slide27.xml><?xml version="1.0" encoding="utf-8"?>
 <p:sld xmlns:a="http://schemas.openxmlformats.org/drawingml/2006/main" xmlns:r="http://schemas.openxmlformats.org/officeDocument/2006/relationships" xmlns:p="http://schemas.openxmlformats.org/presentationml/2006/main">
   <p:cSld>
     <p:spTree>
@@ -11687,7 +13656,7 @@
           <a:p>
             <a:fld id="{C9E0B00B-E6DF-4183-A694-3DE28BEFB357}" type="slidenum">
               <a:rPr lang="en-US" smtClean="0"/>
-              <a:t>25</a:t>
+              <a:t>27</a:t>
             </a:fld>
             <a:endParaRPr lang="en-US"/>
           </a:p>
@@ -11706,7 +13675,7 @@
 </p:sld>
 </file>
 
-<file path=ppt/slides/slide26.xml><?xml version="1.0" encoding="utf-8"?>
+<file path=ppt/slides/slide28.xml><?xml version="1.0" encoding="utf-8"?>
 <p:sld xmlns:a="http://schemas.openxmlformats.org/drawingml/2006/main" xmlns:r="http://schemas.openxmlformats.org/officeDocument/2006/relationships" xmlns:p="http://schemas.openxmlformats.org/presentationml/2006/main">
   <p:cSld>
     <p:spTree>
@@ -11772,7 +13741,7 @@
           <a:p>
             <a:fld id="{C9E0B00B-E6DF-4183-A694-3DE28BEFB357}" type="slidenum">
               <a:rPr lang="en-US" smtClean="0"/>
-              <a:t>26</a:t>
+              <a:t>28</a:t>
             </a:fld>
             <a:endParaRPr lang="en-US"/>
           </a:p>

</xml_diff>

<commit_message>
revised regex list in slides
</commit_message>
<xml_diff>
--- a/5_seminar/Contents_Part_02/slides/Präsentation_Teil2_Lisa.pptx
+++ b/5_seminar/Contents_Part_02/slides/Präsentation_Teil2_Lisa.pptx
@@ -27,13 +27,13 @@
     <p:sldId id="318" r:id="rId18"/>
     <p:sldId id="320" r:id="rId19"/>
     <p:sldId id="328" r:id="rId20"/>
-    <p:sldId id="322" r:id="rId21"/>
-    <p:sldId id="333" r:id="rId22"/>
-    <p:sldId id="334" r:id="rId23"/>
+    <p:sldId id="333" r:id="rId21"/>
+    <p:sldId id="334" r:id="rId22"/>
+    <p:sldId id="335" r:id="rId23"/>
     <p:sldId id="329" r:id="rId24"/>
     <p:sldId id="327" r:id="rId25"/>
-    <p:sldId id="324" r:id="rId26"/>
-    <p:sldId id="332" r:id="rId27"/>
+    <p:sldId id="332" r:id="rId26"/>
+    <p:sldId id="324" r:id="rId27"/>
     <p:sldId id="331" r:id="rId28"/>
     <p:sldId id="274" r:id="rId29"/>
   </p:sldIdLst>
@@ -1413,7 +1413,7 @@
     </p:spTree>
     <p:extLst>
       <p:ext uri="{BB962C8B-B14F-4D97-AF65-F5344CB8AC3E}">
-        <p14:creationId xmlns:p14="http://schemas.microsoft.com/office/powerpoint/2010/main" val="2338490074"/>
+        <p14:creationId xmlns:p14="http://schemas.microsoft.com/office/powerpoint/2010/main" val="2125338506"/>
       </p:ext>
     </p:extLst>
   </p:cSld>
@@ -1514,7 +1514,7 @@
     </p:spTree>
     <p:extLst>
       <p:ext uri="{BB962C8B-B14F-4D97-AF65-F5344CB8AC3E}">
-        <p14:creationId xmlns:p14="http://schemas.microsoft.com/office/powerpoint/2010/main" val="2125338506"/>
+        <p14:creationId xmlns:p14="http://schemas.microsoft.com/office/powerpoint/2010/main" val="1043460771"/>
       </p:ext>
     </p:extLst>
   </p:cSld>
@@ -1615,7 +1615,7 @@
     </p:spTree>
     <p:extLst>
       <p:ext uri="{BB962C8B-B14F-4D97-AF65-F5344CB8AC3E}">
-        <p14:creationId xmlns:p14="http://schemas.microsoft.com/office/powerpoint/2010/main" val="1043460771"/>
+        <p14:creationId xmlns:p14="http://schemas.microsoft.com/office/powerpoint/2010/main" val="1901018132"/>
       </p:ext>
     </p:extLst>
   </p:cSld>
@@ -2100,7 +2100,7 @@
     </p:spTree>
     <p:extLst>
       <p:ext uri="{BB962C8B-B14F-4D97-AF65-F5344CB8AC3E}">
-        <p14:creationId xmlns:p14="http://schemas.microsoft.com/office/powerpoint/2010/main" val="2610095379"/>
+        <p14:creationId xmlns:p14="http://schemas.microsoft.com/office/powerpoint/2010/main" val="2688366435"/>
       </p:ext>
     </p:extLst>
   </p:cSld>
@@ -2201,7 +2201,7 @@
     </p:spTree>
     <p:extLst>
       <p:ext uri="{BB962C8B-B14F-4D97-AF65-F5344CB8AC3E}">
-        <p14:creationId xmlns:p14="http://schemas.microsoft.com/office/powerpoint/2010/main" val="2688366435"/>
+        <p14:creationId xmlns:p14="http://schemas.microsoft.com/office/powerpoint/2010/main" val="2610095379"/>
       </p:ext>
     </p:extLst>
   </p:cSld>
@@ -9213,987 +9213,14 @@
           <p:nvPr>
             <p:extLst>
               <p:ext uri="{D42A27DB-BD31-4B8C-83A1-F6EECF244321}">
-                <p14:modId xmlns:p14="http://schemas.microsoft.com/office/powerpoint/2010/main" val="2941018916"/>
-              </p:ext>
-            </p:extLst>
-          </p:nvPr>
-        </p:nvGraphicFramePr>
-        <p:xfrm>
-          <a:off x="1066801" y="1966912"/>
-          <a:ext cx="10287000" cy="4239675"/>
-        </p:xfrm>
-        <a:graphic>
-          <a:graphicData uri="http://schemas.openxmlformats.org/drawingml/2006/table">
-            <a:tbl>
-              <a:tblPr firstRow="1" bandRow="1">
-                <a:tableStyleId>{5940675A-B579-460E-94D1-54222C63F5DA}</a:tableStyleId>
-              </a:tblPr>
-              <a:tblGrid>
-                <a:gridCol w="2886074">
-                  <a:extLst>
-                    <a:ext uri="{9D8B030D-6E8A-4147-A177-3AD203B41FA5}">
-                      <a16:colId xmlns:a16="http://schemas.microsoft.com/office/drawing/2014/main" val="1121755169"/>
-                    </a:ext>
-                  </a:extLst>
-                </a:gridCol>
-                <a:gridCol w="7400926">
-                  <a:extLst>
-                    <a:ext uri="{9D8B030D-6E8A-4147-A177-3AD203B41FA5}">
-                      <a16:colId xmlns:a16="http://schemas.microsoft.com/office/drawing/2014/main" val="3255343523"/>
-                    </a:ext>
-                  </a:extLst>
-                </a:gridCol>
-              </a:tblGrid>
-              <a:tr h="215358">
-                <a:tc>
-                  <a:txBody>
-                    <a:bodyPr/>
-                    <a:lstStyle/>
-                    <a:p>
-                      <a:r>
-                        <a:rPr lang="en-US" sz="1800" b="1" dirty="0"/>
-                        <a:t>Pattern</a:t>
-                      </a:r>
-                    </a:p>
-                  </a:txBody>
-                  <a:tcPr>
-                    <a:solidFill>
-                      <a:schemeClr val="bg1">
-                        <a:lumMod val="85000"/>
-                      </a:schemeClr>
-                    </a:solidFill>
-                  </a:tcPr>
-                </a:tc>
-                <a:tc>
-                  <a:txBody>
-                    <a:bodyPr/>
-                    <a:lstStyle/>
-                    <a:p>
-                      <a:pPr algn="l"/>
-                      <a:r>
-                        <a:rPr lang="en-US" sz="1800" b="1" dirty="0"/>
-                        <a:t>Function</a:t>
-                      </a:r>
-                    </a:p>
-                  </a:txBody>
-                  <a:tcPr/>
-                </a:tc>
-                <a:extLst>
-                  <a:ext uri="{0D108BD9-81ED-4DB2-BD59-A6C34878D82A}">
-                    <a16:rowId xmlns:a16="http://schemas.microsoft.com/office/drawing/2014/main" val="3604647407"/>
-                  </a:ext>
-                </a:extLst>
-              </a:tr>
-              <a:tr h="430435">
-                <a:tc>
-                  <a:txBody>
-                    <a:bodyPr/>
-                    <a:lstStyle/>
-                    <a:p>
-                      <a:r>
-                        <a:rPr lang="en-US" sz="1800" b="0" kern="1200" dirty="0">
-                          <a:solidFill>
-                            <a:schemeClr val="tx1"/>
-                          </a:solidFill>
-                          <a:latin typeface="+mn-lt"/>
-                          <a:ea typeface="+mn-ea"/>
-                          <a:cs typeface="+mn-cs"/>
-                        </a:rPr>
-                        <a:t>\d or [:digit:] or [0-9]</a:t>
-                      </a:r>
-                    </a:p>
-                  </a:txBody>
-                  <a:tcPr>
-                    <a:solidFill>
-                      <a:schemeClr val="bg1">
-                        <a:lumMod val="85000"/>
-                      </a:schemeClr>
-                    </a:solidFill>
-                  </a:tcPr>
-                </a:tc>
-                <a:tc>
-                  <a:txBody>
-                    <a:bodyPr/>
-                    <a:lstStyle/>
-                    <a:p>
-                      <a:r>
-                        <a:rPr lang="en-US" sz="1800" b="0" kern="1200" dirty="0">
-                          <a:solidFill>
-                            <a:schemeClr val="tx1"/>
-                          </a:solidFill>
-                          <a:latin typeface="+mn-lt"/>
-                          <a:ea typeface="+mn-ea"/>
-                          <a:cs typeface="+mn-cs"/>
-                        </a:rPr>
-                        <a:t>Matches any digit</a:t>
-                      </a:r>
-                    </a:p>
-                  </a:txBody>
-                  <a:tcPr/>
-                </a:tc>
-                <a:extLst>
-                  <a:ext uri="{0D108BD9-81ED-4DB2-BD59-A6C34878D82A}">
-                    <a16:rowId xmlns:a16="http://schemas.microsoft.com/office/drawing/2014/main" val="1726118439"/>
-                  </a:ext>
-                </a:extLst>
-              </a:tr>
-              <a:tr h="430435">
-                <a:tc>
-                  <a:txBody>
-                    <a:bodyPr/>
-                    <a:lstStyle/>
-                    <a:p>
-                      <a:pPr marL="0" marR="0" lvl="0" indent="0" algn="l" defTabSz="914400" rtl="0" eaLnBrk="1" fontAlgn="auto" latinLnBrk="0" hangingPunct="1">
-                        <a:lnSpc>
-                          <a:spcPct val="100000"/>
-                        </a:lnSpc>
-                        <a:spcBef>
-                          <a:spcPts val="0"/>
-                        </a:spcBef>
-                        <a:spcAft>
-                          <a:spcPts val="0"/>
-                        </a:spcAft>
-                        <a:buClrTx/>
-                        <a:buSzTx/>
-                        <a:buFontTx/>
-                        <a:buNone/>
-                        <a:tabLst/>
-                        <a:defRPr/>
-                      </a:pPr>
-                      <a:r>
-                        <a:rPr lang="en-GB" sz="1800" b="0" kern="1200" dirty="0">
-                          <a:solidFill>
-                            <a:schemeClr val="tx1"/>
-                          </a:solidFill>
-                          <a:latin typeface="+mn-lt"/>
-                          <a:ea typeface="+mn-ea"/>
-                          <a:cs typeface="+mn-cs"/>
-                        </a:rPr>
-                        <a:t>[a-z] or [:lower:]</a:t>
-                      </a:r>
-                      <a:endParaRPr lang="en-US" sz="1800" b="0" kern="1200" dirty="0">
-                        <a:solidFill>
-                          <a:schemeClr val="tx1"/>
-                        </a:solidFill>
-                        <a:latin typeface="+mn-lt"/>
-                        <a:ea typeface="+mn-ea"/>
-                        <a:cs typeface="+mn-cs"/>
-                      </a:endParaRPr>
-                    </a:p>
-                  </a:txBody>
-                  <a:tcPr>
-                    <a:solidFill>
-                      <a:schemeClr val="bg1">
-                        <a:lumMod val="85000"/>
-                      </a:schemeClr>
-                    </a:solidFill>
-                  </a:tcPr>
-                </a:tc>
-                <a:tc>
-                  <a:txBody>
-                    <a:bodyPr/>
-                    <a:lstStyle/>
-                    <a:p>
-                      <a:r>
-                        <a:rPr lang="en-US" sz="1800" b="0" kern="1200" dirty="0">
-                          <a:solidFill>
-                            <a:schemeClr val="tx1"/>
-                          </a:solidFill>
-                          <a:latin typeface="+mn-lt"/>
-                          <a:ea typeface="+mn-ea"/>
-                          <a:cs typeface="+mn-cs"/>
-                        </a:rPr>
-                        <a:t>Matches </a:t>
-                      </a:r>
-                      <a:r>
-                        <a:rPr lang="en-US" sz="1800" b="0" kern="1200">
-                          <a:solidFill>
-                            <a:schemeClr val="tx1"/>
-                          </a:solidFill>
-                          <a:latin typeface="+mn-lt"/>
-                          <a:ea typeface="+mn-ea"/>
-                          <a:cs typeface="+mn-cs"/>
-                        </a:rPr>
-                        <a:t>any whitespace</a:t>
-                      </a:r>
-                      <a:endParaRPr lang="en-US" sz="1800" b="0" kern="1200" dirty="0">
-                        <a:solidFill>
-                          <a:schemeClr val="tx1"/>
-                        </a:solidFill>
-                        <a:latin typeface="+mn-lt"/>
-                        <a:ea typeface="+mn-ea"/>
-                        <a:cs typeface="+mn-cs"/>
-                      </a:endParaRPr>
-                    </a:p>
-                  </a:txBody>
-                  <a:tcPr/>
-                </a:tc>
-                <a:extLst>
-                  <a:ext uri="{0D108BD9-81ED-4DB2-BD59-A6C34878D82A}">
-                    <a16:rowId xmlns:a16="http://schemas.microsoft.com/office/drawing/2014/main" val="1294027997"/>
-                  </a:ext>
-                </a:extLst>
-              </a:tr>
-              <a:tr h="430435">
-                <a:tc>
-                  <a:txBody>
-                    <a:bodyPr/>
-                    <a:lstStyle/>
-                    <a:p>
-                      <a:r>
-                        <a:rPr lang="en-GB" sz="1800" b="0" kern="1200" dirty="0">
-                          <a:solidFill>
-                            <a:schemeClr val="tx1"/>
-                          </a:solidFill>
-                          <a:latin typeface="+mn-lt"/>
-                          <a:ea typeface="+mn-ea"/>
-                          <a:cs typeface="+mn-cs"/>
-                        </a:rPr>
-                        <a:t>[A-Z] or [:upper:]</a:t>
-                      </a:r>
-                      <a:endParaRPr lang="en-US" sz="1800" b="0" kern="1200" dirty="0">
-                        <a:solidFill>
-                          <a:schemeClr val="tx1"/>
-                        </a:solidFill>
-                        <a:latin typeface="+mn-lt"/>
-                        <a:ea typeface="+mn-ea"/>
-                        <a:cs typeface="+mn-cs"/>
-                      </a:endParaRPr>
-                    </a:p>
-                  </a:txBody>
-                  <a:tcPr>
-                    <a:solidFill>
-                      <a:schemeClr val="bg1">
-                        <a:lumMod val="85000"/>
-                      </a:schemeClr>
-                    </a:solidFill>
-                  </a:tcPr>
-                </a:tc>
-                <a:tc>
-                  <a:txBody>
-                    <a:bodyPr/>
-                    <a:lstStyle/>
-                    <a:p>
-                      <a:pPr marL="0" marR="0" lvl="0" indent="0" algn="l" defTabSz="914400" rtl="0" eaLnBrk="1" fontAlgn="auto" latinLnBrk="0" hangingPunct="1">
-                        <a:lnSpc>
-                          <a:spcPct val="100000"/>
-                        </a:lnSpc>
-                        <a:spcBef>
-                          <a:spcPts val="0"/>
-                        </a:spcBef>
-                        <a:spcAft>
-                          <a:spcPts val="0"/>
-                        </a:spcAft>
-                        <a:buClrTx/>
-                        <a:buSzTx/>
-                        <a:buFontTx/>
-                        <a:buNone/>
-                        <a:tabLst/>
-                        <a:defRPr/>
-                      </a:pPr>
-                      <a:r>
-                        <a:rPr lang="en-US" sz="1800" b="0" kern="1200" dirty="0">
-                          <a:solidFill>
-                            <a:schemeClr val="tx1"/>
-                          </a:solidFill>
-                          <a:latin typeface="+mn-lt"/>
-                          <a:ea typeface="+mn-ea"/>
-                          <a:cs typeface="+mn-cs"/>
-                        </a:rPr>
-                        <a:t>Matches any alphanumeric</a:t>
-                      </a:r>
-                    </a:p>
-                  </a:txBody>
-                  <a:tcPr/>
-                </a:tc>
-                <a:extLst>
-                  <a:ext uri="{0D108BD9-81ED-4DB2-BD59-A6C34878D82A}">
-                    <a16:rowId xmlns:a16="http://schemas.microsoft.com/office/drawing/2014/main" val="427721822"/>
-                  </a:ext>
-                </a:extLst>
-              </a:tr>
-              <a:tr h="430435">
-                <a:tc>
-                  <a:txBody>
-                    <a:bodyPr/>
-                    <a:lstStyle/>
-                    <a:p>
-                      <a:r>
-                        <a:rPr lang="en-GB" sz="1800" b="0" kern="1200" dirty="0">
-                          <a:solidFill>
-                            <a:schemeClr val="tx1"/>
-                          </a:solidFill>
-                          <a:latin typeface="+mn-lt"/>
-                          <a:ea typeface="+mn-ea"/>
-                          <a:cs typeface="+mn-cs"/>
-                        </a:rPr>
-                        <a:t>[</a:t>
-                      </a:r>
-                      <a:r>
-                        <a:rPr lang="en-GB" sz="1800" b="0" kern="1200" dirty="0" err="1">
-                          <a:solidFill>
-                            <a:schemeClr val="tx1"/>
-                          </a:solidFill>
-                          <a:latin typeface="+mn-lt"/>
-                          <a:ea typeface="+mn-ea"/>
-                          <a:cs typeface="+mn-cs"/>
-                        </a:rPr>
-                        <a:t>abc</a:t>
-                      </a:r>
-                      <a:r>
-                        <a:rPr lang="en-GB" sz="1800" b="0" kern="1200" dirty="0">
-                          <a:solidFill>
-                            <a:schemeClr val="tx1"/>
-                          </a:solidFill>
-                          <a:latin typeface="+mn-lt"/>
-                          <a:ea typeface="+mn-ea"/>
-                          <a:cs typeface="+mn-cs"/>
-                        </a:rPr>
-                        <a:t>]</a:t>
-                      </a:r>
-                      <a:endParaRPr lang="en-US" sz="1800" b="0" kern="1200" dirty="0">
-                        <a:solidFill>
-                          <a:schemeClr val="tx1"/>
-                        </a:solidFill>
-                        <a:latin typeface="+mn-lt"/>
-                        <a:ea typeface="+mn-ea"/>
-                        <a:cs typeface="+mn-cs"/>
-                      </a:endParaRPr>
-                    </a:p>
-                  </a:txBody>
-                  <a:tcPr>
-                    <a:solidFill>
-                      <a:schemeClr val="bg1">
-                        <a:lumMod val="85000"/>
-                      </a:schemeClr>
-                    </a:solidFill>
-                  </a:tcPr>
-                </a:tc>
-                <a:tc>
-                  <a:txBody>
-                    <a:bodyPr/>
-                    <a:lstStyle/>
-                    <a:p>
-                      <a:r>
-                        <a:rPr lang="en-US" sz="1800" b="0" kern="1200" dirty="0">
-                          <a:solidFill>
-                            <a:schemeClr val="tx1"/>
-                          </a:solidFill>
-                          <a:latin typeface="+mn-lt"/>
-                          <a:ea typeface="+mn-ea"/>
-                          <a:cs typeface="+mn-cs"/>
-                        </a:rPr>
-                        <a:t>Matches a, b or c</a:t>
-                      </a:r>
-                    </a:p>
-                  </a:txBody>
-                  <a:tcPr/>
-                </a:tc>
-                <a:extLst>
-                  <a:ext uri="{0D108BD9-81ED-4DB2-BD59-A6C34878D82A}">
-                    <a16:rowId xmlns:a16="http://schemas.microsoft.com/office/drawing/2014/main" val="3626129505"/>
-                  </a:ext>
-                </a:extLst>
-              </a:tr>
-              <a:tr h="430435">
-                <a:tc>
-                  <a:txBody>
-                    <a:bodyPr/>
-                    <a:lstStyle/>
-                    <a:p>
-                      <a:r>
-                        <a:rPr lang="en-GB" sz="1800" b="0" kern="1200" dirty="0">
-                          <a:solidFill>
-                            <a:schemeClr val="tx1"/>
-                          </a:solidFill>
-                          <a:latin typeface="+mn-lt"/>
-                          <a:ea typeface="+mn-ea"/>
-                          <a:cs typeface="+mn-cs"/>
-                        </a:rPr>
-                        <a:t>[^</a:t>
-                      </a:r>
-                      <a:r>
-                        <a:rPr lang="en-GB" sz="1800" b="0" kern="1200" dirty="0" err="1">
-                          <a:solidFill>
-                            <a:schemeClr val="tx1"/>
-                          </a:solidFill>
-                          <a:latin typeface="+mn-lt"/>
-                          <a:ea typeface="+mn-ea"/>
-                          <a:cs typeface="+mn-cs"/>
-                        </a:rPr>
-                        <a:t>abc</a:t>
-                      </a:r>
-                      <a:r>
-                        <a:rPr lang="en-GB" sz="1800" b="0" kern="1200" dirty="0">
-                          <a:solidFill>
-                            <a:schemeClr val="tx1"/>
-                          </a:solidFill>
-                          <a:latin typeface="+mn-lt"/>
-                          <a:ea typeface="+mn-ea"/>
-                          <a:cs typeface="+mn-cs"/>
-                        </a:rPr>
-                        <a:t>]</a:t>
-                      </a:r>
-                      <a:r>
-                        <a:rPr lang="en-US" sz="1800" b="0" kern="1200" dirty="0">
-                          <a:solidFill>
-                            <a:schemeClr val="tx1"/>
-                          </a:solidFill>
-                          <a:latin typeface="+mn-lt"/>
-                          <a:ea typeface="+mn-ea"/>
-                          <a:cs typeface="+mn-cs"/>
-                        </a:rPr>
-                        <a:t> </a:t>
-                      </a:r>
-                    </a:p>
-                  </a:txBody>
-                  <a:tcPr>
-                    <a:solidFill>
-                      <a:schemeClr val="bg1">
-                        <a:lumMod val="85000"/>
-                      </a:schemeClr>
-                    </a:solidFill>
-                  </a:tcPr>
-                </a:tc>
-                <a:tc>
-                  <a:txBody>
-                    <a:bodyPr/>
-                    <a:lstStyle/>
-                    <a:p>
-                      <a:r>
-                        <a:rPr lang="en-GB" sz="1800" b="0" kern="1200" dirty="0">
-                          <a:solidFill>
-                            <a:schemeClr val="tx1"/>
-                          </a:solidFill>
-                          <a:latin typeface="+mn-lt"/>
-                          <a:ea typeface="+mn-ea"/>
-                          <a:cs typeface="+mn-cs"/>
-                        </a:rPr>
-                        <a:t>Matches anything except a, b, or c.</a:t>
-                      </a:r>
-                      <a:endParaRPr lang="en-US" sz="1800" b="0" kern="1200" dirty="0">
-                        <a:solidFill>
-                          <a:schemeClr val="tx1"/>
-                        </a:solidFill>
-                        <a:latin typeface="+mn-lt"/>
-                        <a:ea typeface="+mn-ea"/>
-                        <a:cs typeface="+mn-cs"/>
-                      </a:endParaRPr>
-                    </a:p>
-                  </a:txBody>
-                  <a:tcPr/>
-                </a:tc>
-                <a:extLst>
-                  <a:ext uri="{0D108BD9-81ED-4DB2-BD59-A6C34878D82A}">
-                    <a16:rowId xmlns:a16="http://schemas.microsoft.com/office/drawing/2014/main" val="2605753601"/>
-                  </a:ext>
-                </a:extLst>
-              </a:tr>
-              <a:tr h="430435">
-                <a:tc>
-                  <a:txBody>
-                    <a:bodyPr/>
-                    <a:lstStyle/>
-                    <a:p>
-                      <a:r>
-                        <a:rPr lang="en-GB" sz="1800" b="0" kern="1200" dirty="0">
-                          <a:solidFill>
-                            <a:schemeClr val="tx1"/>
-                          </a:solidFill>
-                          <a:latin typeface="+mn-lt"/>
-                          <a:ea typeface="+mn-ea"/>
-                          <a:cs typeface="+mn-cs"/>
-                        </a:rPr>
-                        <a:t>[:</a:t>
-                      </a:r>
-                      <a:r>
-                        <a:rPr lang="en-GB" sz="1800" b="0" kern="1200" dirty="0" err="1">
-                          <a:solidFill>
-                            <a:schemeClr val="tx1"/>
-                          </a:solidFill>
-                          <a:latin typeface="+mn-lt"/>
-                          <a:ea typeface="+mn-ea"/>
-                          <a:cs typeface="+mn-cs"/>
-                        </a:rPr>
-                        <a:t>punct</a:t>
-                      </a:r>
-                      <a:r>
-                        <a:rPr lang="en-GB" sz="1800" b="0" kern="1200" dirty="0">
-                          <a:solidFill>
-                            <a:schemeClr val="tx1"/>
-                          </a:solidFill>
-                          <a:latin typeface="+mn-lt"/>
-                          <a:ea typeface="+mn-ea"/>
-                          <a:cs typeface="+mn-cs"/>
-                        </a:rPr>
-                        <a:t>:]</a:t>
-                      </a:r>
-                      <a:endParaRPr lang="en-US" sz="1800" b="0" kern="1200" dirty="0">
-                        <a:solidFill>
-                          <a:schemeClr val="tx1"/>
-                        </a:solidFill>
-                        <a:latin typeface="+mn-lt"/>
-                        <a:ea typeface="+mn-ea"/>
-                        <a:cs typeface="+mn-cs"/>
-                      </a:endParaRPr>
-                    </a:p>
-                  </a:txBody>
-                  <a:tcPr>
-                    <a:solidFill>
-                      <a:schemeClr val="bg1">
-                        <a:lumMod val="85000"/>
-                      </a:schemeClr>
-                    </a:solidFill>
-                  </a:tcPr>
-                </a:tc>
-                <a:tc>
-                  <a:txBody>
-                    <a:bodyPr/>
-                    <a:lstStyle/>
-                    <a:p>
-                      <a:r>
-                        <a:rPr lang="en-GB" sz="1800" b="0" kern="1200" dirty="0">
-                          <a:solidFill>
-                            <a:schemeClr val="tx1"/>
-                          </a:solidFill>
-                          <a:latin typeface="+mn-lt"/>
-                          <a:ea typeface="+mn-ea"/>
-                          <a:cs typeface="+mn-cs"/>
-                        </a:rPr>
-                        <a:t>punctuation characters, ! " # $ % &amp; ’ ( ) * + , - . / : ; &lt; = &gt; ? @ [  ] ^ _ ` { | } ~</a:t>
-                      </a:r>
-                      <a:endParaRPr lang="en-US" sz="1800" b="0" kern="1200" dirty="0">
-                        <a:solidFill>
-                          <a:schemeClr val="tx1"/>
-                        </a:solidFill>
-                        <a:latin typeface="+mn-lt"/>
-                        <a:ea typeface="+mn-ea"/>
-                        <a:cs typeface="+mn-cs"/>
-                      </a:endParaRPr>
-                    </a:p>
-                  </a:txBody>
-                  <a:tcPr/>
-                </a:tc>
-                <a:extLst>
-                  <a:ext uri="{0D108BD9-81ED-4DB2-BD59-A6C34878D82A}">
-                    <a16:rowId xmlns:a16="http://schemas.microsoft.com/office/drawing/2014/main" val="1165361152"/>
-                  </a:ext>
-                </a:extLst>
-              </a:tr>
-              <a:tr h="430435">
-                <a:tc>
-                  <a:txBody>
-                    <a:bodyPr/>
-                    <a:lstStyle/>
-                    <a:p>
-                      <a:r>
-                        <a:rPr lang="en-GB" sz="1800" b="0" kern="1200" dirty="0">
-                          <a:solidFill>
-                            <a:schemeClr val="tx1"/>
-                          </a:solidFill>
-                          <a:latin typeface="+mn-lt"/>
-                          <a:ea typeface="+mn-ea"/>
-                          <a:cs typeface="+mn-cs"/>
-                        </a:rPr>
-                        <a:t>{n,}</a:t>
-                      </a:r>
-                      <a:endParaRPr lang="en-US" sz="1800" b="0" kern="1200" dirty="0">
-                        <a:solidFill>
-                          <a:schemeClr val="tx1"/>
-                        </a:solidFill>
-                        <a:latin typeface="+mn-lt"/>
-                        <a:ea typeface="+mn-ea"/>
-                        <a:cs typeface="+mn-cs"/>
-                      </a:endParaRPr>
-                    </a:p>
-                  </a:txBody>
-                  <a:tcPr>
-                    <a:solidFill>
-                      <a:schemeClr val="bg1">
-                        <a:lumMod val="85000"/>
-                      </a:schemeClr>
-                    </a:solidFill>
-                  </a:tcPr>
-                </a:tc>
-                <a:tc>
-                  <a:txBody>
-                    <a:bodyPr/>
-                    <a:lstStyle/>
-                    <a:p>
-                      <a:r>
-                        <a:rPr lang="en-GB" sz="1800" b="0" kern="1200" dirty="0">
-                          <a:solidFill>
-                            <a:schemeClr val="tx1"/>
-                          </a:solidFill>
-                          <a:latin typeface="+mn-lt"/>
-                          <a:ea typeface="+mn-ea"/>
-                          <a:cs typeface="+mn-cs"/>
-                        </a:rPr>
-                        <a:t>n or more matches</a:t>
-                      </a:r>
-                      <a:endParaRPr lang="en-US" sz="1800" b="0" kern="1200" dirty="0">
-                        <a:solidFill>
-                          <a:schemeClr val="tx1"/>
-                        </a:solidFill>
-                        <a:latin typeface="+mn-lt"/>
-                        <a:ea typeface="+mn-ea"/>
-                        <a:cs typeface="+mn-cs"/>
-                      </a:endParaRPr>
-                    </a:p>
-                  </a:txBody>
-                  <a:tcPr/>
-                </a:tc>
-                <a:extLst>
-                  <a:ext uri="{0D108BD9-81ED-4DB2-BD59-A6C34878D82A}">
-                    <a16:rowId xmlns:a16="http://schemas.microsoft.com/office/drawing/2014/main" val="714321488"/>
-                  </a:ext>
-                </a:extLst>
-              </a:tr>
-              <a:tr h="430435">
-                <a:tc>
-                  <a:txBody>
-                    <a:bodyPr/>
-                    <a:lstStyle/>
-                    <a:p>
-                      <a:r>
-                        <a:rPr lang="en-GB" sz="1800" b="0" kern="1200" dirty="0">
-                          <a:solidFill>
-                            <a:schemeClr val="tx1"/>
-                          </a:solidFill>
-                          <a:latin typeface="+mn-lt"/>
-                          <a:ea typeface="+mn-ea"/>
-                          <a:cs typeface="+mn-cs"/>
-                        </a:rPr>
-                        <a:t>{,m}</a:t>
-                      </a:r>
-                      <a:endParaRPr lang="en-US" sz="1800" b="0" kern="1200" dirty="0">
-                        <a:solidFill>
-                          <a:schemeClr val="tx1"/>
-                        </a:solidFill>
-                        <a:latin typeface="+mn-lt"/>
-                        <a:ea typeface="+mn-ea"/>
-                        <a:cs typeface="+mn-cs"/>
-                      </a:endParaRPr>
-                    </a:p>
-                  </a:txBody>
-                  <a:tcPr>
-                    <a:solidFill>
-                      <a:schemeClr val="bg1">
-                        <a:lumMod val="85000"/>
-                      </a:schemeClr>
-                    </a:solidFill>
-                  </a:tcPr>
-                </a:tc>
-                <a:tc>
-                  <a:txBody>
-                    <a:bodyPr/>
-                    <a:lstStyle/>
-                    <a:p>
-                      <a:r>
-                        <a:rPr lang="en-GB" sz="1800" b="0" kern="1200" dirty="0">
-                          <a:solidFill>
-                            <a:schemeClr val="tx1"/>
-                          </a:solidFill>
-                          <a:latin typeface="+mn-lt"/>
-                          <a:ea typeface="+mn-ea"/>
-                          <a:cs typeface="+mn-cs"/>
-                        </a:rPr>
-                        <a:t>at most m matches</a:t>
-                      </a:r>
-                      <a:endParaRPr lang="en-US" sz="1800" b="0" kern="1200" dirty="0">
-                        <a:solidFill>
-                          <a:schemeClr val="tx1"/>
-                        </a:solidFill>
-                        <a:latin typeface="+mn-lt"/>
-                        <a:ea typeface="+mn-ea"/>
-                        <a:cs typeface="+mn-cs"/>
-                      </a:endParaRPr>
-                    </a:p>
-                  </a:txBody>
-                  <a:tcPr/>
-                </a:tc>
-                <a:extLst>
-                  <a:ext uri="{0D108BD9-81ED-4DB2-BD59-A6C34878D82A}">
-                    <a16:rowId xmlns:a16="http://schemas.microsoft.com/office/drawing/2014/main" val="119559271"/>
-                  </a:ext>
-                </a:extLst>
-              </a:tr>
-              <a:tr h="430435">
-                <a:tc>
-                  <a:txBody>
-                    <a:bodyPr/>
-                    <a:lstStyle/>
-                    <a:p>
-                      <a:r>
-                        <a:rPr lang="en-GB" sz="1800" b="0" kern="1200" dirty="0">
-                          <a:solidFill>
-                            <a:schemeClr val="tx1"/>
-                          </a:solidFill>
-                          <a:latin typeface="+mn-lt"/>
-                          <a:ea typeface="+mn-ea"/>
-                          <a:cs typeface="+mn-cs"/>
-                        </a:rPr>
-                        <a:t>{</a:t>
-                      </a:r>
-                      <a:r>
-                        <a:rPr lang="en-GB" sz="1800" b="0" kern="1200" dirty="0" err="1">
-                          <a:solidFill>
-                            <a:schemeClr val="tx1"/>
-                          </a:solidFill>
-                          <a:latin typeface="+mn-lt"/>
-                          <a:ea typeface="+mn-ea"/>
-                          <a:cs typeface="+mn-cs"/>
-                        </a:rPr>
-                        <a:t>n,m</a:t>
-                      </a:r>
-                      <a:r>
-                        <a:rPr lang="en-GB" sz="1800" b="0" kern="1200" dirty="0">
-                          <a:solidFill>
-                            <a:schemeClr val="tx1"/>
-                          </a:solidFill>
-                          <a:latin typeface="+mn-lt"/>
-                          <a:ea typeface="+mn-ea"/>
-                          <a:cs typeface="+mn-cs"/>
-                        </a:rPr>
-                        <a:t>}</a:t>
-                      </a:r>
-                      <a:endParaRPr lang="en-US" sz="1800" b="0" kern="1200" dirty="0">
-                        <a:solidFill>
-                          <a:schemeClr val="tx1"/>
-                        </a:solidFill>
-                        <a:latin typeface="+mn-lt"/>
-                        <a:ea typeface="+mn-ea"/>
-                        <a:cs typeface="+mn-cs"/>
-                      </a:endParaRPr>
-                    </a:p>
-                  </a:txBody>
-                  <a:tcPr>
-                    <a:solidFill>
-                      <a:schemeClr val="bg1">
-                        <a:lumMod val="85000"/>
-                      </a:schemeClr>
-                    </a:solidFill>
-                  </a:tcPr>
-                </a:tc>
-                <a:tc>
-                  <a:txBody>
-                    <a:bodyPr/>
-                    <a:lstStyle/>
-                    <a:p>
-                      <a:r>
-                        <a:rPr lang="en-GB" sz="1800" b="0" kern="1200" dirty="0">
-                          <a:solidFill>
-                            <a:schemeClr val="tx1"/>
-                          </a:solidFill>
-                          <a:latin typeface="+mn-lt"/>
-                          <a:ea typeface="+mn-ea"/>
-                          <a:cs typeface="+mn-cs"/>
-                        </a:rPr>
-                        <a:t>between n and m matches</a:t>
-                      </a:r>
-                      <a:endParaRPr lang="en-US" sz="1800" b="0" kern="1200" dirty="0">
-                        <a:solidFill>
-                          <a:schemeClr val="tx1"/>
-                        </a:solidFill>
-                        <a:latin typeface="+mn-lt"/>
-                        <a:ea typeface="+mn-ea"/>
-                        <a:cs typeface="+mn-cs"/>
-                      </a:endParaRPr>
-                    </a:p>
-                  </a:txBody>
-                  <a:tcPr/>
-                </a:tc>
-                <a:extLst>
-                  <a:ext uri="{0D108BD9-81ED-4DB2-BD59-A6C34878D82A}">
-                    <a16:rowId xmlns:a16="http://schemas.microsoft.com/office/drawing/2014/main" val="869907065"/>
-                  </a:ext>
-                </a:extLst>
-              </a:tr>
-            </a:tbl>
-          </a:graphicData>
-        </a:graphic>
-      </p:graphicFrame>
-      <p:sp>
-        <p:nvSpPr>
-          <p:cNvPr id="9" name="Rectangle 8">
-            <a:extLst>
-              <a:ext uri="{FF2B5EF4-FFF2-40B4-BE49-F238E27FC236}">
-                <a16:creationId xmlns:a16="http://schemas.microsoft.com/office/drawing/2014/main" id="{681685EE-532E-4BCA-82AE-FC4ABF85F532}"/>
-              </a:ext>
-            </a:extLst>
-          </p:cNvPr>
-          <p:cNvSpPr/>
-          <p:nvPr/>
-        </p:nvSpPr>
-        <p:spPr>
-          <a:xfrm>
-            <a:off x="4827104" y="0"/>
-            <a:ext cx="7364896" cy="914400"/>
-          </a:xfrm>
-          <a:prstGeom prst="rect">
-            <a:avLst/>
-          </a:prstGeom>
-          <a:solidFill>
-            <a:schemeClr val="accent2"/>
-          </a:solidFill>
-          <a:ln>
-            <a:solidFill>
-              <a:schemeClr val="accent2"/>
-            </a:solidFill>
-          </a:ln>
-        </p:spPr>
-        <p:style>
-          <a:lnRef idx="2">
-            <a:schemeClr val="accent1">
-              <a:shade val="50000"/>
-            </a:schemeClr>
-          </a:lnRef>
-          <a:fillRef idx="1">
-            <a:schemeClr val="accent1"/>
-          </a:fillRef>
-          <a:effectRef idx="0">
-            <a:schemeClr val="accent1"/>
-          </a:effectRef>
-          <a:fontRef idx="minor">
-            <a:schemeClr val="lt1"/>
-          </a:fontRef>
-        </p:style>
-        <p:txBody>
-          <a:bodyPr rtlCol="0" anchor="ctr"/>
-          <a:lstStyle/>
-          <a:p>
-            <a:pPr algn="ctr"/>
-            <a:r>
-              <a:rPr lang="de-DE"/>
-              <a:t>nochmal checken!! und ggf. ergänzen </a:t>
-            </a:r>
-          </a:p>
-          <a:p>
-            <a:pPr algn="ctr"/>
-            <a:r>
-              <a:rPr lang="de-DE"/>
-              <a:t>https://cran.r-project.org/web/packages/stringr/vignettes/regular-expressions.html</a:t>
-            </a:r>
-            <a:endParaRPr lang="en-US"/>
-          </a:p>
-        </p:txBody>
-      </p:sp>
-    </p:spTree>
-    <p:extLst>
-      <p:ext uri="{BB962C8B-B14F-4D97-AF65-F5344CB8AC3E}">
-        <p14:creationId xmlns:p14="http://schemas.microsoft.com/office/powerpoint/2010/main" val="1373776916"/>
-      </p:ext>
-    </p:extLst>
-  </p:cSld>
-  <p:clrMapOvr>
-    <a:masterClrMapping/>
-  </p:clrMapOvr>
-</p:sld>
-</file>
-
-<file path=ppt/slides/slide21.xml><?xml version="1.0" encoding="utf-8"?>
-<p:sld xmlns:a="http://schemas.openxmlformats.org/drawingml/2006/main" xmlns:r="http://schemas.openxmlformats.org/officeDocument/2006/relationships" xmlns:p="http://schemas.openxmlformats.org/presentationml/2006/main">
-  <p:cSld>
-    <p:spTree>
-      <p:nvGrpSpPr>
-        <p:cNvPr id="1" name=""/>
-        <p:cNvGrpSpPr/>
-        <p:nvPr/>
-      </p:nvGrpSpPr>
-      <p:grpSpPr>
-        <a:xfrm>
-          <a:off x="0" y="0"/>
-          <a:ext cx="0" cy="0"/>
-          <a:chOff x="0" y="0"/>
-          <a:chExt cx="0" cy="0"/>
-        </a:xfrm>
-      </p:grpSpPr>
-      <p:sp>
-        <p:nvSpPr>
-          <p:cNvPr id="4" name="Foliennummernplatzhalter 3"/>
-          <p:cNvSpPr>
-            <a:spLocks noGrp="1"/>
-          </p:cNvSpPr>
-          <p:nvPr>
-            <p:ph type="sldNum" sz="quarter" idx="12"/>
-          </p:nvPr>
-        </p:nvSpPr>
-        <p:spPr/>
-        <p:txBody>
-          <a:bodyPr/>
-          <a:lstStyle/>
-          <a:p>
-            <a:fld id="{C9E0B00B-E6DF-4183-A694-3DE28BEFB357}" type="slidenum">
-              <a:rPr lang="en-US" smtClean="0"/>
-              <a:t>21</a:t>
-            </a:fld>
-            <a:endParaRPr lang="en-US"/>
-          </a:p>
-        </p:txBody>
-      </p:sp>
-      <p:sp>
-        <p:nvSpPr>
-          <p:cNvPr id="12" name="Titel 1">
-            <a:extLst>
-              <a:ext uri="{FF2B5EF4-FFF2-40B4-BE49-F238E27FC236}">
-                <a16:creationId xmlns:a16="http://schemas.microsoft.com/office/drawing/2014/main" id="{478EA67A-3C39-4D0A-996A-C363F30A14B2}"/>
-              </a:ext>
-            </a:extLst>
-          </p:cNvPr>
-          <p:cNvSpPr>
-            <a:spLocks noGrp="1"/>
-          </p:cNvSpPr>
-          <p:nvPr>
-            <p:ph type="title"/>
-          </p:nvPr>
-        </p:nvSpPr>
-        <p:spPr>
-          <a:xfrm>
-            <a:off x="1066800" y="561524"/>
-            <a:ext cx="10287000" cy="1129164"/>
-          </a:xfrm>
-        </p:spPr>
-        <p:txBody>
-          <a:bodyPr/>
-          <a:lstStyle/>
-          <a:p>
-            <a:r>
-              <a:rPr lang="en-US"/>
-              <a:t>Text Normalization  </a:t>
-            </a:r>
-            <a:r>
-              <a:rPr lang="en-US" b="1"/>
-              <a:t>Useful regex patterns</a:t>
-            </a:r>
-            <a:endParaRPr lang="en-US" b="1">
-              <a:latin typeface="Consolas" panose="020B0609020204030204" pitchFamily="49" charset="0"/>
-            </a:endParaRPr>
-          </a:p>
-        </p:txBody>
-      </p:sp>
-      <p:graphicFrame>
-        <p:nvGraphicFramePr>
-          <p:cNvPr id="8" name="Tabelle 4">
-            <a:extLst>
-              <a:ext uri="{FF2B5EF4-FFF2-40B4-BE49-F238E27FC236}">
-                <a16:creationId xmlns:a16="http://schemas.microsoft.com/office/drawing/2014/main" id="{537B2507-2BD2-4806-9EA4-E88973333406}"/>
-              </a:ext>
-            </a:extLst>
-          </p:cNvPr>
-          <p:cNvGraphicFramePr>
-            <a:graphicFrameLocks noGrp="1"/>
-          </p:cNvGraphicFramePr>
-          <p:nvPr>
-            <p:extLst>
-              <p:ext uri="{D42A27DB-BD31-4B8C-83A1-F6EECF244321}">
-                <p14:modId xmlns:p14="http://schemas.microsoft.com/office/powerpoint/2010/main" val="2274877544"/>
+                <p14:modId xmlns:p14="http://schemas.microsoft.com/office/powerpoint/2010/main" val="3687020090"/>
               </p:ext>
             </p:extLst>
           </p:nvPr>
         </p:nvGraphicFramePr>
         <p:xfrm>
           <a:off x="1066801" y="1966913"/>
-          <a:ext cx="10287000" cy="4297680"/>
+          <a:ext cx="10287000" cy="3931920"/>
         </p:xfrm>
         <a:graphic>
           <a:graphicData uri="http://schemas.openxmlformats.org/drawingml/2006/table">
@@ -10225,7 +9252,7 @@
                     <a:p>
                       <a:pPr algn="l"/>
                       <a:r>
-                        <a:rPr lang="en-US" sz="1800" b="1" dirty="0"/>
+                        <a:rPr lang="en-US" sz="1600" b="1" dirty="0"/>
                         <a:t>Pattern</a:t>
                       </a:r>
                     </a:p>
@@ -10245,7 +9272,7 @@
                     <a:p>
                       <a:pPr algn="l"/>
                       <a:r>
-                        <a:rPr lang="en-US" sz="1800" b="1" dirty="0"/>
+                        <a:rPr lang="en-US" sz="1600" b="1" dirty="0"/>
                         <a:t>Function</a:t>
                       </a:r>
                     </a:p>
@@ -10266,7 +9293,7 @@
                     <a:p>
                       <a:pPr algn="l"/>
                       <a:r>
-                        <a:rPr lang="en-US" sz="1800" b="0" kern="1200" dirty="0">
+                        <a:rPr lang="en-US" sz="1600" b="0" kern="1200" dirty="0">
                           <a:solidFill>
                             <a:schemeClr val="tx1"/>
                           </a:solidFill>
@@ -10293,7 +9320,7 @@
                     <a:p>
                       <a:pPr algn="l"/>
                       <a:r>
-                        <a:rPr lang="en-US" sz="1800" b="0" kern="1200" dirty="0">
+                        <a:rPr lang="en-US" sz="1600" b="0" kern="1200" dirty="0">
                           <a:solidFill>
                             <a:schemeClr val="tx1"/>
                           </a:solidFill>
@@ -10321,7 +9348,7 @@
                     <a:p>
                       <a:pPr algn="l"/>
                       <a:r>
-                        <a:rPr lang="de-DE" sz="1800" b="0" kern="1200">
+                        <a:rPr lang="de-DE" sz="1600" b="0" kern="1200">
                           <a:solidFill>
                             <a:schemeClr val="tx1"/>
                           </a:solidFill>
@@ -10331,7 +9358,7 @@
                         </a:rPr>
                         <a:t>[:alpha:] or [A-Za-z]</a:t>
                       </a:r>
-                      <a:endParaRPr lang="en-US" sz="1800" b="0" kern="1200" dirty="0">
+                      <a:endParaRPr lang="en-US" sz="1600" b="0" kern="1200" dirty="0">
                         <a:solidFill>
                           <a:schemeClr val="tx1"/>
                         </a:solidFill>
@@ -10356,7 +9383,7 @@
                     <a:p>
                       <a:pPr algn="l"/>
                       <a:r>
-                        <a:rPr lang="de-DE" sz="1800" b="0" kern="1200">
+                        <a:rPr lang="de-DE" sz="1600" b="0" kern="1200">
                           <a:solidFill>
                             <a:schemeClr val="tx1"/>
                           </a:solidFill>
@@ -10366,7 +9393,7 @@
                         </a:rPr>
                         <a:t>Matches any character</a:t>
                       </a:r>
-                      <a:endParaRPr lang="en-US" sz="1800" b="0" kern="1200" dirty="0">
+                      <a:endParaRPr lang="en-US" sz="1600" b="0" kern="1200" dirty="0">
                         <a:solidFill>
                           <a:schemeClr val="tx1"/>
                         </a:solidFill>
@@ -10408,7 +9435,7 @@
                         <a:defRPr/>
                       </a:pPr>
                       <a:r>
-                        <a:rPr lang="en-GB" sz="1800" b="0" kern="1200" dirty="0">
+                        <a:rPr lang="en-GB" sz="1600" b="0" kern="1200" dirty="0">
                           <a:solidFill>
                             <a:schemeClr val="tx1"/>
                           </a:solidFill>
@@ -10418,7 +9445,7 @@
                         </a:rPr>
                         <a:t>[a-z] or [:lower:]</a:t>
                       </a:r>
-                      <a:endParaRPr lang="en-US" sz="1800" b="0" kern="1200" dirty="0">
+                      <a:endParaRPr lang="en-US" sz="1600" b="0" kern="1200" dirty="0">
                         <a:solidFill>
                           <a:schemeClr val="tx1"/>
                         </a:solidFill>
@@ -10443,7 +9470,7 @@
                     <a:p>
                       <a:pPr algn="l"/>
                       <a:r>
-                        <a:rPr lang="en-US" sz="1800" b="0" kern="1200" dirty="0">
+                        <a:rPr lang="en-US" sz="1600" b="0" kern="1200" dirty="0">
                           <a:solidFill>
                             <a:schemeClr val="tx1"/>
                           </a:solidFill>
@@ -10454,7 +9481,7 @@
                         <a:t>Matches </a:t>
                       </a:r>
                       <a:r>
-                        <a:rPr lang="en-US" sz="1800" b="0" kern="1200">
+                        <a:rPr lang="en-US" sz="1600" b="0" kern="1200">
                           <a:solidFill>
                             <a:schemeClr val="tx1"/>
                           </a:solidFill>
@@ -10464,7 +9491,7 @@
                         </a:rPr>
                         <a:t>any lowercase character</a:t>
                       </a:r>
-                      <a:endParaRPr lang="en-US" sz="1800" b="0" kern="1200" dirty="0">
+                      <a:endParaRPr lang="en-US" sz="1600" b="0" kern="1200" dirty="0">
                         <a:solidFill>
                           <a:schemeClr val="tx1"/>
                         </a:solidFill>
@@ -10490,7 +9517,7 @@
                     <a:p>
                       <a:pPr algn="l"/>
                       <a:r>
-                        <a:rPr lang="en-GB" sz="1800" b="0" kern="1200" dirty="0">
+                        <a:rPr lang="en-GB" sz="1600" b="0" kern="1200" dirty="0">
                           <a:solidFill>
                             <a:schemeClr val="tx1"/>
                           </a:solidFill>
@@ -10500,7 +9527,7 @@
                         </a:rPr>
                         <a:t>[A-Z] or [:upper:]</a:t>
                       </a:r>
-                      <a:endParaRPr lang="en-US" sz="1800" b="0" kern="1200" dirty="0">
+                      <a:endParaRPr lang="en-US" sz="1600" b="0" kern="1200" dirty="0">
                         <a:solidFill>
                           <a:schemeClr val="tx1"/>
                         </a:solidFill>
@@ -10541,7 +9568,7 @@
                         <a:defRPr/>
                       </a:pPr>
                       <a:r>
-                        <a:rPr lang="en-US" sz="1800" b="0" kern="1200" dirty="0">
+                        <a:rPr lang="en-US" sz="1600" b="0" kern="1200" dirty="0">
                           <a:solidFill>
                             <a:schemeClr val="tx1"/>
                           </a:solidFill>
@@ -10552,7 +9579,7 @@
                         <a:t>Matches </a:t>
                       </a:r>
                       <a:r>
-                        <a:rPr lang="en-US" sz="1800" b="0" kern="1200">
+                        <a:rPr lang="en-US" sz="1600" b="0" kern="1200">
                           <a:solidFill>
                             <a:schemeClr val="tx1"/>
                           </a:solidFill>
@@ -10562,7 +9589,7 @@
                         </a:rPr>
                         <a:t>any uppercase character</a:t>
                       </a:r>
-                      <a:endParaRPr lang="en-US" sz="1800" b="0" kern="1200" dirty="0">
+                      <a:endParaRPr lang="en-US" sz="1600" b="0" kern="1200" dirty="0">
                         <a:solidFill>
                           <a:schemeClr val="tx1"/>
                         </a:solidFill>
@@ -10588,7 +9615,7 @@
                     <a:p>
                       <a:pPr algn="l"/>
                       <a:r>
-                        <a:rPr lang="en-GB" sz="1800" b="0" kern="1200" dirty="0">
+                        <a:rPr lang="en-GB" sz="1600" b="0" kern="1200" dirty="0">
                           <a:solidFill>
                             <a:schemeClr val="tx1"/>
                           </a:solidFill>
@@ -10599,7 +9626,7 @@
                         <a:t>[</a:t>
                       </a:r>
                       <a:r>
-                        <a:rPr lang="en-GB" sz="1800" b="0" kern="1200" dirty="0" err="1">
+                        <a:rPr lang="en-GB" sz="1600" b="0" kern="1200" dirty="0" err="1">
                           <a:solidFill>
                             <a:schemeClr val="tx1"/>
                           </a:solidFill>
@@ -10610,7 +9637,7 @@
                         <a:t>abc</a:t>
                       </a:r>
                       <a:r>
-                        <a:rPr lang="en-GB" sz="1800" b="0" kern="1200" dirty="0">
+                        <a:rPr lang="en-GB" sz="1600" b="0" kern="1200" dirty="0">
                           <a:solidFill>
                             <a:schemeClr val="tx1"/>
                           </a:solidFill>
@@ -10620,7 +9647,7 @@
                         </a:rPr>
                         <a:t>]</a:t>
                       </a:r>
-                      <a:endParaRPr lang="en-US" sz="1800" b="0" kern="1200" dirty="0">
+                      <a:endParaRPr lang="en-US" sz="1600" b="0" kern="1200" dirty="0">
                         <a:solidFill>
                           <a:schemeClr val="tx1"/>
                         </a:solidFill>
@@ -10645,7 +9672,7 @@
                     <a:p>
                       <a:pPr algn="l"/>
                       <a:r>
-                        <a:rPr lang="en-US" sz="1800" b="0" kern="1200" dirty="0">
+                        <a:rPr lang="en-US" sz="1600" b="0" kern="1200" dirty="0">
                           <a:solidFill>
                             <a:schemeClr val="tx1"/>
                           </a:solidFill>
@@ -10673,7 +9700,7 @@
                     <a:p>
                       <a:pPr algn="l"/>
                       <a:r>
-                        <a:rPr lang="en-GB" sz="1800" b="0" kern="1200" dirty="0">
+                        <a:rPr lang="en-GB" sz="1600" b="0" kern="1200" dirty="0">
                           <a:solidFill>
                             <a:schemeClr val="tx1"/>
                           </a:solidFill>
@@ -10684,7 +9711,7 @@
                         <a:t>[^</a:t>
                       </a:r>
                       <a:r>
-                        <a:rPr lang="en-GB" sz="1800" b="0" kern="1200" dirty="0" err="1">
+                        <a:rPr lang="en-GB" sz="1600" b="0" kern="1200" dirty="0" err="1">
                           <a:solidFill>
                             <a:schemeClr val="tx1"/>
                           </a:solidFill>
@@ -10695,7 +9722,7 @@
                         <a:t>abc</a:t>
                       </a:r>
                       <a:r>
-                        <a:rPr lang="en-GB" sz="1800" b="0" kern="1200" dirty="0">
+                        <a:rPr lang="en-GB" sz="1600" b="0" kern="1200" dirty="0">
                           <a:solidFill>
                             <a:schemeClr val="tx1"/>
                           </a:solidFill>
@@ -10706,7 +9733,7 @@
                         <a:t>]</a:t>
                       </a:r>
                       <a:r>
-                        <a:rPr lang="en-US" sz="1800" b="0" kern="1200" dirty="0">
+                        <a:rPr lang="en-US" sz="1600" b="0" kern="1200" dirty="0">
                           <a:solidFill>
                             <a:schemeClr val="tx1"/>
                           </a:solidFill>
@@ -10733,7 +9760,7 @@
                     <a:p>
                       <a:pPr algn="l"/>
                       <a:r>
-                        <a:rPr lang="en-GB" sz="1800" b="0" kern="1200" dirty="0">
+                        <a:rPr lang="en-GB" sz="1600" b="0" kern="1200" dirty="0">
                           <a:solidFill>
                             <a:schemeClr val="tx1"/>
                           </a:solidFill>
@@ -10743,7 +9770,7 @@
                         </a:rPr>
                         <a:t>Matches anything except a, b, or c.</a:t>
                       </a:r>
-                      <a:endParaRPr lang="en-US" sz="1800" b="0" kern="1200" dirty="0">
+                      <a:endParaRPr lang="en-US" sz="1600" b="0" kern="1200" dirty="0">
                         <a:solidFill>
                           <a:schemeClr val="tx1"/>
                         </a:solidFill>
@@ -10769,7 +9796,7 @@
                     <a:p>
                       <a:pPr algn="l"/>
                       <a:r>
-                        <a:rPr lang="en-GB" sz="1800" b="0" kern="1200" dirty="0">
+                        <a:rPr lang="en-GB" sz="1600" b="0" kern="1200" dirty="0">
                           <a:solidFill>
                             <a:schemeClr val="tx1"/>
                           </a:solidFill>
@@ -10780,7 +9807,7 @@
                         <a:t>[:</a:t>
                       </a:r>
                       <a:r>
-                        <a:rPr lang="en-GB" sz="1800" b="0" kern="1200" dirty="0" err="1">
+                        <a:rPr lang="en-GB" sz="1600" b="0" kern="1200" dirty="0" err="1">
                           <a:solidFill>
                             <a:schemeClr val="tx1"/>
                           </a:solidFill>
@@ -10791,7 +9818,7 @@
                         <a:t>punct</a:t>
                       </a:r>
                       <a:r>
-                        <a:rPr lang="en-GB" sz="1800" b="0" kern="1200" dirty="0">
+                        <a:rPr lang="en-GB" sz="1600" b="0" kern="1200" dirty="0">
                           <a:solidFill>
                             <a:schemeClr val="tx1"/>
                           </a:solidFill>
@@ -10801,7 +9828,7 @@
                         </a:rPr>
                         <a:t>:]</a:t>
                       </a:r>
-                      <a:endParaRPr lang="en-US" sz="1800" b="0" kern="1200" dirty="0">
+                      <a:endParaRPr lang="en-US" sz="1600" b="0" kern="1200" dirty="0">
                         <a:solidFill>
                           <a:schemeClr val="tx1"/>
                         </a:solidFill>
@@ -10826,7 +9853,7 @@
                     <a:p>
                       <a:pPr algn="l"/>
                       <a:r>
-                        <a:rPr lang="en-GB" sz="1800" b="0" kern="1200">
+                        <a:rPr lang="en-GB" sz="1600" b="0" kern="1200">
                           <a:solidFill>
                             <a:schemeClr val="tx1"/>
                           </a:solidFill>
@@ -10837,7 +9864,7 @@
                         <a:t>Matches punctuation characters:</a:t>
                       </a:r>
                       <a:br>
-                        <a:rPr lang="en-GB" sz="1800" b="0" kern="1200">
+                        <a:rPr lang="en-GB" sz="1600" b="0" kern="1200">
                           <a:solidFill>
                             <a:schemeClr val="tx1"/>
                           </a:solidFill>
@@ -10847,7 +9874,7 @@
                         </a:rPr>
                       </a:br>
                       <a:r>
-                        <a:rPr lang="en-GB" sz="1800" b="0" kern="1200">
+                        <a:rPr lang="en-GB" sz="1600" b="0" kern="1200">
                           <a:solidFill>
                             <a:schemeClr val="tx1"/>
                           </a:solidFill>
@@ -10858,7 +9885,7 @@
                         <a:t>! </a:t>
                       </a:r>
                       <a:r>
-                        <a:rPr lang="en-GB" sz="1800" b="0" kern="1200" dirty="0">
+                        <a:rPr lang="en-GB" sz="1600" b="0" kern="1200" dirty="0">
                           <a:solidFill>
                             <a:schemeClr val="tx1"/>
                           </a:solidFill>
@@ -10868,7 +9895,7 @@
                         </a:rPr>
                         <a:t>" # $ % &amp; ’ ( ) * + , - . / : ; &lt; = &gt; ? @ [  ] ^ _ ` { | } ~</a:t>
                       </a:r>
-                      <a:endParaRPr lang="en-US" sz="1800" b="0" kern="1200" dirty="0">
+                      <a:endParaRPr lang="en-US" sz="1600" b="0" kern="1200" dirty="0">
                         <a:solidFill>
                           <a:schemeClr val="tx1"/>
                         </a:solidFill>
@@ -10894,7 +9921,7 @@
                     <a:p>
                       <a:pPr algn="l"/>
                       <a:r>
-                        <a:rPr lang="en-GB" sz="1800" b="0" kern="1200" dirty="0">
+                        <a:rPr lang="de-DE" sz="1600" b="0" kern="1200">
                           <a:solidFill>
                             <a:schemeClr val="tx1"/>
                           </a:solidFill>
@@ -10902,9 +9929,9 @@
                           <a:ea typeface="+mn-ea"/>
                           <a:cs typeface="+mn-cs"/>
                         </a:rPr>
-                        <a:t>{n,}</a:t>
+                        <a:t>a(b|c)d</a:t>
                       </a:r>
-                      <a:endParaRPr lang="en-US" sz="1800" b="0" kern="1200" dirty="0">
+                      <a:endParaRPr lang="en-US" sz="1600" b="0" kern="1200" dirty="0">
                         <a:solidFill>
                           <a:schemeClr val="tx1"/>
                         </a:solidFill>
@@ -10929,7 +9956,7 @@
                     <a:p>
                       <a:pPr algn="l"/>
                       <a:r>
-                        <a:rPr lang="en-GB" sz="1800" b="0" kern="1200" dirty="0">
+                        <a:rPr lang="de-DE" sz="1600" b="0" kern="1200">
                           <a:solidFill>
                             <a:schemeClr val="tx1"/>
                           </a:solidFill>
@@ -10937,9 +9964,80 @@
                           <a:ea typeface="+mn-ea"/>
                           <a:cs typeface="+mn-cs"/>
                         </a:rPr>
-                        <a:t>n or more matches</a:t>
+                        <a:t>Matches abd or acd</a:t>
                       </a:r>
-                      <a:endParaRPr lang="en-US" sz="1800" b="0" kern="1200" dirty="0">
+                      <a:endParaRPr lang="en-US" sz="1600" b="0" kern="1200" dirty="0">
+                        <a:solidFill>
+                          <a:schemeClr val="tx1"/>
+                        </a:solidFill>
+                        <a:latin typeface="+mn-lt"/>
+                        <a:ea typeface="+mn-ea"/>
+                        <a:cs typeface="+mn-cs"/>
+                      </a:endParaRPr>
+                    </a:p>
+                  </a:txBody>
+                  <a:tcPr anchor="ctr"/>
+                </a:tc>
+                <a:extLst>
+                  <a:ext uri="{0D108BD9-81ED-4DB2-BD59-A6C34878D82A}">
+                    <a16:rowId xmlns:a16="http://schemas.microsoft.com/office/drawing/2014/main" val="374232267"/>
+                  </a:ext>
+                </a:extLst>
+              </a:tr>
+              <a:tr h="254794">
+                <a:tc>
+                  <a:txBody>
+                    <a:bodyPr/>
+                    <a:lstStyle/>
+                    <a:p>
+                      <a:pPr algn="l"/>
+                      <a:r>
+                        <a:rPr lang="en-GB" sz="1600" b="0" kern="1200">
+                          <a:solidFill>
+                            <a:schemeClr val="tx1"/>
+                          </a:solidFill>
+                          <a:latin typeface="+mn-lt"/>
+                          <a:ea typeface="+mn-ea"/>
+                          <a:cs typeface="+mn-cs"/>
+                        </a:rPr>
+                        <a:t>^x</a:t>
+                      </a:r>
+                      <a:endParaRPr lang="en-US" sz="1600" b="0" kern="1200" dirty="0">
+                        <a:solidFill>
+                          <a:schemeClr val="tx1"/>
+                        </a:solidFill>
+                        <a:latin typeface="+mn-lt"/>
+                        <a:ea typeface="+mn-ea"/>
+                        <a:cs typeface="+mn-cs"/>
+                      </a:endParaRPr>
+                    </a:p>
+                  </a:txBody>
+                  <a:tcPr anchor="ctr">
+                    <a:solidFill>
+                      <a:schemeClr val="bg1">
+                        <a:lumMod val="85000"/>
+                      </a:schemeClr>
+                    </a:solidFill>
+                  </a:tcPr>
+                </a:tc>
+                <a:tc>
+                  <a:txBody>
+                    <a:bodyPr/>
+                    <a:lstStyle/>
+                    <a:p>
+                      <a:pPr algn="l"/>
+                      <a:r>
+                        <a:rPr lang="en-GB" sz="1600" b="0" kern="1200">
+                          <a:solidFill>
+                            <a:schemeClr val="tx1"/>
+                          </a:solidFill>
+                          <a:latin typeface="+mn-lt"/>
+                          <a:ea typeface="+mn-ea"/>
+                          <a:cs typeface="+mn-cs"/>
+                        </a:rPr>
+                        <a:t>Matches x if string begins with x</a:t>
+                      </a:r>
+                      <a:endParaRPr lang="en-US" sz="1600" b="0" kern="1200" dirty="0">
                         <a:solidFill>
                           <a:schemeClr val="tx1"/>
                         </a:solidFill>
@@ -10965,7 +10063,7 @@
                     <a:p>
                       <a:pPr algn="l"/>
                       <a:r>
-                        <a:rPr lang="en-GB" sz="1800" b="0" kern="1200" dirty="0">
+                        <a:rPr lang="en-GB" sz="1600" b="0" kern="1200">
                           <a:solidFill>
                             <a:schemeClr val="tx1"/>
                           </a:solidFill>
@@ -10973,9 +10071,9 @@
                           <a:ea typeface="+mn-ea"/>
                           <a:cs typeface="+mn-cs"/>
                         </a:rPr>
-                        <a:t>{,m}</a:t>
+                        <a:t>x$</a:t>
                       </a:r>
-                      <a:endParaRPr lang="en-US" sz="1800" b="0" kern="1200" dirty="0">
+                      <a:endParaRPr lang="en-US" sz="1600" b="0" kern="1200" dirty="0">
                         <a:solidFill>
                           <a:schemeClr val="tx1"/>
                         </a:solidFill>
@@ -11000,7 +10098,7 @@
                     <a:p>
                       <a:pPr algn="l"/>
                       <a:r>
-                        <a:rPr lang="en-GB" sz="1800" b="0" kern="1200" dirty="0">
+                        <a:rPr lang="en-GB" sz="1600" b="0" kern="1200">
                           <a:solidFill>
                             <a:schemeClr val="tx1"/>
                           </a:solidFill>
@@ -11008,9 +10106,9 @@
                           <a:ea typeface="+mn-ea"/>
                           <a:cs typeface="+mn-cs"/>
                         </a:rPr>
-                        <a:t>at most m matches</a:t>
+                        <a:t>Matches x if string ends with x</a:t>
                       </a:r>
-                      <a:endParaRPr lang="en-US" sz="1800" b="0" kern="1200" dirty="0">
+                      <a:endParaRPr lang="en-US" sz="1600" b="0" kern="1200" dirty="0">
                         <a:solidFill>
                           <a:schemeClr val="tx1"/>
                         </a:solidFill>
@@ -11028,168 +10126,10 @@
                   </a:ext>
                 </a:extLst>
               </a:tr>
-              <a:tr h="254794">
-                <a:tc>
-                  <a:txBody>
-                    <a:bodyPr/>
-                    <a:lstStyle/>
-                    <a:p>
-                      <a:pPr algn="l"/>
-                      <a:r>
-                        <a:rPr lang="en-GB" sz="1800" b="0" kern="1200" dirty="0">
-                          <a:solidFill>
-                            <a:schemeClr val="tx1"/>
-                          </a:solidFill>
-                          <a:latin typeface="+mn-lt"/>
-                          <a:ea typeface="+mn-ea"/>
-                          <a:cs typeface="+mn-cs"/>
-                        </a:rPr>
-                        <a:t>{</a:t>
-                      </a:r>
-                      <a:r>
-                        <a:rPr lang="en-GB" sz="1800" b="0" kern="1200" dirty="0" err="1">
-                          <a:solidFill>
-                            <a:schemeClr val="tx1"/>
-                          </a:solidFill>
-                          <a:latin typeface="+mn-lt"/>
-                          <a:ea typeface="+mn-ea"/>
-                          <a:cs typeface="+mn-cs"/>
-                        </a:rPr>
-                        <a:t>n,m</a:t>
-                      </a:r>
-                      <a:r>
-                        <a:rPr lang="en-GB" sz="1800" b="0" kern="1200" dirty="0">
-                          <a:solidFill>
-                            <a:schemeClr val="tx1"/>
-                          </a:solidFill>
-                          <a:latin typeface="+mn-lt"/>
-                          <a:ea typeface="+mn-ea"/>
-                          <a:cs typeface="+mn-cs"/>
-                        </a:rPr>
-                        <a:t>}</a:t>
-                      </a:r>
-                      <a:endParaRPr lang="en-US" sz="1800" b="0" kern="1200" dirty="0">
-                        <a:solidFill>
-                          <a:schemeClr val="tx1"/>
-                        </a:solidFill>
-                        <a:latin typeface="+mn-lt"/>
-                        <a:ea typeface="+mn-ea"/>
-                        <a:cs typeface="+mn-cs"/>
-                      </a:endParaRPr>
-                    </a:p>
-                  </a:txBody>
-                  <a:tcPr anchor="ctr">
-                    <a:solidFill>
-                      <a:schemeClr val="bg1">
-                        <a:lumMod val="85000"/>
-                      </a:schemeClr>
-                    </a:solidFill>
-                  </a:tcPr>
-                </a:tc>
-                <a:tc>
-                  <a:txBody>
-                    <a:bodyPr/>
-                    <a:lstStyle/>
-                    <a:p>
-                      <a:pPr algn="l"/>
-                      <a:r>
-                        <a:rPr lang="en-GB" sz="1800" b="0" kern="1200" dirty="0">
-                          <a:solidFill>
-                            <a:schemeClr val="tx1"/>
-                          </a:solidFill>
-                          <a:latin typeface="+mn-lt"/>
-                          <a:ea typeface="+mn-ea"/>
-                          <a:cs typeface="+mn-cs"/>
-                        </a:rPr>
-                        <a:t>between n and m matches</a:t>
-                      </a:r>
-                      <a:endParaRPr lang="en-US" sz="1800" b="0" kern="1200" dirty="0">
-                        <a:solidFill>
-                          <a:schemeClr val="tx1"/>
-                        </a:solidFill>
-                        <a:latin typeface="+mn-lt"/>
-                        <a:ea typeface="+mn-ea"/>
-                        <a:cs typeface="+mn-cs"/>
-                      </a:endParaRPr>
-                    </a:p>
-                  </a:txBody>
-                  <a:tcPr anchor="ctr"/>
-                </a:tc>
-                <a:extLst>
-                  <a:ext uri="{0D108BD9-81ED-4DB2-BD59-A6C34878D82A}">
-                    <a16:rowId xmlns:a16="http://schemas.microsoft.com/office/drawing/2014/main" val="869907065"/>
-                  </a:ext>
-                </a:extLst>
-              </a:tr>
             </a:tbl>
           </a:graphicData>
         </a:graphic>
       </p:graphicFrame>
-      <p:sp>
-        <p:nvSpPr>
-          <p:cNvPr id="9" name="Rectangle 8">
-            <a:extLst>
-              <a:ext uri="{FF2B5EF4-FFF2-40B4-BE49-F238E27FC236}">
-                <a16:creationId xmlns:a16="http://schemas.microsoft.com/office/drawing/2014/main" id="{681685EE-532E-4BCA-82AE-FC4ABF85F532}"/>
-              </a:ext>
-            </a:extLst>
-          </p:cNvPr>
-          <p:cNvSpPr/>
-          <p:nvPr/>
-        </p:nvSpPr>
-        <p:spPr>
-          <a:xfrm>
-            <a:off x="4827104" y="0"/>
-            <a:ext cx="7364896" cy="914400"/>
-          </a:xfrm>
-          <a:prstGeom prst="rect">
-            <a:avLst/>
-          </a:prstGeom>
-          <a:solidFill>
-            <a:schemeClr val="accent2"/>
-          </a:solidFill>
-          <a:ln>
-            <a:solidFill>
-              <a:schemeClr val="accent2"/>
-            </a:solidFill>
-          </a:ln>
-        </p:spPr>
-        <p:style>
-          <a:lnRef idx="2">
-            <a:schemeClr val="accent1">
-              <a:shade val="50000"/>
-            </a:schemeClr>
-          </a:lnRef>
-          <a:fillRef idx="1">
-            <a:schemeClr val="accent1"/>
-          </a:fillRef>
-          <a:effectRef idx="0">
-            <a:schemeClr val="accent1"/>
-          </a:effectRef>
-          <a:fontRef idx="minor">
-            <a:schemeClr val="lt1"/>
-          </a:fontRef>
-        </p:style>
-        <p:txBody>
-          <a:bodyPr rtlCol="0" anchor="ctr"/>
-          <a:lstStyle/>
-          <a:p>
-            <a:pPr algn="ctr"/>
-            <a:r>
-              <a:rPr lang="de-DE"/>
-              <a:t>nochmal checken!! und ggf. ergänzen </a:t>
-            </a:r>
-          </a:p>
-          <a:p>
-            <a:pPr algn="ctr"/>
-            <a:r>
-              <a:rPr lang="de-DE"/>
-              <a:t>https://cran.r-project.org/web/packages/stringr/vignettes/regular-expressions.html</a:t>
-            </a:r>
-            <a:endParaRPr lang="en-US"/>
-          </a:p>
-        </p:txBody>
-      </p:sp>
     </p:spTree>
     <p:extLst>
       <p:ext uri="{BB962C8B-B14F-4D97-AF65-F5344CB8AC3E}">
@@ -11203,7 +10143,7 @@
 </p:sld>
 </file>
 
-<file path=ppt/slides/slide22.xml><?xml version="1.0" encoding="utf-8"?>
+<file path=ppt/slides/slide21.xml><?xml version="1.0" encoding="utf-8"?>
 <p:sld xmlns:a="http://schemas.openxmlformats.org/drawingml/2006/main" xmlns:r="http://schemas.openxmlformats.org/officeDocument/2006/relationships" xmlns:p="http://schemas.openxmlformats.org/presentationml/2006/main">
   <p:cSld>
     <p:spTree>
@@ -11237,7 +10177,7 @@
           <a:p>
             <a:fld id="{C9E0B00B-E6DF-4183-A694-3DE28BEFB357}" type="slidenum">
               <a:rPr lang="en-US" smtClean="0"/>
-              <a:t>22</a:t>
+              <a:t>21</a:t>
             </a:fld>
             <a:endParaRPr lang="en-US"/>
           </a:p>
@@ -11298,14 +10238,14 @@
           <p:nvPr>
             <p:extLst>
               <p:ext uri="{D42A27DB-BD31-4B8C-83A1-F6EECF244321}">
-                <p14:modId xmlns:p14="http://schemas.microsoft.com/office/powerpoint/2010/main" val="3249419493"/>
+                <p14:modId xmlns:p14="http://schemas.microsoft.com/office/powerpoint/2010/main" val="3097514952"/>
               </p:ext>
             </p:extLst>
           </p:nvPr>
         </p:nvGraphicFramePr>
         <p:xfrm>
           <a:off x="1066801" y="1966913"/>
-          <a:ext cx="10287000" cy="2926080"/>
+          <a:ext cx="10287000" cy="3352800"/>
         </p:xfrm>
         <a:graphic>
           <a:graphicData uri="http://schemas.openxmlformats.org/drawingml/2006/table">
@@ -11337,7 +10277,7 @@
                     <a:p>
                       <a:pPr algn="l"/>
                       <a:r>
-                        <a:rPr lang="en-US" sz="1800" b="1" dirty="0"/>
+                        <a:rPr lang="en-US" sz="1600" b="1" dirty="0"/>
                         <a:t>Pattern</a:t>
                       </a:r>
                     </a:p>
@@ -11357,7 +10297,7 @@
                     <a:p>
                       <a:pPr algn="l"/>
                       <a:r>
-                        <a:rPr lang="en-US" sz="1800" b="1" dirty="0"/>
+                        <a:rPr lang="en-US" sz="1600" b="1" dirty="0"/>
                         <a:t>Function</a:t>
                       </a:r>
                     </a:p>
@@ -11378,7 +10318,7 @@
                     <a:p>
                       <a:pPr algn="l"/>
                       <a:r>
-                        <a:rPr lang="de-DE" sz="1800" b="0" kern="1200">
+                        <a:rPr lang="de-DE" sz="1600" b="0" kern="1200">
                           <a:solidFill>
                             <a:schemeClr val="tx1"/>
                           </a:solidFill>
@@ -11386,9 +10326,9 @@
                           <a:ea typeface="+mn-ea"/>
                           <a:cs typeface="+mn-cs"/>
                         </a:rPr>
-                        <a:t>?</a:t>
+                        <a:t>x?</a:t>
                       </a:r>
-                      <a:endParaRPr lang="en-US" sz="1800" b="0" kern="1200" dirty="0">
+                      <a:endParaRPr lang="en-US" sz="1600" b="0" kern="1200" dirty="0">
                         <a:solidFill>
                           <a:schemeClr val="tx1"/>
                         </a:solidFill>
@@ -11429,7 +10369,7 @@
                         <a:defRPr/>
                       </a:pPr>
                       <a:r>
-                        <a:rPr lang="de-DE" sz="1800" b="0" kern="1200">
+                        <a:rPr lang="de-DE" sz="1600" b="0" kern="1200">
                           <a:solidFill>
                             <a:schemeClr val="tx1"/>
                           </a:solidFill>
@@ -11437,9 +10377,9 @@
                           <a:ea typeface="+mn-ea"/>
                           <a:cs typeface="+mn-cs"/>
                         </a:rPr>
-                        <a:t>0 or 1 matches</a:t>
+                        <a:t>Matches 0 or 1 occurrences of x</a:t>
                       </a:r>
-                      <a:endParaRPr lang="en-US" sz="1800" b="0" kern="1200" dirty="0">
+                      <a:endParaRPr lang="en-US" sz="1600" b="0" kern="1200" dirty="0">
                         <a:solidFill>
                           <a:schemeClr val="tx1"/>
                         </a:solidFill>
@@ -11465,7 +10405,7 @@
                     <a:p>
                       <a:pPr algn="l"/>
                       <a:r>
-                        <a:rPr lang="de-DE" sz="1800" b="0" kern="1200">
+                        <a:rPr lang="de-DE" sz="1600" b="0" kern="1200">
                           <a:solidFill>
                             <a:schemeClr val="tx1"/>
                           </a:solidFill>
@@ -11473,9 +10413,9 @@
                           <a:ea typeface="+mn-ea"/>
                           <a:cs typeface="+mn-cs"/>
                         </a:rPr>
-                        <a:t>*</a:t>
+                        <a:t>x*</a:t>
                       </a:r>
-                      <a:endParaRPr lang="en-US" sz="1800" b="0" kern="1200" dirty="0">
+                      <a:endParaRPr lang="en-US" sz="1600" b="0" kern="1200" dirty="0">
                         <a:solidFill>
                           <a:schemeClr val="tx1"/>
                         </a:solidFill>
@@ -11498,9 +10438,25 @@
                     <a:bodyPr/>
                     <a:lstStyle/>
                     <a:p>
-                      <a:pPr algn="l"/>
+                      <a:pPr marL="0" marR="0" lvl="0" indent="0" algn="l" defTabSz="914400" rtl="0" eaLnBrk="1" fontAlgn="auto" latinLnBrk="0" hangingPunct="1">
+                        <a:lnSpc>
+                          <a:spcPct val="100000"/>
+                        </a:lnSpc>
+                        <a:spcBef>
+                          <a:spcPts val="0"/>
+                        </a:spcBef>
+                        <a:spcAft>
+                          <a:spcPts val="0"/>
+                        </a:spcAft>
+                        <a:buClrTx/>
+                        <a:buSzTx/>
+                        <a:buFontTx/>
+                        <a:buNone/>
+                        <a:tabLst/>
+                        <a:defRPr/>
+                      </a:pPr>
                       <a:r>
-                        <a:rPr lang="de-DE" sz="1800" b="0" kern="1200">
+                        <a:rPr lang="de-DE" sz="1600" b="0" kern="1200">
                           <a:solidFill>
                             <a:schemeClr val="tx1"/>
                           </a:solidFill>
@@ -11508,9 +10464,9 @@
                           <a:ea typeface="+mn-ea"/>
                           <a:cs typeface="+mn-cs"/>
                         </a:rPr>
-                        <a:t>0 or more matches</a:t>
+                        <a:t>Matches 0 or more occurrences of x</a:t>
                       </a:r>
-                      <a:endParaRPr lang="en-US" sz="1800" b="0" kern="1200" dirty="0">
+                      <a:endParaRPr lang="en-US" sz="1600" b="0" kern="1200" dirty="0">
                         <a:solidFill>
                           <a:schemeClr val="tx1"/>
                         </a:solidFill>
@@ -11536,7 +10492,7 @@
                     <a:p>
                       <a:pPr algn="l"/>
                       <a:r>
-                        <a:rPr lang="de-DE" sz="1800" b="0" kern="1200">
+                        <a:rPr lang="de-DE" sz="1600" b="0" kern="1200">
                           <a:solidFill>
                             <a:schemeClr val="tx1"/>
                           </a:solidFill>
@@ -11544,9 +10500,9 @@
                           <a:ea typeface="+mn-ea"/>
                           <a:cs typeface="+mn-cs"/>
                         </a:rPr>
-                        <a:t>+ </a:t>
+                        <a:t>x+ </a:t>
                       </a:r>
-                      <a:endParaRPr lang="en-US" sz="1800" b="0" kern="1200" dirty="0">
+                      <a:endParaRPr lang="en-US" sz="1600" b="0" kern="1200" dirty="0">
                         <a:solidFill>
                           <a:schemeClr val="tx1"/>
                         </a:solidFill>
@@ -11569,9 +10525,25 @@
                     <a:bodyPr/>
                     <a:lstStyle/>
                     <a:p>
-                      <a:pPr algn="l"/>
+                      <a:pPr marL="0" marR="0" lvl="0" indent="0" algn="l" defTabSz="914400" rtl="0" eaLnBrk="1" fontAlgn="auto" latinLnBrk="0" hangingPunct="1">
+                        <a:lnSpc>
+                          <a:spcPct val="100000"/>
+                        </a:lnSpc>
+                        <a:spcBef>
+                          <a:spcPts val="0"/>
+                        </a:spcBef>
+                        <a:spcAft>
+                          <a:spcPts val="0"/>
+                        </a:spcAft>
+                        <a:buClrTx/>
+                        <a:buSzTx/>
+                        <a:buFontTx/>
+                        <a:buNone/>
+                        <a:tabLst/>
+                        <a:defRPr/>
+                      </a:pPr>
                       <a:r>
-                        <a:rPr lang="de-DE" sz="1800" b="0" kern="1200">
+                        <a:rPr lang="de-DE" sz="1600" b="0" kern="1200">
                           <a:solidFill>
                             <a:schemeClr val="tx1"/>
                           </a:solidFill>
@@ -11579,9 +10551,9 @@
                           <a:ea typeface="+mn-ea"/>
                           <a:cs typeface="+mn-cs"/>
                         </a:rPr>
-                        <a:t>1 or more matches</a:t>
+                        <a:t>Matches 1 or more occurrences of x</a:t>
                       </a:r>
-                      <a:endParaRPr lang="en-US" sz="1800" b="0" kern="1200" dirty="0">
+                      <a:endParaRPr lang="en-US" sz="1600" b="0" kern="1200" dirty="0">
                         <a:solidFill>
                           <a:schemeClr val="tx1"/>
                         </a:solidFill>
@@ -11607,7 +10579,7 @@
                     <a:p>
                       <a:pPr algn="l"/>
                       <a:r>
-                        <a:rPr lang="en-GB" sz="1800" b="0" kern="1200" dirty="0">
+                        <a:rPr lang="en-GB" sz="1600" b="0" kern="1200">
                           <a:solidFill>
                             <a:schemeClr val="tx1"/>
                           </a:solidFill>
@@ -11615,9 +10587,9 @@
                           <a:ea typeface="+mn-ea"/>
                           <a:cs typeface="+mn-cs"/>
                         </a:rPr>
-                        <a:t>{n,}</a:t>
+                        <a:t>x{n}</a:t>
                       </a:r>
-                      <a:endParaRPr lang="en-US" sz="1800" b="0" kern="1200" dirty="0">
+                      <a:endParaRPr lang="en-US" sz="1600" b="0" kern="1200" dirty="0">
                         <a:solidFill>
                           <a:schemeClr val="tx1"/>
                         </a:solidFill>
@@ -11640,9 +10612,25 @@
                     <a:bodyPr/>
                     <a:lstStyle/>
                     <a:p>
-                      <a:pPr algn="l"/>
+                      <a:pPr marL="0" marR="0" lvl="0" indent="0" algn="l" defTabSz="914400" rtl="0" eaLnBrk="1" fontAlgn="auto" latinLnBrk="0" hangingPunct="1">
+                        <a:lnSpc>
+                          <a:spcPct val="100000"/>
+                        </a:lnSpc>
+                        <a:spcBef>
+                          <a:spcPts val="0"/>
+                        </a:spcBef>
+                        <a:spcAft>
+                          <a:spcPts val="0"/>
+                        </a:spcAft>
+                        <a:buClrTx/>
+                        <a:buSzTx/>
+                        <a:buFontTx/>
+                        <a:buNone/>
+                        <a:tabLst/>
+                        <a:defRPr/>
+                      </a:pPr>
                       <a:r>
-                        <a:rPr lang="en-GB" sz="1800" b="0" kern="1200" dirty="0">
+                        <a:rPr lang="de-DE" sz="1600" b="0" kern="1200">
                           <a:solidFill>
                             <a:schemeClr val="tx1"/>
                           </a:solidFill>
@@ -11650,9 +10638,151 @@
                           <a:ea typeface="+mn-ea"/>
                           <a:cs typeface="+mn-cs"/>
                         </a:rPr>
-                        <a:t>n or more matches</a:t>
+                        <a:t>Matches exactly </a:t>
                       </a:r>
-                      <a:endParaRPr lang="en-US" sz="1800" b="0" kern="1200" dirty="0">
+                      <a:r>
+                        <a:rPr lang="de-DE" sz="1600" b="0" i="1" kern="1200">
+                          <a:solidFill>
+                            <a:schemeClr val="tx1"/>
+                          </a:solidFill>
+                          <a:latin typeface="+mn-lt"/>
+                          <a:ea typeface="+mn-ea"/>
+                          <a:cs typeface="+mn-cs"/>
+                        </a:rPr>
+                        <a:t>n</a:t>
+                      </a:r>
+                      <a:r>
+                        <a:rPr lang="de-DE" sz="1600" b="0" kern="1200">
+                          <a:solidFill>
+                            <a:schemeClr val="tx1"/>
+                          </a:solidFill>
+                          <a:latin typeface="+mn-lt"/>
+                          <a:ea typeface="+mn-ea"/>
+                          <a:cs typeface="+mn-cs"/>
+                        </a:rPr>
+                        <a:t> occurrences of x</a:t>
+                      </a:r>
+                      <a:endParaRPr lang="en-US" sz="1600" b="0" kern="1200" dirty="0">
+                        <a:solidFill>
+                          <a:schemeClr val="tx1"/>
+                        </a:solidFill>
+                        <a:latin typeface="+mn-lt"/>
+                        <a:ea typeface="+mn-ea"/>
+                        <a:cs typeface="+mn-cs"/>
+                      </a:endParaRPr>
+                    </a:p>
+                  </a:txBody>
+                  <a:tcPr anchor="ctr"/>
+                </a:tc>
+                <a:extLst>
+                  <a:ext uri="{0D108BD9-81ED-4DB2-BD59-A6C34878D82A}">
+                    <a16:rowId xmlns:a16="http://schemas.microsoft.com/office/drawing/2014/main" val="2548827822"/>
+                  </a:ext>
+                </a:extLst>
+              </a:tr>
+              <a:tr h="254794">
+                <a:tc>
+                  <a:txBody>
+                    <a:bodyPr/>
+                    <a:lstStyle/>
+                    <a:p>
+                      <a:pPr algn="l"/>
+                      <a:r>
+                        <a:rPr lang="en-GB" sz="1600" b="0" kern="1200">
+                          <a:solidFill>
+                            <a:schemeClr val="tx1"/>
+                          </a:solidFill>
+                          <a:latin typeface="+mn-lt"/>
+                          <a:ea typeface="+mn-ea"/>
+                          <a:cs typeface="+mn-cs"/>
+                        </a:rPr>
+                        <a:t>x{</a:t>
+                      </a:r>
+                      <a:r>
+                        <a:rPr lang="en-GB" sz="1600" b="0" kern="1200" dirty="0">
+                          <a:solidFill>
+                            <a:schemeClr val="tx1"/>
+                          </a:solidFill>
+                          <a:latin typeface="+mn-lt"/>
+                          <a:ea typeface="+mn-ea"/>
+                          <a:cs typeface="+mn-cs"/>
+                        </a:rPr>
+                        <a:t>n,}</a:t>
+                      </a:r>
+                      <a:endParaRPr lang="en-US" sz="1600" b="0" kern="1200" dirty="0">
+                        <a:solidFill>
+                          <a:schemeClr val="tx1"/>
+                        </a:solidFill>
+                        <a:latin typeface="+mn-lt"/>
+                        <a:ea typeface="+mn-ea"/>
+                        <a:cs typeface="+mn-cs"/>
+                      </a:endParaRPr>
+                    </a:p>
+                  </a:txBody>
+                  <a:tcPr anchor="ctr">
+                    <a:solidFill>
+                      <a:schemeClr val="bg1">
+                        <a:lumMod val="85000"/>
+                      </a:schemeClr>
+                    </a:solidFill>
+                  </a:tcPr>
+                </a:tc>
+                <a:tc>
+                  <a:txBody>
+                    <a:bodyPr/>
+                    <a:lstStyle/>
+                    <a:p>
+                      <a:pPr marL="0" marR="0" lvl="0" indent="0" algn="l" defTabSz="914400" rtl="0" eaLnBrk="1" fontAlgn="auto" latinLnBrk="0" hangingPunct="1">
+                        <a:lnSpc>
+                          <a:spcPct val="100000"/>
+                        </a:lnSpc>
+                        <a:spcBef>
+                          <a:spcPts val="0"/>
+                        </a:spcBef>
+                        <a:spcAft>
+                          <a:spcPts val="0"/>
+                        </a:spcAft>
+                        <a:buClrTx/>
+                        <a:buSzTx/>
+                        <a:buFontTx/>
+                        <a:buNone/>
+                        <a:tabLst/>
+                        <a:defRPr/>
+                      </a:pPr>
+                      <a:r>
+                        <a:rPr lang="de-DE" sz="1600" b="0" kern="1200">
+                          <a:solidFill>
+                            <a:schemeClr val="tx1"/>
+                          </a:solidFill>
+                          <a:latin typeface="+mn-lt"/>
+                          <a:ea typeface="+mn-ea"/>
+                          <a:cs typeface="+mn-cs"/>
+                        </a:rPr>
+                        <a:t>Matches </a:t>
+                      </a:r>
+                      <a:r>
+                        <a:rPr lang="de-DE" sz="1600" b="0" i="1" kern="1200">
+                          <a:solidFill>
+                            <a:schemeClr val="tx1"/>
+                          </a:solidFill>
+                          <a:latin typeface="+mn-lt"/>
+                          <a:ea typeface="+mn-ea"/>
+                          <a:cs typeface="+mn-cs"/>
+                        </a:rPr>
+                        <a:t>n</a:t>
+                      </a:r>
+                      <a:r>
+                        <a:rPr lang="de-DE" sz="1600" b="0" kern="1200">
+                          <a:solidFill>
+                            <a:schemeClr val="tx1"/>
+                          </a:solidFill>
+                          <a:latin typeface="+mn-lt"/>
+                          <a:ea typeface="+mn-ea"/>
+                          <a:cs typeface="+mn-cs"/>
+                        </a:rPr>
+                        <a:t> or more occurrences of x</a:t>
+                      </a:r>
+                      <a:endParaRPr lang="en-US" sz="1600" b="0" kern="1200" dirty="0">
                         <a:solidFill>
                           <a:schemeClr val="tx1"/>
                         </a:solidFill>
@@ -11678,7 +10808,7 @@
                     <a:p>
                       <a:pPr algn="l"/>
                       <a:r>
-                        <a:rPr lang="en-GB" sz="1800" b="0" kern="1200" dirty="0">
+                        <a:rPr lang="en-GB" sz="1600" b="0" kern="1200">
                           <a:solidFill>
                             <a:schemeClr val="tx1"/>
                           </a:solidFill>
@@ -11686,9 +10816,20 @@
                           <a:ea typeface="+mn-ea"/>
                           <a:cs typeface="+mn-cs"/>
                         </a:rPr>
-                        <a:t>{,m}</a:t>
+                        <a:t>x{,</a:t>
                       </a:r>
-                      <a:endParaRPr lang="en-US" sz="1800" b="0" kern="1200" dirty="0">
+                      <a:r>
+                        <a:rPr lang="en-GB" sz="1600" b="0" kern="1200" dirty="0">
+                          <a:solidFill>
+                            <a:schemeClr val="tx1"/>
+                          </a:solidFill>
+                          <a:latin typeface="+mn-lt"/>
+                          <a:ea typeface="+mn-ea"/>
+                          <a:cs typeface="+mn-cs"/>
+                        </a:rPr>
+                        <a:t>m}</a:t>
+                      </a:r>
+                      <a:endParaRPr lang="en-US" sz="1600" b="0" kern="1200" dirty="0">
                         <a:solidFill>
                           <a:schemeClr val="tx1"/>
                         </a:solidFill>
@@ -11711,9 +10852,25 @@
                     <a:bodyPr/>
                     <a:lstStyle/>
                     <a:p>
-                      <a:pPr algn="l"/>
+                      <a:pPr marL="0" marR="0" lvl="0" indent="0" algn="l" defTabSz="914400" rtl="0" eaLnBrk="1" fontAlgn="auto" latinLnBrk="0" hangingPunct="1">
+                        <a:lnSpc>
+                          <a:spcPct val="100000"/>
+                        </a:lnSpc>
+                        <a:spcBef>
+                          <a:spcPts val="0"/>
+                        </a:spcBef>
+                        <a:spcAft>
+                          <a:spcPts val="0"/>
+                        </a:spcAft>
+                        <a:buClrTx/>
+                        <a:buSzTx/>
+                        <a:buFontTx/>
+                        <a:buNone/>
+                        <a:tabLst/>
+                        <a:defRPr/>
+                      </a:pPr>
                       <a:r>
-                        <a:rPr lang="en-GB" sz="1800" b="0" kern="1200" dirty="0">
+                        <a:rPr lang="de-DE" sz="1600" b="0" kern="1200">
                           <a:solidFill>
                             <a:schemeClr val="tx1"/>
                           </a:solidFill>
@@ -11721,9 +10878,31 @@
                           <a:ea typeface="+mn-ea"/>
                           <a:cs typeface="+mn-cs"/>
                         </a:rPr>
-                        <a:t>at most m matches</a:t>
+                        <a:t>Matches at least </a:t>
                       </a:r>
-                      <a:endParaRPr lang="en-US" sz="1800" b="0" kern="1200" dirty="0">
+                      <a:r>
+                        <a:rPr lang="de-DE" sz="1600" b="0" i="1" kern="1200">
+                          <a:solidFill>
+                            <a:schemeClr val="tx1"/>
+                          </a:solidFill>
+                          <a:latin typeface="+mn-lt"/>
+                          <a:ea typeface="+mn-ea"/>
+                          <a:cs typeface="+mn-cs"/>
+                        </a:rPr>
+                        <a:t>m</a:t>
+                      </a:r>
+                      <a:r>
+                        <a:rPr lang="de-DE" sz="1600" b="0" kern="1200">
+                          <a:solidFill>
+                            <a:schemeClr val="tx1"/>
+                          </a:solidFill>
+                          <a:latin typeface="+mn-lt"/>
+                          <a:ea typeface="+mn-ea"/>
+                          <a:cs typeface="+mn-cs"/>
+                        </a:rPr>
+                        <a:t> occurrences of x</a:t>
+                      </a:r>
+                      <a:endParaRPr lang="en-US" sz="1600" b="0" kern="1200" dirty="0">
                         <a:solidFill>
                           <a:schemeClr val="tx1"/>
                         </a:solidFill>
@@ -11749,7 +10928,7 @@
                     <a:p>
                       <a:pPr algn="l"/>
                       <a:r>
-                        <a:rPr lang="en-GB" sz="1800" b="0" kern="1200" dirty="0">
+                        <a:rPr lang="en-GB" sz="1600" b="0" kern="1200">
                           <a:solidFill>
                             <a:schemeClr val="tx1"/>
                           </a:solidFill>
@@ -11757,10 +10936,10 @@
                           <a:ea typeface="+mn-ea"/>
                           <a:cs typeface="+mn-cs"/>
                         </a:rPr>
-                        <a:t>{</a:t>
+                        <a:t>x{</a:t>
                       </a:r>
                       <a:r>
-                        <a:rPr lang="en-GB" sz="1800" b="0" kern="1200" dirty="0" err="1">
+                        <a:rPr lang="en-GB" sz="1600" b="0" kern="1200" dirty="0" err="1">
                           <a:solidFill>
                             <a:schemeClr val="tx1"/>
                           </a:solidFill>
@@ -11771,7 +10950,7 @@
                         <a:t>n,m</a:t>
                       </a:r>
                       <a:r>
-                        <a:rPr lang="en-GB" sz="1800" b="0" kern="1200" dirty="0">
+                        <a:rPr lang="en-GB" sz="1600" b="0" kern="1200" dirty="0">
                           <a:solidFill>
                             <a:schemeClr val="tx1"/>
                           </a:solidFill>
@@ -11781,7 +10960,138 @@
                         </a:rPr>
                         <a:t>}</a:t>
                       </a:r>
-                      <a:endParaRPr lang="en-US" sz="1800" b="0" kern="1200" dirty="0">
+                      <a:endParaRPr lang="en-US" sz="1600" b="0" kern="1200" dirty="0">
+                        <a:solidFill>
+                          <a:schemeClr val="tx1"/>
+                        </a:solidFill>
+                        <a:latin typeface="+mn-lt"/>
+                        <a:ea typeface="+mn-ea"/>
+                        <a:cs typeface="+mn-cs"/>
+                      </a:endParaRPr>
+                    </a:p>
+                  </a:txBody>
+                  <a:tcPr anchor="ctr">
+                    <a:solidFill>
+                      <a:schemeClr val="bg1">
+                        <a:lumMod val="85000"/>
+                      </a:schemeClr>
+                    </a:solidFill>
+                  </a:tcPr>
+                </a:tc>
+                <a:tc>
+                  <a:txBody>
+                    <a:bodyPr/>
+                    <a:lstStyle/>
+                    <a:p>
+                      <a:pPr marL="0" marR="0" lvl="0" indent="0" algn="l" defTabSz="914400" rtl="0" eaLnBrk="1" fontAlgn="auto" latinLnBrk="0" hangingPunct="1">
+                        <a:lnSpc>
+                          <a:spcPct val="100000"/>
+                        </a:lnSpc>
+                        <a:spcBef>
+                          <a:spcPts val="0"/>
+                        </a:spcBef>
+                        <a:spcAft>
+                          <a:spcPts val="0"/>
+                        </a:spcAft>
+                        <a:buClrTx/>
+                        <a:buSzTx/>
+                        <a:buFontTx/>
+                        <a:buNone/>
+                        <a:tabLst/>
+                        <a:defRPr/>
+                      </a:pPr>
+                      <a:r>
+                        <a:rPr lang="de-DE" sz="1600" b="0" kern="1200">
+                          <a:solidFill>
+                            <a:schemeClr val="tx1"/>
+                          </a:solidFill>
+                          <a:latin typeface="+mn-lt"/>
+                          <a:ea typeface="+mn-ea"/>
+                          <a:cs typeface="+mn-cs"/>
+                        </a:rPr>
+                        <a:t>Matches between </a:t>
+                      </a:r>
+                      <a:r>
+                        <a:rPr lang="de-DE" sz="1600" b="0" i="1" kern="1200">
+                          <a:solidFill>
+                            <a:schemeClr val="tx1"/>
+                          </a:solidFill>
+                          <a:latin typeface="+mn-lt"/>
+                          <a:ea typeface="+mn-ea"/>
+                          <a:cs typeface="+mn-cs"/>
+                        </a:rPr>
+                        <a:t>n</a:t>
+                      </a:r>
+                      <a:r>
+                        <a:rPr lang="de-DE" sz="1600" b="0" kern="1200">
+                          <a:solidFill>
+                            <a:schemeClr val="tx1"/>
+                          </a:solidFill>
+                          <a:latin typeface="+mn-lt"/>
+                          <a:ea typeface="+mn-ea"/>
+                          <a:cs typeface="+mn-cs"/>
+                        </a:rPr>
+                        <a:t> and </a:t>
+                      </a:r>
+                      <a:r>
+                        <a:rPr lang="de-DE" sz="1600" b="0" i="1" kern="1200">
+                          <a:solidFill>
+                            <a:schemeClr val="tx1"/>
+                          </a:solidFill>
+                          <a:latin typeface="+mn-lt"/>
+                          <a:ea typeface="+mn-ea"/>
+                          <a:cs typeface="+mn-cs"/>
+                        </a:rPr>
+                        <a:t>m</a:t>
+                      </a:r>
+                      <a:r>
+                        <a:rPr lang="de-DE" sz="1600" b="0" kern="1200">
+                          <a:solidFill>
+                            <a:schemeClr val="tx1"/>
+                          </a:solidFill>
+                          <a:latin typeface="+mn-lt"/>
+                          <a:ea typeface="+mn-ea"/>
+                          <a:cs typeface="+mn-cs"/>
+                        </a:rPr>
+                        <a:t> occurrences of x</a:t>
+                      </a:r>
+                      <a:endParaRPr lang="en-US" sz="1600" b="0" kern="1200" dirty="0">
+                        <a:solidFill>
+                          <a:schemeClr val="tx1"/>
+                        </a:solidFill>
+                        <a:latin typeface="+mn-lt"/>
+                        <a:ea typeface="+mn-ea"/>
+                        <a:cs typeface="+mn-cs"/>
+                      </a:endParaRPr>
+                    </a:p>
+                  </a:txBody>
+                  <a:tcPr anchor="ctr"/>
+                </a:tc>
+                <a:extLst>
+                  <a:ext uri="{0D108BD9-81ED-4DB2-BD59-A6C34878D82A}">
+                    <a16:rowId xmlns:a16="http://schemas.microsoft.com/office/drawing/2014/main" val="119559271"/>
+                  </a:ext>
+                </a:extLst>
+              </a:tr>
+              <a:tr h="254794">
+                <a:tc>
+                  <a:txBody>
+                    <a:bodyPr/>
+                    <a:lstStyle/>
+                    <a:p>
+                      <a:pPr algn="l"/>
+                      <a:r>
+                        <a:rPr lang="de-DE" sz="1600" b="0" kern="1200">
+                          <a:solidFill>
+                            <a:schemeClr val="tx1"/>
+                          </a:solidFill>
+                          <a:latin typeface="+mn-lt"/>
+                          <a:ea typeface="+mn-ea"/>
+                          <a:cs typeface="+mn-cs"/>
+                        </a:rPr>
+                        <a:t>x(?=...), x(?!...)</a:t>
+                      </a:r>
+                      <a:endParaRPr lang="en-US" sz="1600" b="0" kern="1200" dirty="0">
                         <a:solidFill>
                           <a:schemeClr val="tx1"/>
                         </a:solidFill>
@@ -11806,7 +11116,7 @@
                     <a:p>
                       <a:pPr algn="l"/>
                       <a:r>
-                        <a:rPr lang="en-GB" sz="1800" b="0" kern="1200" dirty="0">
+                        <a:rPr lang="de-DE" sz="1600" b="0" i="0" kern="1200">
                           <a:solidFill>
                             <a:schemeClr val="tx1"/>
                           </a:solidFill>
@@ -11814,9 +11124,9 @@
                           <a:ea typeface="+mn-ea"/>
                           <a:cs typeface="+mn-cs"/>
                         </a:rPr>
-                        <a:t>between n and m matches</a:t>
+                        <a:t>Matches x if (not) followed by ...</a:t>
                       </a:r>
-                      <a:endParaRPr lang="en-US" sz="1800" b="0" kern="1200" dirty="0">
+                      <a:endParaRPr lang="en-US" sz="1600" b="0" i="0" kern="1200" dirty="0">
                         <a:solidFill>
                           <a:schemeClr val="tx1"/>
                         </a:solidFill>
@@ -11830,7 +11140,7 @@
                 </a:tc>
                 <a:extLst>
                   <a:ext uri="{0D108BD9-81ED-4DB2-BD59-A6C34878D82A}">
-                    <a16:rowId xmlns:a16="http://schemas.microsoft.com/office/drawing/2014/main" val="119559271"/>
+                    <a16:rowId xmlns:a16="http://schemas.microsoft.com/office/drawing/2014/main" val="869907065"/>
                   </a:ext>
                 </a:extLst>
               </a:tr>
@@ -11841,7 +11151,18 @@
                     <a:lstStyle/>
                     <a:p>
                       <a:pPr algn="l"/>
-                      <a:endParaRPr lang="en-US" sz="1800" b="0" kern="1200" dirty="0">
+                      <a:r>
+                        <a:rPr lang="de-DE" sz="1600" b="0" kern="1200">
+                          <a:solidFill>
+                            <a:schemeClr val="tx1"/>
+                          </a:solidFill>
+                          <a:latin typeface="+mn-lt"/>
+                          <a:ea typeface="+mn-ea"/>
+                          <a:cs typeface="+mn-cs"/>
+                        </a:rPr>
+                        <a:t>(?&lt;=...)x, (?&lt;!)x</a:t>
+                      </a:r>
+                      <a:endParaRPr lang="en-US" sz="1600" b="0" kern="1200" dirty="0">
                         <a:solidFill>
                           <a:schemeClr val="tx1"/>
                         </a:solidFill>
@@ -11865,7 +11186,18 @@
                     <a:lstStyle/>
                     <a:p>
                       <a:pPr algn="l"/>
-                      <a:endParaRPr lang="en-US" sz="1800" b="0" kern="1200" dirty="0">
+                      <a:r>
+                        <a:rPr lang="de-DE" sz="1600" b="0" i="0" kern="1200">
+                          <a:solidFill>
+                            <a:schemeClr val="tx1"/>
+                          </a:solidFill>
+                          <a:latin typeface="+mn-lt"/>
+                          <a:ea typeface="+mn-ea"/>
+                          <a:cs typeface="+mn-cs"/>
+                        </a:rPr>
+                        <a:t>Matches x if (not) preceded by ...</a:t>
+                      </a:r>
+                      <a:endParaRPr lang="en-US" sz="1600" b="0" i="0" kern="1200" dirty="0">
                         <a:solidFill>
                           <a:schemeClr val="tx1"/>
                         </a:solidFill>
@@ -11879,7 +11211,7 @@
                 </a:tc>
                 <a:extLst>
                   <a:ext uri="{0D108BD9-81ED-4DB2-BD59-A6C34878D82A}">
-                    <a16:rowId xmlns:a16="http://schemas.microsoft.com/office/drawing/2014/main" val="869907065"/>
+                    <a16:rowId xmlns:a16="http://schemas.microsoft.com/office/drawing/2014/main" val="3063450925"/>
                   </a:ext>
                 </a:extLst>
               </a:tr>
@@ -11889,10 +11221,182 @@
       </p:graphicFrame>
       <p:sp>
         <p:nvSpPr>
-          <p:cNvPr id="9" name="Rectangle 8">
+          <p:cNvPr id="7" name="TextBox 6">
             <a:extLst>
               <a:ext uri="{FF2B5EF4-FFF2-40B4-BE49-F238E27FC236}">
-                <a16:creationId xmlns:a16="http://schemas.microsoft.com/office/drawing/2014/main" id="{681685EE-532E-4BCA-82AE-FC4ABF85F532}"/>
+                <a16:creationId xmlns:a16="http://schemas.microsoft.com/office/drawing/2014/main" id="{388B01E1-7944-4A8B-B96B-6A84C75CB949}"/>
+              </a:ext>
+            </a:extLst>
+          </p:cNvPr>
+          <p:cNvSpPr txBox="1"/>
+          <p:nvPr/>
+        </p:nvSpPr>
+        <p:spPr>
+          <a:xfrm>
+            <a:off x="1934765" y="5897046"/>
+            <a:ext cx="8322469" cy="369332"/>
+          </a:xfrm>
+          <a:prstGeom prst="rect">
+            <a:avLst/>
+          </a:prstGeom>
+          <a:noFill/>
+        </p:spPr>
+        <p:txBody>
+          <a:bodyPr wrap="square">
+            <a:spAutoFit/>
+          </a:bodyPr>
+          <a:lstStyle/>
+          <a:p>
+            <a:pPr algn="ctr"/>
+            <a:r>
+              <a:rPr lang="de-DE" i="1">
+                <a:hlinkClick r:id="rId3"/>
+              </a:rPr>
+              <a:t>https://cran.r-project.org/web/packages/stringr/vignettes/regular-expressions.html</a:t>
+            </a:r>
+            <a:r>
+              <a:rPr lang="de-DE" i="1"/>
+              <a:t> </a:t>
+            </a:r>
+            <a:endParaRPr lang="en-US" i="1"/>
+          </a:p>
+        </p:txBody>
+      </p:sp>
+      <p:pic>
+        <p:nvPicPr>
+          <p:cNvPr id="5" name="Graphic 4" descr="Remote learning language with solid fill">
+            <a:extLst>
+              <a:ext uri="{FF2B5EF4-FFF2-40B4-BE49-F238E27FC236}">
+                <a16:creationId xmlns:a16="http://schemas.microsoft.com/office/drawing/2014/main" id="{38AF4DEE-4C45-4F5D-A293-043B317A7D3B}"/>
+              </a:ext>
+            </a:extLst>
+          </p:cNvPr>
+          <p:cNvPicPr>
+            <a:picLocks noChangeAspect="1"/>
+          </p:cNvPicPr>
+          <p:nvPr/>
+        </p:nvPicPr>
+        <p:blipFill>
+          <a:blip r:embed="rId4">
+            <a:extLst>
+              <a:ext uri="{28A0092B-C50C-407E-A947-70E740481C1C}">
+                <a14:useLocalDpi xmlns:a14="http://schemas.microsoft.com/office/drawing/2010/main" val="0"/>
+              </a:ext>
+              <a:ext uri="{96DAC541-7B7A-43D3-8B79-37D633B846F1}">
+                <asvg:svgBlip xmlns:asvg="http://schemas.microsoft.com/office/drawing/2016/SVG/main" r:embed="rId5"/>
+              </a:ext>
+            </a:extLst>
+          </a:blip>
+          <a:stretch>
+            <a:fillRect/>
+          </a:stretch>
+        </p:blipFill>
+        <p:spPr>
+          <a:xfrm>
+            <a:off x="983456" y="5624512"/>
+            <a:ext cx="914400" cy="914400"/>
+          </a:xfrm>
+          <a:prstGeom prst="rect">
+            <a:avLst/>
+          </a:prstGeom>
+        </p:spPr>
+      </p:pic>
+    </p:spTree>
+    <p:extLst>
+      <p:ext uri="{BB962C8B-B14F-4D97-AF65-F5344CB8AC3E}">
+        <p14:creationId xmlns:p14="http://schemas.microsoft.com/office/powerpoint/2010/main" val="1583612714"/>
+      </p:ext>
+    </p:extLst>
+  </p:cSld>
+  <p:clrMapOvr>
+    <a:masterClrMapping/>
+  </p:clrMapOvr>
+</p:sld>
+</file>
+
+<file path=ppt/slides/slide22.xml><?xml version="1.0" encoding="utf-8"?>
+<p:sld xmlns:a="http://schemas.openxmlformats.org/drawingml/2006/main" xmlns:r="http://schemas.openxmlformats.org/officeDocument/2006/relationships" xmlns:p="http://schemas.openxmlformats.org/presentationml/2006/main">
+  <p:cSld>
+    <p:spTree>
+      <p:nvGrpSpPr>
+        <p:cNvPr id="1" name=""/>
+        <p:cNvGrpSpPr/>
+        <p:nvPr/>
+      </p:nvGrpSpPr>
+      <p:grpSpPr>
+        <a:xfrm>
+          <a:off x="0" y="0"/>
+          <a:ext cx="0" cy="0"/>
+          <a:chOff x="0" y="0"/>
+          <a:chExt cx="0" cy="0"/>
+        </a:xfrm>
+      </p:grpSpPr>
+      <p:sp>
+        <p:nvSpPr>
+          <p:cNvPr id="4" name="Foliennummernplatzhalter 3"/>
+          <p:cNvSpPr>
+            <a:spLocks noGrp="1"/>
+          </p:cNvSpPr>
+          <p:nvPr>
+            <p:ph type="sldNum" sz="quarter" idx="12"/>
+          </p:nvPr>
+        </p:nvSpPr>
+        <p:spPr/>
+        <p:txBody>
+          <a:bodyPr/>
+          <a:lstStyle/>
+          <a:p>
+            <a:fld id="{C9E0B00B-E6DF-4183-A694-3DE28BEFB357}" type="slidenum">
+              <a:rPr lang="en-US" smtClean="0"/>
+              <a:t>22</a:t>
+            </a:fld>
+            <a:endParaRPr lang="en-US"/>
+          </a:p>
+        </p:txBody>
+      </p:sp>
+      <p:sp>
+        <p:nvSpPr>
+          <p:cNvPr id="12" name="Titel 1">
+            <a:extLst>
+              <a:ext uri="{FF2B5EF4-FFF2-40B4-BE49-F238E27FC236}">
+                <a16:creationId xmlns:a16="http://schemas.microsoft.com/office/drawing/2014/main" id="{478EA67A-3C39-4D0A-996A-C363F30A14B2}"/>
+              </a:ext>
+            </a:extLst>
+          </p:cNvPr>
+          <p:cNvSpPr>
+            <a:spLocks noGrp="1"/>
+          </p:cNvSpPr>
+          <p:nvPr>
+            <p:ph type="title"/>
+          </p:nvPr>
+        </p:nvSpPr>
+        <p:spPr>
+          <a:xfrm>
+            <a:off x="1066800" y="561524"/>
+            <a:ext cx="10287000" cy="1129164"/>
+          </a:xfrm>
+        </p:spPr>
+        <p:txBody>
+          <a:bodyPr/>
+          <a:lstStyle/>
+          <a:p>
+            <a:r>
+              <a:rPr lang="en-US"/>
+              <a:t>Text Normalization  </a:t>
+            </a:r>
+            <a:r>
+              <a:rPr lang="en-US" b="1"/>
+              <a:t>Exercise</a:t>
+            </a:r>
+          </a:p>
+        </p:txBody>
+      </p:sp>
+      <p:sp>
+        <p:nvSpPr>
+          <p:cNvPr id="7" name="Rectangle 6">
+            <a:extLst>
+              <a:ext uri="{FF2B5EF4-FFF2-40B4-BE49-F238E27FC236}">
+                <a16:creationId xmlns:a16="http://schemas.microsoft.com/office/drawing/2014/main" id="{399D5C87-EDAB-4C4B-A55D-E6DBDD9D5ABA}"/>
               </a:ext>
             </a:extLst>
           </p:cNvPr>
@@ -11901,61 +11405,98 @@
         </p:nvSpPr>
         <p:spPr>
           <a:xfrm>
-            <a:off x="4827104" y="0"/>
-            <a:ext cx="7364896" cy="914400"/>
+            <a:off x="3228976" y="1992993"/>
+            <a:ext cx="8153400" cy="2872013"/>
           </a:xfrm>
           <a:prstGeom prst="rect">
             <a:avLst/>
           </a:prstGeom>
           <a:solidFill>
-            <a:schemeClr val="accent2"/>
+            <a:schemeClr val="bg2"/>
           </a:solidFill>
-          <a:ln>
+          <a:ln w="19050">
             <a:solidFill>
-              <a:schemeClr val="accent2"/>
+              <a:schemeClr val="bg2"/>
             </a:solidFill>
           </a:ln>
         </p:spPr>
         <p:style>
           <a:lnRef idx="2">
-            <a:schemeClr val="accent1">
-              <a:shade val="50000"/>
-            </a:schemeClr>
+            <a:schemeClr val="dk1"/>
           </a:lnRef>
           <a:fillRef idx="1">
-            <a:schemeClr val="accent1"/>
+            <a:schemeClr val="lt1"/>
           </a:fillRef>
           <a:effectRef idx="0">
-            <a:schemeClr val="accent1"/>
+            <a:schemeClr val="dk1"/>
           </a:effectRef>
           <a:fontRef idx="minor">
-            <a:schemeClr val="lt1"/>
+            <a:schemeClr val="dk1"/>
           </a:fontRef>
         </p:style>
         <p:txBody>
           <a:bodyPr rtlCol="0" anchor="ctr"/>
           <a:lstStyle/>
           <a:p>
-            <a:pPr algn="ctr"/>
-            <a:r>
-              <a:rPr lang="de-DE"/>
-              <a:t>nochmal checken!! und ggf. ergänzen </a:t>
-            </a:r>
-          </a:p>
-          <a:p>
-            <a:pPr algn="ctr"/>
-            <a:r>
-              <a:rPr lang="de-DE"/>
-              <a:t>https://cran.r-project.org/web/packages/stringr/vignettes/regular-expressions.html</a:t>
-            </a:r>
-            <a:endParaRPr lang="en-US"/>
-          </a:p>
-        </p:txBody>
-      </p:sp>
+            <a:r>
+              <a:rPr lang="de-DE" sz="4000" b="1">
+                <a:solidFill>
+                  <a:schemeClr val="tx1"/>
+                </a:solidFill>
+              </a:rPr>
+              <a:t>Exercise 2: Regular Expressions</a:t>
+            </a:r>
+            <a:endParaRPr lang="en-US" sz="4000" b="1">
+              <a:solidFill>
+                <a:schemeClr val="tx1"/>
+              </a:solidFill>
+            </a:endParaRPr>
+          </a:p>
+        </p:txBody>
+      </p:sp>
+      <p:pic>
+        <p:nvPicPr>
+          <p:cNvPr id="6" name="Graphic 5" descr="Game controller with solid fill">
+            <a:extLst>
+              <a:ext uri="{FF2B5EF4-FFF2-40B4-BE49-F238E27FC236}">
+                <a16:creationId xmlns:a16="http://schemas.microsoft.com/office/drawing/2014/main" id="{449635E3-0ECF-4549-A66D-053B46FAF69D}"/>
+              </a:ext>
+            </a:extLst>
+          </p:cNvPr>
+          <p:cNvPicPr>
+            <a:picLocks noChangeAspect="1"/>
+          </p:cNvPicPr>
+          <p:nvPr/>
+        </p:nvPicPr>
+        <p:blipFill>
+          <a:blip r:embed="rId3">
+            <a:extLst>
+              <a:ext uri="{28A0092B-C50C-407E-A947-70E740481C1C}">
+                <a14:useLocalDpi xmlns:a14="http://schemas.microsoft.com/office/drawing/2010/main" val="0"/>
+              </a:ext>
+              <a:ext uri="{96DAC541-7B7A-43D3-8B79-37D633B846F1}">
+                <asvg:svgBlip xmlns:asvg="http://schemas.microsoft.com/office/drawing/2016/SVG/main" r:embed="rId4"/>
+              </a:ext>
+            </a:extLst>
+          </a:blip>
+          <a:stretch>
+            <a:fillRect/>
+          </a:stretch>
+        </p:blipFill>
+        <p:spPr>
+          <a:xfrm>
+            <a:off x="1066800" y="2481284"/>
+            <a:ext cx="1894360" cy="1895432"/>
+          </a:xfrm>
+          <a:prstGeom prst="rect">
+            <a:avLst/>
+          </a:prstGeom>
+        </p:spPr>
+      </p:pic>
     </p:spTree>
     <p:extLst>
       <p:ext uri="{BB962C8B-B14F-4D97-AF65-F5344CB8AC3E}">
-        <p14:creationId xmlns:p14="http://schemas.microsoft.com/office/powerpoint/2010/main" val="1583612714"/>
+        <p14:creationId xmlns:p14="http://schemas.microsoft.com/office/powerpoint/2010/main" val="3074896263"/>
       </p:ext>
     </p:extLst>
   </p:cSld>
@@ -12849,6 +12390,64 @@
           </a:p>
         </p:txBody>
       </p:sp>
+      <p:sp>
+        <p:nvSpPr>
+          <p:cNvPr id="19" name="Rectangle 18">
+            <a:extLst>
+              <a:ext uri="{FF2B5EF4-FFF2-40B4-BE49-F238E27FC236}">
+                <a16:creationId xmlns:a16="http://schemas.microsoft.com/office/drawing/2014/main" id="{93DEFFCB-9B2C-4850-B84B-605466A4B7C1}"/>
+              </a:ext>
+            </a:extLst>
+          </p:cNvPr>
+          <p:cNvSpPr/>
+          <p:nvPr/>
+        </p:nvSpPr>
+        <p:spPr>
+          <a:xfrm>
+            <a:off x="1066800" y="2971800"/>
+            <a:ext cx="7781925" cy="914400"/>
+          </a:xfrm>
+          <a:prstGeom prst="rect">
+            <a:avLst/>
+          </a:prstGeom>
+          <a:solidFill>
+            <a:schemeClr val="accent2"/>
+          </a:solidFill>
+          <a:ln>
+            <a:solidFill>
+              <a:schemeClr val="accent2"/>
+            </a:solidFill>
+          </a:ln>
+        </p:spPr>
+        <p:style>
+          <a:lnRef idx="2">
+            <a:schemeClr val="accent1">
+              <a:shade val="50000"/>
+            </a:schemeClr>
+          </a:lnRef>
+          <a:fillRef idx="1">
+            <a:schemeClr val="accent1"/>
+          </a:fillRef>
+          <a:effectRef idx="0">
+            <a:schemeClr val="accent1"/>
+          </a:effectRef>
+          <a:fontRef idx="minor">
+            <a:schemeClr val="lt1"/>
+          </a:fontRef>
+        </p:style>
+        <p:txBody>
+          <a:bodyPr rtlCol="0" anchor="ctr"/>
+          <a:lstStyle/>
+          <a:p>
+            <a:pPr algn="ctr"/>
+            <a:r>
+              <a:rPr lang="de-DE"/>
+              <a:t>input von slides matthias?</a:t>
+            </a:r>
+            <a:endParaRPr lang="en-US"/>
+          </a:p>
+        </p:txBody>
+      </p:sp>
     </p:spTree>
     <p:extLst>
       <p:ext uri="{BB962C8B-B14F-4D97-AF65-F5344CB8AC3E}">
@@ -13132,6 +12731,64 @@
           </a:p>
         </p:txBody>
       </p:sp>
+      <p:sp>
+        <p:nvSpPr>
+          <p:cNvPr id="5" name="Rectangle 4">
+            <a:extLst>
+              <a:ext uri="{FF2B5EF4-FFF2-40B4-BE49-F238E27FC236}">
+                <a16:creationId xmlns:a16="http://schemas.microsoft.com/office/drawing/2014/main" id="{3249BE61-F4E3-48AA-BF47-D19521EB5AE2}"/>
+              </a:ext>
+            </a:extLst>
+          </p:cNvPr>
+          <p:cNvSpPr/>
+          <p:nvPr/>
+        </p:nvSpPr>
+        <p:spPr>
+          <a:xfrm>
+            <a:off x="1066800" y="2971800"/>
+            <a:ext cx="7781925" cy="914400"/>
+          </a:xfrm>
+          <a:prstGeom prst="rect">
+            <a:avLst/>
+          </a:prstGeom>
+          <a:solidFill>
+            <a:schemeClr val="accent2"/>
+          </a:solidFill>
+          <a:ln>
+            <a:solidFill>
+              <a:schemeClr val="accent2"/>
+            </a:solidFill>
+          </a:ln>
+        </p:spPr>
+        <p:style>
+          <a:lnRef idx="2">
+            <a:schemeClr val="accent1">
+              <a:shade val="50000"/>
+            </a:schemeClr>
+          </a:lnRef>
+          <a:fillRef idx="1">
+            <a:schemeClr val="accent1"/>
+          </a:fillRef>
+          <a:effectRef idx="0">
+            <a:schemeClr val="accent1"/>
+          </a:effectRef>
+          <a:fontRef idx="minor">
+            <a:schemeClr val="lt1"/>
+          </a:fontRef>
+        </p:style>
+        <p:txBody>
+          <a:bodyPr rtlCol="0" anchor="ctr"/>
+          <a:lstStyle/>
+          <a:p>
+            <a:pPr algn="ctr"/>
+            <a:r>
+              <a:rPr lang="de-DE"/>
+              <a:t>input von slides matthias?</a:t>
+            </a:r>
+            <a:endParaRPr lang="en-US"/>
+          </a:p>
+        </p:txBody>
+      </p:sp>
     </p:spTree>
     <p:extLst>
       <p:ext uri="{BB962C8B-B14F-4D97-AF65-F5344CB8AC3E}">
@@ -13180,6 +12837,154 @@
             <a:fld id="{C9E0B00B-E6DF-4183-A694-3DE28BEFB357}" type="slidenum">
               <a:rPr lang="en-US" smtClean="0"/>
               <a:t>25</a:t>
+            </a:fld>
+            <a:endParaRPr lang="en-US"/>
+          </a:p>
+        </p:txBody>
+      </p:sp>
+      <p:sp>
+        <p:nvSpPr>
+          <p:cNvPr id="12" name="Titel 1">
+            <a:extLst>
+              <a:ext uri="{FF2B5EF4-FFF2-40B4-BE49-F238E27FC236}">
+                <a16:creationId xmlns:a16="http://schemas.microsoft.com/office/drawing/2014/main" id="{478EA67A-3C39-4D0A-996A-C363F30A14B2}"/>
+              </a:ext>
+            </a:extLst>
+          </p:cNvPr>
+          <p:cNvSpPr>
+            <a:spLocks noGrp="1"/>
+          </p:cNvSpPr>
+          <p:nvPr>
+            <p:ph type="title"/>
+          </p:nvPr>
+        </p:nvSpPr>
+        <p:spPr>
+          <a:xfrm>
+            <a:off x="1066800" y="561524"/>
+            <a:ext cx="10287000" cy="1129164"/>
+          </a:xfrm>
+        </p:spPr>
+        <p:txBody>
+          <a:bodyPr/>
+          <a:lstStyle/>
+          <a:p>
+            <a:r>
+              <a:rPr lang="en-US"/>
+              <a:t>Text Normalization  </a:t>
+            </a:r>
+            <a:r>
+              <a:rPr lang="en-US" b="1"/>
+              <a:t>Static Feature Extraction</a:t>
+            </a:r>
+          </a:p>
+        </p:txBody>
+      </p:sp>
+      <p:sp>
+        <p:nvSpPr>
+          <p:cNvPr id="8" name="Rectangle 7">
+            <a:extLst>
+              <a:ext uri="{FF2B5EF4-FFF2-40B4-BE49-F238E27FC236}">
+                <a16:creationId xmlns:a16="http://schemas.microsoft.com/office/drawing/2014/main" id="{E60687D1-1FAD-4D3F-B598-CA2DD768872B}"/>
+              </a:ext>
+            </a:extLst>
+          </p:cNvPr>
+          <p:cNvSpPr/>
+          <p:nvPr/>
+        </p:nvSpPr>
+        <p:spPr>
+          <a:xfrm>
+            <a:off x="1066800" y="2971800"/>
+            <a:ext cx="7781925" cy="914400"/>
+          </a:xfrm>
+          <a:prstGeom prst="rect">
+            <a:avLst/>
+          </a:prstGeom>
+          <a:solidFill>
+            <a:schemeClr val="accent2"/>
+          </a:solidFill>
+          <a:ln>
+            <a:solidFill>
+              <a:schemeClr val="accent2"/>
+            </a:solidFill>
+          </a:ln>
+        </p:spPr>
+        <p:style>
+          <a:lnRef idx="2">
+            <a:schemeClr val="accent1">
+              <a:shade val="50000"/>
+            </a:schemeClr>
+          </a:lnRef>
+          <a:fillRef idx="1">
+            <a:schemeClr val="accent1"/>
+          </a:fillRef>
+          <a:effectRef idx="0">
+            <a:schemeClr val="accent1"/>
+          </a:effectRef>
+          <a:fontRef idx="minor">
+            <a:schemeClr val="lt1"/>
+          </a:fontRef>
+        </p:style>
+        <p:txBody>
+          <a:bodyPr rtlCol="0" anchor="ctr"/>
+          <a:lstStyle/>
+          <a:p>
+            <a:pPr algn="ctr"/>
+            <a:r>
+              <a:rPr lang="de-DE"/>
+              <a:t>statische features</a:t>
+            </a:r>
+            <a:endParaRPr lang="en-US"/>
+          </a:p>
+        </p:txBody>
+      </p:sp>
+    </p:spTree>
+    <p:extLst>
+      <p:ext uri="{BB962C8B-B14F-4D97-AF65-F5344CB8AC3E}">
+        <p14:creationId xmlns:p14="http://schemas.microsoft.com/office/powerpoint/2010/main" val="1909789367"/>
+      </p:ext>
+    </p:extLst>
+  </p:cSld>
+  <p:clrMapOvr>
+    <a:masterClrMapping/>
+  </p:clrMapOvr>
+</p:sld>
+</file>
+
+<file path=ppt/slides/slide26.xml><?xml version="1.0" encoding="utf-8"?>
+<p:sld xmlns:a="http://schemas.openxmlformats.org/drawingml/2006/main" xmlns:r="http://schemas.openxmlformats.org/officeDocument/2006/relationships" xmlns:p="http://schemas.openxmlformats.org/presentationml/2006/main">
+  <p:cSld>
+    <p:spTree>
+      <p:nvGrpSpPr>
+        <p:cNvPr id="1" name=""/>
+        <p:cNvGrpSpPr/>
+        <p:nvPr/>
+      </p:nvGrpSpPr>
+      <p:grpSpPr>
+        <a:xfrm>
+          <a:off x="0" y="0"/>
+          <a:ext cx="0" cy="0"/>
+          <a:chOff x="0" y="0"/>
+          <a:chExt cx="0" cy="0"/>
+        </a:xfrm>
+      </p:grpSpPr>
+      <p:sp>
+        <p:nvSpPr>
+          <p:cNvPr id="4" name="Foliennummernplatzhalter 3"/>
+          <p:cNvSpPr>
+            <a:spLocks noGrp="1"/>
+          </p:cNvSpPr>
+          <p:nvPr>
+            <p:ph type="sldNum" sz="quarter" idx="12"/>
+          </p:nvPr>
+        </p:nvSpPr>
+        <p:spPr/>
+        <p:txBody>
+          <a:bodyPr/>
+          <a:lstStyle/>
+          <a:p>
+            <a:fld id="{C9E0B00B-E6DF-4183-A694-3DE28BEFB357}" type="slidenum">
+              <a:rPr lang="en-US" smtClean="0"/>
+              <a:t>26</a:t>
             </a:fld>
             <a:endParaRPr lang="en-US"/>
           </a:p>
@@ -13275,7 +13080,7 @@
                   <a:schemeClr val="tx1"/>
                 </a:solidFill>
               </a:rPr>
-              <a:t>Exercise 2: Text Normalization</a:t>
+              <a:t>Exercise 3: Static Feature Extraction</a:t>
             </a:r>
             <a:endParaRPr lang="en-US" sz="4000" b="1">
               <a:solidFill>
@@ -13376,7 +13181,7 @@
             <a:pPr algn="ctr"/>
             <a:r>
               <a:rPr lang="de-DE"/>
-              <a:t>übung ausbauen</a:t>
+              <a:t>übung aufsetzen</a:t>
             </a:r>
             <a:endParaRPr lang="en-US"/>
           </a:p>
@@ -13386,154 +13191,6 @@
     <p:extLst>
       <p:ext uri="{BB962C8B-B14F-4D97-AF65-F5344CB8AC3E}">
         <p14:creationId xmlns:p14="http://schemas.microsoft.com/office/powerpoint/2010/main" val="4254960058"/>
-      </p:ext>
-    </p:extLst>
-  </p:cSld>
-  <p:clrMapOvr>
-    <a:masterClrMapping/>
-  </p:clrMapOvr>
-</p:sld>
-</file>
-
-<file path=ppt/slides/slide26.xml><?xml version="1.0" encoding="utf-8"?>
-<p:sld xmlns:a="http://schemas.openxmlformats.org/drawingml/2006/main" xmlns:r="http://schemas.openxmlformats.org/officeDocument/2006/relationships" xmlns:p="http://schemas.openxmlformats.org/presentationml/2006/main">
-  <p:cSld>
-    <p:spTree>
-      <p:nvGrpSpPr>
-        <p:cNvPr id="1" name=""/>
-        <p:cNvGrpSpPr/>
-        <p:nvPr/>
-      </p:nvGrpSpPr>
-      <p:grpSpPr>
-        <a:xfrm>
-          <a:off x="0" y="0"/>
-          <a:ext cx="0" cy="0"/>
-          <a:chOff x="0" y="0"/>
-          <a:chExt cx="0" cy="0"/>
-        </a:xfrm>
-      </p:grpSpPr>
-      <p:sp>
-        <p:nvSpPr>
-          <p:cNvPr id="4" name="Foliennummernplatzhalter 3"/>
-          <p:cNvSpPr>
-            <a:spLocks noGrp="1"/>
-          </p:cNvSpPr>
-          <p:nvPr>
-            <p:ph type="sldNum" sz="quarter" idx="12"/>
-          </p:nvPr>
-        </p:nvSpPr>
-        <p:spPr/>
-        <p:txBody>
-          <a:bodyPr/>
-          <a:lstStyle/>
-          <a:p>
-            <a:fld id="{C9E0B00B-E6DF-4183-A694-3DE28BEFB357}" type="slidenum">
-              <a:rPr lang="en-US" smtClean="0"/>
-              <a:t>26</a:t>
-            </a:fld>
-            <a:endParaRPr lang="en-US"/>
-          </a:p>
-        </p:txBody>
-      </p:sp>
-      <p:sp>
-        <p:nvSpPr>
-          <p:cNvPr id="12" name="Titel 1">
-            <a:extLst>
-              <a:ext uri="{FF2B5EF4-FFF2-40B4-BE49-F238E27FC236}">
-                <a16:creationId xmlns:a16="http://schemas.microsoft.com/office/drawing/2014/main" id="{478EA67A-3C39-4D0A-996A-C363F30A14B2}"/>
-              </a:ext>
-            </a:extLst>
-          </p:cNvPr>
-          <p:cNvSpPr>
-            <a:spLocks noGrp="1"/>
-          </p:cNvSpPr>
-          <p:nvPr>
-            <p:ph type="title"/>
-          </p:nvPr>
-        </p:nvSpPr>
-        <p:spPr>
-          <a:xfrm>
-            <a:off x="1066800" y="561524"/>
-            <a:ext cx="10287000" cy="1129164"/>
-          </a:xfrm>
-        </p:spPr>
-        <p:txBody>
-          <a:bodyPr/>
-          <a:lstStyle/>
-          <a:p>
-            <a:r>
-              <a:rPr lang="en-US"/>
-              <a:t>Text Normalization  </a:t>
-            </a:r>
-            <a:r>
-              <a:rPr lang="en-US" b="1"/>
-              <a:t>Exercise</a:t>
-            </a:r>
-          </a:p>
-        </p:txBody>
-      </p:sp>
-      <p:sp>
-        <p:nvSpPr>
-          <p:cNvPr id="8" name="Rectangle 7">
-            <a:extLst>
-              <a:ext uri="{FF2B5EF4-FFF2-40B4-BE49-F238E27FC236}">
-                <a16:creationId xmlns:a16="http://schemas.microsoft.com/office/drawing/2014/main" id="{E60687D1-1FAD-4D3F-B598-CA2DD768872B}"/>
-              </a:ext>
-            </a:extLst>
-          </p:cNvPr>
-          <p:cNvSpPr/>
-          <p:nvPr/>
-        </p:nvSpPr>
-        <p:spPr>
-          <a:xfrm>
-            <a:off x="1066800" y="2971800"/>
-            <a:ext cx="7781925" cy="914400"/>
-          </a:xfrm>
-          <a:prstGeom prst="rect">
-            <a:avLst/>
-          </a:prstGeom>
-          <a:solidFill>
-            <a:schemeClr val="accent2"/>
-          </a:solidFill>
-          <a:ln>
-            <a:solidFill>
-              <a:schemeClr val="accent2"/>
-            </a:solidFill>
-          </a:ln>
-        </p:spPr>
-        <p:style>
-          <a:lnRef idx="2">
-            <a:schemeClr val="accent1">
-              <a:shade val="50000"/>
-            </a:schemeClr>
-          </a:lnRef>
-          <a:fillRef idx="1">
-            <a:schemeClr val="accent1"/>
-          </a:fillRef>
-          <a:effectRef idx="0">
-            <a:schemeClr val="accent1"/>
-          </a:effectRef>
-          <a:fontRef idx="minor">
-            <a:schemeClr val="lt1"/>
-          </a:fontRef>
-        </p:style>
-        <p:txBody>
-          <a:bodyPr rtlCol="0" anchor="ctr"/>
-          <a:lstStyle/>
-          <a:p>
-            <a:pPr algn="ctr"/>
-            <a:r>
-              <a:rPr lang="de-DE"/>
-              <a:t>statische features</a:t>
-            </a:r>
-            <a:endParaRPr lang="en-US"/>
-          </a:p>
-        </p:txBody>
-      </p:sp>
-    </p:spTree>
-    <p:extLst>
-      <p:ext uri="{BB962C8B-B14F-4D97-AF65-F5344CB8AC3E}">
-        <p14:creationId xmlns:p14="http://schemas.microsoft.com/office/powerpoint/2010/main" val="1909789367"/>
       </p:ext>
     </p:extLst>
   </p:cSld>

</xml_diff>

<commit_message>
added final sentence to demo
</commit_message>
<xml_diff>
--- a/5_seminar/Contents_Part_02/slides/Präsentation_Teil2_Lisa.pptx
+++ b/5_seminar/Contents_Part_02/slides/Präsentation_Teil2_Lisa.pptx
@@ -5,7 +5,7 @@
     <p:sldMasterId id="2147483648" r:id="rId1"/>
   </p:sldMasterIdLst>
   <p:notesMasterIdLst>
-    <p:notesMasterId r:id="rId34"/>
+    <p:notesMasterId r:id="rId35"/>
   </p:notesMasterIdLst>
   <p:sldIdLst>
     <p:sldId id="303" r:id="rId2"/>
@@ -29,17 +29,18 @@
     <p:sldId id="328" r:id="rId20"/>
     <p:sldId id="333" r:id="rId21"/>
     <p:sldId id="334" r:id="rId22"/>
-    <p:sldId id="335" r:id="rId23"/>
-    <p:sldId id="329" r:id="rId24"/>
-    <p:sldId id="327" r:id="rId25"/>
-    <p:sldId id="338" r:id="rId26"/>
-    <p:sldId id="332" r:id="rId27"/>
-    <p:sldId id="336" r:id="rId28"/>
-    <p:sldId id="337" r:id="rId29"/>
-    <p:sldId id="339" r:id="rId30"/>
-    <p:sldId id="324" r:id="rId31"/>
-    <p:sldId id="331" r:id="rId32"/>
-    <p:sldId id="274" r:id="rId33"/>
+    <p:sldId id="340" r:id="rId23"/>
+    <p:sldId id="335" r:id="rId24"/>
+    <p:sldId id="329" r:id="rId25"/>
+    <p:sldId id="327" r:id="rId26"/>
+    <p:sldId id="338" r:id="rId27"/>
+    <p:sldId id="332" r:id="rId28"/>
+    <p:sldId id="336" r:id="rId29"/>
+    <p:sldId id="337" r:id="rId30"/>
+    <p:sldId id="339" r:id="rId31"/>
+    <p:sldId id="324" r:id="rId32"/>
+    <p:sldId id="331" r:id="rId33"/>
+    <p:sldId id="274" r:id="rId34"/>
   </p:sldIdLst>
   <p:sldSz cx="12192000" cy="6858000"/>
   <p:notesSz cx="6858000" cy="9144000"/>
@@ -1619,7 +1620,7 @@
     </p:spTree>
     <p:extLst>
       <p:ext uri="{BB962C8B-B14F-4D97-AF65-F5344CB8AC3E}">
-        <p14:creationId xmlns:p14="http://schemas.microsoft.com/office/powerpoint/2010/main" val="1901018132"/>
+        <p14:creationId xmlns:p14="http://schemas.microsoft.com/office/powerpoint/2010/main" val="3465977125"/>
       </p:ext>
     </p:extLst>
   </p:cSld>
@@ -1806,31 +1807,6 @@
           <a:bodyPr/>
           <a:lstStyle/>
           <a:p>
-            <a:r>
-              <a:rPr lang="de-DE"/>
-              <a:t>Ziel ist möglichst gute Suchergebnisse zu liefern</a:t>
-            </a:r>
-          </a:p>
-          <a:p>
-            <a:r>
-              <a:rPr lang="de-DE"/>
-              <a:t>Dafür werden verschiedene Verfahren eingesetzt. </a:t>
-            </a:r>
-          </a:p>
-          <a:p>
-            <a:r>
-              <a:rPr lang="de-DE"/>
-              <a:t>Stemming (Grundformenreduktion) ist ein Verfahren, mit dem verschiedene morphologische Varianten eines Wortes auf ihren gemeinsamen Wortstamm (stem) zurückgeführt werden </a:t>
-            </a:r>
-          </a:p>
-          <a:p>
-            <a:r>
-              <a:rPr lang="de-DE"/>
-              <a:t>Die Idee: die eigentliche lexikalische Bedeutung eines Wortes ist in seinem Stamm zu finden</a:t>
-            </a:r>
-            <a:endParaRPr lang="en-US"/>
-          </a:p>
-          <a:p>
             <a:pPr marL="0" marR="0" lvl="0" indent="0" algn="l" defTabSz="914400" rtl="0" eaLnBrk="1" fontAlgn="auto" latinLnBrk="0" hangingPunct="1">
               <a:lnSpc>
                 <a:spcPct val="100000"/>
@@ -1878,7 +1854,7 @@
     </p:spTree>
     <p:extLst>
       <p:ext uri="{BB962C8B-B14F-4D97-AF65-F5344CB8AC3E}">
-        <p14:creationId xmlns:p14="http://schemas.microsoft.com/office/powerpoint/2010/main" val="217416670"/>
+        <p14:creationId xmlns:p14="http://schemas.microsoft.com/office/powerpoint/2010/main" val="1901018132"/>
       </p:ext>
     </p:extLst>
   </p:cSld>
@@ -1933,47 +1909,48 @@
           <a:lstStyle/>
           <a:p>
             <a:r>
-              <a:rPr lang="en-US"/>
-              <a:t>Slower bc </a:t>
-            </a:r>
-            <a:r>
-              <a:rPr lang="en-US" sz="1200" b="0" i="0" u="none" strike="noStrike" kern="1200" baseline="0">
-                <a:solidFill>
-                  <a:schemeClr val="tx1"/>
-                </a:solidFill>
-                <a:latin typeface="+mn-lt"/>
-                <a:ea typeface="+mn-ea"/>
-                <a:cs typeface="+mn-cs"/>
-              </a:rPr>
-              <a:t>an</a:t>
-            </a:r>
-          </a:p>
-          <a:p>
-            <a:r>
-              <a:rPr lang="en-GB" sz="1200" b="0" i="0" u="none" strike="noStrike" kern="1200" baseline="0">
-                <a:solidFill>
-                  <a:schemeClr val="tx1"/>
-                </a:solidFill>
-                <a:latin typeface="+mn-lt"/>
-                <a:ea typeface="+mn-ea"/>
-                <a:cs typeface="+mn-cs"/>
-              </a:rPr>
-              <a:t>additional step is involved where the root form or lemma is formed by removing the affix</a:t>
-            </a:r>
-          </a:p>
-          <a:p>
-            <a:r>
-              <a:rPr lang="en-GB" sz="1200" b="0" i="0" u="none" strike="noStrike" kern="1200" baseline="0">
-                <a:solidFill>
-                  <a:schemeClr val="tx1"/>
-                </a:solidFill>
-                <a:latin typeface="+mn-lt"/>
-                <a:ea typeface="+mn-ea"/>
-                <a:cs typeface="+mn-cs"/>
-              </a:rPr>
-              <a:t>from the word if and only if the lemma is present in the dictionary</a:t>
-            </a:r>
-            <a:endParaRPr lang="en-US" dirty="0"/>
+              <a:rPr lang="de-DE"/>
+              <a:t>Ziel ist möglichst gute Suchergebnisse zu liefern</a:t>
+            </a:r>
+          </a:p>
+          <a:p>
+            <a:r>
+              <a:rPr lang="de-DE"/>
+              <a:t>Dafür werden verschiedene Verfahren eingesetzt. </a:t>
+            </a:r>
+          </a:p>
+          <a:p>
+            <a:r>
+              <a:rPr lang="de-DE"/>
+              <a:t>Stemming (Grundformenreduktion) ist ein Verfahren, mit dem verschiedene morphologische Varianten eines Wortes auf ihren gemeinsamen Wortstamm (stem) zurückgeführt werden </a:t>
+            </a:r>
+          </a:p>
+          <a:p>
+            <a:r>
+              <a:rPr lang="de-DE"/>
+              <a:t>Die Idee: die eigentliche lexikalische Bedeutung eines Wortes ist in seinem Stamm zu finden</a:t>
+            </a:r>
+            <a:endParaRPr lang="en-US"/>
+          </a:p>
+          <a:p>
+            <a:pPr marL="0" marR="0" lvl="0" indent="0" algn="l" defTabSz="914400" rtl="0" eaLnBrk="1" fontAlgn="auto" latinLnBrk="0" hangingPunct="1">
+              <a:lnSpc>
+                <a:spcPct val="100000"/>
+              </a:lnSpc>
+              <a:spcBef>
+                <a:spcPts val="0"/>
+              </a:spcBef>
+              <a:spcAft>
+                <a:spcPts val="0"/>
+              </a:spcAft>
+              <a:buClrTx/>
+              <a:buSzTx/>
+              <a:buFontTx/>
+              <a:buNone/>
+              <a:tabLst/>
+              <a:defRPr/>
+            </a:pPr>
+            <a:endParaRPr lang="en-US" b="1"/>
           </a:p>
         </p:txBody>
       </p:sp>
@@ -2003,7 +1980,7 @@
     </p:spTree>
     <p:extLst>
       <p:ext uri="{BB962C8B-B14F-4D97-AF65-F5344CB8AC3E}">
-        <p14:creationId xmlns:p14="http://schemas.microsoft.com/office/powerpoint/2010/main" val="1596822755"/>
+        <p14:creationId xmlns:p14="http://schemas.microsoft.com/office/powerpoint/2010/main" val="217416670"/>
       </p:ext>
     </p:extLst>
   </p:cSld>
@@ -2057,24 +2034,48 @@
           <a:bodyPr/>
           <a:lstStyle/>
           <a:p>
-            <a:pPr marL="0" marR="0" lvl="0" indent="0" algn="l" defTabSz="914400" rtl="0" eaLnBrk="1" fontAlgn="auto" latinLnBrk="0" hangingPunct="1">
-              <a:lnSpc>
-                <a:spcPct val="100000"/>
-              </a:lnSpc>
-              <a:spcBef>
-                <a:spcPts val="0"/>
-              </a:spcBef>
-              <a:spcAft>
-                <a:spcPts val="0"/>
-              </a:spcAft>
-              <a:buClrTx/>
-              <a:buSzTx/>
-              <a:buFontTx/>
-              <a:buNone/>
-              <a:tabLst/>
-              <a:defRPr/>
-            </a:pPr>
-            <a:endParaRPr lang="en-US" b="1"/>
+            <a:r>
+              <a:rPr lang="en-US"/>
+              <a:t>Slower bc </a:t>
+            </a:r>
+            <a:r>
+              <a:rPr lang="en-US" sz="1200" b="0" i="0" u="none" strike="noStrike" kern="1200" baseline="0">
+                <a:solidFill>
+                  <a:schemeClr val="tx1"/>
+                </a:solidFill>
+                <a:latin typeface="+mn-lt"/>
+                <a:ea typeface="+mn-ea"/>
+                <a:cs typeface="+mn-cs"/>
+              </a:rPr>
+              <a:t>an</a:t>
+            </a:r>
+          </a:p>
+          <a:p>
+            <a:r>
+              <a:rPr lang="en-GB" sz="1200" b="0" i="0" u="none" strike="noStrike" kern="1200" baseline="0">
+                <a:solidFill>
+                  <a:schemeClr val="tx1"/>
+                </a:solidFill>
+                <a:latin typeface="+mn-lt"/>
+                <a:ea typeface="+mn-ea"/>
+                <a:cs typeface="+mn-cs"/>
+              </a:rPr>
+              <a:t>additional step is involved where the root form or lemma is formed by removing the affix</a:t>
+            </a:r>
+          </a:p>
+          <a:p>
+            <a:r>
+              <a:rPr lang="en-GB" sz="1200" b="0" i="0" u="none" strike="noStrike" kern="1200" baseline="0">
+                <a:solidFill>
+                  <a:schemeClr val="tx1"/>
+                </a:solidFill>
+                <a:latin typeface="+mn-lt"/>
+                <a:ea typeface="+mn-ea"/>
+                <a:cs typeface="+mn-cs"/>
+              </a:rPr>
+              <a:t>from the word if and only if the lemma is present in the dictionary</a:t>
+            </a:r>
+            <a:endParaRPr lang="en-US" dirty="0"/>
           </a:p>
         </p:txBody>
       </p:sp>
@@ -2095,7 +2096,7 @@
           <a:p>
             <a:fld id="{20A41429-B750-4047-B563-2878417A70E7}" type="slidenum">
               <a:rPr lang="en-US" smtClean="0"/>
-              <a:t>26</a:t>
+              <a:t>25</a:t>
             </a:fld>
             <a:endParaRPr lang="en-US"/>
           </a:p>
@@ -2104,7 +2105,7 @@
     </p:spTree>
     <p:extLst>
       <p:ext uri="{BB962C8B-B14F-4D97-AF65-F5344CB8AC3E}">
-        <p14:creationId xmlns:p14="http://schemas.microsoft.com/office/powerpoint/2010/main" val="2688366435"/>
+        <p14:creationId xmlns:p14="http://schemas.microsoft.com/office/powerpoint/2010/main" val="1596822755"/>
       </p:ext>
     </p:extLst>
   </p:cSld>
@@ -2205,7 +2206,7 @@
     </p:spTree>
     <p:extLst>
       <p:ext uri="{BB962C8B-B14F-4D97-AF65-F5344CB8AC3E}">
-        <p14:creationId xmlns:p14="http://schemas.microsoft.com/office/powerpoint/2010/main" val="1217802932"/>
+        <p14:creationId xmlns:p14="http://schemas.microsoft.com/office/powerpoint/2010/main" val="2688366435"/>
       </p:ext>
     </p:extLst>
   </p:cSld>
@@ -2306,7 +2307,7 @@
     </p:spTree>
     <p:extLst>
       <p:ext uri="{BB962C8B-B14F-4D97-AF65-F5344CB8AC3E}">
-        <p14:creationId xmlns:p14="http://schemas.microsoft.com/office/powerpoint/2010/main" val="2379137352"/>
+        <p14:creationId xmlns:p14="http://schemas.microsoft.com/office/powerpoint/2010/main" val="1217802932"/>
       </p:ext>
     </p:extLst>
   </p:cSld>
@@ -2407,7 +2408,7 @@
     </p:spTree>
     <p:extLst>
       <p:ext uri="{BB962C8B-B14F-4D97-AF65-F5344CB8AC3E}">
-        <p14:creationId xmlns:p14="http://schemas.microsoft.com/office/powerpoint/2010/main" val="3300864957"/>
+        <p14:creationId xmlns:p14="http://schemas.microsoft.com/office/powerpoint/2010/main" val="2379137352"/>
       </p:ext>
     </p:extLst>
   </p:cSld>
@@ -2500,6 +2501,107 @@
             <a:fld id="{20A41429-B750-4047-B563-2878417A70E7}" type="slidenum">
               <a:rPr lang="en-US" smtClean="0"/>
               <a:t>30</a:t>
+            </a:fld>
+            <a:endParaRPr lang="en-US"/>
+          </a:p>
+        </p:txBody>
+      </p:sp>
+    </p:spTree>
+    <p:extLst>
+      <p:ext uri="{BB962C8B-B14F-4D97-AF65-F5344CB8AC3E}">
+        <p14:creationId xmlns:p14="http://schemas.microsoft.com/office/powerpoint/2010/main" val="3300864957"/>
+      </p:ext>
+    </p:extLst>
+  </p:cSld>
+  <p:clrMapOvr>
+    <a:masterClrMapping/>
+  </p:clrMapOvr>
+</p:notes>
+</file>
+
+<file path=ppt/notesSlides/notesSlide27.xml><?xml version="1.0" encoding="utf-8"?>
+<p:notes xmlns:a="http://schemas.openxmlformats.org/drawingml/2006/main" xmlns:r="http://schemas.openxmlformats.org/officeDocument/2006/relationships" xmlns:p="http://schemas.openxmlformats.org/presentationml/2006/main">
+  <p:cSld>
+    <p:spTree>
+      <p:nvGrpSpPr>
+        <p:cNvPr id="1" name=""/>
+        <p:cNvGrpSpPr/>
+        <p:nvPr/>
+      </p:nvGrpSpPr>
+      <p:grpSpPr>
+        <a:xfrm>
+          <a:off x="0" y="0"/>
+          <a:ext cx="0" cy="0"/>
+          <a:chOff x="0" y="0"/>
+          <a:chExt cx="0" cy="0"/>
+        </a:xfrm>
+      </p:grpSpPr>
+      <p:sp>
+        <p:nvSpPr>
+          <p:cNvPr id="2" name="Folienbildplatzhalter 1"/>
+          <p:cNvSpPr>
+            <a:spLocks noGrp="1" noRot="1" noChangeAspect="1"/>
+          </p:cNvSpPr>
+          <p:nvPr>
+            <p:ph type="sldImg"/>
+          </p:nvPr>
+        </p:nvSpPr>
+        <p:spPr/>
+      </p:sp>
+      <p:sp>
+        <p:nvSpPr>
+          <p:cNvPr id="3" name="Notizenplatzhalter 2"/>
+          <p:cNvSpPr>
+            <a:spLocks noGrp="1"/>
+          </p:cNvSpPr>
+          <p:nvPr>
+            <p:ph type="body" idx="1"/>
+          </p:nvPr>
+        </p:nvSpPr>
+        <p:spPr/>
+        <p:txBody>
+          <a:bodyPr/>
+          <a:lstStyle/>
+          <a:p>
+            <a:pPr marL="0" marR="0" lvl="0" indent="0" algn="l" defTabSz="914400" rtl="0" eaLnBrk="1" fontAlgn="auto" latinLnBrk="0" hangingPunct="1">
+              <a:lnSpc>
+                <a:spcPct val="100000"/>
+              </a:lnSpc>
+              <a:spcBef>
+                <a:spcPts val="0"/>
+              </a:spcBef>
+              <a:spcAft>
+                <a:spcPts val="0"/>
+              </a:spcAft>
+              <a:buClrTx/>
+              <a:buSzTx/>
+              <a:buFontTx/>
+              <a:buNone/>
+              <a:tabLst/>
+              <a:defRPr/>
+            </a:pPr>
+            <a:endParaRPr lang="en-US" b="1"/>
+          </a:p>
+        </p:txBody>
+      </p:sp>
+      <p:sp>
+        <p:nvSpPr>
+          <p:cNvPr id="4" name="Foliennummernplatzhalter 3"/>
+          <p:cNvSpPr>
+            <a:spLocks noGrp="1"/>
+          </p:cNvSpPr>
+          <p:nvPr>
+            <p:ph type="sldNum" sz="quarter" idx="10"/>
+          </p:nvPr>
+        </p:nvSpPr>
+        <p:spPr/>
+        <p:txBody>
+          <a:bodyPr/>
+          <a:lstStyle/>
+          <a:p>
+            <a:fld id="{20A41429-B750-4047-B563-2878417A70E7}" type="slidenum">
+              <a:rPr lang="en-US" smtClean="0"/>
+              <a:t>31</a:t>
             </a:fld>
             <a:endParaRPr lang="en-US"/>
           </a:p>
@@ -11689,6 +11791,256 @@
           <a:p>
             <a:r>
               <a:rPr lang="en-US"/>
+              <a:t>Static Feature Extraction  </a:t>
+            </a:r>
+            <a:r>
+              <a:rPr lang="en-US" b="1"/>
+              <a:t>Basic Text Cleaning</a:t>
+            </a:r>
+          </a:p>
+        </p:txBody>
+      </p:sp>
+      <p:sp>
+        <p:nvSpPr>
+          <p:cNvPr id="9" name="Rectangle 8">
+            <a:extLst>
+              <a:ext uri="{FF2B5EF4-FFF2-40B4-BE49-F238E27FC236}">
+                <a16:creationId xmlns:a16="http://schemas.microsoft.com/office/drawing/2014/main" id="{2EC660B0-2AF0-406A-AF24-9D3AD89EB773}"/>
+              </a:ext>
+            </a:extLst>
+          </p:cNvPr>
+          <p:cNvSpPr/>
+          <p:nvPr/>
+        </p:nvSpPr>
+        <p:spPr>
+          <a:xfrm>
+            <a:off x="3228976" y="1992993"/>
+            <a:ext cx="8153400" cy="2872013"/>
+          </a:xfrm>
+          <a:prstGeom prst="rect">
+            <a:avLst/>
+          </a:prstGeom>
+          <a:solidFill>
+            <a:schemeClr val="bg2"/>
+          </a:solidFill>
+          <a:ln w="19050">
+            <a:solidFill>
+              <a:schemeClr val="bg2"/>
+            </a:solidFill>
+          </a:ln>
+        </p:spPr>
+        <p:style>
+          <a:lnRef idx="2">
+            <a:schemeClr val="dk1"/>
+          </a:lnRef>
+          <a:fillRef idx="1">
+            <a:schemeClr val="lt1"/>
+          </a:fillRef>
+          <a:effectRef idx="0">
+            <a:schemeClr val="dk1"/>
+          </a:effectRef>
+          <a:fontRef idx="minor">
+            <a:schemeClr val="dk1"/>
+          </a:fontRef>
+        </p:style>
+        <p:txBody>
+          <a:bodyPr rtlCol="0" anchor="ctr"/>
+          <a:lstStyle/>
+          <a:p>
+            <a:r>
+              <a:rPr lang="de-DE" sz="4000" b="1">
+                <a:solidFill>
+                  <a:schemeClr val="tx1"/>
+                </a:solidFill>
+              </a:rPr>
+              <a:t>Demo 4: Regular Expressions</a:t>
+            </a:r>
+            <a:endParaRPr lang="en-US" sz="4000" b="1">
+              <a:solidFill>
+                <a:schemeClr val="tx1"/>
+              </a:solidFill>
+            </a:endParaRPr>
+          </a:p>
+        </p:txBody>
+      </p:sp>
+      <p:pic>
+        <p:nvPicPr>
+          <p:cNvPr id="10" name="Graphic 9" descr="Play with solid fill">
+            <a:extLst>
+              <a:ext uri="{FF2B5EF4-FFF2-40B4-BE49-F238E27FC236}">
+                <a16:creationId xmlns:a16="http://schemas.microsoft.com/office/drawing/2014/main" id="{9F627A46-A235-45BB-A8A2-E29404D79B82}"/>
+              </a:ext>
+            </a:extLst>
+          </p:cNvPr>
+          <p:cNvPicPr>
+            <a:picLocks noChangeAspect="1"/>
+          </p:cNvPicPr>
+          <p:nvPr/>
+        </p:nvPicPr>
+        <p:blipFill>
+          <a:blip r:embed="rId3">
+            <a:extLst>
+              <a:ext uri="{28A0092B-C50C-407E-A947-70E740481C1C}">
+                <a14:useLocalDpi xmlns:a14="http://schemas.microsoft.com/office/drawing/2010/main" val="0"/>
+              </a:ext>
+              <a:ext uri="{96DAC541-7B7A-43D3-8B79-37D633B846F1}">
+                <asvg:svgBlip xmlns:asvg="http://schemas.microsoft.com/office/drawing/2016/SVG/main" r:embed="rId4"/>
+              </a:ext>
+            </a:extLst>
+          </a:blip>
+          <a:stretch>
+            <a:fillRect/>
+          </a:stretch>
+        </p:blipFill>
+        <p:spPr>
+          <a:xfrm>
+            <a:off x="923914" y="2276468"/>
+            <a:ext cx="2305062" cy="2305062"/>
+          </a:xfrm>
+          <a:prstGeom prst="rect">
+            <a:avLst/>
+          </a:prstGeom>
+        </p:spPr>
+      </p:pic>
+      <p:sp>
+        <p:nvSpPr>
+          <p:cNvPr id="11" name="Rectangle 10">
+            <a:extLst>
+              <a:ext uri="{FF2B5EF4-FFF2-40B4-BE49-F238E27FC236}">
+                <a16:creationId xmlns:a16="http://schemas.microsoft.com/office/drawing/2014/main" id="{F1589F71-999D-4CF0-88E5-29F808D3EF06}"/>
+              </a:ext>
+            </a:extLst>
+          </p:cNvPr>
+          <p:cNvSpPr/>
+          <p:nvPr/>
+        </p:nvSpPr>
+        <p:spPr>
+          <a:xfrm>
+            <a:off x="4827104" y="0"/>
+            <a:ext cx="7364896" cy="914400"/>
+          </a:xfrm>
+          <a:prstGeom prst="rect">
+            <a:avLst/>
+          </a:prstGeom>
+          <a:solidFill>
+            <a:schemeClr val="accent2"/>
+          </a:solidFill>
+          <a:ln>
+            <a:solidFill>
+              <a:schemeClr val="accent2"/>
+            </a:solidFill>
+          </a:ln>
+        </p:spPr>
+        <p:style>
+          <a:lnRef idx="2">
+            <a:schemeClr val="accent1">
+              <a:shade val="50000"/>
+            </a:schemeClr>
+          </a:lnRef>
+          <a:fillRef idx="1">
+            <a:schemeClr val="accent1"/>
+          </a:fillRef>
+          <a:effectRef idx="0">
+            <a:schemeClr val="accent1"/>
+          </a:effectRef>
+          <a:fontRef idx="minor">
+            <a:schemeClr val="lt1"/>
+          </a:fontRef>
+        </p:style>
+        <p:txBody>
+          <a:bodyPr rtlCol="0" anchor="ctr"/>
+          <a:lstStyle/>
+          <a:p>
+            <a:pPr algn="ctr"/>
+            <a:r>
+              <a:rPr lang="de-DE"/>
+              <a:t>demo aufsetzen</a:t>
+            </a:r>
+            <a:endParaRPr lang="en-US"/>
+          </a:p>
+        </p:txBody>
+      </p:sp>
+    </p:spTree>
+    <p:extLst>
+      <p:ext uri="{BB962C8B-B14F-4D97-AF65-F5344CB8AC3E}">
+        <p14:creationId xmlns:p14="http://schemas.microsoft.com/office/powerpoint/2010/main" val="58051887"/>
+      </p:ext>
+    </p:extLst>
+  </p:cSld>
+  <p:clrMapOvr>
+    <a:masterClrMapping/>
+  </p:clrMapOvr>
+</p:sld>
+</file>
+
+<file path=ppt/slides/slide23.xml><?xml version="1.0" encoding="utf-8"?>
+<p:sld xmlns:a="http://schemas.openxmlformats.org/drawingml/2006/main" xmlns:r="http://schemas.openxmlformats.org/officeDocument/2006/relationships" xmlns:p="http://schemas.openxmlformats.org/presentationml/2006/main">
+  <p:cSld>
+    <p:spTree>
+      <p:nvGrpSpPr>
+        <p:cNvPr id="1" name=""/>
+        <p:cNvGrpSpPr/>
+        <p:nvPr/>
+      </p:nvGrpSpPr>
+      <p:grpSpPr>
+        <a:xfrm>
+          <a:off x="0" y="0"/>
+          <a:ext cx="0" cy="0"/>
+          <a:chOff x="0" y="0"/>
+          <a:chExt cx="0" cy="0"/>
+        </a:xfrm>
+      </p:grpSpPr>
+      <p:sp>
+        <p:nvSpPr>
+          <p:cNvPr id="4" name="Foliennummernplatzhalter 3"/>
+          <p:cNvSpPr>
+            <a:spLocks noGrp="1"/>
+          </p:cNvSpPr>
+          <p:nvPr>
+            <p:ph type="sldNum" sz="quarter" idx="12"/>
+          </p:nvPr>
+        </p:nvSpPr>
+        <p:spPr/>
+        <p:txBody>
+          <a:bodyPr/>
+          <a:lstStyle/>
+          <a:p>
+            <a:fld id="{C9E0B00B-E6DF-4183-A694-3DE28BEFB357}" type="slidenum">
+              <a:rPr lang="en-US" smtClean="0"/>
+              <a:t>23</a:t>
+            </a:fld>
+            <a:endParaRPr lang="en-US"/>
+          </a:p>
+        </p:txBody>
+      </p:sp>
+      <p:sp>
+        <p:nvSpPr>
+          <p:cNvPr id="12" name="Titel 1">
+            <a:extLst>
+              <a:ext uri="{FF2B5EF4-FFF2-40B4-BE49-F238E27FC236}">
+                <a16:creationId xmlns:a16="http://schemas.microsoft.com/office/drawing/2014/main" id="{478EA67A-3C39-4D0A-996A-C363F30A14B2}"/>
+              </a:ext>
+            </a:extLst>
+          </p:cNvPr>
+          <p:cNvSpPr>
+            <a:spLocks noGrp="1"/>
+          </p:cNvSpPr>
+          <p:nvPr>
+            <p:ph type="title"/>
+          </p:nvPr>
+        </p:nvSpPr>
+        <p:spPr>
+          <a:xfrm>
+            <a:off x="1066800" y="561524"/>
+            <a:ext cx="10287000" cy="1129164"/>
+          </a:xfrm>
+        </p:spPr>
+        <p:txBody>
+          <a:bodyPr/>
+          <a:lstStyle/>
+          <a:p>
+            <a:r>
+              <a:rPr lang="en-US"/>
               <a:t>Text Normalization  </a:t>
             </a:r>
             <a:r>
@@ -11813,7 +12165,7 @@
 </p:sld>
 </file>
 
-<file path=ppt/slides/slide23.xml><?xml version="1.0" encoding="utf-8"?>
+<file path=ppt/slides/slide24.xml><?xml version="1.0" encoding="utf-8"?>
 <p:sld xmlns:a="http://schemas.openxmlformats.org/drawingml/2006/main" xmlns:r="http://schemas.openxmlformats.org/officeDocument/2006/relationships" xmlns:p="http://schemas.openxmlformats.org/presentationml/2006/main">
   <p:cSld>
     <p:spTree>
@@ -11847,7 +12199,7 @@
           <a:p>
             <a:fld id="{C9E0B00B-E6DF-4183-A694-3DE28BEFB357}" type="slidenum">
               <a:rPr lang="en-US" smtClean="0"/>
-              <a:t>23</a:t>
+              <a:t>24</a:t>
             </a:fld>
             <a:endParaRPr lang="en-US"/>
           </a:p>
@@ -12768,7 +13120,7 @@
 </p:sld>
 </file>
 
-<file path=ppt/slides/slide24.xml><?xml version="1.0" encoding="utf-8"?>
+<file path=ppt/slides/slide25.xml><?xml version="1.0" encoding="utf-8"?>
 <p:sld xmlns:a="http://schemas.openxmlformats.org/drawingml/2006/main" xmlns:r="http://schemas.openxmlformats.org/officeDocument/2006/relationships" xmlns:p="http://schemas.openxmlformats.org/presentationml/2006/main">
   <p:cSld>
     <p:spTree>
@@ -12802,7 +13154,7 @@
           <a:p>
             <a:fld id="{C9E0B00B-E6DF-4183-A694-3DE28BEFB357}" type="slidenum">
               <a:rPr lang="en-US" smtClean="0"/>
-              <a:t>24</a:t>
+              <a:t>25</a:t>
             </a:fld>
             <a:endParaRPr lang="en-US"/>
           </a:p>
@@ -13109,138 +13461,6 @@
 </p:sld>
 </file>
 
-<file path=ppt/slides/slide25.xml><?xml version="1.0" encoding="utf-8"?>
-<p:sld xmlns:a="http://schemas.openxmlformats.org/drawingml/2006/main" xmlns:r="http://schemas.openxmlformats.org/officeDocument/2006/relationships" xmlns:p="http://schemas.openxmlformats.org/presentationml/2006/main">
-  <p:cSld>
-    <p:spTree>
-      <p:nvGrpSpPr>
-        <p:cNvPr id="1" name=""/>
-        <p:cNvGrpSpPr/>
-        <p:nvPr/>
-      </p:nvGrpSpPr>
-      <p:grpSpPr>
-        <a:xfrm>
-          <a:off x="0" y="0"/>
-          <a:ext cx="0" cy="0"/>
-          <a:chOff x="0" y="0"/>
-          <a:chExt cx="0" cy="0"/>
-        </a:xfrm>
-      </p:grpSpPr>
-      <p:sp>
-        <p:nvSpPr>
-          <p:cNvPr id="2" name="Titel 1"/>
-          <p:cNvSpPr>
-            <a:spLocks noGrp="1"/>
-          </p:cNvSpPr>
-          <p:nvPr>
-            <p:ph type="title"/>
-          </p:nvPr>
-        </p:nvSpPr>
-        <p:spPr>
-          <a:xfrm>
-            <a:off x="1066800" y="1990724"/>
-            <a:ext cx="10287000" cy="2886075"/>
-          </a:xfrm>
-        </p:spPr>
-        <p:txBody>
-          <a:bodyPr/>
-          <a:lstStyle/>
-          <a:p>
-            <a:r>
-              <a:rPr lang="en-US" b="1">
-                <a:effectLst>
-                  <a:outerShdw blurRad="38100" dist="38100" dir="2700000" algn="tl">
-                    <a:srgbClr val="000000">
-                      <a:alpha val="43137"/>
-                    </a:srgbClr>
-                  </a:outerShdw>
-                </a:effectLst>
-              </a:rPr>
-              <a:t>Part II: Scraping, Text Normalization &amp; Static Feature Extraction</a:t>
-            </a:r>
-          </a:p>
-        </p:txBody>
-      </p:sp>
-      <p:sp>
-        <p:nvSpPr>
-          <p:cNvPr id="3" name="Textplatzhalter 2"/>
-          <p:cNvSpPr>
-            <a:spLocks noGrp="1"/>
-          </p:cNvSpPr>
-          <p:nvPr>
-            <p:ph type="body" idx="1"/>
-          </p:nvPr>
-        </p:nvSpPr>
-        <p:spPr>
-          <a:xfrm>
-            <a:off x="1066798" y="4876799"/>
-            <a:ext cx="10280651" cy="1212851"/>
-          </a:xfrm>
-        </p:spPr>
-        <p:txBody>
-          <a:bodyPr/>
-          <a:lstStyle/>
-          <a:p>
-            <a:r>
-              <a:rPr lang="en-US" b="1">
-                <a:effectLst>
-                  <a:outerShdw blurRad="38100" dist="38100" dir="2700000" algn="tl">
-                    <a:srgbClr val="000000">
-                      <a:alpha val="43137"/>
-                    </a:srgbClr>
-                  </a:outerShdw>
-                </a:effectLst>
-              </a:rPr>
-              <a:t>Static Feature Extraction</a:t>
-            </a:r>
-            <a:endParaRPr lang="en-US" b="1" dirty="0">
-              <a:effectLst>
-                <a:outerShdw blurRad="38100" dist="38100" dir="2700000" algn="tl">
-                  <a:srgbClr val="000000">
-                    <a:alpha val="43137"/>
-                  </a:srgbClr>
-                </a:outerShdw>
-              </a:effectLst>
-            </a:endParaRPr>
-          </a:p>
-        </p:txBody>
-      </p:sp>
-      <p:sp>
-        <p:nvSpPr>
-          <p:cNvPr id="4" name="Foliennummernplatzhalter 3"/>
-          <p:cNvSpPr>
-            <a:spLocks noGrp="1"/>
-          </p:cNvSpPr>
-          <p:nvPr>
-            <p:ph type="sldNum" sz="quarter" idx="12"/>
-          </p:nvPr>
-        </p:nvSpPr>
-        <p:spPr/>
-        <p:txBody>
-          <a:bodyPr/>
-          <a:lstStyle/>
-          <a:p>
-            <a:fld id="{C9E0B00B-E6DF-4183-A694-3DE28BEFB357}" type="slidenum">
-              <a:rPr lang="en-US" smtClean="0"/>
-              <a:t>25</a:t>
-            </a:fld>
-            <a:endParaRPr lang="en-US"/>
-          </a:p>
-        </p:txBody>
-      </p:sp>
-    </p:spTree>
-    <p:extLst>
-      <p:ext uri="{BB962C8B-B14F-4D97-AF65-F5344CB8AC3E}">
-        <p14:creationId xmlns:p14="http://schemas.microsoft.com/office/powerpoint/2010/main" val="4038923884"/>
-      </p:ext>
-    </p:extLst>
-  </p:cSld>
-  <p:clrMapOvr>
-    <a:masterClrMapping/>
-  </p:clrMapOvr>
-</p:sld>
-</file>
-
 <file path=ppt/slides/slide26.xml><?xml version="1.0" encoding="utf-8"?>
 <p:sld xmlns:a="http://schemas.openxmlformats.org/drawingml/2006/main" xmlns:r="http://schemas.openxmlformats.org/officeDocument/2006/relationships" xmlns:p="http://schemas.openxmlformats.org/presentationml/2006/main">
   <p:cSld>
@@ -13260,6 +13480,138 @@
       </p:grpSpPr>
       <p:sp>
         <p:nvSpPr>
+          <p:cNvPr id="2" name="Titel 1"/>
+          <p:cNvSpPr>
+            <a:spLocks noGrp="1"/>
+          </p:cNvSpPr>
+          <p:nvPr>
+            <p:ph type="title"/>
+          </p:nvPr>
+        </p:nvSpPr>
+        <p:spPr>
+          <a:xfrm>
+            <a:off x="1066800" y="1990724"/>
+            <a:ext cx="10287000" cy="2886075"/>
+          </a:xfrm>
+        </p:spPr>
+        <p:txBody>
+          <a:bodyPr/>
+          <a:lstStyle/>
+          <a:p>
+            <a:r>
+              <a:rPr lang="en-US" b="1">
+                <a:effectLst>
+                  <a:outerShdw blurRad="38100" dist="38100" dir="2700000" algn="tl">
+                    <a:srgbClr val="000000">
+                      <a:alpha val="43137"/>
+                    </a:srgbClr>
+                  </a:outerShdw>
+                </a:effectLst>
+              </a:rPr>
+              <a:t>Part II: Scraping, Text Normalization &amp; Static Feature Extraction</a:t>
+            </a:r>
+          </a:p>
+        </p:txBody>
+      </p:sp>
+      <p:sp>
+        <p:nvSpPr>
+          <p:cNvPr id="3" name="Textplatzhalter 2"/>
+          <p:cNvSpPr>
+            <a:spLocks noGrp="1"/>
+          </p:cNvSpPr>
+          <p:nvPr>
+            <p:ph type="body" idx="1"/>
+          </p:nvPr>
+        </p:nvSpPr>
+        <p:spPr>
+          <a:xfrm>
+            <a:off x="1066798" y="4876799"/>
+            <a:ext cx="10280651" cy="1212851"/>
+          </a:xfrm>
+        </p:spPr>
+        <p:txBody>
+          <a:bodyPr/>
+          <a:lstStyle/>
+          <a:p>
+            <a:r>
+              <a:rPr lang="en-US" b="1">
+                <a:effectLst>
+                  <a:outerShdw blurRad="38100" dist="38100" dir="2700000" algn="tl">
+                    <a:srgbClr val="000000">
+                      <a:alpha val="43137"/>
+                    </a:srgbClr>
+                  </a:outerShdw>
+                </a:effectLst>
+              </a:rPr>
+              <a:t>Static Feature Extraction</a:t>
+            </a:r>
+            <a:endParaRPr lang="en-US" b="1" dirty="0">
+              <a:effectLst>
+                <a:outerShdw blurRad="38100" dist="38100" dir="2700000" algn="tl">
+                  <a:srgbClr val="000000">
+                    <a:alpha val="43137"/>
+                  </a:srgbClr>
+                </a:outerShdw>
+              </a:effectLst>
+            </a:endParaRPr>
+          </a:p>
+        </p:txBody>
+      </p:sp>
+      <p:sp>
+        <p:nvSpPr>
+          <p:cNvPr id="4" name="Foliennummernplatzhalter 3"/>
+          <p:cNvSpPr>
+            <a:spLocks noGrp="1"/>
+          </p:cNvSpPr>
+          <p:nvPr>
+            <p:ph type="sldNum" sz="quarter" idx="12"/>
+          </p:nvPr>
+        </p:nvSpPr>
+        <p:spPr/>
+        <p:txBody>
+          <a:bodyPr/>
+          <a:lstStyle/>
+          <a:p>
+            <a:fld id="{C9E0B00B-E6DF-4183-A694-3DE28BEFB357}" type="slidenum">
+              <a:rPr lang="en-US" smtClean="0"/>
+              <a:t>26</a:t>
+            </a:fld>
+            <a:endParaRPr lang="en-US"/>
+          </a:p>
+        </p:txBody>
+      </p:sp>
+    </p:spTree>
+    <p:extLst>
+      <p:ext uri="{BB962C8B-B14F-4D97-AF65-F5344CB8AC3E}">
+        <p14:creationId xmlns:p14="http://schemas.microsoft.com/office/powerpoint/2010/main" val="4038923884"/>
+      </p:ext>
+    </p:extLst>
+  </p:cSld>
+  <p:clrMapOvr>
+    <a:masterClrMapping/>
+  </p:clrMapOvr>
+</p:sld>
+</file>
+
+<file path=ppt/slides/slide27.xml><?xml version="1.0" encoding="utf-8"?>
+<p:sld xmlns:a="http://schemas.openxmlformats.org/drawingml/2006/main" xmlns:r="http://schemas.openxmlformats.org/officeDocument/2006/relationships" xmlns:p="http://schemas.openxmlformats.org/presentationml/2006/main">
+  <p:cSld>
+    <p:spTree>
+      <p:nvGrpSpPr>
+        <p:cNvPr id="1" name=""/>
+        <p:cNvGrpSpPr/>
+        <p:nvPr/>
+      </p:nvGrpSpPr>
+      <p:grpSpPr>
+        <a:xfrm>
+          <a:off x="0" y="0"/>
+          <a:ext cx="0" cy="0"/>
+          <a:chOff x="0" y="0"/>
+          <a:chExt cx="0" cy="0"/>
+        </a:xfrm>
+      </p:grpSpPr>
+      <p:sp>
+        <p:nvSpPr>
           <p:cNvPr id="7" name="Content Placeholder 2">
             <a:extLst>
               <a:ext uri="{FF2B5EF4-FFF2-40B4-BE49-F238E27FC236}">
@@ -13337,7 +13689,7 @@
           <a:p>
             <a:fld id="{C9E0B00B-E6DF-4183-A694-3DE28BEFB357}" type="slidenum">
               <a:rPr lang="en-US" smtClean="0"/>
-              <a:t>26</a:t>
+              <a:t>27</a:t>
             </a:fld>
             <a:endParaRPr lang="en-US"/>
           </a:p>
@@ -13423,7 +13775,7 @@
 </p:sld>
 </file>
 
-<file path=ppt/slides/slide27.xml><?xml version="1.0" encoding="utf-8"?>
+<file path=ppt/slides/slide28.xml><?xml version="1.0" encoding="utf-8"?>
 <p:sld xmlns:a="http://schemas.openxmlformats.org/drawingml/2006/main" xmlns:r="http://schemas.openxmlformats.org/officeDocument/2006/relationships" xmlns:p="http://schemas.openxmlformats.org/presentationml/2006/main">
   <p:cSld>
     <p:spTree>
@@ -13457,7 +13809,7 @@
           <a:p>
             <a:fld id="{C9E0B00B-E6DF-4183-A694-3DE28BEFB357}" type="slidenum">
               <a:rPr lang="en-US" smtClean="0"/>
-              <a:t>27</a:t>
+              <a:t>28</a:t>
             </a:fld>
             <a:endParaRPr lang="en-US"/>
           </a:p>
@@ -13553,7 +13905,7 @@
                   <a:schemeClr val="tx1"/>
                 </a:solidFill>
               </a:rPr>
-              <a:t>Demo 4: Basic Text Cleaning</a:t>
+              <a:t>Demo 5: Basic Text Cleaning</a:t>
             </a:r>
             <a:endParaRPr lang="en-US" sz="4000" b="1">
               <a:solidFill>
@@ -13673,7 +14025,7 @@
 </p:sld>
 </file>
 
-<file path=ppt/slides/slide28.xml><?xml version="1.0" encoding="utf-8"?>
+<file path=ppt/slides/slide29.xml><?xml version="1.0" encoding="utf-8"?>
 <p:sld xmlns:a="http://schemas.openxmlformats.org/drawingml/2006/main" xmlns:r="http://schemas.openxmlformats.org/officeDocument/2006/relationships" xmlns:p="http://schemas.openxmlformats.org/presentationml/2006/main">
   <p:cSld>
     <p:spTree>
@@ -13820,7 +14172,7 @@
           <a:p>
             <a:fld id="{C9E0B00B-E6DF-4183-A694-3DE28BEFB357}" type="slidenum">
               <a:rPr lang="en-US" smtClean="0"/>
-              <a:t>28</a:t>
+              <a:t>29</a:t>
             </a:fld>
             <a:endParaRPr lang="en-US"/>
           </a:p>
@@ -13906,208 +14258,6 @@
 </p:sld>
 </file>
 
-<file path=ppt/slides/slide29.xml><?xml version="1.0" encoding="utf-8"?>
-<p:sld xmlns:a="http://schemas.openxmlformats.org/drawingml/2006/main" xmlns:r="http://schemas.openxmlformats.org/officeDocument/2006/relationships" xmlns:p="http://schemas.openxmlformats.org/presentationml/2006/main">
-  <p:cSld>
-    <p:spTree>
-      <p:nvGrpSpPr>
-        <p:cNvPr id="1" name=""/>
-        <p:cNvGrpSpPr/>
-        <p:nvPr/>
-      </p:nvGrpSpPr>
-      <p:grpSpPr>
-        <a:xfrm>
-          <a:off x="0" y="0"/>
-          <a:ext cx="0" cy="0"/>
-          <a:chOff x="0" y="0"/>
-          <a:chExt cx="0" cy="0"/>
-        </a:xfrm>
-      </p:grpSpPr>
-      <p:sp>
-        <p:nvSpPr>
-          <p:cNvPr id="7" name="Content Placeholder 2">
-            <a:extLst>
-              <a:ext uri="{FF2B5EF4-FFF2-40B4-BE49-F238E27FC236}">
-                <a16:creationId xmlns:a16="http://schemas.microsoft.com/office/drawing/2014/main" id="{0F324A9E-9392-4545-96A6-95DE3958C6B2}"/>
-              </a:ext>
-            </a:extLst>
-          </p:cNvPr>
-          <p:cNvSpPr>
-            <a:spLocks noGrp="1"/>
-          </p:cNvSpPr>
-          <p:nvPr>
-            <p:ph idx="1"/>
-          </p:nvPr>
-        </p:nvSpPr>
-        <p:spPr>
-          <a:xfrm>
-            <a:off x="1066797" y="1990725"/>
-            <a:ext cx="10287001" cy="4457700"/>
-          </a:xfrm>
-        </p:spPr>
-        <p:txBody>
-          <a:bodyPr>
-            <a:normAutofit/>
-          </a:bodyPr>
-          <a:lstStyle/>
-          <a:p>
-            <a:r>
-              <a:rPr lang="en-US" b="1"/>
-              <a:t>Useful (static) features in sentiment analysis</a:t>
-            </a:r>
-            <a:endParaRPr lang="en-US" b="1" i="1">
-              <a:solidFill>
-                <a:srgbClr val="33CCFF"/>
-              </a:solidFill>
-            </a:endParaRPr>
-          </a:p>
-          <a:p>
-            <a:pPr lvl="1"/>
-            <a:r>
-              <a:rPr lang="en-US"/>
-              <a:t>Polarity words</a:t>
-            </a:r>
-          </a:p>
-          <a:p>
-            <a:pPr lvl="1"/>
-            <a:r>
-              <a:rPr lang="en-US"/>
-              <a:t>Hashtags and emojis</a:t>
-            </a:r>
-          </a:p>
-          <a:p>
-            <a:pPr lvl="2"/>
-            <a:r>
-              <a:rPr lang="en-US"/>
-              <a:t>Presence / absence</a:t>
-            </a:r>
-          </a:p>
-          <a:p>
-            <a:pPr lvl="2"/>
-            <a:r>
-              <a:rPr lang="en-US"/>
-              <a:t>If possible, polarity</a:t>
-            </a:r>
-          </a:p>
-          <a:p>
-            <a:pPr lvl="1"/>
-            <a:r>
-              <a:rPr lang="en-US"/>
-              <a:t>Negations, intensifications, punctuations, repetitions</a:t>
-            </a:r>
-          </a:p>
-          <a:p>
-            <a:pPr lvl="1"/>
-            <a:r>
-              <a:rPr lang="en-US"/>
-              <a:t>Word / character n-grams</a:t>
-            </a:r>
-          </a:p>
-          <a:p>
-            <a:pPr lvl="1"/>
-            <a:r>
-              <a:rPr lang="en-US"/>
-              <a:t>Part-of-speech (POS) tags</a:t>
-            </a:r>
-            <a:br>
-              <a:rPr lang="en-US"/>
-            </a:br>
-            <a:endParaRPr lang="en-US"/>
-          </a:p>
-          <a:p>
-            <a:r>
-              <a:rPr lang="en-US" b="1"/>
-              <a:t>Recall our goal: </a:t>
-            </a:r>
-            <a:r>
-              <a:rPr lang="en-US"/>
-              <a:t>numeric </a:t>
-            </a:r>
-            <a:r>
-              <a:rPr lang="en-US">
-                <a:sym typeface="Symbol" panose="05050102010706020507" pitchFamily="18" charset="2"/>
-              </a:rPr>
-              <a:t>representation of texts by tokens that co-occur across documents</a:t>
-            </a:r>
-          </a:p>
-          <a:p>
-            <a:endParaRPr lang="en-US"/>
-          </a:p>
-        </p:txBody>
-      </p:sp>
-      <p:sp>
-        <p:nvSpPr>
-          <p:cNvPr id="4" name="Foliennummernplatzhalter 3"/>
-          <p:cNvSpPr>
-            <a:spLocks noGrp="1"/>
-          </p:cNvSpPr>
-          <p:nvPr>
-            <p:ph type="sldNum" sz="quarter" idx="12"/>
-          </p:nvPr>
-        </p:nvSpPr>
-        <p:spPr/>
-        <p:txBody>
-          <a:bodyPr/>
-          <a:lstStyle/>
-          <a:p>
-            <a:fld id="{C9E0B00B-E6DF-4183-A694-3DE28BEFB357}" type="slidenum">
-              <a:rPr lang="en-US" smtClean="0"/>
-              <a:t>29</a:t>
-            </a:fld>
-            <a:endParaRPr lang="en-US"/>
-          </a:p>
-        </p:txBody>
-      </p:sp>
-      <p:sp>
-        <p:nvSpPr>
-          <p:cNvPr id="12" name="Titel 1">
-            <a:extLst>
-              <a:ext uri="{FF2B5EF4-FFF2-40B4-BE49-F238E27FC236}">
-                <a16:creationId xmlns:a16="http://schemas.microsoft.com/office/drawing/2014/main" id="{478EA67A-3C39-4D0A-996A-C363F30A14B2}"/>
-              </a:ext>
-            </a:extLst>
-          </p:cNvPr>
-          <p:cNvSpPr>
-            <a:spLocks noGrp="1"/>
-          </p:cNvSpPr>
-          <p:nvPr>
-            <p:ph type="title"/>
-          </p:nvPr>
-        </p:nvSpPr>
-        <p:spPr>
-          <a:xfrm>
-            <a:off x="1066800" y="561524"/>
-            <a:ext cx="10287000" cy="1129164"/>
-          </a:xfrm>
-        </p:spPr>
-        <p:txBody>
-          <a:bodyPr/>
-          <a:lstStyle/>
-          <a:p>
-            <a:r>
-              <a:rPr lang="en-US"/>
-              <a:t>Static Feature Extraction  </a:t>
-            </a:r>
-            <a:r>
-              <a:rPr lang="en-US" b="1"/>
-              <a:t>Features</a:t>
-            </a:r>
-          </a:p>
-        </p:txBody>
-      </p:sp>
-    </p:spTree>
-    <p:extLst>
-      <p:ext uri="{BB962C8B-B14F-4D97-AF65-F5344CB8AC3E}">
-        <p14:creationId xmlns:p14="http://schemas.microsoft.com/office/powerpoint/2010/main" val="3089296070"/>
-      </p:ext>
-    </p:extLst>
-  </p:cSld>
-  <p:clrMapOvr>
-    <a:masterClrMapping/>
-  </p:clrMapOvr>
-</p:sld>
-</file>
-
 <file path=ppt/slides/slide3.xml><?xml version="1.0" encoding="utf-8"?>
 <p:sld xmlns:a="http://schemas.openxmlformats.org/drawingml/2006/main" xmlns:r="http://schemas.openxmlformats.org/officeDocument/2006/relationships" xmlns:p="http://schemas.openxmlformats.org/presentationml/2006/main">
   <p:cSld>
@@ -14291,6 +14441,118 @@
       </p:grpSpPr>
       <p:sp>
         <p:nvSpPr>
+          <p:cNvPr id="7" name="Content Placeholder 2">
+            <a:extLst>
+              <a:ext uri="{FF2B5EF4-FFF2-40B4-BE49-F238E27FC236}">
+                <a16:creationId xmlns:a16="http://schemas.microsoft.com/office/drawing/2014/main" id="{0F324A9E-9392-4545-96A6-95DE3958C6B2}"/>
+              </a:ext>
+            </a:extLst>
+          </p:cNvPr>
+          <p:cNvSpPr>
+            <a:spLocks noGrp="1"/>
+          </p:cNvSpPr>
+          <p:nvPr>
+            <p:ph idx="1"/>
+          </p:nvPr>
+        </p:nvSpPr>
+        <p:spPr>
+          <a:xfrm>
+            <a:off x="1066797" y="1990725"/>
+            <a:ext cx="10287001" cy="4457700"/>
+          </a:xfrm>
+        </p:spPr>
+        <p:txBody>
+          <a:bodyPr>
+            <a:normAutofit/>
+          </a:bodyPr>
+          <a:lstStyle/>
+          <a:p>
+            <a:r>
+              <a:rPr lang="en-US" b="1"/>
+              <a:t>Useful (static) features in sentiment analysis</a:t>
+            </a:r>
+            <a:endParaRPr lang="en-US" b="1" i="1">
+              <a:solidFill>
+                <a:srgbClr val="33CCFF"/>
+              </a:solidFill>
+            </a:endParaRPr>
+          </a:p>
+          <a:p>
+            <a:pPr lvl="1"/>
+            <a:r>
+              <a:rPr lang="en-US"/>
+              <a:t>Polarity words</a:t>
+            </a:r>
+          </a:p>
+          <a:p>
+            <a:pPr lvl="1"/>
+            <a:r>
+              <a:rPr lang="en-US"/>
+              <a:t>Hashtags and emojis</a:t>
+            </a:r>
+          </a:p>
+          <a:p>
+            <a:pPr lvl="2"/>
+            <a:r>
+              <a:rPr lang="en-US"/>
+              <a:t>Presence / absence</a:t>
+            </a:r>
+          </a:p>
+          <a:p>
+            <a:pPr lvl="2"/>
+            <a:r>
+              <a:rPr lang="en-US"/>
+              <a:t>If possible, polarity</a:t>
+            </a:r>
+          </a:p>
+          <a:p>
+            <a:pPr lvl="1"/>
+            <a:r>
+              <a:rPr lang="en-US"/>
+              <a:t>Negations, intensifications, punctuations, repetitions</a:t>
+            </a:r>
+          </a:p>
+          <a:p>
+            <a:pPr lvl="1"/>
+            <a:r>
+              <a:rPr lang="en-US"/>
+              <a:t>Word / character n-grams</a:t>
+            </a:r>
+          </a:p>
+          <a:p>
+            <a:pPr lvl="1"/>
+            <a:r>
+              <a:rPr lang="en-US"/>
+              <a:t>Part-of-speech (POS) tags</a:t>
+            </a:r>
+            <a:br>
+              <a:rPr lang="en-US"/>
+            </a:br>
+            <a:endParaRPr lang="en-US"/>
+          </a:p>
+          <a:p>
+            <a:r>
+              <a:rPr lang="en-US" b="1"/>
+              <a:t>Recall our goal: </a:t>
+            </a:r>
+            <a:r>
+              <a:rPr lang="en-US"/>
+              <a:t>numeric </a:t>
+            </a:r>
+            <a:r>
+              <a:rPr lang="en-US">
+                <a:sym typeface="Symbol" panose="05050102010706020507" pitchFamily="18" charset="2"/>
+              </a:rPr>
+              <a:t>representation of texts by tokens that co-occur across documents</a:t>
+            </a:r>
+          </a:p>
+          <a:p>
+            <a:endParaRPr lang="en-US"/>
+          </a:p>
+        </p:txBody>
+      </p:sp>
+      <p:sp>
+        <p:nvSpPr>
           <p:cNvPr id="4" name="Foliennummernplatzhalter 3"/>
           <p:cNvSpPr>
             <a:spLocks noGrp="1"/>
@@ -14307,6 +14569,96 @@
             <a:fld id="{C9E0B00B-E6DF-4183-A694-3DE28BEFB357}" type="slidenum">
               <a:rPr lang="en-US" smtClean="0"/>
               <a:t>30</a:t>
+            </a:fld>
+            <a:endParaRPr lang="en-US"/>
+          </a:p>
+        </p:txBody>
+      </p:sp>
+      <p:sp>
+        <p:nvSpPr>
+          <p:cNvPr id="12" name="Titel 1">
+            <a:extLst>
+              <a:ext uri="{FF2B5EF4-FFF2-40B4-BE49-F238E27FC236}">
+                <a16:creationId xmlns:a16="http://schemas.microsoft.com/office/drawing/2014/main" id="{478EA67A-3C39-4D0A-996A-C363F30A14B2}"/>
+              </a:ext>
+            </a:extLst>
+          </p:cNvPr>
+          <p:cNvSpPr>
+            <a:spLocks noGrp="1"/>
+          </p:cNvSpPr>
+          <p:nvPr>
+            <p:ph type="title"/>
+          </p:nvPr>
+        </p:nvSpPr>
+        <p:spPr>
+          <a:xfrm>
+            <a:off x="1066800" y="561524"/>
+            <a:ext cx="10287000" cy="1129164"/>
+          </a:xfrm>
+        </p:spPr>
+        <p:txBody>
+          <a:bodyPr/>
+          <a:lstStyle/>
+          <a:p>
+            <a:r>
+              <a:rPr lang="en-US"/>
+              <a:t>Static Feature Extraction  </a:t>
+            </a:r>
+            <a:r>
+              <a:rPr lang="en-US" b="1"/>
+              <a:t>Features</a:t>
+            </a:r>
+          </a:p>
+        </p:txBody>
+      </p:sp>
+    </p:spTree>
+    <p:extLst>
+      <p:ext uri="{BB962C8B-B14F-4D97-AF65-F5344CB8AC3E}">
+        <p14:creationId xmlns:p14="http://schemas.microsoft.com/office/powerpoint/2010/main" val="3089296070"/>
+      </p:ext>
+    </p:extLst>
+  </p:cSld>
+  <p:clrMapOvr>
+    <a:masterClrMapping/>
+  </p:clrMapOvr>
+</p:sld>
+</file>
+
+<file path=ppt/slides/slide31.xml><?xml version="1.0" encoding="utf-8"?>
+<p:sld xmlns:a="http://schemas.openxmlformats.org/drawingml/2006/main" xmlns:r="http://schemas.openxmlformats.org/officeDocument/2006/relationships" xmlns:p="http://schemas.openxmlformats.org/presentationml/2006/main">
+  <p:cSld>
+    <p:spTree>
+      <p:nvGrpSpPr>
+        <p:cNvPr id="1" name=""/>
+        <p:cNvGrpSpPr/>
+        <p:nvPr/>
+      </p:nvGrpSpPr>
+      <p:grpSpPr>
+        <a:xfrm>
+          <a:off x="0" y="0"/>
+          <a:ext cx="0" cy="0"/>
+          <a:chOff x="0" y="0"/>
+          <a:chExt cx="0" cy="0"/>
+        </a:xfrm>
+      </p:grpSpPr>
+      <p:sp>
+        <p:nvSpPr>
+          <p:cNvPr id="4" name="Foliennummernplatzhalter 3"/>
+          <p:cNvSpPr>
+            <a:spLocks noGrp="1"/>
+          </p:cNvSpPr>
+          <p:nvPr>
+            <p:ph type="sldNum" sz="quarter" idx="12"/>
+          </p:nvPr>
+        </p:nvSpPr>
+        <p:spPr/>
+        <p:txBody>
+          <a:bodyPr/>
+          <a:lstStyle/>
+          <a:p>
+            <a:fld id="{C9E0B00B-E6DF-4183-A694-3DE28BEFB357}" type="slidenum">
+              <a:rPr lang="en-US" smtClean="0"/>
+              <a:t>31</a:t>
             </a:fld>
             <a:endParaRPr lang="en-US"/>
           </a:p>
@@ -14522,147 +14874,6 @@
 </p:sld>
 </file>
 
-<file path=ppt/slides/slide31.xml><?xml version="1.0" encoding="utf-8"?>
-<p:sld xmlns:a="http://schemas.openxmlformats.org/drawingml/2006/main" xmlns:r="http://schemas.openxmlformats.org/officeDocument/2006/relationships" xmlns:p="http://schemas.openxmlformats.org/presentationml/2006/main">
-  <p:cSld>
-    <p:spTree>
-      <p:nvGrpSpPr>
-        <p:cNvPr id="1" name=""/>
-        <p:cNvGrpSpPr/>
-        <p:nvPr/>
-      </p:nvGrpSpPr>
-      <p:grpSpPr>
-        <a:xfrm>
-          <a:off x="0" y="0"/>
-          <a:ext cx="0" cy="0"/>
-          <a:chOff x="0" y="0"/>
-          <a:chExt cx="0" cy="0"/>
-        </a:xfrm>
-      </p:grpSpPr>
-      <p:sp>
-        <p:nvSpPr>
-          <p:cNvPr id="2" name="Titel 1"/>
-          <p:cNvSpPr>
-            <a:spLocks noGrp="1"/>
-          </p:cNvSpPr>
-          <p:nvPr>
-            <p:ph type="title"/>
-          </p:nvPr>
-        </p:nvSpPr>
-        <p:spPr>
-          <a:xfrm>
-            <a:off x="1066800" y="1990724"/>
-            <a:ext cx="10287000" cy="2886075"/>
-          </a:xfrm>
-        </p:spPr>
-        <p:txBody>
-          <a:bodyPr/>
-          <a:lstStyle/>
-          <a:p>
-            <a:r>
-              <a:rPr lang="en-US" b="1">
-                <a:effectLst>
-                  <a:outerShdw blurRad="38100" dist="38100" dir="2700000" algn="tl">
-                    <a:srgbClr val="000000">
-                      <a:alpha val="43137"/>
-                    </a:srgbClr>
-                  </a:outerShdw>
-                </a:effectLst>
-              </a:rPr>
-              <a:t>Part II: Scraping, Text Normalization &amp; Static Feature Extraction</a:t>
-            </a:r>
-            <a:endParaRPr lang="en-US">
-              <a:effectLst>
-                <a:outerShdw blurRad="38100" dist="38100" dir="2700000" algn="tl">
-                  <a:srgbClr val="000000">
-                    <a:alpha val="43137"/>
-                  </a:srgbClr>
-                </a:outerShdw>
-              </a:effectLst>
-            </a:endParaRPr>
-          </a:p>
-        </p:txBody>
-      </p:sp>
-      <p:sp>
-        <p:nvSpPr>
-          <p:cNvPr id="3" name="Textplatzhalter 2"/>
-          <p:cNvSpPr>
-            <a:spLocks noGrp="1"/>
-          </p:cNvSpPr>
-          <p:nvPr>
-            <p:ph type="body" idx="1"/>
-          </p:nvPr>
-        </p:nvSpPr>
-        <p:spPr>
-          <a:xfrm>
-            <a:off x="1066798" y="4876799"/>
-            <a:ext cx="10280651" cy="1212851"/>
-          </a:xfrm>
-        </p:spPr>
-        <p:txBody>
-          <a:bodyPr/>
-          <a:lstStyle/>
-          <a:p>
-            <a:r>
-              <a:rPr lang="en-US" b="1">
-                <a:effectLst>
-                  <a:outerShdw blurRad="38100" dist="38100" dir="2700000" algn="tl">
-                    <a:srgbClr val="000000">
-                      <a:alpha val="43137"/>
-                    </a:srgbClr>
-                  </a:outerShdw>
-                </a:effectLst>
-              </a:rPr>
-              <a:t>Literature and References</a:t>
-            </a:r>
-            <a:endParaRPr lang="en-US" b="1" dirty="0">
-              <a:effectLst>
-                <a:outerShdw blurRad="38100" dist="38100" dir="2700000" algn="tl">
-                  <a:srgbClr val="000000">
-                    <a:alpha val="43137"/>
-                  </a:srgbClr>
-                </a:outerShdw>
-              </a:effectLst>
-            </a:endParaRPr>
-          </a:p>
-        </p:txBody>
-      </p:sp>
-      <p:sp>
-        <p:nvSpPr>
-          <p:cNvPr id="4" name="Foliennummernplatzhalter 3"/>
-          <p:cNvSpPr>
-            <a:spLocks noGrp="1"/>
-          </p:cNvSpPr>
-          <p:nvPr>
-            <p:ph type="sldNum" sz="quarter" idx="12"/>
-          </p:nvPr>
-        </p:nvSpPr>
-        <p:spPr/>
-        <p:txBody>
-          <a:bodyPr/>
-          <a:lstStyle/>
-          <a:p>
-            <a:fld id="{C9E0B00B-E6DF-4183-A694-3DE28BEFB357}" type="slidenum">
-              <a:rPr lang="en-US" smtClean="0"/>
-              <a:t>31</a:t>
-            </a:fld>
-            <a:endParaRPr lang="en-US"/>
-          </a:p>
-        </p:txBody>
-      </p:sp>
-    </p:spTree>
-    <p:extLst>
-      <p:ext uri="{BB962C8B-B14F-4D97-AF65-F5344CB8AC3E}">
-        <p14:creationId xmlns:p14="http://schemas.microsoft.com/office/powerpoint/2010/main" val="3483205053"/>
-      </p:ext>
-    </p:extLst>
-  </p:cSld>
-  <p:clrMapOvr>
-    <a:masterClrMapping/>
-  </p:clrMapOvr>
-</p:sld>
-</file>
-
 <file path=ppt/slides/slide32.xml><?xml version="1.0" encoding="utf-8"?>
 <p:sld xmlns:a="http://schemas.openxmlformats.org/drawingml/2006/main" xmlns:r="http://schemas.openxmlformats.org/officeDocument/2006/relationships" xmlns:p="http://schemas.openxmlformats.org/presentationml/2006/main">
   <p:cSld>
@@ -14682,6 +14893,147 @@
       </p:grpSpPr>
       <p:sp>
         <p:nvSpPr>
+          <p:cNvPr id="2" name="Titel 1"/>
+          <p:cNvSpPr>
+            <a:spLocks noGrp="1"/>
+          </p:cNvSpPr>
+          <p:nvPr>
+            <p:ph type="title"/>
+          </p:nvPr>
+        </p:nvSpPr>
+        <p:spPr>
+          <a:xfrm>
+            <a:off x="1066800" y="1990724"/>
+            <a:ext cx="10287000" cy="2886075"/>
+          </a:xfrm>
+        </p:spPr>
+        <p:txBody>
+          <a:bodyPr/>
+          <a:lstStyle/>
+          <a:p>
+            <a:r>
+              <a:rPr lang="en-US" b="1">
+                <a:effectLst>
+                  <a:outerShdw blurRad="38100" dist="38100" dir="2700000" algn="tl">
+                    <a:srgbClr val="000000">
+                      <a:alpha val="43137"/>
+                    </a:srgbClr>
+                  </a:outerShdw>
+                </a:effectLst>
+              </a:rPr>
+              <a:t>Part II: Scraping, Text Normalization &amp; Static Feature Extraction</a:t>
+            </a:r>
+            <a:endParaRPr lang="en-US">
+              <a:effectLst>
+                <a:outerShdw blurRad="38100" dist="38100" dir="2700000" algn="tl">
+                  <a:srgbClr val="000000">
+                    <a:alpha val="43137"/>
+                  </a:srgbClr>
+                </a:outerShdw>
+              </a:effectLst>
+            </a:endParaRPr>
+          </a:p>
+        </p:txBody>
+      </p:sp>
+      <p:sp>
+        <p:nvSpPr>
+          <p:cNvPr id="3" name="Textplatzhalter 2"/>
+          <p:cNvSpPr>
+            <a:spLocks noGrp="1"/>
+          </p:cNvSpPr>
+          <p:nvPr>
+            <p:ph type="body" idx="1"/>
+          </p:nvPr>
+        </p:nvSpPr>
+        <p:spPr>
+          <a:xfrm>
+            <a:off x="1066798" y="4876799"/>
+            <a:ext cx="10280651" cy="1212851"/>
+          </a:xfrm>
+        </p:spPr>
+        <p:txBody>
+          <a:bodyPr/>
+          <a:lstStyle/>
+          <a:p>
+            <a:r>
+              <a:rPr lang="en-US" b="1">
+                <a:effectLst>
+                  <a:outerShdw blurRad="38100" dist="38100" dir="2700000" algn="tl">
+                    <a:srgbClr val="000000">
+                      <a:alpha val="43137"/>
+                    </a:srgbClr>
+                  </a:outerShdw>
+                </a:effectLst>
+              </a:rPr>
+              <a:t>Literature and References</a:t>
+            </a:r>
+            <a:endParaRPr lang="en-US" b="1" dirty="0">
+              <a:effectLst>
+                <a:outerShdw blurRad="38100" dist="38100" dir="2700000" algn="tl">
+                  <a:srgbClr val="000000">
+                    <a:alpha val="43137"/>
+                  </a:srgbClr>
+                </a:outerShdw>
+              </a:effectLst>
+            </a:endParaRPr>
+          </a:p>
+        </p:txBody>
+      </p:sp>
+      <p:sp>
+        <p:nvSpPr>
+          <p:cNvPr id="4" name="Foliennummernplatzhalter 3"/>
+          <p:cNvSpPr>
+            <a:spLocks noGrp="1"/>
+          </p:cNvSpPr>
+          <p:nvPr>
+            <p:ph type="sldNum" sz="quarter" idx="12"/>
+          </p:nvPr>
+        </p:nvSpPr>
+        <p:spPr/>
+        <p:txBody>
+          <a:bodyPr/>
+          <a:lstStyle/>
+          <a:p>
+            <a:fld id="{C9E0B00B-E6DF-4183-A694-3DE28BEFB357}" type="slidenum">
+              <a:rPr lang="en-US" smtClean="0"/>
+              <a:t>32</a:t>
+            </a:fld>
+            <a:endParaRPr lang="en-US"/>
+          </a:p>
+        </p:txBody>
+      </p:sp>
+    </p:spTree>
+    <p:extLst>
+      <p:ext uri="{BB962C8B-B14F-4D97-AF65-F5344CB8AC3E}">
+        <p14:creationId xmlns:p14="http://schemas.microsoft.com/office/powerpoint/2010/main" val="3483205053"/>
+      </p:ext>
+    </p:extLst>
+  </p:cSld>
+  <p:clrMapOvr>
+    <a:masterClrMapping/>
+  </p:clrMapOvr>
+</p:sld>
+</file>
+
+<file path=ppt/slides/slide33.xml><?xml version="1.0" encoding="utf-8"?>
+<p:sld xmlns:a="http://schemas.openxmlformats.org/drawingml/2006/main" xmlns:r="http://schemas.openxmlformats.org/officeDocument/2006/relationships" xmlns:p="http://schemas.openxmlformats.org/presentationml/2006/main">
+  <p:cSld>
+    <p:spTree>
+      <p:nvGrpSpPr>
+        <p:cNvPr id="1" name=""/>
+        <p:cNvGrpSpPr/>
+        <p:nvPr/>
+      </p:nvGrpSpPr>
+      <p:grpSpPr>
+        <a:xfrm>
+          <a:off x="0" y="0"/>
+          <a:ext cx="0" cy="0"/>
+          <a:chOff x="0" y="0"/>
+          <a:chExt cx="0" cy="0"/>
+        </a:xfrm>
+      </p:grpSpPr>
+      <p:sp>
+        <p:nvSpPr>
           <p:cNvPr id="3" name="Inhaltsplatzhalter 2"/>
           <p:cNvSpPr>
             <a:spLocks noGrp="1"/>
@@ -14729,7 +15081,7 @@
           <a:p>
             <a:fld id="{C9E0B00B-E6DF-4183-A694-3DE28BEFB357}" type="slidenum">
               <a:rPr lang="en-US" smtClean="0"/>
-              <a:t>32</a:t>
+              <a:t>33</a:t>
             </a:fld>
             <a:endParaRPr lang="en-US"/>
           </a:p>

</xml_diff>

<commit_message>
drafted demo static features
</commit_message>
<xml_diff>
--- a/5_seminar/Contents_Part_02/slides/Präsentation_Teil2_Lisa.pptx
+++ b/5_seminar/Contents_Part_02/slides/Präsentation_Teil2_Lisa.pptx
@@ -5,7 +5,7 @@
     <p:sldMasterId id="2147483648" r:id="rId1"/>
   </p:sldMasterIdLst>
   <p:notesMasterIdLst>
-    <p:notesMasterId r:id="rId35"/>
+    <p:notesMasterId r:id="rId36"/>
   </p:notesMasterIdLst>
   <p:sldIdLst>
     <p:sldId id="303" r:id="rId2"/>
@@ -38,9 +38,10 @@
     <p:sldId id="336" r:id="rId29"/>
     <p:sldId id="337" r:id="rId30"/>
     <p:sldId id="339" r:id="rId31"/>
-    <p:sldId id="324" r:id="rId32"/>
-    <p:sldId id="331" r:id="rId33"/>
-    <p:sldId id="274" r:id="rId34"/>
+    <p:sldId id="341" r:id="rId32"/>
+    <p:sldId id="324" r:id="rId33"/>
+    <p:sldId id="331" r:id="rId34"/>
+    <p:sldId id="274" r:id="rId35"/>
   </p:sldIdLst>
   <p:sldSz cx="12192000" cy="6858000"/>
   <p:notesSz cx="6858000" cy="9144000"/>
@@ -229,7 +230,7 @@
           <a:p>
             <a:fld id="{7A5B87F2-13FD-4A24-9F19-39B31C60B536}" type="datetimeFigureOut">
               <a:rPr lang="en-US" smtClean="0"/>
-              <a:t>4/10/2021</a:t>
+              <a:t>4/11/2021</a:t>
             </a:fld>
             <a:endParaRPr lang="en-US"/>
           </a:p>
@@ -2610,6 +2611,107 @@
     </p:spTree>
     <p:extLst>
       <p:ext uri="{BB962C8B-B14F-4D97-AF65-F5344CB8AC3E}">
+        <p14:creationId xmlns:p14="http://schemas.microsoft.com/office/powerpoint/2010/main" val="1018856079"/>
+      </p:ext>
+    </p:extLst>
+  </p:cSld>
+  <p:clrMapOvr>
+    <a:masterClrMapping/>
+  </p:clrMapOvr>
+</p:notes>
+</file>
+
+<file path=ppt/notesSlides/notesSlide28.xml><?xml version="1.0" encoding="utf-8"?>
+<p:notes xmlns:a="http://schemas.openxmlformats.org/drawingml/2006/main" xmlns:r="http://schemas.openxmlformats.org/officeDocument/2006/relationships" xmlns:p="http://schemas.openxmlformats.org/presentationml/2006/main">
+  <p:cSld>
+    <p:spTree>
+      <p:nvGrpSpPr>
+        <p:cNvPr id="1" name=""/>
+        <p:cNvGrpSpPr/>
+        <p:nvPr/>
+      </p:nvGrpSpPr>
+      <p:grpSpPr>
+        <a:xfrm>
+          <a:off x="0" y="0"/>
+          <a:ext cx="0" cy="0"/>
+          <a:chOff x="0" y="0"/>
+          <a:chExt cx="0" cy="0"/>
+        </a:xfrm>
+      </p:grpSpPr>
+      <p:sp>
+        <p:nvSpPr>
+          <p:cNvPr id="2" name="Folienbildplatzhalter 1"/>
+          <p:cNvSpPr>
+            <a:spLocks noGrp="1" noRot="1" noChangeAspect="1"/>
+          </p:cNvSpPr>
+          <p:nvPr>
+            <p:ph type="sldImg"/>
+          </p:nvPr>
+        </p:nvSpPr>
+        <p:spPr/>
+      </p:sp>
+      <p:sp>
+        <p:nvSpPr>
+          <p:cNvPr id="3" name="Notizenplatzhalter 2"/>
+          <p:cNvSpPr>
+            <a:spLocks noGrp="1"/>
+          </p:cNvSpPr>
+          <p:nvPr>
+            <p:ph type="body" idx="1"/>
+          </p:nvPr>
+        </p:nvSpPr>
+        <p:spPr/>
+        <p:txBody>
+          <a:bodyPr/>
+          <a:lstStyle/>
+          <a:p>
+            <a:pPr marL="0" marR="0" lvl="0" indent="0" algn="l" defTabSz="914400" rtl="0" eaLnBrk="1" fontAlgn="auto" latinLnBrk="0" hangingPunct="1">
+              <a:lnSpc>
+                <a:spcPct val="100000"/>
+              </a:lnSpc>
+              <a:spcBef>
+                <a:spcPts val="0"/>
+              </a:spcBef>
+              <a:spcAft>
+                <a:spcPts val="0"/>
+              </a:spcAft>
+              <a:buClrTx/>
+              <a:buSzTx/>
+              <a:buFontTx/>
+              <a:buNone/>
+              <a:tabLst/>
+              <a:defRPr/>
+            </a:pPr>
+            <a:endParaRPr lang="en-US" b="1"/>
+          </a:p>
+        </p:txBody>
+      </p:sp>
+      <p:sp>
+        <p:nvSpPr>
+          <p:cNvPr id="4" name="Foliennummernplatzhalter 3"/>
+          <p:cNvSpPr>
+            <a:spLocks noGrp="1"/>
+          </p:cNvSpPr>
+          <p:nvPr>
+            <p:ph type="sldNum" sz="quarter" idx="10"/>
+          </p:nvPr>
+        </p:nvSpPr>
+        <p:spPr/>
+        <p:txBody>
+          <a:bodyPr/>
+          <a:lstStyle/>
+          <a:p>
+            <a:fld id="{20A41429-B750-4047-B563-2878417A70E7}" type="slidenum">
+              <a:rPr lang="en-US" smtClean="0"/>
+              <a:t>32</a:t>
+            </a:fld>
+            <a:endParaRPr lang="en-US"/>
+          </a:p>
+        </p:txBody>
+      </p:sp>
+    </p:spTree>
+    <p:extLst>
+      <p:ext uri="{BB962C8B-B14F-4D97-AF65-F5344CB8AC3E}">
         <p14:creationId xmlns:p14="http://schemas.microsoft.com/office/powerpoint/2010/main" val="2610095379"/>
       </p:ext>
     </p:extLst>
@@ -3643,7 +3745,7 @@
           <a:p>
             <a:fld id="{5A1811BA-6AD9-41A7-B7A2-456C8523519C}" type="datetime1">
               <a:rPr lang="en-US" smtClean="0"/>
-              <a:t>4/10/2021</a:t>
+              <a:t>4/11/2021</a:t>
             </a:fld>
             <a:endParaRPr lang="en-US"/>
           </a:p>
@@ -3813,7 +3915,7 @@
           <a:p>
             <a:fld id="{B0494441-C196-4BB0-93EE-AF22360207AB}" type="datetime1">
               <a:rPr lang="en-US" smtClean="0"/>
-              <a:t>4/10/2021</a:t>
+              <a:t>4/11/2021</a:t>
             </a:fld>
             <a:endParaRPr lang="en-US"/>
           </a:p>
@@ -3993,7 +4095,7 @@
           <a:p>
             <a:fld id="{D7B9282B-C3CE-4F56-8DD1-5349F982F1D2}" type="datetime1">
               <a:rPr lang="en-US" smtClean="0"/>
-              <a:t>4/10/2021</a:t>
+              <a:t>4/11/2021</a:t>
             </a:fld>
             <a:endParaRPr lang="en-US"/>
           </a:p>
@@ -4163,7 +4265,7 @@
           <a:p>
             <a:fld id="{E6E86D6A-786F-4E85-AF3B-385015383ABA}" type="datetime1">
               <a:rPr lang="en-US" smtClean="0"/>
-              <a:t>4/10/2021</a:t>
+              <a:t>4/11/2021</a:t>
             </a:fld>
             <a:endParaRPr lang="en-US"/>
           </a:p>
@@ -4409,7 +4511,7 @@
           <a:p>
             <a:fld id="{051FFEB0-9C80-4A34-A5C7-72D52D52FC7D}" type="datetime1">
               <a:rPr lang="en-US" smtClean="0"/>
-              <a:t>4/10/2021</a:t>
+              <a:t>4/11/2021</a:t>
             </a:fld>
             <a:endParaRPr lang="en-US"/>
           </a:p>
@@ -4641,7 +4743,7 @@
           <a:p>
             <a:fld id="{084267AD-C299-471B-ABA1-D0EA94C7EDCF}" type="datetime1">
               <a:rPr lang="en-US" smtClean="0"/>
-              <a:t>4/10/2021</a:t>
+              <a:t>4/11/2021</a:t>
             </a:fld>
             <a:endParaRPr lang="en-US"/>
           </a:p>
@@ -5008,7 +5110,7 @@
           <a:p>
             <a:fld id="{6468DBC7-10F8-46A1-8CE1-DBB0A6F0EF3E}" type="datetime1">
               <a:rPr lang="en-US" smtClean="0"/>
-              <a:t>4/10/2021</a:t>
+              <a:t>4/11/2021</a:t>
             </a:fld>
             <a:endParaRPr lang="en-US"/>
           </a:p>
@@ -5126,7 +5228,7 @@
           <a:p>
             <a:fld id="{0A97ED80-8DDA-43A7-A78F-B0542D691D0E}" type="datetime1">
               <a:rPr lang="en-US" smtClean="0"/>
-              <a:t>4/10/2021</a:t>
+              <a:t>4/11/2021</a:t>
             </a:fld>
             <a:endParaRPr lang="en-US"/>
           </a:p>
@@ -5221,7 +5323,7 @@
           <a:p>
             <a:fld id="{0AF827E6-45BA-40D2-98F2-BE4FFF095577}" type="datetime1">
               <a:rPr lang="en-US" smtClean="0"/>
-              <a:t>4/10/2021</a:t>
+              <a:t>4/11/2021</a:t>
             </a:fld>
             <a:endParaRPr lang="en-US"/>
           </a:p>
@@ -5498,7 +5600,7 @@
           <a:p>
             <a:fld id="{42BD114C-22EA-4B1A-A45B-ED6465C7BB4E}" type="datetime1">
               <a:rPr lang="en-US" smtClean="0"/>
-              <a:t>4/10/2021</a:t>
+              <a:t>4/11/2021</a:t>
             </a:fld>
             <a:endParaRPr lang="en-US"/>
           </a:p>
@@ -5751,7 +5853,7 @@
           <a:p>
             <a:fld id="{F46F8903-38BE-4FD8-98FC-E4EF771B2D8C}" type="datetime1">
               <a:rPr lang="en-US" smtClean="0"/>
-              <a:t>4/10/2021</a:t>
+              <a:t>4/11/2021</a:t>
             </a:fld>
             <a:endParaRPr lang="en-US"/>
           </a:p>
@@ -5964,7 +6066,7 @@
           <a:p>
             <a:fld id="{A91AC8C7-9CA9-4E83-8CE3-AD3BE4150B39}" type="datetime1">
               <a:rPr lang="en-US" smtClean="0"/>
-              <a:t>4/10/2021</a:t>
+              <a:t>4/11/2021</a:t>
             </a:fld>
             <a:endParaRPr lang="en-US"/>
           </a:p>
@@ -14643,6 +14745,118 @@
       </p:grpSpPr>
       <p:sp>
         <p:nvSpPr>
+          <p:cNvPr id="7" name="Content Placeholder 2">
+            <a:extLst>
+              <a:ext uri="{FF2B5EF4-FFF2-40B4-BE49-F238E27FC236}">
+                <a16:creationId xmlns:a16="http://schemas.microsoft.com/office/drawing/2014/main" id="{0F324A9E-9392-4545-96A6-95DE3958C6B2}"/>
+              </a:ext>
+            </a:extLst>
+          </p:cNvPr>
+          <p:cNvSpPr>
+            <a:spLocks noGrp="1"/>
+          </p:cNvSpPr>
+          <p:nvPr>
+            <p:ph idx="1"/>
+          </p:nvPr>
+        </p:nvSpPr>
+        <p:spPr>
+          <a:xfrm>
+            <a:off x="1066797" y="1990725"/>
+            <a:ext cx="10287001" cy="4457700"/>
+          </a:xfrm>
+        </p:spPr>
+        <p:txBody>
+          <a:bodyPr>
+            <a:normAutofit/>
+          </a:bodyPr>
+          <a:lstStyle/>
+          <a:p>
+            <a:r>
+              <a:rPr lang="en-US" b="1"/>
+              <a:t>Useful (static) features in sentiment analysis</a:t>
+            </a:r>
+            <a:endParaRPr lang="en-US" b="1" i="1">
+              <a:solidFill>
+                <a:srgbClr val="33CCFF"/>
+              </a:solidFill>
+            </a:endParaRPr>
+          </a:p>
+          <a:p>
+            <a:pPr lvl="1"/>
+            <a:r>
+              <a:rPr lang="en-US"/>
+              <a:t>Polarity clues</a:t>
+            </a:r>
+          </a:p>
+          <a:p>
+            <a:pPr lvl="1"/>
+            <a:r>
+              <a:rPr lang="en-US"/>
+              <a:t>Hashtags and emojis</a:t>
+            </a:r>
+          </a:p>
+          <a:p>
+            <a:pPr lvl="2"/>
+            <a:r>
+              <a:rPr lang="en-US"/>
+              <a:t>Presence / absence</a:t>
+            </a:r>
+          </a:p>
+          <a:p>
+            <a:pPr lvl="2"/>
+            <a:r>
+              <a:rPr lang="en-US"/>
+              <a:t>If possible, polarity</a:t>
+            </a:r>
+          </a:p>
+          <a:p>
+            <a:pPr lvl="1"/>
+            <a:r>
+              <a:rPr lang="en-US"/>
+              <a:t>Negations, intensifications, punctuations, repetitions</a:t>
+            </a:r>
+          </a:p>
+          <a:p>
+            <a:pPr lvl="1"/>
+            <a:r>
+              <a:rPr lang="en-US"/>
+              <a:t>Word / character n-grams</a:t>
+            </a:r>
+          </a:p>
+          <a:p>
+            <a:pPr lvl="1"/>
+            <a:r>
+              <a:rPr lang="en-US"/>
+              <a:t>Part-of-speech (POS) tags</a:t>
+            </a:r>
+            <a:br>
+              <a:rPr lang="en-US"/>
+            </a:br>
+            <a:endParaRPr lang="en-US"/>
+          </a:p>
+          <a:p>
+            <a:r>
+              <a:rPr lang="en-US" b="1"/>
+              <a:t>Recall our goal: </a:t>
+            </a:r>
+            <a:r>
+              <a:rPr lang="en-US"/>
+              <a:t>numeric </a:t>
+            </a:r>
+            <a:r>
+              <a:rPr lang="en-US">
+                <a:sym typeface="Symbol" panose="05050102010706020507" pitchFamily="18" charset="2"/>
+              </a:rPr>
+              <a:t>representation of texts by tokens that co-occur across documents</a:t>
+            </a:r>
+          </a:p>
+          <a:p>
+            <a:endParaRPr lang="en-US"/>
+          </a:p>
+        </p:txBody>
+      </p:sp>
+      <p:sp>
+        <p:nvSpPr>
           <p:cNvPr id="4" name="Foliennummernplatzhalter 3"/>
           <p:cNvSpPr>
             <a:spLocks noGrp="1"/>
@@ -14659,6 +14873,154 @@
             <a:fld id="{C9E0B00B-E6DF-4183-A694-3DE28BEFB357}" type="slidenum">
               <a:rPr lang="en-US" smtClean="0"/>
               <a:t>31</a:t>
+            </a:fld>
+            <a:endParaRPr lang="en-US"/>
+          </a:p>
+        </p:txBody>
+      </p:sp>
+      <p:sp>
+        <p:nvSpPr>
+          <p:cNvPr id="12" name="Titel 1">
+            <a:extLst>
+              <a:ext uri="{FF2B5EF4-FFF2-40B4-BE49-F238E27FC236}">
+                <a16:creationId xmlns:a16="http://schemas.microsoft.com/office/drawing/2014/main" id="{478EA67A-3C39-4D0A-996A-C363F30A14B2}"/>
+              </a:ext>
+            </a:extLst>
+          </p:cNvPr>
+          <p:cNvSpPr>
+            <a:spLocks noGrp="1"/>
+          </p:cNvSpPr>
+          <p:nvPr>
+            <p:ph type="title"/>
+          </p:nvPr>
+        </p:nvSpPr>
+        <p:spPr>
+          <a:xfrm>
+            <a:off x="1066800" y="561524"/>
+            <a:ext cx="10287000" cy="1129164"/>
+          </a:xfrm>
+        </p:spPr>
+        <p:txBody>
+          <a:bodyPr/>
+          <a:lstStyle/>
+          <a:p>
+            <a:r>
+              <a:rPr lang="en-US"/>
+              <a:t>Static Feature Extraction  </a:t>
+            </a:r>
+            <a:r>
+              <a:rPr lang="en-US" b="1"/>
+              <a:t>Features</a:t>
+            </a:r>
+          </a:p>
+        </p:txBody>
+      </p:sp>
+      <p:sp>
+        <p:nvSpPr>
+          <p:cNvPr id="5" name="Rectangle 4">
+            <a:extLst>
+              <a:ext uri="{FF2B5EF4-FFF2-40B4-BE49-F238E27FC236}">
+                <a16:creationId xmlns:a16="http://schemas.microsoft.com/office/drawing/2014/main" id="{DD45DA9A-3659-4201-8633-5A0A565F1544}"/>
+              </a:ext>
+            </a:extLst>
+          </p:cNvPr>
+          <p:cNvSpPr/>
+          <p:nvPr/>
+        </p:nvSpPr>
+        <p:spPr>
+          <a:xfrm>
+            <a:off x="4827104" y="0"/>
+            <a:ext cx="7364896" cy="914400"/>
+          </a:xfrm>
+          <a:prstGeom prst="rect">
+            <a:avLst/>
+          </a:prstGeom>
+          <a:solidFill>
+            <a:schemeClr val="accent2"/>
+          </a:solidFill>
+          <a:ln>
+            <a:solidFill>
+              <a:schemeClr val="accent2"/>
+            </a:solidFill>
+          </a:ln>
+        </p:spPr>
+        <p:style>
+          <a:lnRef idx="2">
+            <a:schemeClr val="accent1">
+              <a:shade val="50000"/>
+            </a:schemeClr>
+          </a:lnRef>
+          <a:fillRef idx="1">
+            <a:schemeClr val="accent1"/>
+          </a:fillRef>
+          <a:effectRef idx="0">
+            <a:schemeClr val="accent1"/>
+          </a:effectRef>
+          <a:fontRef idx="minor">
+            <a:schemeClr val="lt1"/>
+          </a:fontRef>
+        </p:style>
+        <p:txBody>
+          <a:bodyPr rtlCol="0" anchor="ctr"/>
+          <a:lstStyle/>
+          <a:p>
+            <a:pPr algn="ctr"/>
+            <a:r>
+              <a:rPr lang="de-DE"/>
+              <a:t>details zu jeweiligem feature typ</a:t>
+            </a:r>
+            <a:endParaRPr lang="en-US"/>
+          </a:p>
+        </p:txBody>
+      </p:sp>
+    </p:spTree>
+    <p:extLst>
+      <p:ext uri="{BB962C8B-B14F-4D97-AF65-F5344CB8AC3E}">
+        <p14:creationId xmlns:p14="http://schemas.microsoft.com/office/powerpoint/2010/main" val="4227116571"/>
+      </p:ext>
+    </p:extLst>
+  </p:cSld>
+  <p:clrMapOvr>
+    <a:masterClrMapping/>
+  </p:clrMapOvr>
+</p:sld>
+</file>
+
+<file path=ppt/slides/slide32.xml><?xml version="1.0" encoding="utf-8"?>
+<p:sld xmlns:a="http://schemas.openxmlformats.org/drawingml/2006/main" xmlns:r="http://schemas.openxmlformats.org/officeDocument/2006/relationships" xmlns:p="http://schemas.openxmlformats.org/presentationml/2006/main">
+  <p:cSld>
+    <p:spTree>
+      <p:nvGrpSpPr>
+        <p:cNvPr id="1" name=""/>
+        <p:cNvGrpSpPr/>
+        <p:nvPr/>
+      </p:nvGrpSpPr>
+      <p:grpSpPr>
+        <a:xfrm>
+          <a:off x="0" y="0"/>
+          <a:ext cx="0" cy="0"/>
+          <a:chOff x="0" y="0"/>
+          <a:chExt cx="0" cy="0"/>
+        </a:xfrm>
+      </p:grpSpPr>
+      <p:sp>
+        <p:nvSpPr>
+          <p:cNvPr id="4" name="Foliennummernplatzhalter 3"/>
+          <p:cNvSpPr>
+            <a:spLocks noGrp="1"/>
+          </p:cNvSpPr>
+          <p:nvPr>
+            <p:ph type="sldNum" sz="quarter" idx="12"/>
+          </p:nvPr>
+        </p:nvSpPr>
+        <p:spPr/>
+        <p:txBody>
+          <a:bodyPr/>
+          <a:lstStyle/>
+          <a:p>
+            <a:fld id="{C9E0B00B-E6DF-4183-A694-3DE28BEFB357}" type="slidenum">
+              <a:rPr lang="en-US" smtClean="0"/>
+              <a:t>32</a:t>
             </a:fld>
             <a:endParaRPr lang="en-US"/>
           </a:p>
@@ -14874,147 +15236,6 @@
 </p:sld>
 </file>
 
-<file path=ppt/slides/slide32.xml><?xml version="1.0" encoding="utf-8"?>
-<p:sld xmlns:a="http://schemas.openxmlformats.org/drawingml/2006/main" xmlns:r="http://schemas.openxmlformats.org/officeDocument/2006/relationships" xmlns:p="http://schemas.openxmlformats.org/presentationml/2006/main">
-  <p:cSld>
-    <p:spTree>
-      <p:nvGrpSpPr>
-        <p:cNvPr id="1" name=""/>
-        <p:cNvGrpSpPr/>
-        <p:nvPr/>
-      </p:nvGrpSpPr>
-      <p:grpSpPr>
-        <a:xfrm>
-          <a:off x="0" y="0"/>
-          <a:ext cx="0" cy="0"/>
-          <a:chOff x="0" y="0"/>
-          <a:chExt cx="0" cy="0"/>
-        </a:xfrm>
-      </p:grpSpPr>
-      <p:sp>
-        <p:nvSpPr>
-          <p:cNvPr id="2" name="Titel 1"/>
-          <p:cNvSpPr>
-            <a:spLocks noGrp="1"/>
-          </p:cNvSpPr>
-          <p:nvPr>
-            <p:ph type="title"/>
-          </p:nvPr>
-        </p:nvSpPr>
-        <p:spPr>
-          <a:xfrm>
-            <a:off x="1066800" y="1990724"/>
-            <a:ext cx="10287000" cy="2886075"/>
-          </a:xfrm>
-        </p:spPr>
-        <p:txBody>
-          <a:bodyPr/>
-          <a:lstStyle/>
-          <a:p>
-            <a:r>
-              <a:rPr lang="en-US" b="1">
-                <a:effectLst>
-                  <a:outerShdw blurRad="38100" dist="38100" dir="2700000" algn="tl">
-                    <a:srgbClr val="000000">
-                      <a:alpha val="43137"/>
-                    </a:srgbClr>
-                  </a:outerShdw>
-                </a:effectLst>
-              </a:rPr>
-              <a:t>Part II: Scraping, Text Normalization &amp; Static Feature Extraction</a:t>
-            </a:r>
-            <a:endParaRPr lang="en-US">
-              <a:effectLst>
-                <a:outerShdw blurRad="38100" dist="38100" dir="2700000" algn="tl">
-                  <a:srgbClr val="000000">
-                    <a:alpha val="43137"/>
-                  </a:srgbClr>
-                </a:outerShdw>
-              </a:effectLst>
-            </a:endParaRPr>
-          </a:p>
-        </p:txBody>
-      </p:sp>
-      <p:sp>
-        <p:nvSpPr>
-          <p:cNvPr id="3" name="Textplatzhalter 2"/>
-          <p:cNvSpPr>
-            <a:spLocks noGrp="1"/>
-          </p:cNvSpPr>
-          <p:nvPr>
-            <p:ph type="body" idx="1"/>
-          </p:nvPr>
-        </p:nvSpPr>
-        <p:spPr>
-          <a:xfrm>
-            <a:off x="1066798" y="4876799"/>
-            <a:ext cx="10280651" cy="1212851"/>
-          </a:xfrm>
-        </p:spPr>
-        <p:txBody>
-          <a:bodyPr/>
-          <a:lstStyle/>
-          <a:p>
-            <a:r>
-              <a:rPr lang="en-US" b="1">
-                <a:effectLst>
-                  <a:outerShdw blurRad="38100" dist="38100" dir="2700000" algn="tl">
-                    <a:srgbClr val="000000">
-                      <a:alpha val="43137"/>
-                    </a:srgbClr>
-                  </a:outerShdw>
-                </a:effectLst>
-              </a:rPr>
-              <a:t>Literature and References</a:t>
-            </a:r>
-            <a:endParaRPr lang="en-US" b="1" dirty="0">
-              <a:effectLst>
-                <a:outerShdw blurRad="38100" dist="38100" dir="2700000" algn="tl">
-                  <a:srgbClr val="000000">
-                    <a:alpha val="43137"/>
-                  </a:srgbClr>
-                </a:outerShdw>
-              </a:effectLst>
-            </a:endParaRPr>
-          </a:p>
-        </p:txBody>
-      </p:sp>
-      <p:sp>
-        <p:nvSpPr>
-          <p:cNvPr id="4" name="Foliennummernplatzhalter 3"/>
-          <p:cNvSpPr>
-            <a:spLocks noGrp="1"/>
-          </p:cNvSpPr>
-          <p:nvPr>
-            <p:ph type="sldNum" sz="quarter" idx="12"/>
-          </p:nvPr>
-        </p:nvSpPr>
-        <p:spPr/>
-        <p:txBody>
-          <a:bodyPr/>
-          <a:lstStyle/>
-          <a:p>
-            <a:fld id="{C9E0B00B-E6DF-4183-A694-3DE28BEFB357}" type="slidenum">
-              <a:rPr lang="en-US" smtClean="0"/>
-              <a:t>32</a:t>
-            </a:fld>
-            <a:endParaRPr lang="en-US"/>
-          </a:p>
-        </p:txBody>
-      </p:sp>
-    </p:spTree>
-    <p:extLst>
-      <p:ext uri="{BB962C8B-B14F-4D97-AF65-F5344CB8AC3E}">
-        <p14:creationId xmlns:p14="http://schemas.microsoft.com/office/powerpoint/2010/main" val="3483205053"/>
-      </p:ext>
-    </p:extLst>
-  </p:cSld>
-  <p:clrMapOvr>
-    <a:masterClrMapping/>
-  </p:clrMapOvr>
-</p:sld>
-</file>
-
 <file path=ppt/slides/slide33.xml><?xml version="1.0" encoding="utf-8"?>
 <p:sld xmlns:a="http://schemas.openxmlformats.org/drawingml/2006/main" xmlns:r="http://schemas.openxmlformats.org/officeDocument/2006/relationships" xmlns:p="http://schemas.openxmlformats.org/presentationml/2006/main">
   <p:cSld>
@@ -15034,6 +15255,147 @@
       </p:grpSpPr>
       <p:sp>
         <p:nvSpPr>
+          <p:cNvPr id="2" name="Titel 1"/>
+          <p:cNvSpPr>
+            <a:spLocks noGrp="1"/>
+          </p:cNvSpPr>
+          <p:nvPr>
+            <p:ph type="title"/>
+          </p:nvPr>
+        </p:nvSpPr>
+        <p:spPr>
+          <a:xfrm>
+            <a:off x="1066800" y="1990724"/>
+            <a:ext cx="10287000" cy="2886075"/>
+          </a:xfrm>
+        </p:spPr>
+        <p:txBody>
+          <a:bodyPr/>
+          <a:lstStyle/>
+          <a:p>
+            <a:r>
+              <a:rPr lang="en-US" b="1">
+                <a:effectLst>
+                  <a:outerShdw blurRad="38100" dist="38100" dir="2700000" algn="tl">
+                    <a:srgbClr val="000000">
+                      <a:alpha val="43137"/>
+                    </a:srgbClr>
+                  </a:outerShdw>
+                </a:effectLst>
+              </a:rPr>
+              <a:t>Part II: Scraping, Text Normalization &amp; Static Feature Extraction</a:t>
+            </a:r>
+            <a:endParaRPr lang="en-US">
+              <a:effectLst>
+                <a:outerShdw blurRad="38100" dist="38100" dir="2700000" algn="tl">
+                  <a:srgbClr val="000000">
+                    <a:alpha val="43137"/>
+                  </a:srgbClr>
+                </a:outerShdw>
+              </a:effectLst>
+            </a:endParaRPr>
+          </a:p>
+        </p:txBody>
+      </p:sp>
+      <p:sp>
+        <p:nvSpPr>
+          <p:cNvPr id="3" name="Textplatzhalter 2"/>
+          <p:cNvSpPr>
+            <a:spLocks noGrp="1"/>
+          </p:cNvSpPr>
+          <p:nvPr>
+            <p:ph type="body" idx="1"/>
+          </p:nvPr>
+        </p:nvSpPr>
+        <p:spPr>
+          <a:xfrm>
+            <a:off x="1066798" y="4876799"/>
+            <a:ext cx="10280651" cy="1212851"/>
+          </a:xfrm>
+        </p:spPr>
+        <p:txBody>
+          <a:bodyPr/>
+          <a:lstStyle/>
+          <a:p>
+            <a:r>
+              <a:rPr lang="en-US" b="1">
+                <a:effectLst>
+                  <a:outerShdw blurRad="38100" dist="38100" dir="2700000" algn="tl">
+                    <a:srgbClr val="000000">
+                      <a:alpha val="43137"/>
+                    </a:srgbClr>
+                  </a:outerShdw>
+                </a:effectLst>
+              </a:rPr>
+              <a:t>Literature and References</a:t>
+            </a:r>
+            <a:endParaRPr lang="en-US" b="1" dirty="0">
+              <a:effectLst>
+                <a:outerShdw blurRad="38100" dist="38100" dir="2700000" algn="tl">
+                  <a:srgbClr val="000000">
+                    <a:alpha val="43137"/>
+                  </a:srgbClr>
+                </a:outerShdw>
+              </a:effectLst>
+            </a:endParaRPr>
+          </a:p>
+        </p:txBody>
+      </p:sp>
+      <p:sp>
+        <p:nvSpPr>
+          <p:cNvPr id="4" name="Foliennummernplatzhalter 3"/>
+          <p:cNvSpPr>
+            <a:spLocks noGrp="1"/>
+          </p:cNvSpPr>
+          <p:nvPr>
+            <p:ph type="sldNum" sz="quarter" idx="12"/>
+          </p:nvPr>
+        </p:nvSpPr>
+        <p:spPr/>
+        <p:txBody>
+          <a:bodyPr/>
+          <a:lstStyle/>
+          <a:p>
+            <a:fld id="{C9E0B00B-E6DF-4183-A694-3DE28BEFB357}" type="slidenum">
+              <a:rPr lang="en-US" smtClean="0"/>
+              <a:t>33</a:t>
+            </a:fld>
+            <a:endParaRPr lang="en-US"/>
+          </a:p>
+        </p:txBody>
+      </p:sp>
+    </p:spTree>
+    <p:extLst>
+      <p:ext uri="{BB962C8B-B14F-4D97-AF65-F5344CB8AC3E}">
+        <p14:creationId xmlns:p14="http://schemas.microsoft.com/office/powerpoint/2010/main" val="3483205053"/>
+      </p:ext>
+    </p:extLst>
+  </p:cSld>
+  <p:clrMapOvr>
+    <a:masterClrMapping/>
+  </p:clrMapOvr>
+</p:sld>
+</file>
+
+<file path=ppt/slides/slide34.xml><?xml version="1.0" encoding="utf-8"?>
+<p:sld xmlns:a="http://schemas.openxmlformats.org/drawingml/2006/main" xmlns:r="http://schemas.openxmlformats.org/officeDocument/2006/relationships" xmlns:p="http://schemas.openxmlformats.org/presentationml/2006/main">
+  <p:cSld>
+    <p:spTree>
+      <p:nvGrpSpPr>
+        <p:cNvPr id="1" name=""/>
+        <p:cNvGrpSpPr/>
+        <p:nvPr/>
+      </p:nvGrpSpPr>
+      <p:grpSpPr>
+        <a:xfrm>
+          <a:off x="0" y="0"/>
+          <a:ext cx="0" cy="0"/>
+          <a:chOff x="0" y="0"/>
+          <a:chExt cx="0" cy="0"/>
+        </a:xfrm>
+      </p:grpSpPr>
+      <p:sp>
+        <p:nvSpPr>
           <p:cNvPr id="3" name="Inhaltsplatzhalter 2"/>
           <p:cNvSpPr>
             <a:spLocks noGrp="1"/>
@@ -15081,7 +15443,7 @@
           <a:p>
             <a:fld id="{C9E0B00B-E6DF-4183-A694-3DE28BEFB357}" type="slidenum">
               <a:rPr lang="en-US" smtClean="0"/>
-              <a:t>33</a:t>
+              <a:t>34</a:t>
             </a:fld>
             <a:endParaRPr lang="en-US"/>
           </a:p>

</xml_diff>

<commit_message>
added slides for static features
</commit_message>
<xml_diff>
--- a/5_seminar/Contents_Part_02/slides/Präsentation_Teil2_Lisa.pptx
+++ b/5_seminar/Contents_Part_02/slides/Präsentation_Teil2_Lisa.pptx
@@ -5,7 +5,7 @@
     <p:sldMasterId id="2147483648" r:id="rId1"/>
   </p:sldMasterIdLst>
   <p:notesMasterIdLst>
-    <p:notesMasterId r:id="rId36"/>
+    <p:notesMasterId r:id="rId41"/>
   </p:notesMasterIdLst>
   <p:sldIdLst>
     <p:sldId id="303" r:id="rId2"/>
@@ -39,9 +39,14 @@
     <p:sldId id="337" r:id="rId30"/>
     <p:sldId id="339" r:id="rId31"/>
     <p:sldId id="341" r:id="rId32"/>
-    <p:sldId id="324" r:id="rId33"/>
-    <p:sldId id="331" r:id="rId34"/>
-    <p:sldId id="274" r:id="rId35"/>
+    <p:sldId id="343" r:id="rId33"/>
+    <p:sldId id="344" r:id="rId34"/>
+    <p:sldId id="345" r:id="rId35"/>
+    <p:sldId id="346" r:id="rId36"/>
+    <p:sldId id="342" r:id="rId37"/>
+    <p:sldId id="324" r:id="rId38"/>
+    <p:sldId id="331" r:id="rId39"/>
+    <p:sldId id="274" r:id="rId40"/>
   </p:sldIdLst>
   <p:sldSz cx="12192000" cy="6858000"/>
   <p:notesSz cx="6858000" cy="9144000"/>
@@ -230,7 +235,7 @@
           <a:p>
             <a:fld id="{7A5B87F2-13FD-4A24-9F19-39B31C60B536}" type="datetimeFigureOut">
               <a:rPr lang="en-US" smtClean="0"/>
-              <a:t>4/11/2021</a:t>
+              <a:t>4/12/2021</a:t>
             </a:fld>
             <a:endParaRPr lang="en-US"/>
           </a:p>
@@ -2712,7 +2717,108 @@
     </p:spTree>
     <p:extLst>
       <p:ext uri="{BB962C8B-B14F-4D97-AF65-F5344CB8AC3E}">
-        <p14:creationId xmlns:p14="http://schemas.microsoft.com/office/powerpoint/2010/main" val="2610095379"/>
+        <p14:creationId xmlns:p14="http://schemas.microsoft.com/office/powerpoint/2010/main" val="976532664"/>
+      </p:ext>
+    </p:extLst>
+  </p:cSld>
+  <p:clrMapOvr>
+    <a:masterClrMapping/>
+  </p:clrMapOvr>
+</p:notes>
+</file>
+
+<file path=ppt/notesSlides/notesSlide29.xml><?xml version="1.0" encoding="utf-8"?>
+<p:notes xmlns:a="http://schemas.openxmlformats.org/drawingml/2006/main" xmlns:r="http://schemas.openxmlformats.org/officeDocument/2006/relationships" xmlns:p="http://schemas.openxmlformats.org/presentationml/2006/main">
+  <p:cSld>
+    <p:spTree>
+      <p:nvGrpSpPr>
+        <p:cNvPr id="1" name=""/>
+        <p:cNvGrpSpPr/>
+        <p:nvPr/>
+      </p:nvGrpSpPr>
+      <p:grpSpPr>
+        <a:xfrm>
+          <a:off x="0" y="0"/>
+          <a:ext cx="0" cy="0"/>
+          <a:chOff x="0" y="0"/>
+          <a:chExt cx="0" cy="0"/>
+        </a:xfrm>
+      </p:grpSpPr>
+      <p:sp>
+        <p:nvSpPr>
+          <p:cNvPr id="2" name="Folienbildplatzhalter 1"/>
+          <p:cNvSpPr>
+            <a:spLocks noGrp="1" noRot="1" noChangeAspect="1"/>
+          </p:cNvSpPr>
+          <p:nvPr>
+            <p:ph type="sldImg"/>
+          </p:nvPr>
+        </p:nvSpPr>
+        <p:spPr/>
+      </p:sp>
+      <p:sp>
+        <p:nvSpPr>
+          <p:cNvPr id="3" name="Notizenplatzhalter 2"/>
+          <p:cNvSpPr>
+            <a:spLocks noGrp="1"/>
+          </p:cNvSpPr>
+          <p:nvPr>
+            <p:ph type="body" idx="1"/>
+          </p:nvPr>
+        </p:nvSpPr>
+        <p:spPr/>
+        <p:txBody>
+          <a:bodyPr/>
+          <a:lstStyle/>
+          <a:p>
+            <a:pPr marL="0" marR="0" lvl="0" indent="0" algn="l" defTabSz="914400" rtl="0" eaLnBrk="1" fontAlgn="auto" latinLnBrk="0" hangingPunct="1">
+              <a:lnSpc>
+                <a:spcPct val="100000"/>
+              </a:lnSpc>
+              <a:spcBef>
+                <a:spcPts val="0"/>
+              </a:spcBef>
+              <a:spcAft>
+                <a:spcPts val="0"/>
+              </a:spcAft>
+              <a:buClrTx/>
+              <a:buSzTx/>
+              <a:buFontTx/>
+              <a:buNone/>
+              <a:tabLst/>
+              <a:defRPr/>
+            </a:pPr>
+            <a:endParaRPr lang="en-US" b="1"/>
+          </a:p>
+        </p:txBody>
+      </p:sp>
+      <p:sp>
+        <p:nvSpPr>
+          <p:cNvPr id="4" name="Foliennummernplatzhalter 3"/>
+          <p:cNvSpPr>
+            <a:spLocks noGrp="1"/>
+          </p:cNvSpPr>
+          <p:nvPr>
+            <p:ph type="sldNum" sz="quarter" idx="10"/>
+          </p:nvPr>
+        </p:nvSpPr>
+        <p:spPr/>
+        <p:txBody>
+          <a:bodyPr/>
+          <a:lstStyle/>
+          <a:p>
+            <a:fld id="{20A41429-B750-4047-B563-2878417A70E7}" type="slidenum">
+              <a:rPr lang="en-US" smtClean="0"/>
+              <a:t>33</a:t>
+            </a:fld>
+            <a:endParaRPr lang="en-US"/>
+          </a:p>
+        </p:txBody>
+      </p:sp>
+    </p:spTree>
+    <p:extLst>
+      <p:ext uri="{BB962C8B-B14F-4D97-AF65-F5344CB8AC3E}">
+        <p14:creationId xmlns:p14="http://schemas.microsoft.com/office/powerpoint/2010/main" val="1816597872"/>
       </p:ext>
     </p:extLst>
   </p:cSld>
@@ -2846,6 +2952,410 @@
     <p:extLst>
       <p:ext uri="{BB962C8B-B14F-4D97-AF65-F5344CB8AC3E}">
         <p14:creationId xmlns:p14="http://schemas.microsoft.com/office/powerpoint/2010/main" val="3255676386"/>
+      </p:ext>
+    </p:extLst>
+  </p:cSld>
+  <p:clrMapOvr>
+    <a:masterClrMapping/>
+  </p:clrMapOvr>
+</p:notes>
+</file>
+
+<file path=ppt/notesSlides/notesSlide30.xml><?xml version="1.0" encoding="utf-8"?>
+<p:notes xmlns:a="http://schemas.openxmlformats.org/drawingml/2006/main" xmlns:r="http://schemas.openxmlformats.org/officeDocument/2006/relationships" xmlns:p="http://schemas.openxmlformats.org/presentationml/2006/main">
+  <p:cSld>
+    <p:spTree>
+      <p:nvGrpSpPr>
+        <p:cNvPr id="1" name=""/>
+        <p:cNvGrpSpPr/>
+        <p:nvPr/>
+      </p:nvGrpSpPr>
+      <p:grpSpPr>
+        <a:xfrm>
+          <a:off x="0" y="0"/>
+          <a:ext cx="0" cy="0"/>
+          <a:chOff x="0" y="0"/>
+          <a:chExt cx="0" cy="0"/>
+        </a:xfrm>
+      </p:grpSpPr>
+      <p:sp>
+        <p:nvSpPr>
+          <p:cNvPr id="2" name="Folienbildplatzhalter 1"/>
+          <p:cNvSpPr>
+            <a:spLocks noGrp="1" noRot="1" noChangeAspect="1"/>
+          </p:cNvSpPr>
+          <p:nvPr>
+            <p:ph type="sldImg"/>
+          </p:nvPr>
+        </p:nvSpPr>
+        <p:spPr/>
+      </p:sp>
+      <p:sp>
+        <p:nvSpPr>
+          <p:cNvPr id="3" name="Notizenplatzhalter 2"/>
+          <p:cNvSpPr>
+            <a:spLocks noGrp="1"/>
+          </p:cNvSpPr>
+          <p:nvPr>
+            <p:ph type="body" idx="1"/>
+          </p:nvPr>
+        </p:nvSpPr>
+        <p:spPr/>
+        <p:txBody>
+          <a:bodyPr/>
+          <a:lstStyle/>
+          <a:p>
+            <a:pPr marL="0" marR="0" lvl="0" indent="0" algn="l" defTabSz="914400" rtl="0" eaLnBrk="1" fontAlgn="auto" latinLnBrk="0" hangingPunct="1">
+              <a:lnSpc>
+                <a:spcPct val="100000"/>
+              </a:lnSpc>
+              <a:spcBef>
+                <a:spcPts val="0"/>
+              </a:spcBef>
+              <a:spcAft>
+                <a:spcPts val="0"/>
+              </a:spcAft>
+              <a:buClrTx/>
+              <a:buSzTx/>
+              <a:buFontTx/>
+              <a:buNone/>
+              <a:tabLst/>
+              <a:defRPr/>
+            </a:pPr>
+            <a:endParaRPr lang="en-US" b="1"/>
+          </a:p>
+        </p:txBody>
+      </p:sp>
+      <p:sp>
+        <p:nvSpPr>
+          <p:cNvPr id="4" name="Foliennummernplatzhalter 3"/>
+          <p:cNvSpPr>
+            <a:spLocks noGrp="1"/>
+          </p:cNvSpPr>
+          <p:nvPr>
+            <p:ph type="sldNum" sz="quarter" idx="10"/>
+          </p:nvPr>
+        </p:nvSpPr>
+        <p:spPr/>
+        <p:txBody>
+          <a:bodyPr/>
+          <a:lstStyle/>
+          <a:p>
+            <a:fld id="{20A41429-B750-4047-B563-2878417A70E7}" type="slidenum">
+              <a:rPr lang="en-US" smtClean="0"/>
+              <a:t>34</a:t>
+            </a:fld>
+            <a:endParaRPr lang="en-US"/>
+          </a:p>
+        </p:txBody>
+      </p:sp>
+    </p:spTree>
+    <p:extLst>
+      <p:ext uri="{BB962C8B-B14F-4D97-AF65-F5344CB8AC3E}">
+        <p14:creationId xmlns:p14="http://schemas.microsoft.com/office/powerpoint/2010/main" val="3797950139"/>
+      </p:ext>
+    </p:extLst>
+  </p:cSld>
+  <p:clrMapOvr>
+    <a:masterClrMapping/>
+  </p:clrMapOvr>
+</p:notes>
+</file>
+
+<file path=ppt/notesSlides/notesSlide31.xml><?xml version="1.0" encoding="utf-8"?>
+<p:notes xmlns:a="http://schemas.openxmlformats.org/drawingml/2006/main" xmlns:r="http://schemas.openxmlformats.org/officeDocument/2006/relationships" xmlns:p="http://schemas.openxmlformats.org/presentationml/2006/main">
+  <p:cSld>
+    <p:spTree>
+      <p:nvGrpSpPr>
+        <p:cNvPr id="1" name=""/>
+        <p:cNvGrpSpPr/>
+        <p:nvPr/>
+      </p:nvGrpSpPr>
+      <p:grpSpPr>
+        <a:xfrm>
+          <a:off x="0" y="0"/>
+          <a:ext cx="0" cy="0"/>
+          <a:chOff x="0" y="0"/>
+          <a:chExt cx="0" cy="0"/>
+        </a:xfrm>
+      </p:grpSpPr>
+      <p:sp>
+        <p:nvSpPr>
+          <p:cNvPr id="2" name="Folienbildplatzhalter 1"/>
+          <p:cNvSpPr>
+            <a:spLocks noGrp="1" noRot="1" noChangeAspect="1"/>
+          </p:cNvSpPr>
+          <p:nvPr>
+            <p:ph type="sldImg"/>
+          </p:nvPr>
+        </p:nvSpPr>
+        <p:spPr/>
+      </p:sp>
+      <p:sp>
+        <p:nvSpPr>
+          <p:cNvPr id="3" name="Notizenplatzhalter 2"/>
+          <p:cNvSpPr>
+            <a:spLocks noGrp="1"/>
+          </p:cNvSpPr>
+          <p:nvPr>
+            <p:ph type="body" idx="1"/>
+          </p:nvPr>
+        </p:nvSpPr>
+        <p:spPr/>
+        <p:txBody>
+          <a:bodyPr/>
+          <a:lstStyle/>
+          <a:p>
+            <a:pPr marL="0" marR="0" lvl="0" indent="0" algn="l" defTabSz="914400" rtl="0" eaLnBrk="1" fontAlgn="auto" latinLnBrk="0" hangingPunct="1">
+              <a:lnSpc>
+                <a:spcPct val="100000"/>
+              </a:lnSpc>
+              <a:spcBef>
+                <a:spcPts val="0"/>
+              </a:spcBef>
+              <a:spcAft>
+                <a:spcPts val="0"/>
+              </a:spcAft>
+              <a:buClrTx/>
+              <a:buSzTx/>
+              <a:buFontTx/>
+              <a:buNone/>
+              <a:tabLst/>
+              <a:defRPr/>
+            </a:pPr>
+            <a:endParaRPr lang="en-US" b="1"/>
+          </a:p>
+        </p:txBody>
+      </p:sp>
+      <p:sp>
+        <p:nvSpPr>
+          <p:cNvPr id="4" name="Foliennummernplatzhalter 3"/>
+          <p:cNvSpPr>
+            <a:spLocks noGrp="1"/>
+          </p:cNvSpPr>
+          <p:nvPr>
+            <p:ph type="sldNum" sz="quarter" idx="10"/>
+          </p:nvPr>
+        </p:nvSpPr>
+        <p:spPr/>
+        <p:txBody>
+          <a:bodyPr/>
+          <a:lstStyle/>
+          <a:p>
+            <a:fld id="{20A41429-B750-4047-B563-2878417A70E7}" type="slidenum">
+              <a:rPr lang="en-US" smtClean="0"/>
+              <a:t>35</a:t>
+            </a:fld>
+            <a:endParaRPr lang="en-US"/>
+          </a:p>
+        </p:txBody>
+      </p:sp>
+    </p:spTree>
+    <p:extLst>
+      <p:ext uri="{BB962C8B-B14F-4D97-AF65-F5344CB8AC3E}">
+        <p14:creationId xmlns:p14="http://schemas.microsoft.com/office/powerpoint/2010/main" val="212170600"/>
+      </p:ext>
+    </p:extLst>
+  </p:cSld>
+  <p:clrMapOvr>
+    <a:masterClrMapping/>
+  </p:clrMapOvr>
+</p:notes>
+</file>
+
+<file path=ppt/notesSlides/notesSlide32.xml><?xml version="1.0" encoding="utf-8"?>
+<p:notes xmlns:a="http://schemas.openxmlformats.org/drawingml/2006/main" xmlns:r="http://schemas.openxmlformats.org/officeDocument/2006/relationships" xmlns:p="http://schemas.openxmlformats.org/presentationml/2006/main">
+  <p:cSld>
+    <p:spTree>
+      <p:nvGrpSpPr>
+        <p:cNvPr id="1" name=""/>
+        <p:cNvGrpSpPr/>
+        <p:nvPr/>
+      </p:nvGrpSpPr>
+      <p:grpSpPr>
+        <a:xfrm>
+          <a:off x="0" y="0"/>
+          <a:ext cx="0" cy="0"/>
+          <a:chOff x="0" y="0"/>
+          <a:chExt cx="0" cy="0"/>
+        </a:xfrm>
+      </p:grpSpPr>
+      <p:sp>
+        <p:nvSpPr>
+          <p:cNvPr id="2" name="Folienbildplatzhalter 1"/>
+          <p:cNvSpPr>
+            <a:spLocks noGrp="1" noRot="1" noChangeAspect="1"/>
+          </p:cNvSpPr>
+          <p:nvPr>
+            <p:ph type="sldImg"/>
+          </p:nvPr>
+        </p:nvSpPr>
+        <p:spPr/>
+      </p:sp>
+      <p:sp>
+        <p:nvSpPr>
+          <p:cNvPr id="3" name="Notizenplatzhalter 2"/>
+          <p:cNvSpPr>
+            <a:spLocks noGrp="1"/>
+          </p:cNvSpPr>
+          <p:nvPr>
+            <p:ph type="body" idx="1"/>
+          </p:nvPr>
+        </p:nvSpPr>
+        <p:spPr/>
+        <p:txBody>
+          <a:bodyPr/>
+          <a:lstStyle/>
+          <a:p>
+            <a:pPr marL="0" marR="0" lvl="0" indent="0" algn="l" defTabSz="914400" rtl="0" eaLnBrk="1" fontAlgn="auto" latinLnBrk="0" hangingPunct="1">
+              <a:lnSpc>
+                <a:spcPct val="100000"/>
+              </a:lnSpc>
+              <a:spcBef>
+                <a:spcPts val="0"/>
+              </a:spcBef>
+              <a:spcAft>
+                <a:spcPts val="0"/>
+              </a:spcAft>
+              <a:buClrTx/>
+              <a:buSzTx/>
+              <a:buFontTx/>
+              <a:buNone/>
+              <a:tabLst/>
+              <a:defRPr/>
+            </a:pPr>
+            <a:endParaRPr lang="en-US" b="1"/>
+          </a:p>
+        </p:txBody>
+      </p:sp>
+      <p:sp>
+        <p:nvSpPr>
+          <p:cNvPr id="4" name="Foliennummernplatzhalter 3"/>
+          <p:cNvSpPr>
+            <a:spLocks noGrp="1"/>
+          </p:cNvSpPr>
+          <p:nvPr>
+            <p:ph type="sldNum" sz="quarter" idx="10"/>
+          </p:nvPr>
+        </p:nvSpPr>
+        <p:spPr/>
+        <p:txBody>
+          <a:bodyPr/>
+          <a:lstStyle/>
+          <a:p>
+            <a:fld id="{20A41429-B750-4047-B563-2878417A70E7}" type="slidenum">
+              <a:rPr lang="en-US" smtClean="0"/>
+              <a:t>36</a:t>
+            </a:fld>
+            <a:endParaRPr lang="en-US"/>
+          </a:p>
+        </p:txBody>
+      </p:sp>
+    </p:spTree>
+    <p:extLst>
+      <p:ext uri="{BB962C8B-B14F-4D97-AF65-F5344CB8AC3E}">
+        <p14:creationId xmlns:p14="http://schemas.microsoft.com/office/powerpoint/2010/main" val="2111269732"/>
+      </p:ext>
+    </p:extLst>
+  </p:cSld>
+  <p:clrMapOvr>
+    <a:masterClrMapping/>
+  </p:clrMapOvr>
+</p:notes>
+</file>
+
+<file path=ppt/notesSlides/notesSlide33.xml><?xml version="1.0" encoding="utf-8"?>
+<p:notes xmlns:a="http://schemas.openxmlformats.org/drawingml/2006/main" xmlns:r="http://schemas.openxmlformats.org/officeDocument/2006/relationships" xmlns:p="http://schemas.openxmlformats.org/presentationml/2006/main">
+  <p:cSld>
+    <p:spTree>
+      <p:nvGrpSpPr>
+        <p:cNvPr id="1" name=""/>
+        <p:cNvGrpSpPr/>
+        <p:nvPr/>
+      </p:nvGrpSpPr>
+      <p:grpSpPr>
+        <a:xfrm>
+          <a:off x="0" y="0"/>
+          <a:ext cx="0" cy="0"/>
+          <a:chOff x="0" y="0"/>
+          <a:chExt cx="0" cy="0"/>
+        </a:xfrm>
+      </p:grpSpPr>
+      <p:sp>
+        <p:nvSpPr>
+          <p:cNvPr id="2" name="Folienbildplatzhalter 1"/>
+          <p:cNvSpPr>
+            <a:spLocks noGrp="1" noRot="1" noChangeAspect="1"/>
+          </p:cNvSpPr>
+          <p:nvPr>
+            <p:ph type="sldImg"/>
+          </p:nvPr>
+        </p:nvSpPr>
+        <p:spPr/>
+      </p:sp>
+      <p:sp>
+        <p:nvSpPr>
+          <p:cNvPr id="3" name="Notizenplatzhalter 2"/>
+          <p:cNvSpPr>
+            <a:spLocks noGrp="1"/>
+          </p:cNvSpPr>
+          <p:nvPr>
+            <p:ph type="body" idx="1"/>
+          </p:nvPr>
+        </p:nvSpPr>
+        <p:spPr/>
+        <p:txBody>
+          <a:bodyPr/>
+          <a:lstStyle/>
+          <a:p>
+            <a:pPr marL="0" marR="0" lvl="0" indent="0" algn="l" defTabSz="914400" rtl="0" eaLnBrk="1" fontAlgn="auto" latinLnBrk="0" hangingPunct="1">
+              <a:lnSpc>
+                <a:spcPct val="100000"/>
+              </a:lnSpc>
+              <a:spcBef>
+                <a:spcPts val="0"/>
+              </a:spcBef>
+              <a:spcAft>
+                <a:spcPts val="0"/>
+              </a:spcAft>
+              <a:buClrTx/>
+              <a:buSzTx/>
+              <a:buFontTx/>
+              <a:buNone/>
+              <a:tabLst/>
+              <a:defRPr/>
+            </a:pPr>
+            <a:endParaRPr lang="en-US" b="1"/>
+          </a:p>
+        </p:txBody>
+      </p:sp>
+      <p:sp>
+        <p:nvSpPr>
+          <p:cNvPr id="4" name="Foliennummernplatzhalter 3"/>
+          <p:cNvSpPr>
+            <a:spLocks noGrp="1"/>
+          </p:cNvSpPr>
+          <p:nvPr>
+            <p:ph type="sldNum" sz="quarter" idx="10"/>
+          </p:nvPr>
+        </p:nvSpPr>
+        <p:spPr/>
+        <p:txBody>
+          <a:bodyPr/>
+          <a:lstStyle/>
+          <a:p>
+            <a:fld id="{20A41429-B750-4047-B563-2878417A70E7}" type="slidenum">
+              <a:rPr lang="en-US" smtClean="0"/>
+              <a:t>37</a:t>
+            </a:fld>
+            <a:endParaRPr lang="en-US"/>
+          </a:p>
+        </p:txBody>
+      </p:sp>
+    </p:spTree>
+    <p:extLst>
+      <p:ext uri="{BB962C8B-B14F-4D97-AF65-F5344CB8AC3E}">
+        <p14:creationId xmlns:p14="http://schemas.microsoft.com/office/powerpoint/2010/main" val="2610095379"/>
       </p:ext>
     </p:extLst>
   </p:cSld>
@@ -3745,7 +4255,7 @@
           <a:p>
             <a:fld id="{5A1811BA-6AD9-41A7-B7A2-456C8523519C}" type="datetime1">
               <a:rPr lang="en-US" smtClean="0"/>
-              <a:t>4/11/2021</a:t>
+              <a:t>4/12/2021</a:t>
             </a:fld>
             <a:endParaRPr lang="en-US"/>
           </a:p>
@@ -3915,7 +4425,7 @@
           <a:p>
             <a:fld id="{B0494441-C196-4BB0-93EE-AF22360207AB}" type="datetime1">
               <a:rPr lang="en-US" smtClean="0"/>
-              <a:t>4/11/2021</a:t>
+              <a:t>4/12/2021</a:t>
             </a:fld>
             <a:endParaRPr lang="en-US"/>
           </a:p>
@@ -4095,7 +4605,7 @@
           <a:p>
             <a:fld id="{D7B9282B-C3CE-4F56-8DD1-5349F982F1D2}" type="datetime1">
               <a:rPr lang="en-US" smtClean="0"/>
-              <a:t>4/11/2021</a:t>
+              <a:t>4/12/2021</a:t>
             </a:fld>
             <a:endParaRPr lang="en-US"/>
           </a:p>
@@ -4265,7 +4775,7 @@
           <a:p>
             <a:fld id="{E6E86D6A-786F-4E85-AF3B-385015383ABA}" type="datetime1">
               <a:rPr lang="en-US" smtClean="0"/>
-              <a:t>4/11/2021</a:t>
+              <a:t>4/12/2021</a:t>
             </a:fld>
             <a:endParaRPr lang="en-US"/>
           </a:p>
@@ -4511,7 +5021,7 @@
           <a:p>
             <a:fld id="{051FFEB0-9C80-4A34-A5C7-72D52D52FC7D}" type="datetime1">
               <a:rPr lang="en-US" smtClean="0"/>
-              <a:t>4/11/2021</a:t>
+              <a:t>4/12/2021</a:t>
             </a:fld>
             <a:endParaRPr lang="en-US"/>
           </a:p>
@@ -4743,7 +5253,7 @@
           <a:p>
             <a:fld id="{084267AD-C299-471B-ABA1-D0EA94C7EDCF}" type="datetime1">
               <a:rPr lang="en-US" smtClean="0"/>
-              <a:t>4/11/2021</a:t>
+              <a:t>4/12/2021</a:t>
             </a:fld>
             <a:endParaRPr lang="en-US"/>
           </a:p>
@@ -5110,7 +5620,7 @@
           <a:p>
             <a:fld id="{6468DBC7-10F8-46A1-8CE1-DBB0A6F0EF3E}" type="datetime1">
               <a:rPr lang="en-US" smtClean="0"/>
-              <a:t>4/11/2021</a:t>
+              <a:t>4/12/2021</a:t>
             </a:fld>
             <a:endParaRPr lang="en-US"/>
           </a:p>
@@ -5228,7 +5738,7 @@
           <a:p>
             <a:fld id="{0A97ED80-8DDA-43A7-A78F-B0542D691D0E}" type="datetime1">
               <a:rPr lang="en-US" smtClean="0"/>
-              <a:t>4/11/2021</a:t>
+              <a:t>4/12/2021</a:t>
             </a:fld>
             <a:endParaRPr lang="en-US"/>
           </a:p>
@@ -5323,7 +5833,7 @@
           <a:p>
             <a:fld id="{0AF827E6-45BA-40D2-98F2-BE4FFF095577}" type="datetime1">
               <a:rPr lang="en-US" smtClean="0"/>
-              <a:t>4/11/2021</a:t>
+              <a:t>4/12/2021</a:t>
             </a:fld>
             <a:endParaRPr lang="en-US"/>
           </a:p>
@@ -5600,7 +6110,7 @@
           <a:p>
             <a:fld id="{42BD114C-22EA-4B1A-A45B-ED6465C7BB4E}" type="datetime1">
               <a:rPr lang="en-US" smtClean="0"/>
-              <a:t>4/11/2021</a:t>
+              <a:t>4/12/2021</a:t>
             </a:fld>
             <a:endParaRPr lang="en-US"/>
           </a:p>
@@ -5853,7 +6363,7 @@
           <a:p>
             <a:fld id="{F46F8903-38BE-4FD8-98FC-E4EF771B2D8C}" type="datetime1">
               <a:rPr lang="en-US" smtClean="0"/>
-              <a:t>4/11/2021</a:t>
+              <a:t>4/12/2021</a:t>
             </a:fld>
             <a:endParaRPr lang="en-US"/>
           </a:p>
@@ -6066,7 +6576,7 @@
           <a:p>
             <a:fld id="{A91AC8C7-9CA9-4E83-8CE3-AD3BE4150B39}" type="datetime1">
               <a:rPr lang="en-US" smtClean="0"/>
-              <a:t>4/11/2021</a:t>
+              <a:t>4/12/2021</a:t>
             </a:fld>
             <a:endParaRPr lang="en-US"/>
           </a:p>
@@ -14056,64 +14566,6 @@
           </a:prstGeom>
         </p:spPr>
       </p:pic>
-      <p:sp>
-        <p:nvSpPr>
-          <p:cNvPr id="11" name="Rectangle 10">
-            <a:extLst>
-              <a:ext uri="{FF2B5EF4-FFF2-40B4-BE49-F238E27FC236}">
-                <a16:creationId xmlns:a16="http://schemas.microsoft.com/office/drawing/2014/main" id="{F1589F71-999D-4CF0-88E5-29F808D3EF06}"/>
-              </a:ext>
-            </a:extLst>
-          </p:cNvPr>
-          <p:cNvSpPr/>
-          <p:nvPr/>
-        </p:nvSpPr>
-        <p:spPr>
-          <a:xfrm>
-            <a:off x="4827104" y="0"/>
-            <a:ext cx="7364896" cy="914400"/>
-          </a:xfrm>
-          <a:prstGeom prst="rect">
-            <a:avLst/>
-          </a:prstGeom>
-          <a:solidFill>
-            <a:schemeClr val="accent2"/>
-          </a:solidFill>
-          <a:ln>
-            <a:solidFill>
-              <a:schemeClr val="accent2"/>
-            </a:solidFill>
-          </a:ln>
-        </p:spPr>
-        <p:style>
-          <a:lnRef idx="2">
-            <a:schemeClr val="accent1">
-              <a:shade val="50000"/>
-            </a:schemeClr>
-          </a:lnRef>
-          <a:fillRef idx="1">
-            <a:schemeClr val="accent1"/>
-          </a:fillRef>
-          <a:effectRef idx="0">
-            <a:schemeClr val="accent1"/>
-          </a:effectRef>
-          <a:fontRef idx="minor">
-            <a:schemeClr val="lt1"/>
-          </a:fontRef>
-        </p:style>
-        <p:txBody>
-          <a:bodyPr rtlCol="0" anchor="ctr"/>
-          <a:lstStyle/>
-          <a:p>
-            <a:pPr algn="ctr"/>
-            <a:r>
-              <a:rPr lang="de-DE"/>
-              <a:t>demo aufsetzen</a:t>
-            </a:r>
-            <a:endParaRPr lang="en-US"/>
-          </a:p>
-        </p:txBody>
-      </p:sp>
     </p:spTree>
     <p:extLst>
       <p:ext uri="{BB962C8B-B14F-4D97-AF65-F5344CB8AC3E}">
@@ -14590,35 +15042,22 @@
             <a:pPr lvl="1"/>
             <a:r>
               <a:rPr lang="en-US"/>
-              <a:t>Hashtags and emojis</a:t>
-            </a:r>
-          </a:p>
-          <a:p>
-            <a:pPr lvl="2"/>
+              <a:t>Negations, intensifications, punctuations, repetitions</a:t>
+            </a:r>
+          </a:p>
+          <a:p>
+            <a:pPr lvl="1"/>
             <a:r>
               <a:rPr lang="en-US"/>
-              <a:t>Presence / absence</a:t>
-            </a:r>
-          </a:p>
-          <a:p>
-            <a:pPr lvl="2"/>
+              <a:t>Word / character </a:t>
+            </a:r>
+            <a:r>
+              <a:rPr lang="en-US" i="1"/>
+              <a:t>n</a:t>
+            </a:r>
             <a:r>
               <a:rPr lang="en-US"/>
-              <a:t>If possible, polarity</a:t>
-            </a:r>
-          </a:p>
-          <a:p>
-            <a:pPr lvl="1"/>
-            <a:r>
-              <a:rPr lang="en-US"/>
-              <a:t>Negations, intensifications, punctuations, repetitions</a:t>
-            </a:r>
-          </a:p>
-          <a:p>
-            <a:pPr lvl="1"/>
-            <a:r>
-              <a:rPr lang="en-US"/>
-              <a:t>Word / character n-grams</a:t>
+              <a:t>-grams</a:t>
             </a:r>
           </a:p>
           <a:p>
@@ -14626,6 +15065,13 @@
             <a:r>
               <a:rPr lang="en-US"/>
               <a:t>Part-of-speech (POS) tags</a:t>
+            </a:r>
+          </a:p>
+          <a:p>
+            <a:pPr lvl="1"/>
+            <a:r>
+              <a:rPr lang="en-US"/>
+              <a:t>Twitter-specific features</a:t>
             </a:r>
             <a:br>
               <a:rPr lang="en-US"/>
@@ -14773,85 +15219,55 @@
           <a:p>
             <a:r>
               <a:rPr lang="en-US" b="1"/>
-              <a:t>Useful (static) features in sentiment analysis</a:t>
-            </a:r>
-            <a:endParaRPr lang="en-US" b="1" i="1">
-              <a:solidFill>
-                <a:srgbClr val="33CCFF"/>
-              </a:solidFill>
-            </a:endParaRPr>
+              <a:t>Polarity clues</a:t>
+            </a:r>
           </a:p>
           <a:p>
             <a:pPr lvl="1"/>
             <a:r>
+              <a:rPr lang="en-US" b="1"/>
+              <a:t>Idea</a:t>
+            </a:r>
+            <a:r>
               <a:rPr lang="en-US"/>
-              <a:t>Polarity clues</a:t>
+              <a:t>: find sentiment-bearing tokens</a:t>
             </a:r>
           </a:p>
           <a:p>
             <a:pPr lvl="1"/>
             <a:r>
+              <a:rPr lang="en-US" b="1"/>
+              <a:t>Details</a:t>
+            </a:r>
+            <a:r>
               <a:rPr lang="en-US"/>
-              <a:t>Hashtags and emojis</a:t>
+              <a:t>:</a:t>
             </a:r>
           </a:p>
           <a:p>
             <a:pPr lvl="2"/>
             <a:r>
               <a:rPr lang="en-US"/>
-              <a:t>Presence / absence</a:t>
+              <a:t>Presence/absence or count</a:t>
             </a:r>
           </a:p>
           <a:p>
             <a:pPr lvl="2"/>
             <a:r>
               <a:rPr lang="en-US"/>
-              <a:t>If possible, polarity</a:t>
+              <a:t>Positive/negative, positive/negative/neutral, more fine-grained emotions, ...</a:t>
             </a:r>
           </a:p>
           <a:p>
             <a:pPr lvl="1"/>
             <a:r>
+              <a:rPr lang="en-US" b="1"/>
+              <a:t>Computation</a:t>
+            </a:r>
+            <a:r>
               <a:rPr lang="en-US"/>
-              <a:t>Negations, intensifications, punctuations, repetitions</a:t>
-            </a:r>
-          </a:p>
-          <a:p>
-            <a:pPr lvl="1"/>
-            <a:r>
-              <a:rPr lang="en-US"/>
-              <a:t>Word / character n-grams</a:t>
-            </a:r>
-          </a:p>
-          <a:p>
-            <a:pPr lvl="1"/>
-            <a:r>
-              <a:rPr lang="en-US"/>
-              <a:t>Part-of-speech (POS) tags</a:t>
-            </a:r>
-            <a:br>
-              <a:rPr lang="en-US"/>
-            </a:br>
-            <a:endParaRPr lang="en-US"/>
-          </a:p>
-          <a:p>
-            <a:r>
-              <a:rPr lang="en-US" b="1"/>
-              <a:t>Recall our goal: </a:t>
-            </a:r>
-            <a:r>
-              <a:rPr lang="en-US"/>
-              <a:t>numeric </a:t>
-            </a:r>
-            <a:r>
-              <a:rPr lang="en-US">
-                <a:sym typeface="Symbol" panose="05050102010706020507" pitchFamily="18" charset="2"/>
-              </a:rPr>
-              <a:t>representation of texts by tokens that co-occur across documents</a:t>
-            </a:r>
-          </a:p>
-          <a:p>
-            <a:endParaRPr lang="en-US"/>
+              <a:t>: look-up using publicly available dictionaries</a:t>
+            </a:r>
           </a:p>
         </p:txBody>
       </p:sp>
@@ -14917,59 +15333,147 @@
       </p:sp>
       <p:sp>
         <p:nvSpPr>
-          <p:cNvPr id="5" name="Rectangle 4">
+          <p:cNvPr id="6" name="TextBox 5">
             <a:extLst>
               <a:ext uri="{FF2B5EF4-FFF2-40B4-BE49-F238E27FC236}">
-                <a16:creationId xmlns:a16="http://schemas.microsoft.com/office/drawing/2014/main" id="{DD45DA9A-3659-4201-8633-5A0A565F1544}"/>
+                <a16:creationId xmlns:a16="http://schemas.microsoft.com/office/drawing/2014/main" id="{6A051408-D768-4246-AE54-87B55596D4D3}"/>
               </a:ext>
             </a:extLst>
           </p:cNvPr>
-          <p:cNvSpPr/>
+          <p:cNvSpPr txBox="1"/>
           <p:nvPr/>
         </p:nvSpPr>
         <p:spPr>
           <a:xfrm>
-            <a:off x="4827104" y="0"/>
-            <a:ext cx="7364896" cy="914400"/>
+            <a:off x="8228112" y="4590758"/>
+            <a:ext cx="3125686" cy="461665"/>
           </a:xfrm>
           <a:prstGeom prst="rect">
             <a:avLst/>
           </a:prstGeom>
-          <a:solidFill>
-            <a:schemeClr val="accent2"/>
-          </a:solidFill>
-          <a:ln>
-            <a:solidFill>
-              <a:schemeClr val="accent2"/>
-            </a:solidFill>
-          </a:ln>
+          <a:noFill/>
         </p:spPr>
-        <p:style>
-          <a:lnRef idx="2">
-            <a:schemeClr val="accent1">
-              <a:shade val="50000"/>
-            </a:schemeClr>
-          </a:lnRef>
-          <a:fillRef idx="1">
-            <a:schemeClr val="accent1"/>
-          </a:fillRef>
-          <a:effectRef idx="0">
-            <a:schemeClr val="accent1"/>
-          </a:effectRef>
-          <a:fontRef idx="minor">
-            <a:schemeClr val="lt1"/>
-          </a:fontRef>
-        </p:style>
-        <p:txBody>
-          <a:bodyPr rtlCol="0" anchor="ctr"/>
-          <a:lstStyle/>
-          <a:p>
-            <a:pPr algn="ctr"/>
-            <a:r>
-              <a:rPr lang="de-DE"/>
-              <a:t>details zu jeweiligem feature typ</a:t>
-            </a:r>
-            <a:endParaRPr lang="en-US"/>
+        <p:txBody>
+          <a:bodyPr wrap="square">
+            <a:spAutoFit/>
+          </a:bodyPr>
+          <a:lstStyle/>
+          <a:p>
+            <a:r>
+              <a:rPr lang="en-US" sz="2400" i="1"/>
+              <a:t>if useful: modify/enrich</a:t>
+            </a:r>
+          </a:p>
+        </p:txBody>
+      </p:sp>
+      <p:pic>
+        <p:nvPicPr>
+          <p:cNvPr id="8" name="Graphic 7" descr="Back with solid fill">
+            <a:extLst>
+              <a:ext uri="{FF2B5EF4-FFF2-40B4-BE49-F238E27FC236}">
+                <a16:creationId xmlns:a16="http://schemas.microsoft.com/office/drawing/2014/main" id="{2E1C229E-13FE-437D-9144-127C09E9FC0D}"/>
+              </a:ext>
+            </a:extLst>
+          </p:cNvPr>
+          <p:cNvPicPr>
+            <a:picLocks noChangeAspect="1"/>
+          </p:cNvPicPr>
+          <p:nvPr/>
+        </p:nvPicPr>
+        <p:blipFill>
+          <a:blip r:embed="rId3">
+            <a:extLst>
+              <a:ext uri="{28A0092B-C50C-407E-A947-70E740481C1C}">
+                <a14:useLocalDpi xmlns:a14="http://schemas.microsoft.com/office/drawing/2010/main" val="0"/>
+              </a:ext>
+              <a:ext uri="{96DAC541-7B7A-43D3-8B79-37D633B846F1}">
+                <asvg:svgBlip xmlns:asvg="http://schemas.microsoft.com/office/drawing/2016/SVG/main" r:embed="rId4"/>
+              </a:ext>
+            </a:extLst>
+          </a:blip>
+          <a:stretch>
+            <a:fillRect/>
+          </a:stretch>
+        </p:blipFill>
+        <p:spPr>
+          <a:xfrm flipH="1" flipV="1">
+            <a:off x="7205271" y="4348443"/>
+            <a:ext cx="757629" cy="946296"/>
+          </a:xfrm>
+          <a:prstGeom prst="rect">
+            <a:avLst/>
+          </a:prstGeom>
+        </p:spPr>
+      </p:pic>
+      <p:sp>
+        <p:nvSpPr>
+          <p:cNvPr id="9" name="TextBox 8">
+            <a:extLst>
+              <a:ext uri="{FF2B5EF4-FFF2-40B4-BE49-F238E27FC236}">
+                <a16:creationId xmlns:a16="http://schemas.microsoft.com/office/drawing/2014/main" id="{815491E0-AD06-416D-AC86-C855E2E601E4}"/>
+              </a:ext>
+            </a:extLst>
+          </p:cNvPr>
+          <p:cNvSpPr txBox="1"/>
+          <p:nvPr/>
+        </p:nvSpPr>
+        <p:spPr>
+          <a:xfrm>
+            <a:off x="1066795" y="5834811"/>
+            <a:ext cx="9648830" cy="461665"/>
+          </a:xfrm>
+          <a:prstGeom prst="rect">
+            <a:avLst/>
+          </a:prstGeom>
+          <a:noFill/>
+        </p:spPr>
+        <p:txBody>
+          <a:bodyPr wrap="square">
+            <a:spAutoFit/>
+          </a:bodyPr>
+          <a:lstStyle/>
+          <a:p>
+            <a:r>
+              <a:rPr lang="en-US" sz="2400"/>
+              <a:t>What a </a:t>
+            </a:r>
+            <a:r>
+              <a:rPr lang="en-US" sz="2400" b="1">
+                <a:solidFill>
+                  <a:srgbClr val="33CCFF"/>
+                </a:solidFill>
+              </a:rPr>
+              <a:t>despicable</a:t>
+            </a:r>
+            <a:r>
+              <a:rPr lang="en-US" sz="2400"/>
+              <a:t> thing to do, I </a:t>
+            </a:r>
+            <a:r>
+              <a:rPr lang="en-US" sz="2400" b="1">
+                <a:solidFill>
+                  <a:srgbClr val="33CCFF"/>
+                </a:solidFill>
+              </a:rPr>
+              <a:t>hate</a:t>
+            </a:r>
+            <a:r>
+              <a:rPr lang="en-US" sz="2400"/>
+              <a:t> him!</a:t>
+            </a:r>
+            <a:r>
+              <a:rPr lang="en-US" sz="2400">
+                <a:sym typeface="Symbol" panose="05050102010706020507" pitchFamily="18" charset="2"/>
+              </a:rPr>
+              <a:t>    </a:t>
+            </a:r>
+            <a:r>
+              <a:rPr lang="en-US" sz="2400" i="1">
+                <a:sym typeface="Symbol" panose="05050102010706020507" pitchFamily="18" charset="2"/>
+              </a:rPr>
+              <a:t>positive: 0, negative: 2</a:t>
+            </a:r>
+            <a:endParaRPr lang="en-US" sz="2400" i="1"/>
           </a:p>
         </p:txBody>
       </p:sp>
@@ -15005,6 +15509,95 @@
       </p:grpSpPr>
       <p:sp>
         <p:nvSpPr>
+          <p:cNvPr id="7" name="Content Placeholder 2">
+            <a:extLst>
+              <a:ext uri="{FF2B5EF4-FFF2-40B4-BE49-F238E27FC236}">
+                <a16:creationId xmlns:a16="http://schemas.microsoft.com/office/drawing/2014/main" id="{0F324A9E-9392-4545-96A6-95DE3958C6B2}"/>
+              </a:ext>
+            </a:extLst>
+          </p:cNvPr>
+          <p:cNvSpPr>
+            <a:spLocks noGrp="1"/>
+          </p:cNvSpPr>
+          <p:nvPr>
+            <p:ph idx="1"/>
+          </p:nvPr>
+        </p:nvSpPr>
+        <p:spPr>
+          <a:xfrm>
+            <a:off x="1066797" y="1990725"/>
+            <a:ext cx="10287001" cy="4457700"/>
+          </a:xfrm>
+        </p:spPr>
+        <p:txBody>
+          <a:bodyPr>
+            <a:normAutofit/>
+          </a:bodyPr>
+          <a:lstStyle/>
+          <a:p>
+            <a:r>
+              <a:rPr lang="en-US" b="1"/>
+              <a:t>Negations, intensifications, punctuations, repetitions</a:t>
+            </a:r>
+          </a:p>
+          <a:p>
+            <a:pPr lvl="1"/>
+            <a:r>
+              <a:rPr lang="en-US" b="1"/>
+              <a:t>Idea</a:t>
+            </a:r>
+            <a:r>
+              <a:rPr lang="en-US"/>
+              <a:t>: capture meaning modifiers (lost with BOW assumption!)</a:t>
+            </a:r>
+          </a:p>
+          <a:p>
+            <a:pPr lvl="1"/>
+            <a:r>
+              <a:rPr lang="en-US" b="1"/>
+              <a:t>Assumptions</a:t>
+            </a:r>
+            <a:r>
+              <a:rPr lang="en-US"/>
+              <a:t>:</a:t>
+            </a:r>
+          </a:p>
+          <a:p>
+            <a:pPr lvl="2"/>
+            <a:r>
+              <a:rPr lang="en-US"/>
+              <a:t>Negations might flip sentiments.</a:t>
+            </a:r>
+          </a:p>
+          <a:p>
+            <a:pPr lvl="2"/>
+            <a:r>
+              <a:rPr lang="en-US"/>
+              <a:t>Intensifications might indicate/strengthen sentiments.</a:t>
+            </a:r>
+          </a:p>
+          <a:p>
+            <a:pPr lvl="2"/>
+            <a:r>
+              <a:rPr lang="en-US"/>
+              <a:t>Punctuations/repetitions might indicate sentiments.</a:t>
+            </a:r>
+          </a:p>
+          <a:p>
+            <a:pPr lvl="1"/>
+            <a:r>
+              <a:rPr lang="en-US" b="1"/>
+              <a:t>Computation</a:t>
+            </a:r>
+            <a:r>
+              <a:rPr lang="en-US"/>
+              <a:t>: look-up using regular expressions</a:t>
+            </a:r>
+          </a:p>
+        </p:txBody>
+      </p:sp>
+      <p:sp>
+        <p:nvSpPr>
           <p:cNvPr id="4" name="Foliennummernplatzhalter 3"/>
           <p:cNvSpPr>
             <a:spLocks noGrp="1"/>
@@ -15021,6 +15614,2107 @@
             <a:fld id="{C9E0B00B-E6DF-4183-A694-3DE28BEFB357}" type="slidenum">
               <a:rPr lang="en-US" smtClean="0"/>
               <a:t>32</a:t>
+            </a:fld>
+            <a:endParaRPr lang="en-US"/>
+          </a:p>
+        </p:txBody>
+      </p:sp>
+      <p:sp>
+        <p:nvSpPr>
+          <p:cNvPr id="12" name="Titel 1">
+            <a:extLst>
+              <a:ext uri="{FF2B5EF4-FFF2-40B4-BE49-F238E27FC236}">
+                <a16:creationId xmlns:a16="http://schemas.microsoft.com/office/drawing/2014/main" id="{478EA67A-3C39-4D0A-996A-C363F30A14B2}"/>
+              </a:ext>
+            </a:extLst>
+          </p:cNvPr>
+          <p:cNvSpPr>
+            <a:spLocks noGrp="1"/>
+          </p:cNvSpPr>
+          <p:nvPr>
+            <p:ph type="title"/>
+          </p:nvPr>
+        </p:nvSpPr>
+        <p:spPr>
+          <a:xfrm>
+            <a:off x="1066800" y="561524"/>
+            <a:ext cx="10287000" cy="1129164"/>
+          </a:xfrm>
+        </p:spPr>
+        <p:txBody>
+          <a:bodyPr/>
+          <a:lstStyle/>
+          <a:p>
+            <a:r>
+              <a:rPr lang="en-US"/>
+              <a:t>Static Feature Extraction  </a:t>
+            </a:r>
+            <a:r>
+              <a:rPr lang="en-US" b="1"/>
+              <a:t>Features</a:t>
+            </a:r>
+          </a:p>
+        </p:txBody>
+      </p:sp>
+      <p:sp>
+        <p:nvSpPr>
+          <p:cNvPr id="9" name="TextBox 8">
+            <a:extLst>
+              <a:ext uri="{FF2B5EF4-FFF2-40B4-BE49-F238E27FC236}">
+                <a16:creationId xmlns:a16="http://schemas.microsoft.com/office/drawing/2014/main" id="{815491E0-AD06-416D-AC86-C855E2E601E4}"/>
+              </a:ext>
+            </a:extLst>
+          </p:cNvPr>
+          <p:cNvSpPr txBox="1"/>
+          <p:nvPr/>
+        </p:nvSpPr>
+        <p:spPr>
+          <a:xfrm>
+            <a:off x="1066794" y="5834811"/>
+            <a:ext cx="10286999" cy="461665"/>
+          </a:xfrm>
+          <a:prstGeom prst="rect">
+            <a:avLst/>
+          </a:prstGeom>
+          <a:noFill/>
+        </p:spPr>
+        <p:txBody>
+          <a:bodyPr wrap="square">
+            <a:spAutoFit/>
+          </a:bodyPr>
+          <a:lstStyle/>
+          <a:p>
+            <a:r>
+              <a:rPr lang="en-US" sz="2400"/>
+              <a:t>A </a:t>
+            </a:r>
+            <a:r>
+              <a:rPr lang="en-US" sz="2400" b="1">
+                <a:solidFill>
+                  <a:srgbClr val="33CCFF"/>
+                </a:solidFill>
+              </a:rPr>
+              <a:t>truly</a:t>
+            </a:r>
+            <a:r>
+              <a:rPr lang="en-US" sz="2400"/>
+              <a:t> grand and </a:t>
+            </a:r>
+            <a:r>
+              <a:rPr lang="en-US" sz="2400" b="1">
+                <a:solidFill>
+                  <a:srgbClr val="33CCFF"/>
+                </a:solidFill>
+              </a:rPr>
+              <a:t>deeply</a:t>
+            </a:r>
+            <a:r>
+              <a:rPr lang="en-US" sz="2400"/>
+              <a:t> moving plot. </a:t>
+            </a:r>
+          </a:p>
+        </p:txBody>
+      </p:sp>
+      <p:sp>
+        <p:nvSpPr>
+          <p:cNvPr id="13" name="TextBox 12">
+            <a:extLst>
+              <a:ext uri="{FF2B5EF4-FFF2-40B4-BE49-F238E27FC236}">
+                <a16:creationId xmlns:a16="http://schemas.microsoft.com/office/drawing/2014/main" id="{0DB36A47-4920-4A6B-90A8-8413D6615838}"/>
+              </a:ext>
+            </a:extLst>
+          </p:cNvPr>
+          <p:cNvSpPr txBox="1"/>
+          <p:nvPr/>
+        </p:nvSpPr>
+        <p:spPr>
+          <a:xfrm>
+            <a:off x="1066795" y="5444435"/>
+            <a:ext cx="10287000" cy="461665"/>
+          </a:xfrm>
+          <a:prstGeom prst="rect">
+            <a:avLst/>
+          </a:prstGeom>
+          <a:noFill/>
+        </p:spPr>
+        <p:txBody>
+          <a:bodyPr wrap="square">
+            <a:spAutoFit/>
+          </a:bodyPr>
+          <a:lstStyle/>
+          <a:p>
+            <a:r>
+              <a:rPr lang="en-US" sz="2400"/>
+              <a:t>I </a:t>
+            </a:r>
+            <a:r>
+              <a:rPr lang="en-US" sz="2400" b="1">
+                <a:solidFill>
+                  <a:srgbClr val="33CCFF"/>
+                </a:solidFill>
+              </a:rPr>
+              <a:t>cannot</a:t>
+            </a:r>
+            <a:r>
+              <a:rPr lang="en-US" sz="2400"/>
+              <a:t> recommend this movie</a:t>
+            </a:r>
+            <a:r>
+              <a:rPr lang="en-US" sz="2400" b="1">
+                <a:solidFill>
+                  <a:srgbClr val="33CCFF"/>
+                </a:solidFill>
+              </a:rPr>
+              <a:t>......</a:t>
+            </a:r>
+            <a:r>
+              <a:rPr lang="en-US" sz="2400"/>
+              <a:t>   </a:t>
+            </a:r>
+            <a:endParaRPr lang="en-US" sz="2400" i="1"/>
+          </a:p>
+        </p:txBody>
+      </p:sp>
+    </p:spTree>
+    <p:extLst>
+      <p:ext uri="{BB962C8B-B14F-4D97-AF65-F5344CB8AC3E}">
+        <p14:creationId xmlns:p14="http://schemas.microsoft.com/office/powerpoint/2010/main" val="356177311"/>
+      </p:ext>
+    </p:extLst>
+  </p:cSld>
+  <p:clrMapOvr>
+    <a:masterClrMapping/>
+  </p:clrMapOvr>
+</p:sld>
+</file>
+
+<file path=ppt/slides/slide33.xml><?xml version="1.0" encoding="utf-8"?>
+<p:sld xmlns:a="http://schemas.openxmlformats.org/drawingml/2006/main" xmlns:r="http://schemas.openxmlformats.org/officeDocument/2006/relationships" xmlns:p="http://schemas.openxmlformats.org/presentationml/2006/main">
+  <p:cSld>
+    <p:spTree>
+      <p:nvGrpSpPr>
+        <p:cNvPr id="1" name=""/>
+        <p:cNvGrpSpPr/>
+        <p:nvPr/>
+      </p:nvGrpSpPr>
+      <p:grpSpPr>
+        <a:xfrm>
+          <a:off x="0" y="0"/>
+          <a:ext cx="0" cy="0"/>
+          <a:chOff x="0" y="0"/>
+          <a:chExt cx="0" cy="0"/>
+        </a:xfrm>
+      </p:grpSpPr>
+      <p:sp>
+        <p:nvSpPr>
+          <p:cNvPr id="7" name="Content Placeholder 2">
+            <a:extLst>
+              <a:ext uri="{FF2B5EF4-FFF2-40B4-BE49-F238E27FC236}">
+                <a16:creationId xmlns:a16="http://schemas.microsoft.com/office/drawing/2014/main" id="{0F324A9E-9392-4545-96A6-95DE3958C6B2}"/>
+              </a:ext>
+            </a:extLst>
+          </p:cNvPr>
+          <p:cNvSpPr>
+            <a:spLocks noGrp="1"/>
+          </p:cNvSpPr>
+          <p:nvPr>
+            <p:ph idx="1"/>
+          </p:nvPr>
+        </p:nvSpPr>
+        <p:spPr>
+          <a:xfrm>
+            <a:off x="1066797" y="1990725"/>
+            <a:ext cx="10287001" cy="4457700"/>
+          </a:xfrm>
+        </p:spPr>
+        <p:txBody>
+          <a:bodyPr>
+            <a:normAutofit/>
+          </a:bodyPr>
+          <a:lstStyle/>
+          <a:p>
+            <a:r>
+              <a:rPr lang="en-US" b="1"/>
+              <a:t>Word / character </a:t>
+            </a:r>
+            <a:r>
+              <a:rPr lang="en-US" b="1" i="1"/>
+              <a:t>n</a:t>
+            </a:r>
+            <a:r>
+              <a:rPr lang="en-US" b="1"/>
+              <a:t>-grams</a:t>
+            </a:r>
+          </a:p>
+          <a:p>
+            <a:pPr lvl="1"/>
+            <a:r>
+              <a:rPr lang="en-US" b="1"/>
+              <a:t>Idea</a:t>
+            </a:r>
+            <a:r>
+              <a:rPr lang="en-US"/>
+              <a:t>: count general tokens to represent texts </a:t>
+            </a:r>
+          </a:p>
+          <a:p>
+            <a:pPr lvl="1"/>
+            <a:r>
+              <a:rPr lang="en-US" b="1"/>
+              <a:t>Details</a:t>
+            </a:r>
+            <a:r>
+              <a:rPr lang="en-US"/>
+              <a:t>:</a:t>
+            </a:r>
+          </a:p>
+          <a:p>
+            <a:pPr lvl="2"/>
+            <a:r>
+              <a:rPr lang="en-US" i="1"/>
+              <a:t>n</a:t>
+            </a:r>
+            <a:r>
+              <a:rPr lang="en-US"/>
+              <a:t>-gram: sequence of </a:t>
+            </a:r>
+            <a:r>
+              <a:rPr lang="en-US" i="1"/>
+              <a:t>n</a:t>
+            </a:r>
+            <a:r>
+              <a:rPr lang="en-US"/>
+              <a:t> words / characters – somewhat mitigating BOW effect</a:t>
+            </a:r>
+          </a:p>
+          <a:p>
+            <a:pPr lvl="2"/>
+            <a:r>
+              <a:rPr lang="en-US"/>
+              <a:t>Unigrams, bigrams, trigrams, ...</a:t>
+            </a:r>
+          </a:p>
+          <a:p>
+            <a:pPr lvl="2"/>
+            <a:r>
+              <a:rPr lang="en-US"/>
+              <a:t>The larger </a:t>
+            </a:r>
+            <a:r>
+              <a:rPr lang="en-US" i="1"/>
+              <a:t>n</a:t>
+            </a:r>
+            <a:r>
+              <a:rPr lang="en-US"/>
+              <a:t>, the lower the probability of </a:t>
+            </a:r>
+            <a:r>
+              <a:rPr lang="en-US" i="1"/>
+              <a:t>n</a:t>
+            </a:r>
+            <a:r>
+              <a:rPr lang="en-US"/>
+              <a:t>-grams occurring in multiple documents</a:t>
+            </a:r>
+          </a:p>
+          <a:p>
+            <a:pPr lvl="1"/>
+            <a:r>
+              <a:rPr lang="en-US" b="1"/>
+              <a:t>Computation</a:t>
+            </a:r>
+            <a:r>
+              <a:rPr lang="en-US"/>
+              <a:t>: count using available functionalities (e.g., in </a:t>
+            </a:r>
+            <a:r>
+              <a:rPr lang="en-US">
+                <a:latin typeface="Consolas" panose="020B0609020204030204" pitchFamily="49" charset="0"/>
+              </a:rPr>
+              <a:t>quanteda</a:t>
+            </a:r>
+            <a:r>
+              <a:rPr lang="en-US"/>
+              <a:t>)</a:t>
+            </a:r>
+          </a:p>
+        </p:txBody>
+      </p:sp>
+      <p:sp>
+        <p:nvSpPr>
+          <p:cNvPr id="4" name="Foliennummernplatzhalter 3"/>
+          <p:cNvSpPr>
+            <a:spLocks noGrp="1"/>
+          </p:cNvSpPr>
+          <p:nvPr>
+            <p:ph type="sldNum" sz="quarter" idx="12"/>
+          </p:nvPr>
+        </p:nvSpPr>
+        <p:spPr/>
+        <p:txBody>
+          <a:bodyPr/>
+          <a:lstStyle/>
+          <a:p>
+            <a:fld id="{C9E0B00B-E6DF-4183-A694-3DE28BEFB357}" type="slidenum">
+              <a:rPr lang="en-US" smtClean="0"/>
+              <a:t>33</a:t>
+            </a:fld>
+            <a:endParaRPr lang="en-US"/>
+          </a:p>
+        </p:txBody>
+      </p:sp>
+      <p:sp>
+        <p:nvSpPr>
+          <p:cNvPr id="12" name="Titel 1">
+            <a:extLst>
+              <a:ext uri="{FF2B5EF4-FFF2-40B4-BE49-F238E27FC236}">
+                <a16:creationId xmlns:a16="http://schemas.microsoft.com/office/drawing/2014/main" id="{478EA67A-3C39-4D0A-996A-C363F30A14B2}"/>
+              </a:ext>
+            </a:extLst>
+          </p:cNvPr>
+          <p:cNvSpPr>
+            <a:spLocks noGrp="1"/>
+          </p:cNvSpPr>
+          <p:nvPr>
+            <p:ph type="title"/>
+          </p:nvPr>
+        </p:nvSpPr>
+        <p:spPr>
+          <a:xfrm>
+            <a:off x="1066800" y="561524"/>
+            <a:ext cx="10287000" cy="1129164"/>
+          </a:xfrm>
+        </p:spPr>
+        <p:txBody>
+          <a:bodyPr/>
+          <a:lstStyle/>
+          <a:p>
+            <a:r>
+              <a:rPr lang="en-US"/>
+              <a:t>Static Feature Extraction  </a:t>
+            </a:r>
+            <a:r>
+              <a:rPr lang="en-US" b="1"/>
+              <a:t>Features</a:t>
+            </a:r>
+          </a:p>
+        </p:txBody>
+      </p:sp>
+      <p:sp>
+        <p:nvSpPr>
+          <p:cNvPr id="9" name="TextBox 8">
+            <a:extLst>
+              <a:ext uri="{FF2B5EF4-FFF2-40B4-BE49-F238E27FC236}">
+                <a16:creationId xmlns:a16="http://schemas.microsoft.com/office/drawing/2014/main" id="{815491E0-AD06-416D-AC86-C855E2E601E4}"/>
+              </a:ext>
+            </a:extLst>
+          </p:cNvPr>
+          <p:cNvSpPr txBox="1"/>
+          <p:nvPr/>
+        </p:nvSpPr>
+        <p:spPr>
+          <a:xfrm>
+            <a:off x="1066790" y="5105297"/>
+            <a:ext cx="10286999" cy="461665"/>
+          </a:xfrm>
+          <a:prstGeom prst="rect">
+            <a:avLst/>
+          </a:prstGeom>
+          <a:noFill/>
+        </p:spPr>
+        <p:txBody>
+          <a:bodyPr wrap="square">
+            <a:spAutoFit/>
+          </a:bodyPr>
+          <a:lstStyle/>
+          <a:p>
+            <a:r>
+              <a:rPr lang="en-US" sz="2400"/>
+              <a:t>Bello the dog is a good boy.</a:t>
+            </a:r>
+          </a:p>
+        </p:txBody>
+      </p:sp>
+      <p:graphicFrame>
+        <p:nvGraphicFramePr>
+          <p:cNvPr id="2" name="Table 2">
+            <a:extLst>
+              <a:ext uri="{FF2B5EF4-FFF2-40B4-BE49-F238E27FC236}">
+                <a16:creationId xmlns:a16="http://schemas.microsoft.com/office/drawing/2014/main" id="{A0748BC3-949E-4F08-8524-EA8510E6F26F}"/>
+              </a:ext>
+            </a:extLst>
+          </p:cNvPr>
+          <p:cNvGraphicFramePr>
+            <a:graphicFrameLocks noGrp="1"/>
+          </p:cNvGraphicFramePr>
+          <p:nvPr>
+            <p:extLst>
+              <p:ext uri="{D42A27DB-BD31-4B8C-83A1-F6EECF244321}">
+                <p14:modId xmlns:p14="http://schemas.microsoft.com/office/powerpoint/2010/main" val="2021410605"/>
+              </p:ext>
+            </p:extLst>
+          </p:nvPr>
+        </p:nvGraphicFramePr>
+        <p:xfrm>
+          <a:off x="1066781" y="5636167"/>
+          <a:ext cx="10287008" cy="670560"/>
+        </p:xfrm>
+        <a:graphic>
+          <a:graphicData uri="http://schemas.openxmlformats.org/drawingml/2006/table">
+            <a:tbl>
+              <a:tblPr firstRow="1" bandRow="1">
+                <a:tableStyleId>{5940675A-B579-460E-94D1-54222C63F5DA}</a:tableStyleId>
+              </a:tblPr>
+              <a:tblGrid>
+                <a:gridCol w="642938">
+                  <a:extLst>
+                    <a:ext uri="{9D8B030D-6E8A-4147-A177-3AD203B41FA5}">
+                      <a16:colId xmlns:a16="http://schemas.microsoft.com/office/drawing/2014/main" val="2623701309"/>
+                    </a:ext>
+                  </a:extLst>
+                </a:gridCol>
+                <a:gridCol w="642938">
+                  <a:extLst>
+                    <a:ext uri="{9D8B030D-6E8A-4147-A177-3AD203B41FA5}">
+                      <a16:colId xmlns:a16="http://schemas.microsoft.com/office/drawing/2014/main" val="1729904020"/>
+                    </a:ext>
+                  </a:extLst>
+                </a:gridCol>
+                <a:gridCol w="642938">
+                  <a:extLst>
+                    <a:ext uri="{9D8B030D-6E8A-4147-A177-3AD203B41FA5}">
+                      <a16:colId xmlns:a16="http://schemas.microsoft.com/office/drawing/2014/main" val="180927769"/>
+                    </a:ext>
+                  </a:extLst>
+                </a:gridCol>
+                <a:gridCol w="642938">
+                  <a:extLst>
+                    <a:ext uri="{9D8B030D-6E8A-4147-A177-3AD203B41FA5}">
+                      <a16:colId xmlns:a16="http://schemas.microsoft.com/office/drawing/2014/main" val="1243734057"/>
+                    </a:ext>
+                  </a:extLst>
+                </a:gridCol>
+                <a:gridCol w="642938">
+                  <a:extLst>
+                    <a:ext uri="{9D8B030D-6E8A-4147-A177-3AD203B41FA5}">
+                      <a16:colId xmlns:a16="http://schemas.microsoft.com/office/drawing/2014/main" val="1065436770"/>
+                    </a:ext>
+                  </a:extLst>
+                </a:gridCol>
+                <a:gridCol w="642938">
+                  <a:extLst>
+                    <a:ext uri="{9D8B030D-6E8A-4147-A177-3AD203B41FA5}">
+                      <a16:colId xmlns:a16="http://schemas.microsoft.com/office/drawing/2014/main" val="1725686100"/>
+                    </a:ext>
+                  </a:extLst>
+                </a:gridCol>
+                <a:gridCol w="642938">
+                  <a:extLst>
+                    <a:ext uri="{9D8B030D-6E8A-4147-A177-3AD203B41FA5}">
+                      <a16:colId xmlns:a16="http://schemas.microsoft.com/office/drawing/2014/main" val="341384362"/>
+                    </a:ext>
+                  </a:extLst>
+                </a:gridCol>
+                <a:gridCol w="642938">
+                  <a:extLst>
+                    <a:ext uri="{9D8B030D-6E8A-4147-A177-3AD203B41FA5}">
+                      <a16:colId xmlns:a16="http://schemas.microsoft.com/office/drawing/2014/main" val="3576258105"/>
+                    </a:ext>
+                  </a:extLst>
+                </a:gridCol>
+                <a:gridCol w="642938">
+                  <a:extLst>
+                    <a:ext uri="{9D8B030D-6E8A-4147-A177-3AD203B41FA5}">
+                      <a16:colId xmlns:a16="http://schemas.microsoft.com/office/drawing/2014/main" val="3047185337"/>
+                    </a:ext>
+                  </a:extLst>
+                </a:gridCol>
+                <a:gridCol w="642938">
+                  <a:extLst>
+                    <a:ext uri="{9D8B030D-6E8A-4147-A177-3AD203B41FA5}">
+                      <a16:colId xmlns:a16="http://schemas.microsoft.com/office/drawing/2014/main" val="1753347057"/>
+                    </a:ext>
+                  </a:extLst>
+                </a:gridCol>
+                <a:gridCol w="642938">
+                  <a:extLst>
+                    <a:ext uri="{9D8B030D-6E8A-4147-A177-3AD203B41FA5}">
+                      <a16:colId xmlns:a16="http://schemas.microsoft.com/office/drawing/2014/main" val="1905415076"/>
+                    </a:ext>
+                  </a:extLst>
+                </a:gridCol>
+                <a:gridCol w="642938">
+                  <a:extLst>
+                    <a:ext uri="{9D8B030D-6E8A-4147-A177-3AD203B41FA5}">
+                      <a16:colId xmlns:a16="http://schemas.microsoft.com/office/drawing/2014/main" val="1825097257"/>
+                    </a:ext>
+                  </a:extLst>
+                </a:gridCol>
+                <a:gridCol w="642938">
+                  <a:extLst>
+                    <a:ext uri="{9D8B030D-6E8A-4147-A177-3AD203B41FA5}">
+                      <a16:colId xmlns:a16="http://schemas.microsoft.com/office/drawing/2014/main" val="1728392291"/>
+                    </a:ext>
+                  </a:extLst>
+                </a:gridCol>
+                <a:gridCol w="642938">
+                  <a:extLst>
+                    <a:ext uri="{9D8B030D-6E8A-4147-A177-3AD203B41FA5}">
+                      <a16:colId xmlns:a16="http://schemas.microsoft.com/office/drawing/2014/main" val="501916568"/>
+                    </a:ext>
+                  </a:extLst>
+                </a:gridCol>
+                <a:gridCol w="642938">
+                  <a:extLst>
+                    <a:ext uri="{9D8B030D-6E8A-4147-A177-3AD203B41FA5}">
+                      <a16:colId xmlns:a16="http://schemas.microsoft.com/office/drawing/2014/main" val="3809760068"/>
+                    </a:ext>
+                  </a:extLst>
+                </a:gridCol>
+                <a:gridCol w="642938">
+                  <a:extLst>
+                    <a:ext uri="{9D8B030D-6E8A-4147-A177-3AD203B41FA5}">
+                      <a16:colId xmlns:a16="http://schemas.microsoft.com/office/drawing/2014/main" val="1306519747"/>
+                    </a:ext>
+                  </a:extLst>
+                </a:gridCol>
+              </a:tblGrid>
+              <a:tr h="125207">
+                <a:tc>
+                  <a:txBody>
+                    <a:bodyPr/>
+                    <a:lstStyle/>
+                    <a:p>
+                      <a:r>
+                        <a:rPr lang="de-DE" sz="1600"/>
+                        <a:t>bello</a:t>
+                      </a:r>
+                      <a:endParaRPr lang="en-US" sz="1600"/>
+                    </a:p>
+                  </a:txBody>
+                  <a:tcPr/>
+                </a:tc>
+                <a:tc>
+                  <a:txBody>
+                    <a:bodyPr/>
+                    <a:lstStyle/>
+                    <a:p>
+                      <a:r>
+                        <a:rPr lang="de-DE" sz="1600"/>
+                        <a:t>dog</a:t>
+                      </a:r>
+                      <a:endParaRPr lang="en-US" sz="1600"/>
+                    </a:p>
+                  </a:txBody>
+                  <a:tcPr/>
+                </a:tc>
+                <a:tc>
+                  <a:txBody>
+                    <a:bodyPr/>
+                    <a:lstStyle/>
+                    <a:p>
+                      <a:r>
+                        <a:rPr lang="de-DE" sz="1600"/>
+                        <a:t>good</a:t>
+                      </a:r>
+                      <a:endParaRPr lang="en-US" sz="1600"/>
+                    </a:p>
+                  </a:txBody>
+                  <a:tcPr/>
+                </a:tc>
+                <a:tc>
+                  <a:txBody>
+                    <a:bodyPr/>
+                    <a:lstStyle/>
+                    <a:p>
+                      <a:r>
+                        <a:rPr lang="de-DE" sz="1600"/>
+                        <a:t>boy</a:t>
+                      </a:r>
+                      <a:endParaRPr lang="en-US" sz="1600"/>
+                    </a:p>
+                  </a:txBody>
+                  <a:tcPr/>
+                </a:tc>
+                <a:tc>
+                  <a:txBody>
+                    <a:bodyPr/>
+                    <a:lstStyle/>
+                    <a:p>
+                      <a:r>
+                        <a:rPr lang="de-DE" sz="1600"/>
+                        <a:t>a</a:t>
+                      </a:r>
+                      <a:endParaRPr lang="en-US" sz="1600"/>
+                    </a:p>
+                  </a:txBody>
+                  <a:tcPr/>
+                </a:tc>
+                <a:tc>
+                  <a:txBody>
+                    <a:bodyPr/>
+                    <a:lstStyle/>
+                    <a:p>
+                      <a:r>
+                        <a:rPr lang="de-DE" sz="1600"/>
+                        <a:t>b </a:t>
+                      </a:r>
+                      <a:endParaRPr lang="en-US" sz="1600"/>
+                    </a:p>
+                  </a:txBody>
+                  <a:tcPr/>
+                </a:tc>
+                <a:tc>
+                  <a:txBody>
+                    <a:bodyPr/>
+                    <a:lstStyle/>
+                    <a:p>
+                      <a:r>
+                        <a:rPr lang="de-DE" sz="1600"/>
+                        <a:t>d </a:t>
+                      </a:r>
+                      <a:endParaRPr lang="en-US" sz="1600"/>
+                    </a:p>
+                  </a:txBody>
+                  <a:tcPr/>
+                </a:tc>
+                <a:tc>
+                  <a:txBody>
+                    <a:bodyPr/>
+                    <a:lstStyle/>
+                    <a:p>
+                      <a:r>
+                        <a:rPr lang="de-DE" sz="1600"/>
+                        <a:t>e </a:t>
+                      </a:r>
+                      <a:endParaRPr lang="en-US" sz="1600"/>
+                    </a:p>
+                  </a:txBody>
+                  <a:tcPr/>
+                </a:tc>
+                <a:tc>
+                  <a:txBody>
+                    <a:bodyPr/>
+                    <a:lstStyle/>
+                    <a:p>
+                      <a:r>
+                        <a:rPr lang="de-DE" sz="1600"/>
+                        <a:t>g </a:t>
+                      </a:r>
+                      <a:endParaRPr lang="en-US" sz="1600"/>
+                    </a:p>
+                  </a:txBody>
+                  <a:tcPr/>
+                </a:tc>
+                <a:tc>
+                  <a:txBody>
+                    <a:bodyPr/>
+                    <a:lstStyle/>
+                    <a:p>
+                      <a:r>
+                        <a:rPr lang="de-DE" sz="1600"/>
+                        <a:t>h</a:t>
+                      </a:r>
+                      <a:endParaRPr lang="en-US" sz="1600"/>
+                    </a:p>
+                  </a:txBody>
+                  <a:tcPr/>
+                </a:tc>
+                <a:tc>
+                  <a:txBody>
+                    <a:bodyPr/>
+                    <a:lstStyle/>
+                    <a:p>
+                      <a:r>
+                        <a:rPr lang="de-DE" sz="1600"/>
+                        <a:t>i</a:t>
+                      </a:r>
+                      <a:endParaRPr lang="en-US" sz="1600"/>
+                    </a:p>
+                  </a:txBody>
+                  <a:tcPr/>
+                </a:tc>
+                <a:tc>
+                  <a:txBody>
+                    <a:bodyPr/>
+                    <a:lstStyle/>
+                    <a:p>
+                      <a:r>
+                        <a:rPr lang="de-DE" sz="1600"/>
+                        <a:t>l </a:t>
+                      </a:r>
+                      <a:endParaRPr lang="en-US" sz="1600"/>
+                    </a:p>
+                  </a:txBody>
+                  <a:tcPr/>
+                </a:tc>
+                <a:tc>
+                  <a:txBody>
+                    <a:bodyPr/>
+                    <a:lstStyle/>
+                    <a:p>
+                      <a:r>
+                        <a:rPr lang="de-DE" sz="1600"/>
+                        <a:t>o </a:t>
+                      </a:r>
+                      <a:endParaRPr lang="en-US" sz="1600"/>
+                    </a:p>
+                  </a:txBody>
+                  <a:tcPr/>
+                </a:tc>
+                <a:tc>
+                  <a:txBody>
+                    <a:bodyPr/>
+                    <a:lstStyle/>
+                    <a:p>
+                      <a:r>
+                        <a:rPr lang="de-DE" sz="1600"/>
+                        <a:t>s</a:t>
+                      </a:r>
+                      <a:endParaRPr lang="en-US" sz="1600"/>
+                    </a:p>
+                  </a:txBody>
+                  <a:tcPr/>
+                </a:tc>
+                <a:tc>
+                  <a:txBody>
+                    <a:bodyPr/>
+                    <a:lstStyle/>
+                    <a:p>
+                      <a:r>
+                        <a:rPr lang="de-DE" sz="1600"/>
+                        <a:t>t</a:t>
+                      </a:r>
+                      <a:endParaRPr lang="en-US" sz="1600"/>
+                    </a:p>
+                  </a:txBody>
+                  <a:tcPr/>
+                </a:tc>
+                <a:tc>
+                  <a:txBody>
+                    <a:bodyPr/>
+                    <a:lstStyle/>
+                    <a:p>
+                      <a:r>
+                        <a:rPr lang="de-DE" sz="1600"/>
+                        <a:t>y</a:t>
+                      </a:r>
+                      <a:endParaRPr lang="en-US" sz="1600"/>
+                    </a:p>
+                  </a:txBody>
+                  <a:tcPr/>
+                </a:tc>
+                <a:extLst>
+                  <a:ext uri="{0D108BD9-81ED-4DB2-BD59-A6C34878D82A}">
+                    <a16:rowId xmlns:a16="http://schemas.microsoft.com/office/drawing/2014/main" val="1710706606"/>
+                  </a:ext>
+                </a:extLst>
+              </a:tr>
+              <a:tr h="125207">
+                <a:tc>
+                  <a:txBody>
+                    <a:bodyPr/>
+                    <a:lstStyle/>
+                    <a:p>
+                      <a:r>
+                        <a:rPr lang="de-DE" sz="1600"/>
+                        <a:t>1</a:t>
+                      </a:r>
+                      <a:endParaRPr lang="en-US" sz="1600"/>
+                    </a:p>
+                  </a:txBody>
+                  <a:tcPr/>
+                </a:tc>
+                <a:tc>
+                  <a:txBody>
+                    <a:bodyPr/>
+                    <a:lstStyle/>
+                    <a:p>
+                      <a:r>
+                        <a:rPr lang="de-DE" sz="1600"/>
+                        <a:t>1</a:t>
+                      </a:r>
+                      <a:endParaRPr lang="en-US" sz="1600"/>
+                    </a:p>
+                  </a:txBody>
+                  <a:tcPr/>
+                </a:tc>
+                <a:tc>
+                  <a:txBody>
+                    <a:bodyPr/>
+                    <a:lstStyle/>
+                    <a:p>
+                      <a:r>
+                        <a:rPr lang="de-DE" sz="1600"/>
+                        <a:t>1</a:t>
+                      </a:r>
+                      <a:endParaRPr lang="en-US" sz="1600"/>
+                    </a:p>
+                  </a:txBody>
+                  <a:tcPr/>
+                </a:tc>
+                <a:tc>
+                  <a:txBody>
+                    <a:bodyPr/>
+                    <a:lstStyle/>
+                    <a:p>
+                      <a:r>
+                        <a:rPr lang="de-DE" sz="1600"/>
+                        <a:t>1</a:t>
+                      </a:r>
+                      <a:endParaRPr lang="en-US" sz="1600"/>
+                    </a:p>
+                  </a:txBody>
+                  <a:tcPr/>
+                </a:tc>
+                <a:tc>
+                  <a:txBody>
+                    <a:bodyPr/>
+                    <a:lstStyle/>
+                    <a:p>
+                      <a:r>
+                        <a:rPr lang="de-DE" sz="1600"/>
+                        <a:t>1</a:t>
+                      </a:r>
+                      <a:endParaRPr lang="en-US" sz="1600"/>
+                    </a:p>
+                  </a:txBody>
+                  <a:tcPr/>
+                </a:tc>
+                <a:tc>
+                  <a:txBody>
+                    <a:bodyPr/>
+                    <a:lstStyle/>
+                    <a:p>
+                      <a:r>
+                        <a:rPr lang="de-DE" sz="1600"/>
+                        <a:t>2</a:t>
+                      </a:r>
+                      <a:endParaRPr lang="en-US" sz="1600"/>
+                    </a:p>
+                  </a:txBody>
+                  <a:tcPr/>
+                </a:tc>
+                <a:tc>
+                  <a:txBody>
+                    <a:bodyPr/>
+                    <a:lstStyle/>
+                    <a:p>
+                      <a:r>
+                        <a:rPr lang="de-DE" sz="1600"/>
+                        <a:t>2</a:t>
+                      </a:r>
+                      <a:endParaRPr lang="en-US" sz="1600"/>
+                    </a:p>
+                  </a:txBody>
+                  <a:tcPr/>
+                </a:tc>
+                <a:tc>
+                  <a:txBody>
+                    <a:bodyPr/>
+                    <a:lstStyle/>
+                    <a:p>
+                      <a:r>
+                        <a:rPr lang="de-DE" sz="1600"/>
+                        <a:t>2</a:t>
+                      </a:r>
+                      <a:endParaRPr lang="en-US" sz="1600"/>
+                    </a:p>
+                  </a:txBody>
+                  <a:tcPr/>
+                </a:tc>
+                <a:tc>
+                  <a:txBody>
+                    <a:bodyPr/>
+                    <a:lstStyle/>
+                    <a:p>
+                      <a:r>
+                        <a:rPr lang="de-DE" sz="1600"/>
+                        <a:t>2</a:t>
+                      </a:r>
+                      <a:endParaRPr lang="en-US" sz="1600"/>
+                    </a:p>
+                  </a:txBody>
+                  <a:tcPr/>
+                </a:tc>
+                <a:tc>
+                  <a:txBody>
+                    <a:bodyPr/>
+                    <a:lstStyle/>
+                    <a:p>
+                      <a:r>
+                        <a:rPr lang="de-DE" sz="1600"/>
+                        <a:t>1</a:t>
+                      </a:r>
+                      <a:endParaRPr lang="en-US" sz="1600"/>
+                    </a:p>
+                  </a:txBody>
+                  <a:tcPr/>
+                </a:tc>
+                <a:tc>
+                  <a:txBody>
+                    <a:bodyPr/>
+                    <a:lstStyle/>
+                    <a:p>
+                      <a:r>
+                        <a:rPr lang="de-DE" sz="1600"/>
+                        <a:t>1</a:t>
+                      </a:r>
+                      <a:endParaRPr lang="en-US" sz="1600"/>
+                    </a:p>
+                  </a:txBody>
+                  <a:tcPr/>
+                </a:tc>
+                <a:tc>
+                  <a:txBody>
+                    <a:bodyPr/>
+                    <a:lstStyle/>
+                    <a:p>
+                      <a:r>
+                        <a:rPr lang="de-DE" sz="1600"/>
+                        <a:t>2</a:t>
+                      </a:r>
+                      <a:endParaRPr lang="en-US" sz="1600"/>
+                    </a:p>
+                  </a:txBody>
+                  <a:tcPr/>
+                </a:tc>
+                <a:tc>
+                  <a:txBody>
+                    <a:bodyPr/>
+                    <a:lstStyle/>
+                    <a:p>
+                      <a:r>
+                        <a:rPr lang="de-DE" sz="1600"/>
+                        <a:t>5</a:t>
+                      </a:r>
+                      <a:endParaRPr lang="en-US" sz="1600"/>
+                    </a:p>
+                  </a:txBody>
+                  <a:tcPr/>
+                </a:tc>
+                <a:tc>
+                  <a:txBody>
+                    <a:bodyPr/>
+                    <a:lstStyle/>
+                    <a:p>
+                      <a:r>
+                        <a:rPr lang="de-DE" sz="1600"/>
+                        <a:t>1</a:t>
+                      </a:r>
+                      <a:endParaRPr lang="en-US" sz="1600"/>
+                    </a:p>
+                  </a:txBody>
+                  <a:tcPr/>
+                </a:tc>
+                <a:tc>
+                  <a:txBody>
+                    <a:bodyPr/>
+                    <a:lstStyle/>
+                    <a:p>
+                      <a:r>
+                        <a:rPr lang="de-DE" sz="1600"/>
+                        <a:t>1</a:t>
+                      </a:r>
+                      <a:endParaRPr lang="en-US" sz="1600"/>
+                    </a:p>
+                  </a:txBody>
+                  <a:tcPr/>
+                </a:tc>
+                <a:tc>
+                  <a:txBody>
+                    <a:bodyPr/>
+                    <a:lstStyle/>
+                    <a:p>
+                      <a:r>
+                        <a:rPr lang="de-DE" sz="1600"/>
+                        <a:t>1</a:t>
+                      </a:r>
+                      <a:endParaRPr lang="en-US" sz="1600"/>
+                    </a:p>
+                  </a:txBody>
+                  <a:tcPr/>
+                </a:tc>
+                <a:extLst>
+                  <a:ext uri="{0D108BD9-81ED-4DB2-BD59-A6C34878D82A}">
+                    <a16:rowId xmlns:a16="http://schemas.microsoft.com/office/drawing/2014/main" val="1149187399"/>
+                  </a:ext>
+                </a:extLst>
+              </a:tr>
+            </a:tbl>
+          </a:graphicData>
+        </a:graphic>
+      </p:graphicFrame>
+    </p:spTree>
+    <p:extLst>
+      <p:ext uri="{BB962C8B-B14F-4D97-AF65-F5344CB8AC3E}">
+        <p14:creationId xmlns:p14="http://schemas.microsoft.com/office/powerpoint/2010/main" val="924658390"/>
+      </p:ext>
+    </p:extLst>
+  </p:cSld>
+  <p:clrMapOvr>
+    <a:masterClrMapping/>
+  </p:clrMapOvr>
+</p:sld>
+</file>
+
+<file path=ppt/slides/slide34.xml><?xml version="1.0" encoding="utf-8"?>
+<p:sld xmlns:a="http://schemas.openxmlformats.org/drawingml/2006/main" xmlns:r="http://schemas.openxmlformats.org/officeDocument/2006/relationships" xmlns:p="http://schemas.openxmlformats.org/presentationml/2006/main">
+  <p:cSld>
+    <p:spTree>
+      <p:nvGrpSpPr>
+        <p:cNvPr id="1" name=""/>
+        <p:cNvGrpSpPr/>
+        <p:nvPr/>
+      </p:nvGrpSpPr>
+      <p:grpSpPr>
+        <a:xfrm>
+          <a:off x="0" y="0"/>
+          <a:ext cx="0" cy="0"/>
+          <a:chOff x="0" y="0"/>
+          <a:chExt cx="0" cy="0"/>
+        </a:xfrm>
+      </p:grpSpPr>
+      <p:sp>
+        <p:nvSpPr>
+          <p:cNvPr id="7" name="Content Placeholder 2">
+            <a:extLst>
+              <a:ext uri="{FF2B5EF4-FFF2-40B4-BE49-F238E27FC236}">
+                <a16:creationId xmlns:a16="http://schemas.microsoft.com/office/drawing/2014/main" id="{0F324A9E-9392-4545-96A6-95DE3958C6B2}"/>
+              </a:ext>
+            </a:extLst>
+          </p:cNvPr>
+          <p:cNvSpPr>
+            <a:spLocks noGrp="1"/>
+          </p:cNvSpPr>
+          <p:nvPr>
+            <p:ph idx="1"/>
+          </p:nvPr>
+        </p:nvSpPr>
+        <p:spPr>
+          <a:xfrm>
+            <a:off x="1066797" y="1990725"/>
+            <a:ext cx="10287001" cy="4457700"/>
+          </a:xfrm>
+        </p:spPr>
+        <p:txBody>
+          <a:bodyPr>
+            <a:normAutofit/>
+          </a:bodyPr>
+          <a:lstStyle/>
+          <a:p>
+            <a:r>
+              <a:rPr lang="en-US" b="1"/>
+              <a:t>POS tags</a:t>
+            </a:r>
+          </a:p>
+          <a:p>
+            <a:pPr lvl="1"/>
+            <a:r>
+              <a:rPr lang="en-US" b="1"/>
+              <a:t>Idea</a:t>
+            </a:r>
+            <a:r>
+              <a:rPr lang="en-US"/>
+              <a:t>: capture grammatical structure</a:t>
+            </a:r>
+          </a:p>
+          <a:p>
+            <a:pPr lvl="1"/>
+            <a:r>
+              <a:rPr lang="en-US" b="1"/>
+              <a:t>Details</a:t>
+            </a:r>
+            <a:r>
+              <a:rPr lang="en-US"/>
+              <a:t>:</a:t>
+            </a:r>
+          </a:p>
+          <a:p>
+            <a:pPr lvl="2"/>
+            <a:r>
+              <a:rPr lang="en-US"/>
+              <a:t>Computed on full text</a:t>
+            </a:r>
+          </a:p>
+          <a:p>
+            <a:pPr lvl="2"/>
+            <a:r>
+              <a:rPr lang="en-US"/>
+              <a:t>Assign each word a grammatical role (18 universal tags)</a:t>
+            </a:r>
+          </a:p>
+          <a:p>
+            <a:pPr lvl="1"/>
+            <a:r>
+              <a:rPr lang="en-US" b="1"/>
+              <a:t>Assumption</a:t>
+            </a:r>
+            <a:r>
+              <a:rPr lang="en-US"/>
+              <a:t>: presence of many adverbs/adjectives might be indicative of sentiments.</a:t>
+            </a:r>
+          </a:p>
+          <a:p>
+            <a:pPr lvl="1"/>
+            <a:r>
+              <a:rPr lang="en-US" b="1"/>
+              <a:t>Computation</a:t>
+            </a:r>
+            <a:r>
+              <a:rPr lang="en-US"/>
+              <a:t>: use available parsers (e.g., in </a:t>
+            </a:r>
+            <a:r>
+              <a:rPr lang="en-US">
+                <a:latin typeface="Consolas" panose="020B0609020204030204" pitchFamily="49" charset="0"/>
+              </a:rPr>
+              <a:t>spacyR</a:t>
+            </a:r>
+            <a:r>
+              <a:rPr lang="en-US"/>
+              <a:t>)</a:t>
+            </a:r>
+          </a:p>
+        </p:txBody>
+      </p:sp>
+      <p:sp>
+        <p:nvSpPr>
+          <p:cNvPr id="4" name="Foliennummernplatzhalter 3"/>
+          <p:cNvSpPr>
+            <a:spLocks noGrp="1"/>
+          </p:cNvSpPr>
+          <p:nvPr>
+            <p:ph type="sldNum" sz="quarter" idx="12"/>
+          </p:nvPr>
+        </p:nvSpPr>
+        <p:spPr/>
+        <p:txBody>
+          <a:bodyPr/>
+          <a:lstStyle/>
+          <a:p>
+            <a:fld id="{C9E0B00B-E6DF-4183-A694-3DE28BEFB357}" type="slidenum">
+              <a:rPr lang="en-US" smtClean="0"/>
+              <a:t>34</a:t>
+            </a:fld>
+            <a:endParaRPr lang="en-US"/>
+          </a:p>
+        </p:txBody>
+      </p:sp>
+      <p:sp>
+        <p:nvSpPr>
+          <p:cNvPr id="12" name="Titel 1">
+            <a:extLst>
+              <a:ext uri="{FF2B5EF4-FFF2-40B4-BE49-F238E27FC236}">
+                <a16:creationId xmlns:a16="http://schemas.microsoft.com/office/drawing/2014/main" id="{478EA67A-3C39-4D0A-996A-C363F30A14B2}"/>
+              </a:ext>
+            </a:extLst>
+          </p:cNvPr>
+          <p:cNvSpPr>
+            <a:spLocks noGrp="1"/>
+          </p:cNvSpPr>
+          <p:nvPr>
+            <p:ph type="title"/>
+          </p:nvPr>
+        </p:nvSpPr>
+        <p:spPr>
+          <a:xfrm>
+            <a:off x="1066800" y="561524"/>
+            <a:ext cx="10287000" cy="1129164"/>
+          </a:xfrm>
+        </p:spPr>
+        <p:txBody>
+          <a:bodyPr/>
+          <a:lstStyle/>
+          <a:p>
+            <a:r>
+              <a:rPr lang="en-US"/>
+              <a:t>Static Feature Extraction  </a:t>
+            </a:r>
+            <a:r>
+              <a:rPr lang="en-US" b="1"/>
+              <a:t>Features</a:t>
+            </a:r>
+          </a:p>
+        </p:txBody>
+      </p:sp>
+      <p:graphicFrame>
+        <p:nvGraphicFramePr>
+          <p:cNvPr id="8" name="Table 2">
+            <a:extLst>
+              <a:ext uri="{FF2B5EF4-FFF2-40B4-BE49-F238E27FC236}">
+                <a16:creationId xmlns:a16="http://schemas.microsoft.com/office/drawing/2014/main" id="{70604617-E34C-41AB-AEB6-115BF6C7E986}"/>
+              </a:ext>
+            </a:extLst>
+          </p:cNvPr>
+          <p:cNvGraphicFramePr>
+            <a:graphicFrameLocks noGrp="1"/>
+          </p:cNvGraphicFramePr>
+          <p:nvPr>
+            <p:extLst>
+              <p:ext uri="{D42A27DB-BD31-4B8C-83A1-F6EECF244321}">
+                <p14:modId xmlns:p14="http://schemas.microsoft.com/office/powerpoint/2010/main" val="921580760"/>
+              </p:ext>
+            </p:extLst>
+          </p:nvPr>
+        </p:nvGraphicFramePr>
+        <p:xfrm>
+          <a:off x="1066781" y="5636167"/>
+          <a:ext cx="10287000" cy="670560"/>
+        </p:xfrm>
+        <a:graphic>
+          <a:graphicData uri="http://schemas.openxmlformats.org/drawingml/2006/table">
+            <a:tbl>
+              <a:tblPr firstRow="1" bandRow="1">
+                <a:tableStyleId>{5940675A-B579-460E-94D1-54222C63F5DA}</a:tableStyleId>
+              </a:tblPr>
+              <a:tblGrid>
+                <a:gridCol w="1285875">
+                  <a:extLst>
+                    <a:ext uri="{9D8B030D-6E8A-4147-A177-3AD203B41FA5}">
+                      <a16:colId xmlns:a16="http://schemas.microsoft.com/office/drawing/2014/main" val="2623701309"/>
+                    </a:ext>
+                  </a:extLst>
+                </a:gridCol>
+                <a:gridCol w="1285875">
+                  <a:extLst>
+                    <a:ext uri="{9D8B030D-6E8A-4147-A177-3AD203B41FA5}">
+                      <a16:colId xmlns:a16="http://schemas.microsoft.com/office/drawing/2014/main" val="1729904020"/>
+                    </a:ext>
+                  </a:extLst>
+                </a:gridCol>
+                <a:gridCol w="1285875">
+                  <a:extLst>
+                    <a:ext uri="{9D8B030D-6E8A-4147-A177-3AD203B41FA5}">
+                      <a16:colId xmlns:a16="http://schemas.microsoft.com/office/drawing/2014/main" val="180927769"/>
+                    </a:ext>
+                  </a:extLst>
+                </a:gridCol>
+                <a:gridCol w="1285875">
+                  <a:extLst>
+                    <a:ext uri="{9D8B030D-6E8A-4147-A177-3AD203B41FA5}">
+                      <a16:colId xmlns:a16="http://schemas.microsoft.com/office/drawing/2014/main" val="1243734057"/>
+                    </a:ext>
+                  </a:extLst>
+                </a:gridCol>
+                <a:gridCol w="1285875">
+                  <a:extLst>
+                    <a:ext uri="{9D8B030D-6E8A-4147-A177-3AD203B41FA5}">
+                      <a16:colId xmlns:a16="http://schemas.microsoft.com/office/drawing/2014/main" val="1065436770"/>
+                    </a:ext>
+                  </a:extLst>
+                </a:gridCol>
+                <a:gridCol w="1285875">
+                  <a:extLst>
+                    <a:ext uri="{9D8B030D-6E8A-4147-A177-3AD203B41FA5}">
+                      <a16:colId xmlns:a16="http://schemas.microsoft.com/office/drawing/2014/main" val="1725686100"/>
+                    </a:ext>
+                  </a:extLst>
+                </a:gridCol>
+                <a:gridCol w="1285875">
+                  <a:extLst>
+                    <a:ext uri="{9D8B030D-6E8A-4147-A177-3AD203B41FA5}">
+                      <a16:colId xmlns:a16="http://schemas.microsoft.com/office/drawing/2014/main" val="341384362"/>
+                    </a:ext>
+                  </a:extLst>
+                </a:gridCol>
+                <a:gridCol w="1285875">
+                  <a:extLst>
+                    <a:ext uri="{9D8B030D-6E8A-4147-A177-3AD203B41FA5}">
+                      <a16:colId xmlns:a16="http://schemas.microsoft.com/office/drawing/2014/main" val="3576258105"/>
+                    </a:ext>
+                  </a:extLst>
+                </a:gridCol>
+              </a:tblGrid>
+              <a:tr h="125207">
+                <a:tc>
+                  <a:txBody>
+                    <a:bodyPr/>
+                    <a:lstStyle/>
+                    <a:p>
+                      <a:r>
+                        <a:rPr lang="de-DE" sz="1600"/>
+                        <a:t>Bello</a:t>
+                      </a:r>
+                      <a:endParaRPr lang="en-US" sz="1600"/>
+                    </a:p>
+                  </a:txBody>
+                  <a:tcPr/>
+                </a:tc>
+                <a:tc>
+                  <a:txBody>
+                    <a:bodyPr/>
+                    <a:lstStyle/>
+                    <a:p>
+                      <a:r>
+                        <a:rPr lang="de-DE" sz="1600"/>
+                        <a:t>the </a:t>
+                      </a:r>
+                      <a:endParaRPr lang="en-US" sz="1600"/>
+                    </a:p>
+                  </a:txBody>
+                  <a:tcPr/>
+                </a:tc>
+                <a:tc>
+                  <a:txBody>
+                    <a:bodyPr/>
+                    <a:lstStyle/>
+                    <a:p>
+                      <a:r>
+                        <a:rPr lang="de-DE" sz="1600"/>
+                        <a:t>dog </a:t>
+                      </a:r>
+                      <a:endParaRPr lang="en-US" sz="1600"/>
+                    </a:p>
+                  </a:txBody>
+                  <a:tcPr/>
+                </a:tc>
+                <a:tc>
+                  <a:txBody>
+                    <a:bodyPr/>
+                    <a:lstStyle/>
+                    <a:p>
+                      <a:r>
+                        <a:rPr lang="de-DE" sz="1600"/>
+                        <a:t>is </a:t>
+                      </a:r>
+                      <a:endParaRPr lang="en-US" sz="1600"/>
+                    </a:p>
+                  </a:txBody>
+                  <a:tcPr/>
+                </a:tc>
+                <a:tc>
+                  <a:txBody>
+                    <a:bodyPr/>
+                    <a:lstStyle/>
+                    <a:p>
+                      <a:r>
+                        <a:rPr lang="de-DE" sz="1600"/>
+                        <a:t>a </a:t>
+                      </a:r>
+                      <a:endParaRPr lang="en-US" sz="1600"/>
+                    </a:p>
+                  </a:txBody>
+                  <a:tcPr/>
+                </a:tc>
+                <a:tc>
+                  <a:txBody>
+                    <a:bodyPr/>
+                    <a:lstStyle/>
+                    <a:p>
+                      <a:r>
+                        <a:rPr lang="de-DE" sz="1600"/>
+                        <a:t>good </a:t>
+                      </a:r>
+                      <a:endParaRPr lang="en-US" sz="1600"/>
+                    </a:p>
+                  </a:txBody>
+                  <a:tcPr/>
+                </a:tc>
+                <a:tc>
+                  <a:txBody>
+                    <a:bodyPr/>
+                    <a:lstStyle/>
+                    <a:p>
+                      <a:r>
+                        <a:rPr lang="de-DE" sz="1600"/>
+                        <a:t>boy </a:t>
+                      </a:r>
+                      <a:endParaRPr lang="en-US" sz="1600"/>
+                    </a:p>
+                  </a:txBody>
+                  <a:tcPr/>
+                </a:tc>
+                <a:tc>
+                  <a:txBody>
+                    <a:bodyPr/>
+                    <a:lstStyle/>
+                    <a:p>
+                      <a:r>
+                        <a:rPr lang="de-DE" sz="1600"/>
+                        <a:t>.</a:t>
+                      </a:r>
+                      <a:endParaRPr lang="en-US" sz="1600"/>
+                    </a:p>
+                  </a:txBody>
+                  <a:tcPr/>
+                </a:tc>
+                <a:extLst>
+                  <a:ext uri="{0D108BD9-81ED-4DB2-BD59-A6C34878D82A}">
+                    <a16:rowId xmlns:a16="http://schemas.microsoft.com/office/drawing/2014/main" val="1710706606"/>
+                  </a:ext>
+                </a:extLst>
+              </a:tr>
+              <a:tr h="125207">
+                <a:tc>
+                  <a:txBody>
+                    <a:bodyPr/>
+                    <a:lstStyle/>
+                    <a:p>
+                      <a:r>
+                        <a:rPr lang="de-DE" sz="1600"/>
+                        <a:t>PROPN</a:t>
+                      </a:r>
+                      <a:endParaRPr lang="en-US" sz="1600"/>
+                    </a:p>
+                  </a:txBody>
+                  <a:tcPr/>
+                </a:tc>
+                <a:tc>
+                  <a:txBody>
+                    <a:bodyPr/>
+                    <a:lstStyle/>
+                    <a:p>
+                      <a:r>
+                        <a:rPr lang="de-DE" sz="1600"/>
+                        <a:t>DET</a:t>
+                      </a:r>
+                      <a:endParaRPr lang="en-US" sz="1600"/>
+                    </a:p>
+                  </a:txBody>
+                  <a:tcPr/>
+                </a:tc>
+                <a:tc>
+                  <a:txBody>
+                    <a:bodyPr/>
+                    <a:lstStyle/>
+                    <a:p>
+                      <a:r>
+                        <a:rPr lang="de-DE" sz="1600"/>
+                        <a:t>NOUN</a:t>
+                      </a:r>
+                      <a:endParaRPr lang="en-US" sz="1600"/>
+                    </a:p>
+                  </a:txBody>
+                  <a:tcPr/>
+                </a:tc>
+                <a:tc>
+                  <a:txBody>
+                    <a:bodyPr/>
+                    <a:lstStyle/>
+                    <a:p>
+                      <a:r>
+                        <a:rPr lang="de-DE" sz="1600"/>
+                        <a:t>AUX</a:t>
+                      </a:r>
+                      <a:endParaRPr lang="en-US" sz="1600"/>
+                    </a:p>
+                  </a:txBody>
+                  <a:tcPr/>
+                </a:tc>
+                <a:tc>
+                  <a:txBody>
+                    <a:bodyPr/>
+                    <a:lstStyle/>
+                    <a:p>
+                      <a:r>
+                        <a:rPr lang="de-DE" sz="1600"/>
+                        <a:t>DET</a:t>
+                      </a:r>
+                      <a:endParaRPr lang="en-US" sz="1600"/>
+                    </a:p>
+                  </a:txBody>
+                  <a:tcPr/>
+                </a:tc>
+                <a:tc>
+                  <a:txBody>
+                    <a:bodyPr/>
+                    <a:lstStyle/>
+                    <a:p>
+                      <a:r>
+                        <a:rPr lang="de-DE" sz="1600"/>
+                        <a:t>ADJ</a:t>
+                      </a:r>
+                      <a:endParaRPr lang="en-US" sz="1600"/>
+                    </a:p>
+                  </a:txBody>
+                  <a:tcPr/>
+                </a:tc>
+                <a:tc>
+                  <a:txBody>
+                    <a:bodyPr/>
+                    <a:lstStyle/>
+                    <a:p>
+                      <a:r>
+                        <a:rPr lang="de-DE" sz="1600"/>
+                        <a:t>NOUN</a:t>
+                      </a:r>
+                      <a:endParaRPr lang="en-US" sz="1600"/>
+                    </a:p>
+                  </a:txBody>
+                  <a:tcPr/>
+                </a:tc>
+                <a:tc>
+                  <a:txBody>
+                    <a:bodyPr/>
+                    <a:lstStyle/>
+                    <a:p>
+                      <a:r>
+                        <a:rPr lang="de-DE" sz="1600"/>
+                        <a:t>PUNCT</a:t>
+                      </a:r>
+                      <a:endParaRPr lang="en-US" sz="1600"/>
+                    </a:p>
+                  </a:txBody>
+                  <a:tcPr/>
+                </a:tc>
+                <a:extLst>
+                  <a:ext uri="{0D108BD9-81ED-4DB2-BD59-A6C34878D82A}">
+                    <a16:rowId xmlns:a16="http://schemas.microsoft.com/office/drawing/2014/main" val="1149187399"/>
+                  </a:ext>
+                </a:extLst>
+              </a:tr>
+            </a:tbl>
+          </a:graphicData>
+        </a:graphic>
+      </p:graphicFrame>
+      <p:sp>
+        <p:nvSpPr>
+          <p:cNvPr id="10" name="TextBox 9">
+            <a:extLst>
+              <a:ext uri="{FF2B5EF4-FFF2-40B4-BE49-F238E27FC236}">
+                <a16:creationId xmlns:a16="http://schemas.microsoft.com/office/drawing/2014/main" id="{0F847D6B-01A1-4121-96D0-D09DDF9D185E}"/>
+              </a:ext>
+            </a:extLst>
+          </p:cNvPr>
+          <p:cNvSpPr txBox="1"/>
+          <p:nvPr/>
+        </p:nvSpPr>
+        <p:spPr>
+          <a:xfrm>
+            <a:off x="7896207" y="2483858"/>
+            <a:ext cx="3457574" cy="646331"/>
+          </a:xfrm>
+          <a:prstGeom prst="rect">
+            <a:avLst/>
+          </a:prstGeom>
+          <a:noFill/>
+        </p:spPr>
+        <p:txBody>
+          <a:bodyPr wrap="square">
+            <a:spAutoFit/>
+          </a:bodyPr>
+          <a:lstStyle/>
+          <a:p>
+            <a:pPr algn="r"/>
+            <a:r>
+              <a:rPr lang="en-US" i="1">
+                <a:hlinkClick r:id="rId3"/>
+              </a:rPr>
+              <a:t>https://universaldependencies.org/u/pos/all.html</a:t>
+            </a:r>
+            <a:r>
+              <a:rPr lang="en-US" i="1"/>
+              <a:t> </a:t>
+            </a:r>
+          </a:p>
+        </p:txBody>
+      </p:sp>
+      <p:pic>
+        <p:nvPicPr>
+          <p:cNvPr id="11" name="Graphic 10" descr="Back with solid fill">
+            <a:extLst>
+              <a:ext uri="{FF2B5EF4-FFF2-40B4-BE49-F238E27FC236}">
+                <a16:creationId xmlns:a16="http://schemas.microsoft.com/office/drawing/2014/main" id="{5A8672C5-2D24-4071-89F0-DA38EB7CE833}"/>
+              </a:ext>
+            </a:extLst>
+          </p:cNvPr>
+          <p:cNvPicPr>
+            <a:picLocks noChangeAspect="1"/>
+          </p:cNvPicPr>
+          <p:nvPr/>
+        </p:nvPicPr>
+        <p:blipFill>
+          <a:blip r:embed="rId4">
+            <a:extLst>
+              <a:ext uri="{28A0092B-C50C-407E-A947-70E740481C1C}">
+                <a14:useLocalDpi xmlns:a14="http://schemas.microsoft.com/office/drawing/2010/main" val="0"/>
+              </a:ext>
+              <a:ext uri="{96DAC541-7B7A-43D3-8B79-37D633B846F1}">
+                <asvg:svgBlip xmlns:asvg="http://schemas.microsoft.com/office/drawing/2016/SVG/main" r:embed="rId5"/>
+              </a:ext>
+            </a:extLst>
+          </a:blip>
+          <a:stretch>
+            <a:fillRect/>
+          </a:stretch>
+        </p:blipFill>
+        <p:spPr>
+          <a:xfrm rot="16200000" flipH="1" flipV="1">
+            <a:off x="8231786" y="2966714"/>
+            <a:ext cx="757629" cy="946296"/>
+          </a:xfrm>
+          <a:prstGeom prst="rect">
+            <a:avLst/>
+          </a:prstGeom>
+        </p:spPr>
+      </p:pic>
+    </p:spTree>
+    <p:extLst>
+      <p:ext uri="{BB962C8B-B14F-4D97-AF65-F5344CB8AC3E}">
+        <p14:creationId xmlns:p14="http://schemas.microsoft.com/office/powerpoint/2010/main" val="3400250255"/>
+      </p:ext>
+    </p:extLst>
+  </p:cSld>
+  <p:clrMapOvr>
+    <a:masterClrMapping/>
+  </p:clrMapOvr>
+</p:sld>
+</file>
+
+<file path=ppt/slides/slide35.xml><?xml version="1.0" encoding="utf-8"?>
+<p:sld xmlns:a="http://schemas.openxmlformats.org/drawingml/2006/main" xmlns:r="http://schemas.openxmlformats.org/officeDocument/2006/relationships" xmlns:p="http://schemas.openxmlformats.org/presentationml/2006/main">
+  <p:cSld>
+    <p:spTree>
+      <p:nvGrpSpPr>
+        <p:cNvPr id="1" name=""/>
+        <p:cNvGrpSpPr/>
+        <p:nvPr/>
+      </p:nvGrpSpPr>
+      <p:grpSpPr>
+        <a:xfrm>
+          <a:off x="0" y="0"/>
+          <a:ext cx="0" cy="0"/>
+          <a:chOff x="0" y="0"/>
+          <a:chExt cx="0" cy="0"/>
+        </a:xfrm>
+      </p:grpSpPr>
+      <p:sp>
+        <p:nvSpPr>
+          <p:cNvPr id="7" name="Content Placeholder 2">
+            <a:extLst>
+              <a:ext uri="{FF2B5EF4-FFF2-40B4-BE49-F238E27FC236}">
+                <a16:creationId xmlns:a16="http://schemas.microsoft.com/office/drawing/2014/main" id="{0F324A9E-9392-4545-96A6-95DE3958C6B2}"/>
+              </a:ext>
+            </a:extLst>
+          </p:cNvPr>
+          <p:cNvSpPr>
+            <a:spLocks noGrp="1"/>
+          </p:cNvSpPr>
+          <p:nvPr>
+            <p:ph idx="1"/>
+          </p:nvPr>
+        </p:nvSpPr>
+        <p:spPr>
+          <a:xfrm>
+            <a:off x="1066797" y="1990725"/>
+            <a:ext cx="10287001" cy="4457700"/>
+          </a:xfrm>
+        </p:spPr>
+        <p:txBody>
+          <a:bodyPr>
+            <a:normAutofit/>
+          </a:bodyPr>
+          <a:lstStyle/>
+          <a:p>
+            <a:r>
+              <a:rPr lang="en-US" b="1"/>
+              <a:t>Twitter-specific features</a:t>
+            </a:r>
+          </a:p>
+          <a:p>
+            <a:pPr lvl="1"/>
+            <a:r>
+              <a:rPr lang="en-US" b="1"/>
+              <a:t>Idea</a:t>
+            </a:r>
+            <a:r>
+              <a:rPr lang="en-US"/>
+              <a:t>: exploit Twitter-inherent tokens</a:t>
+            </a:r>
+          </a:p>
+          <a:p>
+            <a:pPr lvl="1"/>
+            <a:r>
+              <a:rPr lang="en-US" b="1"/>
+              <a:t>Details</a:t>
+            </a:r>
+            <a:r>
+              <a:rPr lang="en-US"/>
+              <a:t>:</a:t>
+            </a:r>
+          </a:p>
+          <a:p>
+            <a:pPr lvl="2"/>
+            <a:r>
+              <a:rPr lang="en-US"/>
+              <a:t>Emojis: count / assign polarity</a:t>
+            </a:r>
+          </a:p>
+          <a:p>
+            <a:pPr lvl="2"/>
+            <a:r>
+              <a:rPr lang="en-US"/>
+              <a:t>Hashtags: count / mine (for topics, meaning, ...)</a:t>
+            </a:r>
+          </a:p>
+          <a:p>
+            <a:pPr lvl="2"/>
+            <a:r>
+              <a:rPr lang="en-US"/>
+              <a:t>Tags: count / mine</a:t>
+            </a:r>
+          </a:p>
+          <a:p>
+            <a:pPr lvl="2"/>
+            <a:r>
+              <a:rPr lang="en-US"/>
+              <a:t>...</a:t>
+            </a:r>
+          </a:p>
+          <a:p>
+            <a:pPr lvl="1"/>
+            <a:r>
+              <a:rPr lang="en-US" b="1"/>
+              <a:t>Computation</a:t>
+            </a:r>
+            <a:r>
+              <a:rPr lang="en-US"/>
+              <a:t>: look-up using regular expressions</a:t>
+            </a:r>
+          </a:p>
+        </p:txBody>
+      </p:sp>
+      <p:sp>
+        <p:nvSpPr>
+          <p:cNvPr id="4" name="Foliennummernplatzhalter 3"/>
+          <p:cNvSpPr>
+            <a:spLocks noGrp="1"/>
+          </p:cNvSpPr>
+          <p:nvPr>
+            <p:ph type="sldNum" sz="quarter" idx="12"/>
+          </p:nvPr>
+        </p:nvSpPr>
+        <p:spPr/>
+        <p:txBody>
+          <a:bodyPr/>
+          <a:lstStyle/>
+          <a:p>
+            <a:fld id="{C9E0B00B-E6DF-4183-A694-3DE28BEFB357}" type="slidenum">
+              <a:rPr lang="en-US" smtClean="0"/>
+              <a:t>35</a:t>
+            </a:fld>
+            <a:endParaRPr lang="en-US"/>
+          </a:p>
+        </p:txBody>
+      </p:sp>
+      <p:sp>
+        <p:nvSpPr>
+          <p:cNvPr id="12" name="Titel 1">
+            <a:extLst>
+              <a:ext uri="{FF2B5EF4-FFF2-40B4-BE49-F238E27FC236}">
+                <a16:creationId xmlns:a16="http://schemas.microsoft.com/office/drawing/2014/main" id="{478EA67A-3C39-4D0A-996A-C363F30A14B2}"/>
+              </a:ext>
+            </a:extLst>
+          </p:cNvPr>
+          <p:cNvSpPr>
+            <a:spLocks noGrp="1"/>
+          </p:cNvSpPr>
+          <p:nvPr>
+            <p:ph type="title"/>
+          </p:nvPr>
+        </p:nvSpPr>
+        <p:spPr>
+          <a:xfrm>
+            <a:off x="1066800" y="561524"/>
+            <a:ext cx="10287000" cy="1129164"/>
+          </a:xfrm>
+        </p:spPr>
+        <p:txBody>
+          <a:bodyPr/>
+          <a:lstStyle/>
+          <a:p>
+            <a:r>
+              <a:rPr lang="en-US"/>
+              <a:t>Static Feature Extraction  </a:t>
+            </a:r>
+            <a:r>
+              <a:rPr lang="en-US" b="1"/>
+              <a:t>Features</a:t>
+            </a:r>
+          </a:p>
+        </p:txBody>
+      </p:sp>
+      <p:sp>
+        <p:nvSpPr>
+          <p:cNvPr id="9" name="TextBox 8">
+            <a:extLst>
+              <a:ext uri="{FF2B5EF4-FFF2-40B4-BE49-F238E27FC236}">
+                <a16:creationId xmlns:a16="http://schemas.microsoft.com/office/drawing/2014/main" id="{815491E0-AD06-416D-AC86-C855E2E601E4}"/>
+              </a:ext>
+            </a:extLst>
+          </p:cNvPr>
+          <p:cNvSpPr txBox="1"/>
+          <p:nvPr/>
+        </p:nvSpPr>
+        <p:spPr>
+          <a:xfrm>
+            <a:off x="1066795" y="5834811"/>
+            <a:ext cx="9648830" cy="461665"/>
+          </a:xfrm>
+          <a:prstGeom prst="rect">
+            <a:avLst/>
+          </a:prstGeom>
+          <a:noFill/>
+        </p:spPr>
+        <p:txBody>
+          <a:bodyPr wrap="square">
+            <a:spAutoFit/>
+          </a:bodyPr>
+          <a:lstStyle/>
+          <a:p>
+            <a:r>
+              <a:rPr lang="en-US" sz="2400"/>
+              <a:t>I love doing dishes #not </a:t>
+            </a:r>
+            <a:r>
+              <a:rPr lang="de-DE" sz="2400"/>
+              <a:t>🙄</a:t>
+            </a:r>
+            <a:endParaRPr lang="en-US" sz="2400" i="1"/>
+          </a:p>
+        </p:txBody>
+      </p:sp>
+    </p:spTree>
+    <p:extLst>
+      <p:ext uri="{BB962C8B-B14F-4D97-AF65-F5344CB8AC3E}">
+        <p14:creationId xmlns:p14="http://schemas.microsoft.com/office/powerpoint/2010/main" val="519225026"/>
+      </p:ext>
+    </p:extLst>
+  </p:cSld>
+  <p:clrMapOvr>
+    <a:masterClrMapping/>
+  </p:clrMapOvr>
+</p:sld>
+</file>
+
+<file path=ppt/slides/slide36.xml><?xml version="1.0" encoding="utf-8"?>
+<p:sld xmlns:a="http://schemas.openxmlformats.org/drawingml/2006/main" xmlns:r="http://schemas.openxmlformats.org/officeDocument/2006/relationships" xmlns:p="http://schemas.openxmlformats.org/presentationml/2006/main">
+  <p:cSld>
+    <p:spTree>
+      <p:nvGrpSpPr>
+        <p:cNvPr id="1" name=""/>
+        <p:cNvGrpSpPr/>
+        <p:nvPr/>
+      </p:nvGrpSpPr>
+      <p:grpSpPr>
+        <a:xfrm>
+          <a:off x="0" y="0"/>
+          <a:ext cx="0" cy="0"/>
+          <a:chOff x="0" y="0"/>
+          <a:chExt cx="0" cy="0"/>
+        </a:xfrm>
+      </p:grpSpPr>
+      <p:sp>
+        <p:nvSpPr>
+          <p:cNvPr id="4" name="Foliennummernplatzhalter 3"/>
+          <p:cNvSpPr>
+            <a:spLocks noGrp="1"/>
+          </p:cNvSpPr>
+          <p:nvPr>
+            <p:ph type="sldNum" sz="quarter" idx="12"/>
+          </p:nvPr>
+        </p:nvSpPr>
+        <p:spPr/>
+        <p:txBody>
+          <a:bodyPr/>
+          <a:lstStyle/>
+          <a:p>
+            <a:fld id="{C9E0B00B-E6DF-4183-A694-3DE28BEFB357}" type="slidenum">
+              <a:rPr lang="en-US" smtClean="0"/>
+              <a:t>36</a:t>
+            </a:fld>
+            <a:endParaRPr lang="en-US"/>
+          </a:p>
+        </p:txBody>
+      </p:sp>
+      <p:sp>
+        <p:nvSpPr>
+          <p:cNvPr id="12" name="Titel 1">
+            <a:extLst>
+              <a:ext uri="{FF2B5EF4-FFF2-40B4-BE49-F238E27FC236}">
+                <a16:creationId xmlns:a16="http://schemas.microsoft.com/office/drawing/2014/main" id="{478EA67A-3C39-4D0A-996A-C363F30A14B2}"/>
+              </a:ext>
+            </a:extLst>
+          </p:cNvPr>
+          <p:cNvSpPr>
+            <a:spLocks noGrp="1"/>
+          </p:cNvSpPr>
+          <p:nvPr>
+            <p:ph type="title"/>
+          </p:nvPr>
+        </p:nvSpPr>
+        <p:spPr>
+          <a:xfrm>
+            <a:off x="1066800" y="561524"/>
+            <a:ext cx="10287000" cy="1129164"/>
+          </a:xfrm>
+        </p:spPr>
+        <p:txBody>
+          <a:bodyPr/>
+          <a:lstStyle/>
+          <a:p>
+            <a:r>
+              <a:rPr lang="en-US"/>
+              <a:t>Static Feature Extraction  </a:t>
+            </a:r>
+            <a:r>
+              <a:rPr lang="en-US" b="1"/>
+              <a:t>Features</a:t>
+            </a:r>
+          </a:p>
+        </p:txBody>
+      </p:sp>
+      <p:sp>
+        <p:nvSpPr>
+          <p:cNvPr id="9" name="Rectangle 8">
+            <a:extLst>
+              <a:ext uri="{FF2B5EF4-FFF2-40B4-BE49-F238E27FC236}">
+                <a16:creationId xmlns:a16="http://schemas.microsoft.com/office/drawing/2014/main" id="{2EC660B0-2AF0-406A-AF24-9D3AD89EB773}"/>
+              </a:ext>
+            </a:extLst>
+          </p:cNvPr>
+          <p:cNvSpPr/>
+          <p:nvPr/>
+        </p:nvSpPr>
+        <p:spPr>
+          <a:xfrm>
+            <a:off x="3228976" y="1992993"/>
+            <a:ext cx="8153400" cy="2872013"/>
+          </a:xfrm>
+          <a:prstGeom prst="rect">
+            <a:avLst/>
+          </a:prstGeom>
+          <a:solidFill>
+            <a:schemeClr val="bg2"/>
+          </a:solidFill>
+          <a:ln w="19050">
+            <a:solidFill>
+              <a:schemeClr val="bg2"/>
+            </a:solidFill>
+          </a:ln>
+        </p:spPr>
+        <p:style>
+          <a:lnRef idx="2">
+            <a:schemeClr val="dk1"/>
+          </a:lnRef>
+          <a:fillRef idx="1">
+            <a:schemeClr val="lt1"/>
+          </a:fillRef>
+          <a:effectRef idx="0">
+            <a:schemeClr val="dk1"/>
+          </a:effectRef>
+          <a:fontRef idx="minor">
+            <a:schemeClr val="dk1"/>
+          </a:fontRef>
+        </p:style>
+        <p:txBody>
+          <a:bodyPr rtlCol="0" anchor="ctr"/>
+          <a:lstStyle/>
+          <a:p>
+            <a:r>
+              <a:rPr lang="de-DE" sz="4000" b="1">
+                <a:solidFill>
+                  <a:schemeClr val="tx1"/>
+                </a:solidFill>
+              </a:rPr>
+              <a:t>Demo 6: Static Feature Extraction</a:t>
+            </a:r>
+            <a:endParaRPr lang="en-US" sz="4000" b="1">
+              <a:solidFill>
+                <a:schemeClr val="tx1"/>
+              </a:solidFill>
+            </a:endParaRPr>
+          </a:p>
+        </p:txBody>
+      </p:sp>
+      <p:pic>
+        <p:nvPicPr>
+          <p:cNvPr id="10" name="Graphic 9" descr="Play with solid fill">
+            <a:extLst>
+              <a:ext uri="{FF2B5EF4-FFF2-40B4-BE49-F238E27FC236}">
+                <a16:creationId xmlns:a16="http://schemas.microsoft.com/office/drawing/2014/main" id="{9F627A46-A235-45BB-A8A2-E29404D79B82}"/>
+              </a:ext>
+            </a:extLst>
+          </p:cNvPr>
+          <p:cNvPicPr>
+            <a:picLocks noChangeAspect="1"/>
+          </p:cNvPicPr>
+          <p:nvPr/>
+        </p:nvPicPr>
+        <p:blipFill>
+          <a:blip r:embed="rId3">
+            <a:extLst>
+              <a:ext uri="{28A0092B-C50C-407E-A947-70E740481C1C}">
+                <a14:useLocalDpi xmlns:a14="http://schemas.microsoft.com/office/drawing/2010/main" val="0"/>
+              </a:ext>
+              <a:ext uri="{96DAC541-7B7A-43D3-8B79-37D633B846F1}">
+                <asvg:svgBlip xmlns:asvg="http://schemas.microsoft.com/office/drawing/2016/SVG/main" r:embed="rId4"/>
+              </a:ext>
+            </a:extLst>
+          </a:blip>
+          <a:stretch>
+            <a:fillRect/>
+          </a:stretch>
+        </p:blipFill>
+        <p:spPr>
+          <a:xfrm>
+            <a:off x="923914" y="2276468"/>
+            <a:ext cx="2305062" cy="2305062"/>
+          </a:xfrm>
+          <a:prstGeom prst="rect">
+            <a:avLst/>
+          </a:prstGeom>
+        </p:spPr>
+      </p:pic>
+    </p:spTree>
+    <p:extLst>
+      <p:ext uri="{BB962C8B-B14F-4D97-AF65-F5344CB8AC3E}">
+        <p14:creationId xmlns:p14="http://schemas.microsoft.com/office/powerpoint/2010/main" val="3097330451"/>
+      </p:ext>
+    </p:extLst>
+  </p:cSld>
+  <p:clrMapOvr>
+    <a:masterClrMapping/>
+  </p:clrMapOvr>
+</p:sld>
+</file>
+
+<file path=ppt/slides/slide37.xml><?xml version="1.0" encoding="utf-8"?>
+<p:sld xmlns:a="http://schemas.openxmlformats.org/drawingml/2006/main" xmlns:r="http://schemas.openxmlformats.org/officeDocument/2006/relationships" xmlns:p="http://schemas.openxmlformats.org/presentationml/2006/main">
+  <p:cSld>
+    <p:spTree>
+      <p:nvGrpSpPr>
+        <p:cNvPr id="1" name=""/>
+        <p:cNvGrpSpPr/>
+        <p:nvPr/>
+      </p:nvGrpSpPr>
+      <p:grpSpPr>
+        <a:xfrm>
+          <a:off x="0" y="0"/>
+          <a:ext cx="0" cy="0"/>
+          <a:chOff x="0" y="0"/>
+          <a:chExt cx="0" cy="0"/>
+        </a:xfrm>
+      </p:grpSpPr>
+      <p:sp>
+        <p:nvSpPr>
+          <p:cNvPr id="4" name="Foliennummernplatzhalter 3"/>
+          <p:cNvSpPr>
+            <a:spLocks noGrp="1"/>
+          </p:cNvSpPr>
+          <p:nvPr>
+            <p:ph type="sldNum" sz="quarter" idx="12"/>
+          </p:nvPr>
+        </p:nvSpPr>
+        <p:spPr/>
+        <p:txBody>
+          <a:bodyPr/>
+          <a:lstStyle/>
+          <a:p>
+            <a:fld id="{C9E0B00B-E6DF-4183-A694-3DE28BEFB357}" type="slidenum">
+              <a:rPr lang="en-US" smtClean="0"/>
+              <a:t>37</a:t>
             </a:fld>
             <a:endParaRPr lang="en-US"/>
           </a:p>
@@ -15165,64 +17859,6 @@
           </a:prstGeom>
         </p:spPr>
       </p:pic>
-      <p:sp>
-        <p:nvSpPr>
-          <p:cNvPr id="8" name="Rectangle 7">
-            <a:extLst>
-              <a:ext uri="{FF2B5EF4-FFF2-40B4-BE49-F238E27FC236}">
-                <a16:creationId xmlns:a16="http://schemas.microsoft.com/office/drawing/2014/main" id="{E60687D1-1FAD-4D3F-B598-CA2DD768872B}"/>
-              </a:ext>
-            </a:extLst>
-          </p:cNvPr>
-          <p:cNvSpPr/>
-          <p:nvPr/>
-        </p:nvSpPr>
-        <p:spPr>
-          <a:xfrm>
-            <a:off x="4827104" y="0"/>
-            <a:ext cx="7364896" cy="914400"/>
-          </a:xfrm>
-          <a:prstGeom prst="rect">
-            <a:avLst/>
-          </a:prstGeom>
-          <a:solidFill>
-            <a:schemeClr val="accent2"/>
-          </a:solidFill>
-          <a:ln>
-            <a:solidFill>
-              <a:schemeClr val="accent2"/>
-            </a:solidFill>
-          </a:ln>
-        </p:spPr>
-        <p:style>
-          <a:lnRef idx="2">
-            <a:schemeClr val="accent1">
-              <a:shade val="50000"/>
-            </a:schemeClr>
-          </a:lnRef>
-          <a:fillRef idx="1">
-            <a:schemeClr val="accent1"/>
-          </a:fillRef>
-          <a:effectRef idx="0">
-            <a:schemeClr val="accent1"/>
-          </a:effectRef>
-          <a:fontRef idx="minor">
-            <a:schemeClr val="lt1"/>
-          </a:fontRef>
-        </p:style>
-        <p:txBody>
-          <a:bodyPr rtlCol="0" anchor="ctr"/>
-          <a:lstStyle/>
-          <a:p>
-            <a:pPr algn="ctr"/>
-            <a:r>
-              <a:rPr lang="de-DE"/>
-              <a:t>übung aufsetzen</a:t>
-            </a:r>
-            <a:endParaRPr lang="en-US"/>
-          </a:p>
-        </p:txBody>
-      </p:sp>
     </p:spTree>
     <p:extLst>
       <p:ext uri="{BB962C8B-B14F-4D97-AF65-F5344CB8AC3E}">
@@ -15236,7 +17872,7 @@
 </p:sld>
 </file>
 
-<file path=ppt/slides/slide33.xml><?xml version="1.0" encoding="utf-8"?>
+<file path=ppt/slides/slide38.xml><?xml version="1.0" encoding="utf-8"?>
 <p:sld xmlns:a="http://schemas.openxmlformats.org/drawingml/2006/main" xmlns:r="http://schemas.openxmlformats.org/officeDocument/2006/relationships" xmlns:p="http://schemas.openxmlformats.org/presentationml/2006/main">
   <p:cSld>
     <p:spTree>
@@ -15358,7 +17994,7 @@
           <a:p>
             <a:fld id="{C9E0B00B-E6DF-4183-A694-3DE28BEFB357}" type="slidenum">
               <a:rPr lang="en-US" smtClean="0"/>
-              <a:t>33</a:t>
+              <a:t>38</a:t>
             </a:fld>
             <a:endParaRPr lang="en-US"/>
           </a:p>
@@ -15377,7 +18013,7 @@
 </p:sld>
 </file>
 
-<file path=ppt/slides/slide34.xml><?xml version="1.0" encoding="utf-8"?>
+<file path=ppt/slides/slide39.xml><?xml version="1.0" encoding="utf-8"?>
 <p:sld xmlns:a="http://schemas.openxmlformats.org/drawingml/2006/main" xmlns:r="http://schemas.openxmlformats.org/officeDocument/2006/relationships" xmlns:p="http://schemas.openxmlformats.org/presentationml/2006/main">
   <p:cSld>
     <p:spTree>
@@ -15443,7 +18079,7 @@
           <a:p>
             <a:fld id="{C9E0B00B-E6DF-4183-A694-3DE28BEFB357}" type="slidenum">
               <a:rPr lang="en-US" smtClean="0"/>
-              <a:t>34</a:t>
+              <a:t>39</a:t>
             </a:fld>
             <a:endParaRPr lang="en-US"/>
           </a:p>

</xml_diff>